<commit_message>
Update Python trainees part 3
</commit_message>
<xml_diff>
--- a/python_trainees/3_pandas_plotting/python_traineeship_3.pptx
+++ b/python_trainees/3_pandas_plotting/python_traineeship_3.pptx
@@ -4,6 +4,9 @@
   <p:sldMasterIdLst>
     <p:sldMasterId id="2147483648" r:id="rId1"/>
   </p:sldMasterIdLst>
+  <p:notesMasterIdLst>
+    <p:notesMasterId r:id="rId27"/>
+  </p:notesMasterIdLst>
   <p:sldIdLst>
     <p:sldId id="334" r:id="rId2"/>
     <p:sldId id="257" r:id="rId3"/>
@@ -15,20 +18,21 @@
     <p:sldId id="331" r:id="rId9"/>
     <p:sldId id="332" r:id="rId10"/>
     <p:sldId id="333" r:id="rId11"/>
-    <p:sldId id="335" r:id="rId12"/>
-    <p:sldId id="272" r:id="rId13"/>
-    <p:sldId id="336" r:id="rId14"/>
-    <p:sldId id="337" r:id="rId15"/>
-    <p:sldId id="338" r:id="rId16"/>
-    <p:sldId id="341" r:id="rId17"/>
-    <p:sldId id="342" r:id="rId18"/>
-    <p:sldId id="346" r:id="rId19"/>
-    <p:sldId id="344" r:id="rId20"/>
-    <p:sldId id="348" r:id="rId21"/>
-    <p:sldId id="347" r:id="rId22"/>
-    <p:sldId id="343" r:id="rId23"/>
-    <p:sldId id="339" r:id="rId24"/>
-    <p:sldId id="340" r:id="rId25"/>
+    <p:sldId id="282" r:id="rId12"/>
+    <p:sldId id="335" r:id="rId13"/>
+    <p:sldId id="272" r:id="rId14"/>
+    <p:sldId id="336" r:id="rId15"/>
+    <p:sldId id="337" r:id="rId16"/>
+    <p:sldId id="338" r:id="rId17"/>
+    <p:sldId id="341" r:id="rId18"/>
+    <p:sldId id="342" r:id="rId19"/>
+    <p:sldId id="346" r:id="rId20"/>
+    <p:sldId id="344" r:id="rId21"/>
+    <p:sldId id="348" r:id="rId22"/>
+    <p:sldId id="347" r:id="rId23"/>
+    <p:sldId id="343" r:id="rId24"/>
+    <p:sldId id="339" r:id="rId25"/>
+    <p:sldId id="340" r:id="rId26"/>
   </p:sldIdLst>
   <p:sldSz cx="12192000" cy="6858000"/>
   <p:notesSz cx="6858000" cy="9144000"/>
@@ -147,6 +151,440 @@
 </p:cmAuthorLst>
 </file>
 
+<file path=ppt/notesMasters/notesMaster1.xml><?xml version="1.0" encoding="utf-8"?>
+<p:notesMaster xmlns:a="http://schemas.openxmlformats.org/drawingml/2006/main" xmlns:r="http://schemas.openxmlformats.org/officeDocument/2006/relationships" xmlns:p="http://schemas.openxmlformats.org/presentationml/2006/main">
+  <p:cSld>
+    <p:bg>
+      <p:bgRef idx="1001">
+        <a:schemeClr val="bg1"/>
+      </p:bgRef>
+    </p:bg>
+    <p:spTree>
+      <p:nvGrpSpPr>
+        <p:cNvPr id="1" name=""/>
+        <p:cNvGrpSpPr/>
+        <p:nvPr/>
+      </p:nvGrpSpPr>
+      <p:grpSpPr>
+        <a:xfrm>
+          <a:off x="0" y="0"/>
+          <a:ext cx="0" cy="0"/>
+          <a:chOff x="0" y="0"/>
+          <a:chExt cx="0" cy="0"/>
+        </a:xfrm>
+      </p:grpSpPr>
+      <p:sp>
+        <p:nvSpPr>
+          <p:cNvPr id="2" name="Header Placeholder 1"/>
+          <p:cNvSpPr>
+            <a:spLocks noGrp="1"/>
+          </p:cNvSpPr>
+          <p:nvPr>
+            <p:ph type="hdr" sz="quarter"/>
+          </p:nvPr>
+        </p:nvSpPr>
+        <p:spPr>
+          <a:xfrm>
+            <a:off x="0" y="0"/>
+            <a:ext cx="2971800" cy="458788"/>
+          </a:xfrm>
+          <a:prstGeom prst="rect">
+            <a:avLst/>
+          </a:prstGeom>
+        </p:spPr>
+        <p:txBody>
+          <a:bodyPr vert="horz" lIns="91440" tIns="45720" rIns="91440" bIns="45720" rtlCol="0"/>
+          <a:lstStyle>
+            <a:lvl1pPr algn="l">
+              <a:defRPr sz="1200"/>
+            </a:lvl1pPr>
+          </a:lstStyle>
+          <a:p>
+            <a:endParaRPr lang="en-NL"/>
+          </a:p>
+        </p:txBody>
+      </p:sp>
+      <p:sp>
+        <p:nvSpPr>
+          <p:cNvPr id="3" name="Date Placeholder 2"/>
+          <p:cNvSpPr>
+            <a:spLocks noGrp="1"/>
+          </p:cNvSpPr>
+          <p:nvPr>
+            <p:ph type="dt" idx="1"/>
+          </p:nvPr>
+        </p:nvSpPr>
+        <p:spPr>
+          <a:xfrm>
+            <a:off x="3884613" y="0"/>
+            <a:ext cx="2971800" cy="458788"/>
+          </a:xfrm>
+          <a:prstGeom prst="rect">
+            <a:avLst/>
+          </a:prstGeom>
+        </p:spPr>
+        <p:txBody>
+          <a:bodyPr vert="horz" lIns="91440" tIns="45720" rIns="91440" bIns="45720" rtlCol="0"/>
+          <a:lstStyle>
+            <a:lvl1pPr algn="r">
+              <a:defRPr sz="1200"/>
+            </a:lvl1pPr>
+          </a:lstStyle>
+          <a:p>
+            <a:fld id="{16CF57F2-0494-4F4F-A7AD-E8F59CFB368A}" type="datetimeFigureOut">
+              <a:rPr lang="en-NL" smtClean="0"/>
+              <a:t>06/03/2023</a:t>
+            </a:fld>
+            <a:endParaRPr lang="en-NL"/>
+          </a:p>
+        </p:txBody>
+      </p:sp>
+      <p:sp>
+        <p:nvSpPr>
+          <p:cNvPr id="4" name="Slide Image Placeholder 3"/>
+          <p:cNvSpPr>
+            <a:spLocks noGrp="1" noRot="1" noChangeAspect="1"/>
+          </p:cNvSpPr>
+          <p:nvPr>
+            <p:ph type="sldImg" idx="2"/>
+          </p:nvPr>
+        </p:nvSpPr>
+        <p:spPr>
+          <a:xfrm>
+            <a:off x="685800" y="1143000"/>
+            <a:ext cx="5486400" cy="3086100"/>
+          </a:xfrm>
+          <a:prstGeom prst="rect">
+            <a:avLst/>
+          </a:prstGeom>
+          <a:noFill/>
+          <a:ln w="12700">
+            <a:solidFill>
+              <a:prstClr val="black"/>
+            </a:solidFill>
+          </a:ln>
+        </p:spPr>
+        <p:txBody>
+          <a:bodyPr vert="horz" lIns="91440" tIns="45720" rIns="91440" bIns="45720" rtlCol="0" anchor="ctr"/>
+          <a:lstStyle/>
+          <a:p>
+            <a:endParaRPr lang="en-NL"/>
+          </a:p>
+        </p:txBody>
+      </p:sp>
+      <p:sp>
+        <p:nvSpPr>
+          <p:cNvPr id="5" name="Notes Placeholder 4"/>
+          <p:cNvSpPr>
+            <a:spLocks noGrp="1"/>
+          </p:cNvSpPr>
+          <p:nvPr>
+            <p:ph type="body" sz="quarter" idx="3"/>
+          </p:nvPr>
+        </p:nvSpPr>
+        <p:spPr>
+          <a:xfrm>
+            <a:off x="685800" y="4400550"/>
+            <a:ext cx="5486400" cy="3600450"/>
+          </a:xfrm>
+          <a:prstGeom prst="rect">
+            <a:avLst/>
+          </a:prstGeom>
+        </p:spPr>
+        <p:txBody>
+          <a:bodyPr vert="horz" lIns="91440" tIns="45720" rIns="91440" bIns="45720" rtlCol="0"/>
+          <a:lstStyle/>
+          <a:p>
+            <a:pPr lvl="0"/>
+            <a:r>
+              <a:rPr lang="en-US"/>
+              <a:t>Click to edit Master text styles</a:t>
+            </a:r>
+          </a:p>
+          <a:p>
+            <a:pPr lvl="1"/>
+            <a:r>
+              <a:rPr lang="en-US"/>
+              <a:t>Second level</a:t>
+            </a:r>
+          </a:p>
+          <a:p>
+            <a:pPr lvl="2"/>
+            <a:r>
+              <a:rPr lang="en-US"/>
+              <a:t>Third level</a:t>
+            </a:r>
+          </a:p>
+          <a:p>
+            <a:pPr lvl="3"/>
+            <a:r>
+              <a:rPr lang="en-US"/>
+              <a:t>Fourth level</a:t>
+            </a:r>
+          </a:p>
+          <a:p>
+            <a:pPr lvl="4"/>
+            <a:r>
+              <a:rPr lang="en-US"/>
+              <a:t>Fifth level</a:t>
+            </a:r>
+            <a:endParaRPr lang="en-NL"/>
+          </a:p>
+        </p:txBody>
+      </p:sp>
+      <p:sp>
+        <p:nvSpPr>
+          <p:cNvPr id="6" name="Footer Placeholder 5"/>
+          <p:cNvSpPr>
+            <a:spLocks noGrp="1"/>
+          </p:cNvSpPr>
+          <p:nvPr>
+            <p:ph type="ftr" sz="quarter" idx="4"/>
+          </p:nvPr>
+        </p:nvSpPr>
+        <p:spPr>
+          <a:xfrm>
+            <a:off x="0" y="8685213"/>
+            <a:ext cx="2971800" cy="458787"/>
+          </a:xfrm>
+          <a:prstGeom prst="rect">
+            <a:avLst/>
+          </a:prstGeom>
+        </p:spPr>
+        <p:txBody>
+          <a:bodyPr vert="horz" lIns="91440" tIns="45720" rIns="91440" bIns="45720" rtlCol="0" anchor="b"/>
+          <a:lstStyle>
+            <a:lvl1pPr algn="l">
+              <a:defRPr sz="1200"/>
+            </a:lvl1pPr>
+          </a:lstStyle>
+          <a:p>
+            <a:endParaRPr lang="en-NL"/>
+          </a:p>
+        </p:txBody>
+      </p:sp>
+      <p:sp>
+        <p:nvSpPr>
+          <p:cNvPr id="7" name="Slide Number Placeholder 6"/>
+          <p:cNvSpPr>
+            <a:spLocks noGrp="1"/>
+          </p:cNvSpPr>
+          <p:nvPr>
+            <p:ph type="sldNum" sz="quarter" idx="5"/>
+          </p:nvPr>
+        </p:nvSpPr>
+        <p:spPr>
+          <a:xfrm>
+            <a:off x="3884613" y="8685213"/>
+            <a:ext cx="2971800" cy="458787"/>
+          </a:xfrm>
+          <a:prstGeom prst="rect">
+            <a:avLst/>
+          </a:prstGeom>
+        </p:spPr>
+        <p:txBody>
+          <a:bodyPr vert="horz" lIns="91440" tIns="45720" rIns="91440" bIns="45720" rtlCol="0" anchor="b"/>
+          <a:lstStyle>
+            <a:lvl1pPr algn="r">
+              <a:defRPr sz="1200"/>
+            </a:lvl1pPr>
+          </a:lstStyle>
+          <a:p>
+            <a:fld id="{90BA3769-E08E-4B35-9D6F-66127FF5678C}" type="slidenum">
+              <a:rPr lang="en-NL" smtClean="0"/>
+              <a:t>‹#›</a:t>
+            </a:fld>
+            <a:endParaRPr lang="en-NL"/>
+          </a:p>
+        </p:txBody>
+      </p:sp>
+    </p:spTree>
+    <p:extLst>
+      <p:ext uri="{BB962C8B-B14F-4D97-AF65-F5344CB8AC3E}">
+        <p14:creationId xmlns:p14="http://schemas.microsoft.com/office/powerpoint/2010/main" val="3836483099"/>
+      </p:ext>
+    </p:extLst>
+  </p:cSld>
+  <p:clrMap bg1="lt1" tx1="dk1" bg2="lt2" tx2="dk2" accent1="accent1" accent2="accent2" accent3="accent3" accent4="accent4" accent5="accent5" accent6="accent6" hlink="hlink" folHlink="folHlink"/>
+  <p:notesStyle>
+    <a:lvl1pPr marL="0" algn="l" defTabSz="914400" rtl="0" eaLnBrk="1" latinLnBrk="0" hangingPunct="1">
+      <a:defRPr sz="1200" kern="1200">
+        <a:solidFill>
+          <a:schemeClr val="tx1"/>
+        </a:solidFill>
+        <a:latin typeface="+mn-lt"/>
+        <a:ea typeface="+mn-ea"/>
+        <a:cs typeface="+mn-cs"/>
+      </a:defRPr>
+    </a:lvl1pPr>
+    <a:lvl2pPr marL="457200" algn="l" defTabSz="914400" rtl="0" eaLnBrk="1" latinLnBrk="0" hangingPunct="1">
+      <a:defRPr sz="1200" kern="1200">
+        <a:solidFill>
+          <a:schemeClr val="tx1"/>
+        </a:solidFill>
+        <a:latin typeface="+mn-lt"/>
+        <a:ea typeface="+mn-ea"/>
+        <a:cs typeface="+mn-cs"/>
+      </a:defRPr>
+    </a:lvl2pPr>
+    <a:lvl3pPr marL="914400" algn="l" defTabSz="914400" rtl="0" eaLnBrk="1" latinLnBrk="0" hangingPunct="1">
+      <a:defRPr sz="1200" kern="1200">
+        <a:solidFill>
+          <a:schemeClr val="tx1"/>
+        </a:solidFill>
+        <a:latin typeface="+mn-lt"/>
+        <a:ea typeface="+mn-ea"/>
+        <a:cs typeface="+mn-cs"/>
+      </a:defRPr>
+    </a:lvl3pPr>
+    <a:lvl4pPr marL="1371600" algn="l" defTabSz="914400" rtl="0" eaLnBrk="1" latinLnBrk="0" hangingPunct="1">
+      <a:defRPr sz="1200" kern="1200">
+        <a:solidFill>
+          <a:schemeClr val="tx1"/>
+        </a:solidFill>
+        <a:latin typeface="+mn-lt"/>
+        <a:ea typeface="+mn-ea"/>
+        <a:cs typeface="+mn-cs"/>
+      </a:defRPr>
+    </a:lvl4pPr>
+    <a:lvl5pPr marL="1828800" algn="l" defTabSz="914400" rtl="0" eaLnBrk="1" latinLnBrk="0" hangingPunct="1">
+      <a:defRPr sz="1200" kern="1200">
+        <a:solidFill>
+          <a:schemeClr val="tx1"/>
+        </a:solidFill>
+        <a:latin typeface="+mn-lt"/>
+        <a:ea typeface="+mn-ea"/>
+        <a:cs typeface="+mn-cs"/>
+      </a:defRPr>
+    </a:lvl5pPr>
+    <a:lvl6pPr marL="2286000" algn="l" defTabSz="914400" rtl="0" eaLnBrk="1" latinLnBrk="0" hangingPunct="1">
+      <a:defRPr sz="1200" kern="1200">
+        <a:solidFill>
+          <a:schemeClr val="tx1"/>
+        </a:solidFill>
+        <a:latin typeface="+mn-lt"/>
+        <a:ea typeface="+mn-ea"/>
+        <a:cs typeface="+mn-cs"/>
+      </a:defRPr>
+    </a:lvl6pPr>
+    <a:lvl7pPr marL="2743200" algn="l" defTabSz="914400" rtl="0" eaLnBrk="1" latinLnBrk="0" hangingPunct="1">
+      <a:defRPr sz="1200" kern="1200">
+        <a:solidFill>
+          <a:schemeClr val="tx1"/>
+        </a:solidFill>
+        <a:latin typeface="+mn-lt"/>
+        <a:ea typeface="+mn-ea"/>
+        <a:cs typeface="+mn-cs"/>
+      </a:defRPr>
+    </a:lvl7pPr>
+    <a:lvl8pPr marL="3200400" algn="l" defTabSz="914400" rtl="0" eaLnBrk="1" latinLnBrk="0" hangingPunct="1">
+      <a:defRPr sz="1200" kern="1200">
+        <a:solidFill>
+          <a:schemeClr val="tx1"/>
+        </a:solidFill>
+        <a:latin typeface="+mn-lt"/>
+        <a:ea typeface="+mn-ea"/>
+        <a:cs typeface="+mn-cs"/>
+      </a:defRPr>
+    </a:lvl8pPr>
+    <a:lvl9pPr marL="3657600" algn="l" defTabSz="914400" rtl="0" eaLnBrk="1" latinLnBrk="0" hangingPunct="1">
+      <a:defRPr sz="1200" kern="1200">
+        <a:solidFill>
+          <a:schemeClr val="tx1"/>
+        </a:solidFill>
+        <a:latin typeface="+mn-lt"/>
+        <a:ea typeface="+mn-ea"/>
+        <a:cs typeface="+mn-cs"/>
+      </a:defRPr>
+    </a:lvl9pPr>
+  </p:notesStyle>
+</p:notesMaster>
+</file>
+
+<file path=ppt/notesSlides/notesSlide1.xml><?xml version="1.0" encoding="utf-8"?>
+<p:notes xmlns:a="http://schemas.openxmlformats.org/drawingml/2006/main" xmlns:r="http://schemas.openxmlformats.org/officeDocument/2006/relationships" xmlns:p="http://schemas.openxmlformats.org/presentationml/2006/main">
+  <p:cSld>
+    <p:spTree>
+      <p:nvGrpSpPr>
+        <p:cNvPr id="1" name=""/>
+        <p:cNvGrpSpPr/>
+        <p:nvPr/>
+      </p:nvGrpSpPr>
+      <p:grpSpPr>
+        <a:xfrm>
+          <a:off x="0" y="0"/>
+          <a:ext cx="0" cy="0"/>
+          <a:chOff x="0" y="0"/>
+          <a:chExt cx="0" cy="0"/>
+        </a:xfrm>
+      </p:grpSpPr>
+      <p:sp>
+        <p:nvSpPr>
+          <p:cNvPr id="2" name="Slide Image Placeholder 1"/>
+          <p:cNvSpPr>
+            <a:spLocks noGrp="1" noRot="1" noChangeAspect="1"/>
+          </p:cNvSpPr>
+          <p:nvPr>
+            <p:ph type="sldImg"/>
+          </p:nvPr>
+        </p:nvSpPr>
+        <p:spPr/>
+      </p:sp>
+      <p:sp>
+        <p:nvSpPr>
+          <p:cNvPr id="3" name="Notes Placeholder 2"/>
+          <p:cNvSpPr>
+            <a:spLocks noGrp="1"/>
+          </p:cNvSpPr>
+          <p:nvPr>
+            <p:ph type="body" idx="1"/>
+          </p:nvPr>
+        </p:nvSpPr>
+        <p:spPr/>
+        <p:txBody>
+          <a:bodyPr/>
+          <a:lstStyle/>
+          <a:p>
+            <a:endParaRPr lang="en-NL" dirty="0"/>
+          </a:p>
+        </p:txBody>
+      </p:sp>
+      <p:sp>
+        <p:nvSpPr>
+          <p:cNvPr id="4" name="Slide Number Placeholder 3"/>
+          <p:cNvSpPr>
+            <a:spLocks noGrp="1"/>
+          </p:cNvSpPr>
+          <p:nvPr>
+            <p:ph type="sldNum" sz="quarter" idx="5"/>
+          </p:nvPr>
+        </p:nvSpPr>
+        <p:spPr/>
+        <p:txBody>
+          <a:bodyPr/>
+          <a:lstStyle/>
+          <a:p>
+            <a:fld id="{F847AAA1-0A2D-4E17-BD7E-ECD1F2F24FF1}" type="slidenum">
+              <a:rPr lang="en-NL" smtClean="0"/>
+              <a:t>11</a:t>
+            </a:fld>
+            <a:endParaRPr lang="en-NL"/>
+          </a:p>
+        </p:txBody>
+      </p:sp>
+    </p:spTree>
+    <p:extLst>
+      <p:ext uri="{BB962C8B-B14F-4D97-AF65-F5344CB8AC3E}">
+        <p14:creationId xmlns:p14="http://schemas.microsoft.com/office/powerpoint/2010/main" val="3730380786"/>
+      </p:ext>
+    </p:extLst>
+  </p:cSld>
+  <p:clrMapOvr>
+    <a:masterClrMapping/>
+  </p:clrMapOvr>
+</p:notes>
+</file>
+
 <file path=ppt/slideLayouts/slideLayout1.xml><?xml version="1.0" encoding="utf-8"?>
 <p:sldLayout xmlns:a="http://schemas.openxmlformats.org/drawingml/2006/main" xmlns:r="http://schemas.openxmlformats.org/officeDocument/2006/relationships" xmlns:p="http://schemas.openxmlformats.org/presentationml/2006/main" type="title" preserve="1">
   <p:cSld name="Title Slide">
@@ -296,7 +734,7 @@
           <a:p>
             <a:fld id="{0EBB069A-003F-4FC0-8534-236B0C5C7B5F}" type="datetimeFigureOut">
               <a:rPr lang="en-NL" smtClean="0"/>
-              <a:t>01/03/2023</a:t>
+              <a:t>06/03/2023</a:t>
             </a:fld>
             <a:endParaRPr lang="en-NL"/>
           </a:p>
@@ -496,7 +934,7 @@
           <a:p>
             <a:fld id="{0EBB069A-003F-4FC0-8534-236B0C5C7B5F}" type="datetimeFigureOut">
               <a:rPr lang="en-NL" smtClean="0"/>
-              <a:t>01/03/2023</a:t>
+              <a:t>06/03/2023</a:t>
             </a:fld>
             <a:endParaRPr lang="en-NL"/>
           </a:p>
@@ -706,7 +1144,7 @@
           <a:p>
             <a:fld id="{0EBB069A-003F-4FC0-8534-236B0C5C7B5F}" type="datetimeFigureOut">
               <a:rPr lang="en-NL" smtClean="0"/>
-              <a:t>01/03/2023</a:t>
+              <a:t>06/03/2023</a:t>
             </a:fld>
             <a:endParaRPr lang="en-NL"/>
           </a:p>
@@ -906,7 +1344,7 @@
           <a:p>
             <a:fld id="{0EBB069A-003F-4FC0-8534-236B0C5C7B5F}" type="datetimeFigureOut">
               <a:rPr lang="en-NL" smtClean="0"/>
-              <a:t>01/03/2023</a:t>
+              <a:t>06/03/2023</a:t>
             </a:fld>
             <a:endParaRPr lang="en-NL"/>
           </a:p>
@@ -1182,7 +1620,7 @@
           <a:p>
             <a:fld id="{0EBB069A-003F-4FC0-8534-236B0C5C7B5F}" type="datetimeFigureOut">
               <a:rPr lang="en-NL" smtClean="0"/>
-              <a:t>01/03/2023</a:t>
+              <a:t>06/03/2023</a:t>
             </a:fld>
             <a:endParaRPr lang="en-NL"/>
           </a:p>
@@ -1450,7 +1888,7 @@
           <a:p>
             <a:fld id="{0EBB069A-003F-4FC0-8534-236B0C5C7B5F}" type="datetimeFigureOut">
               <a:rPr lang="en-NL" smtClean="0"/>
-              <a:t>01/03/2023</a:t>
+              <a:t>06/03/2023</a:t>
             </a:fld>
             <a:endParaRPr lang="en-NL"/>
           </a:p>
@@ -1865,7 +2303,7 @@
           <a:p>
             <a:fld id="{0EBB069A-003F-4FC0-8534-236B0C5C7B5F}" type="datetimeFigureOut">
               <a:rPr lang="en-NL" smtClean="0"/>
-              <a:t>01/03/2023</a:t>
+              <a:t>06/03/2023</a:t>
             </a:fld>
             <a:endParaRPr lang="en-NL"/>
           </a:p>
@@ -2007,7 +2445,7 @@
           <a:p>
             <a:fld id="{0EBB069A-003F-4FC0-8534-236B0C5C7B5F}" type="datetimeFigureOut">
               <a:rPr lang="en-NL" smtClean="0"/>
-              <a:t>01/03/2023</a:t>
+              <a:t>06/03/2023</a:t>
             </a:fld>
             <a:endParaRPr lang="en-NL"/>
           </a:p>
@@ -2120,7 +2558,7 @@
           <a:p>
             <a:fld id="{0EBB069A-003F-4FC0-8534-236B0C5C7B5F}" type="datetimeFigureOut">
               <a:rPr lang="en-NL" smtClean="0"/>
-              <a:t>01/03/2023</a:t>
+              <a:t>06/03/2023</a:t>
             </a:fld>
             <a:endParaRPr lang="en-NL"/>
           </a:p>
@@ -2433,7 +2871,7 @@
           <a:p>
             <a:fld id="{0EBB069A-003F-4FC0-8534-236B0C5C7B5F}" type="datetimeFigureOut">
               <a:rPr lang="en-NL" smtClean="0"/>
-              <a:t>01/03/2023</a:t>
+              <a:t>06/03/2023</a:t>
             </a:fld>
             <a:endParaRPr lang="en-NL"/>
           </a:p>
@@ -2722,7 +3160,7 @@
           <a:p>
             <a:fld id="{0EBB069A-003F-4FC0-8534-236B0C5C7B5F}" type="datetimeFigureOut">
               <a:rPr lang="en-NL" smtClean="0"/>
-              <a:t>01/03/2023</a:t>
+              <a:t>06/03/2023</a:t>
             </a:fld>
             <a:endParaRPr lang="en-NL"/>
           </a:p>
@@ -2965,7 +3403,7 @@
           <a:p>
             <a:fld id="{0EBB069A-003F-4FC0-8534-236B0C5C7B5F}" type="datetimeFigureOut">
               <a:rPr lang="en-NL" smtClean="0"/>
-              <a:t>01/03/2023</a:t>
+              <a:t>06/03/2023</a:t>
             </a:fld>
             <a:endParaRPr lang="en-NL"/>
           </a:p>
@@ -4419,6 +4857,2414 @@
       </p:grpSpPr>
       <p:sp>
         <p:nvSpPr>
+          <p:cNvPr id="2" name="Title 1">
+            <a:extLst>
+              <a:ext uri="{FF2B5EF4-FFF2-40B4-BE49-F238E27FC236}">
+                <a16:creationId xmlns:a16="http://schemas.microsoft.com/office/drawing/2014/main" id="{9BDFD261-0D2C-41B9-9E28-43DF575D40E0}"/>
+              </a:ext>
+            </a:extLst>
+          </p:cNvPr>
+          <p:cNvSpPr>
+            <a:spLocks noGrp="1"/>
+          </p:cNvSpPr>
+          <p:nvPr>
+            <p:ph type="title"/>
+          </p:nvPr>
+        </p:nvSpPr>
+        <p:spPr/>
+        <p:txBody>
+          <a:bodyPr>
+            <a:normAutofit/>
+          </a:bodyPr>
+          <a:lstStyle/>
+          <a:p>
+            <a:r>
+              <a:rPr lang="nl-NL" sz="3600" dirty="0" err="1"/>
+              <a:t>Merge</a:t>
+            </a:r>
+            <a:r>
+              <a:rPr lang="nl-NL" sz="3600" dirty="0"/>
+              <a:t> types</a:t>
+            </a:r>
+          </a:p>
+        </p:txBody>
+      </p:sp>
+      <p:graphicFrame>
+        <p:nvGraphicFramePr>
+          <p:cNvPr id="9" name="Table 9">
+            <a:extLst>
+              <a:ext uri="{FF2B5EF4-FFF2-40B4-BE49-F238E27FC236}">
+                <a16:creationId xmlns:a16="http://schemas.microsoft.com/office/drawing/2014/main" id="{087CED63-0024-496B-90EA-6179AA00022E}"/>
+              </a:ext>
+            </a:extLst>
+          </p:cNvPr>
+          <p:cNvGraphicFramePr>
+            <a:graphicFrameLocks noGrp="1"/>
+          </p:cNvGraphicFramePr>
+          <p:nvPr/>
+        </p:nvGraphicFramePr>
+        <p:xfrm>
+          <a:off x="838200" y="2200675"/>
+          <a:ext cx="870735" cy="1676400"/>
+        </p:xfrm>
+        <a:graphic>
+          <a:graphicData uri="http://schemas.openxmlformats.org/drawingml/2006/table">
+            <a:tbl>
+              <a:tblPr firstRow="1" bandRow="1">
+                <a:tableStyleId>{5C22544A-7EE6-4342-B048-85BDC9FD1C3A}</a:tableStyleId>
+              </a:tblPr>
+              <a:tblGrid>
+                <a:gridCol w="870735">
+                  <a:extLst>
+                    <a:ext uri="{9D8B030D-6E8A-4147-A177-3AD203B41FA5}">
+                      <a16:colId xmlns:a16="http://schemas.microsoft.com/office/drawing/2014/main" val="2491559972"/>
+                    </a:ext>
+                  </a:extLst>
+                </a:gridCol>
+              </a:tblGrid>
+              <a:tr h="302969">
+                <a:tc>
+                  <a:txBody>
+                    <a:bodyPr/>
+                    <a:lstStyle/>
+                    <a:p>
+                      <a:pPr algn="ctr"/>
+                      <a:r>
+                        <a:rPr lang="en-US" sz="1600" dirty="0"/>
+                        <a:t>LEFT</a:t>
+                      </a:r>
+                      <a:endParaRPr lang="en-NL" sz="1600" dirty="0"/>
+                    </a:p>
+                  </a:txBody>
+                  <a:tcPr/>
+                </a:tc>
+                <a:extLst>
+                  <a:ext uri="{0D108BD9-81ED-4DB2-BD59-A6C34878D82A}">
+                    <a16:rowId xmlns:a16="http://schemas.microsoft.com/office/drawing/2014/main" val="3546219780"/>
+                  </a:ext>
+                </a:extLst>
+              </a:tr>
+              <a:tr h="302969">
+                <a:tc>
+                  <a:txBody>
+                    <a:bodyPr/>
+                    <a:lstStyle/>
+                    <a:p>
+                      <a:pPr algn="ctr"/>
+                      <a:r>
+                        <a:rPr lang="en-US" sz="1600" dirty="0"/>
+                        <a:t>1</a:t>
+                      </a:r>
+                      <a:endParaRPr lang="en-NL" sz="1600" dirty="0"/>
+                    </a:p>
+                  </a:txBody>
+                  <a:tcPr/>
+                </a:tc>
+                <a:extLst>
+                  <a:ext uri="{0D108BD9-81ED-4DB2-BD59-A6C34878D82A}">
+                    <a16:rowId xmlns:a16="http://schemas.microsoft.com/office/drawing/2014/main" val="1999053236"/>
+                  </a:ext>
+                </a:extLst>
+              </a:tr>
+              <a:tr h="302969">
+                <a:tc>
+                  <a:txBody>
+                    <a:bodyPr/>
+                    <a:lstStyle/>
+                    <a:p>
+                      <a:pPr algn="ctr"/>
+                      <a:r>
+                        <a:rPr lang="en-US" sz="1600" dirty="0"/>
+                        <a:t>2</a:t>
+                      </a:r>
+                      <a:endParaRPr lang="en-NL" sz="1600" dirty="0"/>
+                    </a:p>
+                  </a:txBody>
+                  <a:tcPr/>
+                </a:tc>
+                <a:extLst>
+                  <a:ext uri="{0D108BD9-81ED-4DB2-BD59-A6C34878D82A}">
+                    <a16:rowId xmlns:a16="http://schemas.microsoft.com/office/drawing/2014/main" val="2764142827"/>
+                  </a:ext>
+                </a:extLst>
+              </a:tr>
+              <a:tr h="302969">
+                <a:tc>
+                  <a:txBody>
+                    <a:bodyPr/>
+                    <a:lstStyle/>
+                    <a:p>
+                      <a:pPr algn="ctr"/>
+                      <a:r>
+                        <a:rPr lang="en-US" sz="1600" dirty="0"/>
+                        <a:t>3</a:t>
+                      </a:r>
+                      <a:endParaRPr lang="en-NL" sz="1600" dirty="0"/>
+                    </a:p>
+                  </a:txBody>
+                  <a:tcPr/>
+                </a:tc>
+                <a:extLst>
+                  <a:ext uri="{0D108BD9-81ED-4DB2-BD59-A6C34878D82A}">
+                    <a16:rowId xmlns:a16="http://schemas.microsoft.com/office/drawing/2014/main" val="2895410762"/>
+                  </a:ext>
+                </a:extLst>
+              </a:tr>
+              <a:tr h="302969">
+                <a:tc>
+                  <a:txBody>
+                    <a:bodyPr/>
+                    <a:lstStyle/>
+                    <a:p>
+                      <a:pPr algn="ctr"/>
+                      <a:endParaRPr lang="en-NL" sz="1600" dirty="0"/>
+                    </a:p>
+                  </a:txBody>
+                  <a:tcPr>
+                    <a:noFill/>
+                  </a:tcPr>
+                </a:tc>
+                <a:extLst>
+                  <a:ext uri="{0D108BD9-81ED-4DB2-BD59-A6C34878D82A}">
+                    <a16:rowId xmlns:a16="http://schemas.microsoft.com/office/drawing/2014/main" val="220184898"/>
+                  </a:ext>
+                </a:extLst>
+              </a:tr>
+            </a:tbl>
+          </a:graphicData>
+        </a:graphic>
+      </p:graphicFrame>
+      <p:graphicFrame>
+        <p:nvGraphicFramePr>
+          <p:cNvPr id="10" name="Table 9">
+            <a:extLst>
+              <a:ext uri="{FF2B5EF4-FFF2-40B4-BE49-F238E27FC236}">
+                <a16:creationId xmlns:a16="http://schemas.microsoft.com/office/drawing/2014/main" id="{5E1CC806-C7B3-4E13-BAF8-383DF5F33601}"/>
+              </a:ext>
+            </a:extLst>
+          </p:cNvPr>
+          <p:cNvGraphicFramePr>
+            <a:graphicFrameLocks noGrp="1"/>
+          </p:cNvGraphicFramePr>
+          <p:nvPr/>
+        </p:nvGraphicFramePr>
+        <p:xfrm>
+          <a:off x="2610278" y="2200675"/>
+          <a:ext cx="870735" cy="1676400"/>
+        </p:xfrm>
+        <a:graphic>
+          <a:graphicData uri="http://schemas.openxmlformats.org/drawingml/2006/table">
+            <a:tbl>
+              <a:tblPr firstRow="1" bandRow="1">
+                <a:tableStyleId>{5C22544A-7EE6-4342-B048-85BDC9FD1C3A}</a:tableStyleId>
+              </a:tblPr>
+              <a:tblGrid>
+                <a:gridCol w="870735">
+                  <a:extLst>
+                    <a:ext uri="{9D8B030D-6E8A-4147-A177-3AD203B41FA5}">
+                      <a16:colId xmlns:a16="http://schemas.microsoft.com/office/drawing/2014/main" val="2491559972"/>
+                    </a:ext>
+                  </a:extLst>
+                </a:gridCol>
+              </a:tblGrid>
+              <a:tr h="302969">
+                <a:tc>
+                  <a:txBody>
+                    <a:bodyPr/>
+                    <a:lstStyle/>
+                    <a:p>
+                      <a:pPr algn="ctr"/>
+                      <a:r>
+                        <a:rPr lang="en-US" sz="1600" dirty="0"/>
+                        <a:t>RIGHT</a:t>
+                      </a:r>
+                      <a:endParaRPr lang="en-NL" sz="1600" dirty="0"/>
+                    </a:p>
+                  </a:txBody>
+                  <a:tcPr/>
+                </a:tc>
+                <a:extLst>
+                  <a:ext uri="{0D108BD9-81ED-4DB2-BD59-A6C34878D82A}">
+                    <a16:rowId xmlns:a16="http://schemas.microsoft.com/office/drawing/2014/main" val="3546219780"/>
+                  </a:ext>
+                </a:extLst>
+              </a:tr>
+              <a:tr h="302969">
+                <a:tc>
+                  <a:txBody>
+                    <a:bodyPr/>
+                    <a:lstStyle/>
+                    <a:p>
+                      <a:pPr algn="ctr"/>
+                      <a:r>
+                        <a:rPr lang="en-US" sz="1600" dirty="0"/>
+                        <a:t>1</a:t>
+                      </a:r>
+                      <a:endParaRPr lang="en-NL" sz="1600" dirty="0"/>
+                    </a:p>
+                  </a:txBody>
+                  <a:tcPr/>
+                </a:tc>
+                <a:extLst>
+                  <a:ext uri="{0D108BD9-81ED-4DB2-BD59-A6C34878D82A}">
+                    <a16:rowId xmlns:a16="http://schemas.microsoft.com/office/drawing/2014/main" val="1999053236"/>
+                  </a:ext>
+                </a:extLst>
+              </a:tr>
+              <a:tr h="302969">
+                <a:tc>
+                  <a:txBody>
+                    <a:bodyPr/>
+                    <a:lstStyle/>
+                    <a:p>
+                      <a:pPr algn="ctr"/>
+                      <a:r>
+                        <a:rPr lang="en-US" sz="1600" dirty="0"/>
+                        <a:t>2</a:t>
+                      </a:r>
+                      <a:endParaRPr lang="en-NL" sz="1600" dirty="0"/>
+                    </a:p>
+                  </a:txBody>
+                  <a:tcPr/>
+                </a:tc>
+                <a:extLst>
+                  <a:ext uri="{0D108BD9-81ED-4DB2-BD59-A6C34878D82A}">
+                    <a16:rowId xmlns:a16="http://schemas.microsoft.com/office/drawing/2014/main" val="2764142827"/>
+                  </a:ext>
+                </a:extLst>
+              </a:tr>
+              <a:tr h="302969">
+                <a:tc>
+                  <a:txBody>
+                    <a:bodyPr/>
+                    <a:lstStyle/>
+                    <a:p>
+                      <a:pPr algn="ctr"/>
+                      <a:endParaRPr lang="en-NL" sz="1600" dirty="0"/>
+                    </a:p>
+                  </a:txBody>
+                  <a:tcPr>
+                    <a:noFill/>
+                  </a:tcPr>
+                </a:tc>
+                <a:extLst>
+                  <a:ext uri="{0D108BD9-81ED-4DB2-BD59-A6C34878D82A}">
+                    <a16:rowId xmlns:a16="http://schemas.microsoft.com/office/drawing/2014/main" val="2895410762"/>
+                  </a:ext>
+                </a:extLst>
+              </a:tr>
+              <a:tr h="302969">
+                <a:tc>
+                  <a:txBody>
+                    <a:bodyPr/>
+                    <a:lstStyle/>
+                    <a:p>
+                      <a:pPr algn="ctr"/>
+                      <a:r>
+                        <a:rPr lang="en-US" sz="1600" dirty="0"/>
+                        <a:t>4</a:t>
+                      </a:r>
+                      <a:endParaRPr lang="en-NL" sz="1600" dirty="0"/>
+                    </a:p>
+                  </a:txBody>
+                  <a:tcPr/>
+                </a:tc>
+                <a:extLst>
+                  <a:ext uri="{0D108BD9-81ED-4DB2-BD59-A6C34878D82A}">
+                    <a16:rowId xmlns:a16="http://schemas.microsoft.com/office/drawing/2014/main" val="220184898"/>
+                  </a:ext>
+                </a:extLst>
+              </a:tr>
+            </a:tbl>
+          </a:graphicData>
+        </a:graphic>
+      </p:graphicFrame>
+      <p:graphicFrame>
+        <p:nvGraphicFramePr>
+          <p:cNvPr id="11" name="Table 10">
+            <a:extLst>
+              <a:ext uri="{FF2B5EF4-FFF2-40B4-BE49-F238E27FC236}">
+                <a16:creationId xmlns:a16="http://schemas.microsoft.com/office/drawing/2014/main" id="{D042556E-4C66-437A-8D79-7F84EB4742DE}"/>
+              </a:ext>
+            </a:extLst>
+          </p:cNvPr>
+          <p:cNvGraphicFramePr>
+            <a:graphicFrameLocks noGrp="1"/>
+          </p:cNvGraphicFramePr>
+          <p:nvPr/>
+        </p:nvGraphicFramePr>
+        <p:xfrm>
+          <a:off x="4382356" y="2200675"/>
+          <a:ext cx="870735" cy="1676400"/>
+        </p:xfrm>
+        <a:graphic>
+          <a:graphicData uri="http://schemas.openxmlformats.org/drawingml/2006/table">
+            <a:tbl>
+              <a:tblPr firstRow="1" bandRow="1">
+                <a:tableStyleId>{5C22544A-7EE6-4342-B048-85BDC9FD1C3A}</a:tableStyleId>
+              </a:tblPr>
+              <a:tblGrid>
+                <a:gridCol w="870735">
+                  <a:extLst>
+                    <a:ext uri="{9D8B030D-6E8A-4147-A177-3AD203B41FA5}">
+                      <a16:colId xmlns:a16="http://schemas.microsoft.com/office/drawing/2014/main" val="2491559972"/>
+                    </a:ext>
+                  </a:extLst>
+                </a:gridCol>
+              </a:tblGrid>
+              <a:tr h="302969">
+                <a:tc>
+                  <a:txBody>
+                    <a:bodyPr/>
+                    <a:lstStyle/>
+                    <a:p>
+                      <a:pPr algn="ctr"/>
+                      <a:r>
+                        <a:rPr lang="en-US" sz="1600" dirty="0"/>
+                        <a:t>JOINED</a:t>
+                      </a:r>
+                      <a:endParaRPr lang="en-NL" sz="1600" dirty="0"/>
+                    </a:p>
+                  </a:txBody>
+                  <a:tcPr/>
+                </a:tc>
+                <a:extLst>
+                  <a:ext uri="{0D108BD9-81ED-4DB2-BD59-A6C34878D82A}">
+                    <a16:rowId xmlns:a16="http://schemas.microsoft.com/office/drawing/2014/main" val="3546219780"/>
+                  </a:ext>
+                </a:extLst>
+              </a:tr>
+              <a:tr h="302969">
+                <a:tc>
+                  <a:txBody>
+                    <a:bodyPr/>
+                    <a:lstStyle/>
+                    <a:p>
+                      <a:pPr algn="ctr"/>
+                      <a:r>
+                        <a:rPr lang="en-US" sz="1600" dirty="0"/>
+                        <a:t>1</a:t>
+                      </a:r>
+                      <a:endParaRPr lang="en-NL" sz="1600" dirty="0"/>
+                    </a:p>
+                  </a:txBody>
+                  <a:tcPr/>
+                </a:tc>
+                <a:extLst>
+                  <a:ext uri="{0D108BD9-81ED-4DB2-BD59-A6C34878D82A}">
+                    <a16:rowId xmlns:a16="http://schemas.microsoft.com/office/drawing/2014/main" val="1999053236"/>
+                  </a:ext>
+                </a:extLst>
+              </a:tr>
+              <a:tr h="302969">
+                <a:tc>
+                  <a:txBody>
+                    <a:bodyPr/>
+                    <a:lstStyle/>
+                    <a:p>
+                      <a:pPr algn="ctr"/>
+                      <a:r>
+                        <a:rPr lang="en-US" sz="1600" dirty="0"/>
+                        <a:t>2</a:t>
+                      </a:r>
+                      <a:endParaRPr lang="en-NL" sz="1600" dirty="0"/>
+                    </a:p>
+                  </a:txBody>
+                  <a:tcPr/>
+                </a:tc>
+                <a:extLst>
+                  <a:ext uri="{0D108BD9-81ED-4DB2-BD59-A6C34878D82A}">
+                    <a16:rowId xmlns:a16="http://schemas.microsoft.com/office/drawing/2014/main" val="2764142827"/>
+                  </a:ext>
+                </a:extLst>
+              </a:tr>
+              <a:tr h="302969">
+                <a:tc>
+                  <a:txBody>
+                    <a:bodyPr/>
+                    <a:lstStyle/>
+                    <a:p>
+                      <a:pPr algn="ctr"/>
+                      <a:endParaRPr lang="en-NL" sz="1600" dirty="0"/>
+                    </a:p>
+                  </a:txBody>
+                  <a:tcPr>
+                    <a:noFill/>
+                  </a:tcPr>
+                </a:tc>
+                <a:extLst>
+                  <a:ext uri="{0D108BD9-81ED-4DB2-BD59-A6C34878D82A}">
+                    <a16:rowId xmlns:a16="http://schemas.microsoft.com/office/drawing/2014/main" val="2895410762"/>
+                  </a:ext>
+                </a:extLst>
+              </a:tr>
+              <a:tr h="302969">
+                <a:tc>
+                  <a:txBody>
+                    <a:bodyPr/>
+                    <a:lstStyle/>
+                    <a:p>
+                      <a:pPr algn="ctr"/>
+                      <a:endParaRPr lang="en-NL" sz="1600" dirty="0"/>
+                    </a:p>
+                  </a:txBody>
+                  <a:tcPr>
+                    <a:noFill/>
+                  </a:tcPr>
+                </a:tc>
+                <a:extLst>
+                  <a:ext uri="{0D108BD9-81ED-4DB2-BD59-A6C34878D82A}">
+                    <a16:rowId xmlns:a16="http://schemas.microsoft.com/office/drawing/2014/main" val="220184898"/>
+                  </a:ext>
+                </a:extLst>
+              </a:tr>
+            </a:tbl>
+          </a:graphicData>
+        </a:graphic>
+      </p:graphicFrame>
+      <p:cxnSp>
+        <p:nvCxnSpPr>
+          <p:cNvPr id="13" name="Straight Connector 12">
+            <a:extLst>
+              <a:ext uri="{FF2B5EF4-FFF2-40B4-BE49-F238E27FC236}">
+                <a16:creationId xmlns:a16="http://schemas.microsoft.com/office/drawing/2014/main" id="{4A9E2554-5D5F-43FF-A69D-6EDFF73A3EBE}"/>
+              </a:ext>
+            </a:extLst>
+          </p:cNvPr>
+          <p:cNvCxnSpPr>
+            <a:cxnSpLocks/>
+          </p:cNvCxnSpPr>
+          <p:nvPr/>
+        </p:nvCxnSpPr>
+        <p:spPr>
+          <a:xfrm>
+            <a:off x="5702157" y="1706364"/>
+            <a:ext cx="0" cy="4858823"/>
+          </a:xfrm>
+          <a:prstGeom prst="line">
+            <a:avLst/>
+          </a:prstGeom>
+        </p:spPr>
+        <p:style>
+          <a:lnRef idx="3">
+            <a:schemeClr val="dk1"/>
+          </a:lnRef>
+          <a:fillRef idx="0">
+            <a:schemeClr val="dk1"/>
+          </a:fillRef>
+          <a:effectRef idx="2">
+            <a:schemeClr val="dk1"/>
+          </a:effectRef>
+          <a:fontRef idx="minor">
+            <a:schemeClr val="tx1"/>
+          </a:fontRef>
+        </p:style>
+      </p:cxnSp>
+      <p:cxnSp>
+        <p:nvCxnSpPr>
+          <p:cNvPr id="15" name="Straight Connector 14">
+            <a:extLst>
+              <a:ext uri="{FF2B5EF4-FFF2-40B4-BE49-F238E27FC236}">
+                <a16:creationId xmlns:a16="http://schemas.microsoft.com/office/drawing/2014/main" id="{015DF19C-F724-401A-AD9A-6B381B077C47}"/>
+              </a:ext>
+            </a:extLst>
+          </p:cNvPr>
+          <p:cNvCxnSpPr/>
+          <p:nvPr/>
+        </p:nvCxnSpPr>
+        <p:spPr>
+          <a:xfrm>
+            <a:off x="838200" y="4119936"/>
+            <a:ext cx="10340083" cy="0"/>
+          </a:xfrm>
+          <a:prstGeom prst="line">
+            <a:avLst/>
+          </a:prstGeom>
+        </p:spPr>
+        <p:style>
+          <a:lnRef idx="3">
+            <a:schemeClr val="dk1"/>
+          </a:lnRef>
+          <a:fillRef idx="0">
+            <a:schemeClr val="dk1"/>
+          </a:fillRef>
+          <a:effectRef idx="2">
+            <a:schemeClr val="dk1"/>
+          </a:effectRef>
+          <a:fontRef idx="minor">
+            <a:schemeClr val="tx1"/>
+          </a:fontRef>
+        </p:style>
+      </p:cxnSp>
+      <p:sp>
+        <p:nvSpPr>
+          <p:cNvPr id="19" name="Plus Sign 18">
+            <a:extLst>
+              <a:ext uri="{FF2B5EF4-FFF2-40B4-BE49-F238E27FC236}">
+                <a16:creationId xmlns:a16="http://schemas.microsoft.com/office/drawing/2014/main" id="{C94BDFE1-CD62-4D6B-B8CF-11F4447038B0}"/>
+              </a:ext>
+            </a:extLst>
+          </p:cNvPr>
+          <p:cNvSpPr/>
+          <p:nvPr/>
+        </p:nvSpPr>
+        <p:spPr>
+          <a:xfrm>
+            <a:off x="1941794" y="2766609"/>
+            <a:ext cx="435625" cy="435625"/>
+          </a:xfrm>
+          <a:prstGeom prst="mathPlus">
+            <a:avLst/>
+          </a:prstGeom>
+        </p:spPr>
+        <p:style>
+          <a:lnRef idx="2">
+            <a:schemeClr val="accent2">
+              <a:shade val="50000"/>
+            </a:schemeClr>
+          </a:lnRef>
+          <a:fillRef idx="1">
+            <a:schemeClr val="accent2"/>
+          </a:fillRef>
+          <a:effectRef idx="0">
+            <a:schemeClr val="accent2"/>
+          </a:effectRef>
+          <a:fontRef idx="minor">
+            <a:schemeClr val="lt1"/>
+          </a:fontRef>
+        </p:style>
+        <p:txBody>
+          <a:bodyPr rtlCol="0" anchor="ctr"/>
+          <a:lstStyle/>
+          <a:p>
+            <a:pPr algn="ctr"/>
+            <a:endParaRPr lang="en-NL"/>
+          </a:p>
+        </p:txBody>
+      </p:sp>
+      <p:sp>
+        <p:nvSpPr>
+          <p:cNvPr id="20" name="Equals 19">
+            <a:extLst>
+              <a:ext uri="{FF2B5EF4-FFF2-40B4-BE49-F238E27FC236}">
+                <a16:creationId xmlns:a16="http://schemas.microsoft.com/office/drawing/2014/main" id="{AFD1AFBA-6D6D-4CDD-ABB3-11101143201E}"/>
+              </a:ext>
+            </a:extLst>
+          </p:cNvPr>
+          <p:cNvSpPr/>
+          <p:nvPr/>
+        </p:nvSpPr>
+        <p:spPr>
+          <a:xfrm>
+            <a:off x="3713872" y="2841400"/>
+            <a:ext cx="435625" cy="322366"/>
+          </a:xfrm>
+          <a:prstGeom prst="mathEqual">
+            <a:avLst/>
+          </a:prstGeom>
+        </p:spPr>
+        <p:style>
+          <a:lnRef idx="2">
+            <a:schemeClr val="accent2">
+              <a:shade val="50000"/>
+            </a:schemeClr>
+          </a:lnRef>
+          <a:fillRef idx="1">
+            <a:schemeClr val="accent2"/>
+          </a:fillRef>
+          <a:effectRef idx="0">
+            <a:schemeClr val="accent2"/>
+          </a:effectRef>
+          <a:fontRef idx="minor">
+            <a:schemeClr val="lt1"/>
+          </a:fontRef>
+        </p:style>
+        <p:txBody>
+          <a:bodyPr rtlCol="0" anchor="ctr"/>
+          <a:lstStyle/>
+          <a:p>
+            <a:pPr algn="ctr"/>
+            <a:endParaRPr lang="en-NL">
+              <a:solidFill>
+                <a:schemeClr val="tx1"/>
+              </a:solidFill>
+            </a:endParaRPr>
+          </a:p>
+        </p:txBody>
+      </p:sp>
+      <p:sp>
+        <p:nvSpPr>
+          <p:cNvPr id="21" name="TextBox 20">
+            <a:extLst>
+              <a:ext uri="{FF2B5EF4-FFF2-40B4-BE49-F238E27FC236}">
+                <a16:creationId xmlns:a16="http://schemas.microsoft.com/office/drawing/2014/main" id="{EEE646E4-999D-41AE-9132-5F78A0893BBD}"/>
+              </a:ext>
+            </a:extLst>
+          </p:cNvPr>
+          <p:cNvSpPr txBox="1"/>
+          <p:nvPr/>
+        </p:nvSpPr>
+        <p:spPr>
+          <a:xfrm>
+            <a:off x="838202" y="1706364"/>
+            <a:ext cx="4414889" cy="369332"/>
+          </a:xfrm>
+          <a:prstGeom prst="rect">
+            <a:avLst/>
+          </a:prstGeom>
+          <a:noFill/>
+        </p:spPr>
+        <p:txBody>
+          <a:bodyPr wrap="square" lIns="0" rIns="0" rtlCol="0">
+            <a:spAutoFit/>
+          </a:bodyPr>
+          <a:lstStyle/>
+          <a:p>
+            <a:r>
+              <a:rPr lang="en-US" dirty="0"/>
+              <a:t>INNER JOIN</a:t>
+            </a:r>
+            <a:endParaRPr lang="en-NL" dirty="0"/>
+          </a:p>
+        </p:txBody>
+      </p:sp>
+      <p:graphicFrame>
+        <p:nvGraphicFramePr>
+          <p:cNvPr id="23" name="Table 9">
+            <a:extLst>
+              <a:ext uri="{FF2B5EF4-FFF2-40B4-BE49-F238E27FC236}">
+                <a16:creationId xmlns:a16="http://schemas.microsoft.com/office/drawing/2014/main" id="{24D04EEA-CCC7-4019-B302-761644690E18}"/>
+              </a:ext>
+            </a:extLst>
+          </p:cNvPr>
+          <p:cNvGraphicFramePr>
+            <a:graphicFrameLocks noGrp="1"/>
+          </p:cNvGraphicFramePr>
+          <p:nvPr/>
+        </p:nvGraphicFramePr>
+        <p:xfrm>
+          <a:off x="6159572" y="2200675"/>
+          <a:ext cx="870735" cy="1676400"/>
+        </p:xfrm>
+        <a:graphic>
+          <a:graphicData uri="http://schemas.openxmlformats.org/drawingml/2006/table">
+            <a:tbl>
+              <a:tblPr firstRow="1" bandRow="1">
+                <a:tableStyleId>{5C22544A-7EE6-4342-B048-85BDC9FD1C3A}</a:tableStyleId>
+              </a:tblPr>
+              <a:tblGrid>
+                <a:gridCol w="870735">
+                  <a:extLst>
+                    <a:ext uri="{9D8B030D-6E8A-4147-A177-3AD203B41FA5}">
+                      <a16:colId xmlns:a16="http://schemas.microsoft.com/office/drawing/2014/main" val="2491559972"/>
+                    </a:ext>
+                  </a:extLst>
+                </a:gridCol>
+              </a:tblGrid>
+              <a:tr h="302969">
+                <a:tc>
+                  <a:txBody>
+                    <a:bodyPr/>
+                    <a:lstStyle/>
+                    <a:p>
+                      <a:pPr algn="ctr"/>
+                      <a:r>
+                        <a:rPr lang="en-US" sz="1600" dirty="0"/>
+                        <a:t>LEFT</a:t>
+                      </a:r>
+                      <a:endParaRPr lang="en-NL" sz="1600" dirty="0"/>
+                    </a:p>
+                  </a:txBody>
+                  <a:tcPr/>
+                </a:tc>
+                <a:extLst>
+                  <a:ext uri="{0D108BD9-81ED-4DB2-BD59-A6C34878D82A}">
+                    <a16:rowId xmlns:a16="http://schemas.microsoft.com/office/drawing/2014/main" val="3546219780"/>
+                  </a:ext>
+                </a:extLst>
+              </a:tr>
+              <a:tr h="302969">
+                <a:tc>
+                  <a:txBody>
+                    <a:bodyPr/>
+                    <a:lstStyle/>
+                    <a:p>
+                      <a:pPr algn="ctr"/>
+                      <a:r>
+                        <a:rPr lang="en-US" sz="1600" dirty="0"/>
+                        <a:t>1</a:t>
+                      </a:r>
+                      <a:endParaRPr lang="en-NL" sz="1600" dirty="0"/>
+                    </a:p>
+                  </a:txBody>
+                  <a:tcPr/>
+                </a:tc>
+                <a:extLst>
+                  <a:ext uri="{0D108BD9-81ED-4DB2-BD59-A6C34878D82A}">
+                    <a16:rowId xmlns:a16="http://schemas.microsoft.com/office/drawing/2014/main" val="1999053236"/>
+                  </a:ext>
+                </a:extLst>
+              </a:tr>
+              <a:tr h="302969">
+                <a:tc>
+                  <a:txBody>
+                    <a:bodyPr/>
+                    <a:lstStyle/>
+                    <a:p>
+                      <a:pPr algn="ctr"/>
+                      <a:r>
+                        <a:rPr lang="en-US" sz="1600" dirty="0"/>
+                        <a:t>2</a:t>
+                      </a:r>
+                      <a:endParaRPr lang="en-NL" sz="1600" dirty="0"/>
+                    </a:p>
+                  </a:txBody>
+                  <a:tcPr/>
+                </a:tc>
+                <a:extLst>
+                  <a:ext uri="{0D108BD9-81ED-4DB2-BD59-A6C34878D82A}">
+                    <a16:rowId xmlns:a16="http://schemas.microsoft.com/office/drawing/2014/main" val="2764142827"/>
+                  </a:ext>
+                </a:extLst>
+              </a:tr>
+              <a:tr h="302969">
+                <a:tc>
+                  <a:txBody>
+                    <a:bodyPr/>
+                    <a:lstStyle/>
+                    <a:p>
+                      <a:pPr algn="ctr"/>
+                      <a:r>
+                        <a:rPr lang="en-US" sz="1600" dirty="0"/>
+                        <a:t>3</a:t>
+                      </a:r>
+                      <a:endParaRPr lang="en-NL" sz="1600" dirty="0"/>
+                    </a:p>
+                  </a:txBody>
+                  <a:tcPr/>
+                </a:tc>
+                <a:extLst>
+                  <a:ext uri="{0D108BD9-81ED-4DB2-BD59-A6C34878D82A}">
+                    <a16:rowId xmlns:a16="http://schemas.microsoft.com/office/drawing/2014/main" val="2895410762"/>
+                  </a:ext>
+                </a:extLst>
+              </a:tr>
+              <a:tr h="302969">
+                <a:tc>
+                  <a:txBody>
+                    <a:bodyPr/>
+                    <a:lstStyle/>
+                    <a:p>
+                      <a:pPr algn="ctr"/>
+                      <a:endParaRPr lang="en-NL" sz="1600" dirty="0"/>
+                    </a:p>
+                  </a:txBody>
+                  <a:tcPr>
+                    <a:noFill/>
+                  </a:tcPr>
+                </a:tc>
+                <a:extLst>
+                  <a:ext uri="{0D108BD9-81ED-4DB2-BD59-A6C34878D82A}">
+                    <a16:rowId xmlns:a16="http://schemas.microsoft.com/office/drawing/2014/main" val="220184898"/>
+                  </a:ext>
+                </a:extLst>
+              </a:tr>
+            </a:tbl>
+          </a:graphicData>
+        </a:graphic>
+      </p:graphicFrame>
+      <p:graphicFrame>
+        <p:nvGraphicFramePr>
+          <p:cNvPr id="24" name="Table 23">
+            <a:extLst>
+              <a:ext uri="{FF2B5EF4-FFF2-40B4-BE49-F238E27FC236}">
+                <a16:creationId xmlns:a16="http://schemas.microsoft.com/office/drawing/2014/main" id="{59A936D6-C210-4CFB-9A1F-D93E584A15A1}"/>
+              </a:ext>
+            </a:extLst>
+          </p:cNvPr>
+          <p:cNvGraphicFramePr>
+            <a:graphicFrameLocks noGrp="1"/>
+          </p:cNvGraphicFramePr>
+          <p:nvPr/>
+        </p:nvGraphicFramePr>
+        <p:xfrm>
+          <a:off x="7931650" y="2200675"/>
+          <a:ext cx="870735" cy="1676400"/>
+        </p:xfrm>
+        <a:graphic>
+          <a:graphicData uri="http://schemas.openxmlformats.org/drawingml/2006/table">
+            <a:tbl>
+              <a:tblPr firstRow="1" bandRow="1">
+                <a:tableStyleId>{5C22544A-7EE6-4342-B048-85BDC9FD1C3A}</a:tableStyleId>
+              </a:tblPr>
+              <a:tblGrid>
+                <a:gridCol w="870735">
+                  <a:extLst>
+                    <a:ext uri="{9D8B030D-6E8A-4147-A177-3AD203B41FA5}">
+                      <a16:colId xmlns:a16="http://schemas.microsoft.com/office/drawing/2014/main" val="2491559972"/>
+                    </a:ext>
+                  </a:extLst>
+                </a:gridCol>
+              </a:tblGrid>
+              <a:tr h="302969">
+                <a:tc>
+                  <a:txBody>
+                    <a:bodyPr/>
+                    <a:lstStyle/>
+                    <a:p>
+                      <a:pPr algn="ctr"/>
+                      <a:r>
+                        <a:rPr lang="en-US" sz="1600" dirty="0"/>
+                        <a:t>RIGHT</a:t>
+                      </a:r>
+                      <a:endParaRPr lang="en-NL" sz="1600" dirty="0"/>
+                    </a:p>
+                  </a:txBody>
+                  <a:tcPr/>
+                </a:tc>
+                <a:extLst>
+                  <a:ext uri="{0D108BD9-81ED-4DB2-BD59-A6C34878D82A}">
+                    <a16:rowId xmlns:a16="http://schemas.microsoft.com/office/drawing/2014/main" val="3546219780"/>
+                  </a:ext>
+                </a:extLst>
+              </a:tr>
+              <a:tr h="302969">
+                <a:tc>
+                  <a:txBody>
+                    <a:bodyPr/>
+                    <a:lstStyle/>
+                    <a:p>
+                      <a:pPr algn="ctr"/>
+                      <a:r>
+                        <a:rPr lang="en-US" sz="1600" dirty="0"/>
+                        <a:t>1</a:t>
+                      </a:r>
+                      <a:endParaRPr lang="en-NL" sz="1600" dirty="0"/>
+                    </a:p>
+                  </a:txBody>
+                  <a:tcPr/>
+                </a:tc>
+                <a:extLst>
+                  <a:ext uri="{0D108BD9-81ED-4DB2-BD59-A6C34878D82A}">
+                    <a16:rowId xmlns:a16="http://schemas.microsoft.com/office/drawing/2014/main" val="1999053236"/>
+                  </a:ext>
+                </a:extLst>
+              </a:tr>
+              <a:tr h="302969">
+                <a:tc>
+                  <a:txBody>
+                    <a:bodyPr/>
+                    <a:lstStyle/>
+                    <a:p>
+                      <a:pPr algn="ctr"/>
+                      <a:r>
+                        <a:rPr lang="en-US" sz="1600" dirty="0"/>
+                        <a:t>2</a:t>
+                      </a:r>
+                      <a:endParaRPr lang="en-NL" sz="1600" dirty="0"/>
+                    </a:p>
+                  </a:txBody>
+                  <a:tcPr/>
+                </a:tc>
+                <a:extLst>
+                  <a:ext uri="{0D108BD9-81ED-4DB2-BD59-A6C34878D82A}">
+                    <a16:rowId xmlns:a16="http://schemas.microsoft.com/office/drawing/2014/main" val="2764142827"/>
+                  </a:ext>
+                </a:extLst>
+              </a:tr>
+              <a:tr h="302969">
+                <a:tc>
+                  <a:txBody>
+                    <a:bodyPr/>
+                    <a:lstStyle/>
+                    <a:p>
+                      <a:pPr algn="ctr"/>
+                      <a:endParaRPr lang="en-NL" sz="1600" dirty="0"/>
+                    </a:p>
+                  </a:txBody>
+                  <a:tcPr>
+                    <a:noFill/>
+                  </a:tcPr>
+                </a:tc>
+                <a:extLst>
+                  <a:ext uri="{0D108BD9-81ED-4DB2-BD59-A6C34878D82A}">
+                    <a16:rowId xmlns:a16="http://schemas.microsoft.com/office/drawing/2014/main" val="2895410762"/>
+                  </a:ext>
+                </a:extLst>
+              </a:tr>
+              <a:tr h="302969">
+                <a:tc>
+                  <a:txBody>
+                    <a:bodyPr/>
+                    <a:lstStyle/>
+                    <a:p>
+                      <a:pPr algn="ctr"/>
+                      <a:r>
+                        <a:rPr lang="en-US" sz="1600" dirty="0"/>
+                        <a:t>4</a:t>
+                      </a:r>
+                      <a:endParaRPr lang="en-NL" sz="1600" dirty="0"/>
+                    </a:p>
+                  </a:txBody>
+                  <a:tcPr/>
+                </a:tc>
+                <a:extLst>
+                  <a:ext uri="{0D108BD9-81ED-4DB2-BD59-A6C34878D82A}">
+                    <a16:rowId xmlns:a16="http://schemas.microsoft.com/office/drawing/2014/main" val="220184898"/>
+                  </a:ext>
+                </a:extLst>
+              </a:tr>
+            </a:tbl>
+          </a:graphicData>
+        </a:graphic>
+      </p:graphicFrame>
+      <p:graphicFrame>
+        <p:nvGraphicFramePr>
+          <p:cNvPr id="25" name="Table 24">
+            <a:extLst>
+              <a:ext uri="{FF2B5EF4-FFF2-40B4-BE49-F238E27FC236}">
+                <a16:creationId xmlns:a16="http://schemas.microsoft.com/office/drawing/2014/main" id="{D0A36028-978B-417D-B364-DFCAC252A870}"/>
+              </a:ext>
+            </a:extLst>
+          </p:cNvPr>
+          <p:cNvGraphicFramePr>
+            <a:graphicFrameLocks noGrp="1"/>
+          </p:cNvGraphicFramePr>
+          <p:nvPr/>
+        </p:nvGraphicFramePr>
+        <p:xfrm>
+          <a:off x="9703728" y="2200675"/>
+          <a:ext cx="870735" cy="1676400"/>
+        </p:xfrm>
+        <a:graphic>
+          <a:graphicData uri="http://schemas.openxmlformats.org/drawingml/2006/table">
+            <a:tbl>
+              <a:tblPr firstRow="1" bandRow="1">
+                <a:tableStyleId>{5C22544A-7EE6-4342-B048-85BDC9FD1C3A}</a:tableStyleId>
+              </a:tblPr>
+              <a:tblGrid>
+                <a:gridCol w="870735">
+                  <a:extLst>
+                    <a:ext uri="{9D8B030D-6E8A-4147-A177-3AD203B41FA5}">
+                      <a16:colId xmlns:a16="http://schemas.microsoft.com/office/drawing/2014/main" val="2491559972"/>
+                    </a:ext>
+                  </a:extLst>
+                </a:gridCol>
+              </a:tblGrid>
+              <a:tr h="302969">
+                <a:tc>
+                  <a:txBody>
+                    <a:bodyPr/>
+                    <a:lstStyle/>
+                    <a:p>
+                      <a:pPr algn="ctr"/>
+                      <a:r>
+                        <a:rPr lang="en-US" sz="1600" dirty="0"/>
+                        <a:t>JOINED</a:t>
+                      </a:r>
+                      <a:endParaRPr lang="en-NL" sz="1600" dirty="0"/>
+                    </a:p>
+                  </a:txBody>
+                  <a:tcPr/>
+                </a:tc>
+                <a:extLst>
+                  <a:ext uri="{0D108BD9-81ED-4DB2-BD59-A6C34878D82A}">
+                    <a16:rowId xmlns:a16="http://schemas.microsoft.com/office/drawing/2014/main" val="3546219780"/>
+                  </a:ext>
+                </a:extLst>
+              </a:tr>
+              <a:tr h="302969">
+                <a:tc>
+                  <a:txBody>
+                    <a:bodyPr/>
+                    <a:lstStyle/>
+                    <a:p>
+                      <a:pPr algn="ctr"/>
+                      <a:r>
+                        <a:rPr lang="en-US" sz="1600" dirty="0"/>
+                        <a:t>1</a:t>
+                      </a:r>
+                      <a:endParaRPr lang="en-NL" sz="1600" dirty="0"/>
+                    </a:p>
+                  </a:txBody>
+                  <a:tcPr/>
+                </a:tc>
+                <a:extLst>
+                  <a:ext uri="{0D108BD9-81ED-4DB2-BD59-A6C34878D82A}">
+                    <a16:rowId xmlns:a16="http://schemas.microsoft.com/office/drawing/2014/main" val="1999053236"/>
+                  </a:ext>
+                </a:extLst>
+              </a:tr>
+              <a:tr h="302969">
+                <a:tc>
+                  <a:txBody>
+                    <a:bodyPr/>
+                    <a:lstStyle/>
+                    <a:p>
+                      <a:pPr algn="ctr"/>
+                      <a:r>
+                        <a:rPr lang="en-US" sz="1600" dirty="0"/>
+                        <a:t>2</a:t>
+                      </a:r>
+                      <a:endParaRPr lang="en-NL" sz="1600" dirty="0"/>
+                    </a:p>
+                  </a:txBody>
+                  <a:tcPr/>
+                </a:tc>
+                <a:extLst>
+                  <a:ext uri="{0D108BD9-81ED-4DB2-BD59-A6C34878D82A}">
+                    <a16:rowId xmlns:a16="http://schemas.microsoft.com/office/drawing/2014/main" val="2764142827"/>
+                  </a:ext>
+                </a:extLst>
+              </a:tr>
+              <a:tr h="302969">
+                <a:tc>
+                  <a:txBody>
+                    <a:bodyPr/>
+                    <a:lstStyle/>
+                    <a:p>
+                      <a:pPr algn="ctr"/>
+                      <a:r>
+                        <a:rPr lang="en-US" sz="1600" dirty="0"/>
+                        <a:t>3</a:t>
+                      </a:r>
+                      <a:endParaRPr lang="en-NL" sz="1600" dirty="0"/>
+                    </a:p>
+                  </a:txBody>
+                  <a:tcPr/>
+                </a:tc>
+                <a:extLst>
+                  <a:ext uri="{0D108BD9-81ED-4DB2-BD59-A6C34878D82A}">
+                    <a16:rowId xmlns:a16="http://schemas.microsoft.com/office/drawing/2014/main" val="2895410762"/>
+                  </a:ext>
+                </a:extLst>
+              </a:tr>
+              <a:tr h="302969">
+                <a:tc>
+                  <a:txBody>
+                    <a:bodyPr/>
+                    <a:lstStyle/>
+                    <a:p>
+                      <a:pPr algn="ctr"/>
+                      <a:r>
+                        <a:rPr lang="en-US" sz="1600" dirty="0"/>
+                        <a:t>4</a:t>
+                      </a:r>
+                      <a:endParaRPr lang="en-NL" sz="1600" dirty="0"/>
+                    </a:p>
+                  </a:txBody>
+                  <a:tcPr/>
+                </a:tc>
+                <a:extLst>
+                  <a:ext uri="{0D108BD9-81ED-4DB2-BD59-A6C34878D82A}">
+                    <a16:rowId xmlns:a16="http://schemas.microsoft.com/office/drawing/2014/main" val="220184898"/>
+                  </a:ext>
+                </a:extLst>
+              </a:tr>
+            </a:tbl>
+          </a:graphicData>
+        </a:graphic>
+      </p:graphicFrame>
+      <p:sp>
+        <p:nvSpPr>
+          <p:cNvPr id="26" name="Plus Sign 25">
+            <a:extLst>
+              <a:ext uri="{FF2B5EF4-FFF2-40B4-BE49-F238E27FC236}">
+                <a16:creationId xmlns:a16="http://schemas.microsoft.com/office/drawing/2014/main" id="{EC57CE91-797A-48FF-8825-0985E5D10286}"/>
+              </a:ext>
+            </a:extLst>
+          </p:cNvPr>
+          <p:cNvSpPr/>
+          <p:nvPr/>
+        </p:nvSpPr>
+        <p:spPr>
+          <a:xfrm>
+            <a:off x="7263166" y="2766609"/>
+            <a:ext cx="435625" cy="435625"/>
+          </a:xfrm>
+          <a:prstGeom prst="mathPlus">
+            <a:avLst/>
+          </a:prstGeom>
+        </p:spPr>
+        <p:style>
+          <a:lnRef idx="2">
+            <a:schemeClr val="accent2">
+              <a:shade val="50000"/>
+            </a:schemeClr>
+          </a:lnRef>
+          <a:fillRef idx="1">
+            <a:schemeClr val="accent2"/>
+          </a:fillRef>
+          <a:effectRef idx="0">
+            <a:schemeClr val="accent2"/>
+          </a:effectRef>
+          <a:fontRef idx="minor">
+            <a:schemeClr val="lt1"/>
+          </a:fontRef>
+        </p:style>
+        <p:txBody>
+          <a:bodyPr rtlCol="0" anchor="ctr"/>
+          <a:lstStyle/>
+          <a:p>
+            <a:pPr algn="r"/>
+            <a:endParaRPr lang="en-NL" dirty="0"/>
+          </a:p>
+        </p:txBody>
+      </p:sp>
+      <p:sp>
+        <p:nvSpPr>
+          <p:cNvPr id="27" name="Equals 26">
+            <a:extLst>
+              <a:ext uri="{FF2B5EF4-FFF2-40B4-BE49-F238E27FC236}">
+                <a16:creationId xmlns:a16="http://schemas.microsoft.com/office/drawing/2014/main" id="{E9FCAE8B-C186-49BD-86DD-C82F215D765C}"/>
+              </a:ext>
+            </a:extLst>
+          </p:cNvPr>
+          <p:cNvSpPr/>
+          <p:nvPr/>
+        </p:nvSpPr>
+        <p:spPr>
+          <a:xfrm>
+            <a:off x="9035244" y="2841400"/>
+            <a:ext cx="435625" cy="322366"/>
+          </a:xfrm>
+          <a:prstGeom prst="mathEqual">
+            <a:avLst/>
+          </a:prstGeom>
+        </p:spPr>
+        <p:style>
+          <a:lnRef idx="2">
+            <a:schemeClr val="accent2">
+              <a:shade val="50000"/>
+            </a:schemeClr>
+          </a:lnRef>
+          <a:fillRef idx="1">
+            <a:schemeClr val="accent2"/>
+          </a:fillRef>
+          <a:effectRef idx="0">
+            <a:schemeClr val="accent2"/>
+          </a:effectRef>
+          <a:fontRef idx="minor">
+            <a:schemeClr val="lt1"/>
+          </a:fontRef>
+        </p:style>
+        <p:txBody>
+          <a:bodyPr rtlCol="0" anchor="ctr"/>
+          <a:lstStyle/>
+          <a:p>
+            <a:pPr algn="r"/>
+            <a:endParaRPr lang="en-NL">
+              <a:solidFill>
+                <a:schemeClr val="tx1"/>
+              </a:solidFill>
+            </a:endParaRPr>
+          </a:p>
+        </p:txBody>
+      </p:sp>
+      <p:sp>
+        <p:nvSpPr>
+          <p:cNvPr id="28" name="TextBox 27">
+            <a:extLst>
+              <a:ext uri="{FF2B5EF4-FFF2-40B4-BE49-F238E27FC236}">
+                <a16:creationId xmlns:a16="http://schemas.microsoft.com/office/drawing/2014/main" id="{4E8C30BA-9D73-4F5F-B57E-322C2449B219}"/>
+              </a:ext>
+            </a:extLst>
+          </p:cNvPr>
+          <p:cNvSpPr txBox="1"/>
+          <p:nvPr/>
+        </p:nvSpPr>
+        <p:spPr>
+          <a:xfrm>
+            <a:off x="6159574" y="1706364"/>
+            <a:ext cx="4414889" cy="369332"/>
+          </a:xfrm>
+          <a:prstGeom prst="rect">
+            <a:avLst/>
+          </a:prstGeom>
+          <a:noFill/>
+        </p:spPr>
+        <p:txBody>
+          <a:bodyPr wrap="square" lIns="0" rIns="0" rtlCol="0">
+            <a:spAutoFit/>
+          </a:bodyPr>
+          <a:lstStyle/>
+          <a:p>
+            <a:pPr algn="r"/>
+            <a:r>
+              <a:rPr lang="en-US" dirty="0"/>
+              <a:t>OUTER JOIN</a:t>
+            </a:r>
+            <a:endParaRPr lang="en-NL" dirty="0"/>
+          </a:p>
+        </p:txBody>
+      </p:sp>
+      <p:graphicFrame>
+        <p:nvGraphicFramePr>
+          <p:cNvPr id="29" name="Table 9">
+            <a:extLst>
+              <a:ext uri="{FF2B5EF4-FFF2-40B4-BE49-F238E27FC236}">
+                <a16:creationId xmlns:a16="http://schemas.microsoft.com/office/drawing/2014/main" id="{BF1434FC-083A-4FFE-B12F-40188FA1CAD3}"/>
+              </a:ext>
+            </a:extLst>
+          </p:cNvPr>
+          <p:cNvGraphicFramePr>
+            <a:graphicFrameLocks noGrp="1"/>
+          </p:cNvGraphicFramePr>
+          <p:nvPr/>
+        </p:nvGraphicFramePr>
+        <p:xfrm>
+          <a:off x="838200" y="4815989"/>
+          <a:ext cx="870735" cy="1676400"/>
+        </p:xfrm>
+        <a:graphic>
+          <a:graphicData uri="http://schemas.openxmlformats.org/drawingml/2006/table">
+            <a:tbl>
+              <a:tblPr firstRow="1" bandRow="1">
+                <a:tableStyleId>{5C22544A-7EE6-4342-B048-85BDC9FD1C3A}</a:tableStyleId>
+              </a:tblPr>
+              <a:tblGrid>
+                <a:gridCol w="870735">
+                  <a:extLst>
+                    <a:ext uri="{9D8B030D-6E8A-4147-A177-3AD203B41FA5}">
+                      <a16:colId xmlns:a16="http://schemas.microsoft.com/office/drawing/2014/main" val="2491559972"/>
+                    </a:ext>
+                  </a:extLst>
+                </a:gridCol>
+              </a:tblGrid>
+              <a:tr h="302969">
+                <a:tc>
+                  <a:txBody>
+                    <a:bodyPr/>
+                    <a:lstStyle/>
+                    <a:p>
+                      <a:pPr algn="ctr"/>
+                      <a:r>
+                        <a:rPr lang="en-US" sz="1600" dirty="0"/>
+                        <a:t>LEFT</a:t>
+                      </a:r>
+                      <a:endParaRPr lang="en-NL" sz="1600" dirty="0"/>
+                    </a:p>
+                  </a:txBody>
+                  <a:tcPr/>
+                </a:tc>
+                <a:extLst>
+                  <a:ext uri="{0D108BD9-81ED-4DB2-BD59-A6C34878D82A}">
+                    <a16:rowId xmlns:a16="http://schemas.microsoft.com/office/drawing/2014/main" val="3546219780"/>
+                  </a:ext>
+                </a:extLst>
+              </a:tr>
+              <a:tr h="302969">
+                <a:tc>
+                  <a:txBody>
+                    <a:bodyPr/>
+                    <a:lstStyle/>
+                    <a:p>
+                      <a:pPr algn="ctr"/>
+                      <a:r>
+                        <a:rPr lang="en-US" sz="1600" dirty="0"/>
+                        <a:t>1</a:t>
+                      </a:r>
+                      <a:endParaRPr lang="en-NL" sz="1600" dirty="0"/>
+                    </a:p>
+                  </a:txBody>
+                  <a:tcPr/>
+                </a:tc>
+                <a:extLst>
+                  <a:ext uri="{0D108BD9-81ED-4DB2-BD59-A6C34878D82A}">
+                    <a16:rowId xmlns:a16="http://schemas.microsoft.com/office/drawing/2014/main" val="1999053236"/>
+                  </a:ext>
+                </a:extLst>
+              </a:tr>
+              <a:tr h="302969">
+                <a:tc>
+                  <a:txBody>
+                    <a:bodyPr/>
+                    <a:lstStyle/>
+                    <a:p>
+                      <a:pPr algn="ctr"/>
+                      <a:r>
+                        <a:rPr lang="en-US" sz="1600" dirty="0"/>
+                        <a:t>2</a:t>
+                      </a:r>
+                      <a:endParaRPr lang="en-NL" sz="1600" dirty="0"/>
+                    </a:p>
+                  </a:txBody>
+                  <a:tcPr/>
+                </a:tc>
+                <a:extLst>
+                  <a:ext uri="{0D108BD9-81ED-4DB2-BD59-A6C34878D82A}">
+                    <a16:rowId xmlns:a16="http://schemas.microsoft.com/office/drawing/2014/main" val="2764142827"/>
+                  </a:ext>
+                </a:extLst>
+              </a:tr>
+              <a:tr h="302969">
+                <a:tc>
+                  <a:txBody>
+                    <a:bodyPr/>
+                    <a:lstStyle/>
+                    <a:p>
+                      <a:pPr algn="ctr"/>
+                      <a:r>
+                        <a:rPr lang="en-US" sz="1600" dirty="0"/>
+                        <a:t>3</a:t>
+                      </a:r>
+                      <a:endParaRPr lang="en-NL" sz="1600" dirty="0"/>
+                    </a:p>
+                  </a:txBody>
+                  <a:tcPr/>
+                </a:tc>
+                <a:extLst>
+                  <a:ext uri="{0D108BD9-81ED-4DB2-BD59-A6C34878D82A}">
+                    <a16:rowId xmlns:a16="http://schemas.microsoft.com/office/drawing/2014/main" val="2895410762"/>
+                  </a:ext>
+                </a:extLst>
+              </a:tr>
+              <a:tr h="302969">
+                <a:tc>
+                  <a:txBody>
+                    <a:bodyPr/>
+                    <a:lstStyle/>
+                    <a:p>
+                      <a:pPr algn="ctr"/>
+                      <a:endParaRPr lang="en-NL" sz="1600" dirty="0"/>
+                    </a:p>
+                  </a:txBody>
+                  <a:tcPr>
+                    <a:noFill/>
+                  </a:tcPr>
+                </a:tc>
+                <a:extLst>
+                  <a:ext uri="{0D108BD9-81ED-4DB2-BD59-A6C34878D82A}">
+                    <a16:rowId xmlns:a16="http://schemas.microsoft.com/office/drawing/2014/main" val="220184898"/>
+                  </a:ext>
+                </a:extLst>
+              </a:tr>
+            </a:tbl>
+          </a:graphicData>
+        </a:graphic>
+      </p:graphicFrame>
+      <p:graphicFrame>
+        <p:nvGraphicFramePr>
+          <p:cNvPr id="30" name="Table 29">
+            <a:extLst>
+              <a:ext uri="{FF2B5EF4-FFF2-40B4-BE49-F238E27FC236}">
+                <a16:creationId xmlns:a16="http://schemas.microsoft.com/office/drawing/2014/main" id="{769042A1-B808-4358-828F-C81279C3DEE5}"/>
+              </a:ext>
+            </a:extLst>
+          </p:cNvPr>
+          <p:cNvGraphicFramePr>
+            <a:graphicFrameLocks noGrp="1"/>
+          </p:cNvGraphicFramePr>
+          <p:nvPr/>
+        </p:nvGraphicFramePr>
+        <p:xfrm>
+          <a:off x="2610278" y="4815989"/>
+          <a:ext cx="870735" cy="1676400"/>
+        </p:xfrm>
+        <a:graphic>
+          <a:graphicData uri="http://schemas.openxmlformats.org/drawingml/2006/table">
+            <a:tbl>
+              <a:tblPr firstRow="1" bandRow="1">
+                <a:tableStyleId>{5C22544A-7EE6-4342-B048-85BDC9FD1C3A}</a:tableStyleId>
+              </a:tblPr>
+              <a:tblGrid>
+                <a:gridCol w="870735">
+                  <a:extLst>
+                    <a:ext uri="{9D8B030D-6E8A-4147-A177-3AD203B41FA5}">
+                      <a16:colId xmlns:a16="http://schemas.microsoft.com/office/drawing/2014/main" val="2491559972"/>
+                    </a:ext>
+                  </a:extLst>
+                </a:gridCol>
+              </a:tblGrid>
+              <a:tr h="302969">
+                <a:tc>
+                  <a:txBody>
+                    <a:bodyPr/>
+                    <a:lstStyle/>
+                    <a:p>
+                      <a:pPr algn="ctr"/>
+                      <a:r>
+                        <a:rPr lang="en-US" sz="1600" dirty="0"/>
+                        <a:t>RIGHT</a:t>
+                      </a:r>
+                      <a:endParaRPr lang="en-NL" sz="1600" dirty="0"/>
+                    </a:p>
+                  </a:txBody>
+                  <a:tcPr/>
+                </a:tc>
+                <a:extLst>
+                  <a:ext uri="{0D108BD9-81ED-4DB2-BD59-A6C34878D82A}">
+                    <a16:rowId xmlns:a16="http://schemas.microsoft.com/office/drawing/2014/main" val="3546219780"/>
+                  </a:ext>
+                </a:extLst>
+              </a:tr>
+              <a:tr h="302969">
+                <a:tc>
+                  <a:txBody>
+                    <a:bodyPr/>
+                    <a:lstStyle/>
+                    <a:p>
+                      <a:pPr algn="ctr"/>
+                      <a:r>
+                        <a:rPr lang="en-US" sz="1600" dirty="0"/>
+                        <a:t>1</a:t>
+                      </a:r>
+                      <a:endParaRPr lang="en-NL" sz="1600" dirty="0"/>
+                    </a:p>
+                  </a:txBody>
+                  <a:tcPr/>
+                </a:tc>
+                <a:extLst>
+                  <a:ext uri="{0D108BD9-81ED-4DB2-BD59-A6C34878D82A}">
+                    <a16:rowId xmlns:a16="http://schemas.microsoft.com/office/drawing/2014/main" val="1999053236"/>
+                  </a:ext>
+                </a:extLst>
+              </a:tr>
+              <a:tr h="302969">
+                <a:tc>
+                  <a:txBody>
+                    <a:bodyPr/>
+                    <a:lstStyle/>
+                    <a:p>
+                      <a:pPr algn="ctr"/>
+                      <a:r>
+                        <a:rPr lang="en-US" sz="1600" dirty="0"/>
+                        <a:t>2</a:t>
+                      </a:r>
+                      <a:endParaRPr lang="en-NL" sz="1600" dirty="0"/>
+                    </a:p>
+                  </a:txBody>
+                  <a:tcPr/>
+                </a:tc>
+                <a:extLst>
+                  <a:ext uri="{0D108BD9-81ED-4DB2-BD59-A6C34878D82A}">
+                    <a16:rowId xmlns:a16="http://schemas.microsoft.com/office/drawing/2014/main" val="2764142827"/>
+                  </a:ext>
+                </a:extLst>
+              </a:tr>
+              <a:tr h="302969">
+                <a:tc>
+                  <a:txBody>
+                    <a:bodyPr/>
+                    <a:lstStyle/>
+                    <a:p>
+                      <a:pPr algn="ctr"/>
+                      <a:endParaRPr lang="en-NL" sz="1600" dirty="0"/>
+                    </a:p>
+                  </a:txBody>
+                  <a:tcPr>
+                    <a:noFill/>
+                  </a:tcPr>
+                </a:tc>
+                <a:extLst>
+                  <a:ext uri="{0D108BD9-81ED-4DB2-BD59-A6C34878D82A}">
+                    <a16:rowId xmlns:a16="http://schemas.microsoft.com/office/drawing/2014/main" val="2895410762"/>
+                  </a:ext>
+                </a:extLst>
+              </a:tr>
+              <a:tr h="302969">
+                <a:tc>
+                  <a:txBody>
+                    <a:bodyPr/>
+                    <a:lstStyle/>
+                    <a:p>
+                      <a:pPr algn="ctr"/>
+                      <a:r>
+                        <a:rPr lang="en-US" sz="1600" dirty="0"/>
+                        <a:t>4</a:t>
+                      </a:r>
+                      <a:endParaRPr lang="en-NL" sz="1600" dirty="0"/>
+                    </a:p>
+                  </a:txBody>
+                  <a:tcPr/>
+                </a:tc>
+                <a:extLst>
+                  <a:ext uri="{0D108BD9-81ED-4DB2-BD59-A6C34878D82A}">
+                    <a16:rowId xmlns:a16="http://schemas.microsoft.com/office/drawing/2014/main" val="220184898"/>
+                  </a:ext>
+                </a:extLst>
+              </a:tr>
+            </a:tbl>
+          </a:graphicData>
+        </a:graphic>
+      </p:graphicFrame>
+      <p:graphicFrame>
+        <p:nvGraphicFramePr>
+          <p:cNvPr id="31" name="Table 30">
+            <a:extLst>
+              <a:ext uri="{FF2B5EF4-FFF2-40B4-BE49-F238E27FC236}">
+                <a16:creationId xmlns:a16="http://schemas.microsoft.com/office/drawing/2014/main" id="{D7D92C89-B8DC-42E1-A60A-E1DFF14B2582}"/>
+              </a:ext>
+            </a:extLst>
+          </p:cNvPr>
+          <p:cNvGraphicFramePr>
+            <a:graphicFrameLocks noGrp="1"/>
+          </p:cNvGraphicFramePr>
+          <p:nvPr/>
+        </p:nvGraphicFramePr>
+        <p:xfrm>
+          <a:off x="4382356" y="4815989"/>
+          <a:ext cx="870735" cy="1676400"/>
+        </p:xfrm>
+        <a:graphic>
+          <a:graphicData uri="http://schemas.openxmlformats.org/drawingml/2006/table">
+            <a:tbl>
+              <a:tblPr firstRow="1" bandRow="1">
+                <a:tableStyleId>{5C22544A-7EE6-4342-B048-85BDC9FD1C3A}</a:tableStyleId>
+              </a:tblPr>
+              <a:tblGrid>
+                <a:gridCol w="870735">
+                  <a:extLst>
+                    <a:ext uri="{9D8B030D-6E8A-4147-A177-3AD203B41FA5}">
+                      <a16:colId xmlns:a16="http://schemas.microsoft.com/office/drawing/2014/main" val="2491559972"/>
+                    </a:ext>
+                  </a:extLst>
+                </a:gridCol>
+              </a:tblGrid>
+              <a:tr h="302969">
+                <a:tc>
+                  <a:txBody>
+                    <a:bodyPr/>
+                    <a:lstStyle/>
+                    <a:p>
+                      <a:pPr algn="ctr"/>
+                      <a:r>
+                        <a:rPr lang="en-US" sz="1600" dirty="0"/>
+                        <a:t>JOINED</a:t>
+                      </a:r>
+                      <a:endParaRPr lang="en-NL" sz="1600" dirty="0"/>
+                    </a:p>
+                  </a:txBody>
+                  <a:tcPr/>
+                </a:tc>
+                <a:extLst>
+                  <a:ext uri="{0D108BD9-81ED-4DB2-BD59-A6C34878D82A}">
+                    <a16:rowId xmlns:a16="http://schemas.microsoft.com/office/drawing/2014/main" val="3546219780"/>
+                  </a:ext>
+                </a:extLst>
+              </a:tr>
+              <a:tr h="302969">
+                <a:tc>
+                  <a:txBody>
+                    <a:bodyPr/>
+                    <a:lstStyle/>
+                    <a:p>
+                      <a:pPr algn="ctr"/>
+                      <a:r>
+                        <a:rPr lang="en-US" sz="1600" dirty="0"/>
+                        <a:t>1</a:t>
+                      </a:r>
+                      <a:endParaRPr lang="en-NL" sz="1600" dirty="0"/>
+                    </a:p>
+                  </a:txBody>
+                  <a:tcPr/>
+                </a:tc>
+                <a:extLst>
+                  <a:ext uri="{0D108BD9-81ED-4DB2-BD59-A6C34878D82A}">
+                    <a16:rowId xmlns:a16="http://schemas.microsoft.com/office/drawing/2014/main" val="1999053236"/>
+                  </a:ext>
+                </a:extLst>
+              </a:tr>
+              <a:tr h="302969">
+                <a:tc>
+                  <a:txBody>
+                    <a:bodyPr/>
+                    <a:lstStyle/>
+                    <a:p>
+                      <a:pPr algn="ctr"/>
+                      <a:r>
+                        <a:rPr lang="en-US" sz="1600" dirty="0"/>
+                        <a:t>2</a:t>
+                      </a:r>
+                      <a:endParaRPr lang="en-NL" sz="1600" dirty="0"/>
+                    </a:p>
+                  </a:txBody>
+                  <a:tcPr/>
+                </a:tc>
+                <a:extLst>
+                  <a:ext uri="{0D108BD9-81ED-4DB2-BD59-A6C34878D82A}">
+                    <a16:rowId xmlns:a16="http://schemas.microsoft.com/office/drawing/2014/main" val="2764142827"/>
+                  </a:ext>
+                </a:extLst>
+              </a:tr>
+              <a:tr h="302969">
+                <a:tc>
+                  <a:txBody>
+                    <a:bodyPr/>
+                    <a:lstStyle/>
+                    <a:p>
+                      <a:pPr algn="ctr"/>
+                      <a:r>
+                        <a:rPr lang="en-US" sz="1600" dirty="0"/>
+                        <a:t>3</a:t>
+                      </a:r>
+                      <a:endParaRPr lang="en-NL" sz="1600" dirty="0"/>
+                    </a:p>
+                  </a:txBody>
+                  <a:tcPr/>
+                </a:tc>
+                <a:extLst>
+                  <a:ext uri="{0D108BD9-81ED-4DB2-BD59-A6C34878D82A}">
+                    <a16:rowId xmlns:a16="http://schemas.microsoft.com/office/drawing/2014/main" val="2895410762"/>
+                  </a:ext>
+                </a:extLst>
+              </a:tr>
+              <a:tr h="302969">
+                <a:tc>
+                  <a:txBody>
+                    <a:bodyPr/>
+                    <a:lstStyle/>
+                    <a:p>
+                      <a:pPr algn="ctr"/>
+                      <a:endParaRPr lang="en-NL" sz="1600" dirty="0"/>
+                    </a:p>
+                  </a:txBody>
+                  <a:tcPr>
+                    <a:noFill/>
+                  </a:tcPr>
+                </a:tc>
+                <a:extLst>
+                  <a:ext uri="{0D108BD9-81ED-4DB2-BD59-A6C34878D82A}">
+                    <a16:rowId xmlns:a16="http://schemas.microsoft.com/office/drawing/2014/main" val="220184898"/>
+                  </a:ext>
+                </a:extLst>
+              </a:tr>
+            </a:tbl>
+          </a:graphicData>
+        </a:graphic>
+      </p:graphicFrame>
+      <p:sp>
+        <p:nvSpPr>
+          <p:cNvPr id="32" name="Plus Sign 31">
+            <a:extLst>
+              <a:ext uri="{FF2B5EF4-FFF2-40B4-BE49-F238E27FC236}">
+                <a16:creationId xmlns:a16="http://schemas.microsoft.com/office/drawing/2014/main" id="{B73295A5-66CA-4D76-AF34-D9E3BE02A576}"/>
+              </a:ext>
+            </a:extLst>
+          </p:cNvPr>
+          <p:cNvSpPr/>
+          <p:nvPr/>
+        </p:nvSpPr>
+        <p:spPr>
+          <a:xfrm>
+            <a:off x="1941793" y="5381923"/>
+            <a:ext cx="435625" cy="435625"/>
+          </a:xfrm>
+          <a:prstGeom prst="mathPlus">
+            <a:avLst/>
+          </a:prstGeom>
+        </p:spPr>
+        <p:style>
+          <a:lnRef idx="2">
+            <a:schemeClr val="accent2">
+              <a:shade val="50000"/>
+            </a:schemeClr>
+          </a:lnRef>
+          <a:fillRef idx="1">
+            <a:schemeClr val="accent2"/>
+          </a:fillRef>
+          <a:effectRef idx="0">
+            <a:schemeClr val="accent2"/>
+          </a:effectRef>
+          <a:fontRef idx="minor">
+            <a:schemeClr val="lt1"/>
+          </a:fontRef>
+        </p:style>
+        <p:txBody>
+          <a:bodyPr rtlCol="0" anchor="ctr"/>
+          <a:lstStyle/>
+          <a:p>
+            <a:pPr algn="ctr"/>
+            <a:endParaRPr lang="en-NL"/>
+          </a:p>
+        </p:txBody>
+      </p:sp>
+      <p:sp>
+        <p:nvSpPr>
+          <p:cNvPr id="33" name="Equals 32">
+            <a:extLst>
+              <a:ext uri="{FF2B5EF4-FFF2-40B4-BE49-F238E27FC236}">
+                <a16:creationId xmlns:a16="http://schemas.microsoft.com/office/drawing/2014/main" id="{1F4CE88A-4E81-4728-B6D5-AB33E433D710}"/>
+              </a:ext>
+            </a:extLst>
+          </p:cNvPr>
+          <p:cNvSpPr/>
+          <p:nvPr/>
+        </p:nvSpPr>
+        <p:spPr>
+          <a:xfrm>
+            <a:off x="3713872" y="5456714"/>
+            <a:ext cx="435625" cy="322366"/>
+          </a:xfrm>
+          <a:prstGeom prst="mathEqual">
+            <a:avLst/>
+          </a:prstGeom>
+        </p:spPr>
+        <p:style>
+          <a:lnRef idx="2">
+            <a:schemeClr val="accent2">
+              <a:shade val="50000"/>
+            </a:schemeClr>
+          </a:lnRef>
+          <a:fillRef idx="1">
+            <a:schemeClr val="accent2"/>
+          </a:fillRef>
+          <a:effectRef idx="0">
+            <a:schemeClr val="accent2"/>
+          </a:effectRef>
+          <a:fontRef idx="minor">
+            <a:schemeClr val="lt1"/>
+          </a:fontRef>
+        </p:style>
+        <p:txBody>
+          <a:bodyPr rtlCol="0" anchor="ctr"/>
+          <a:lstStyle/>
+          <a:p>
+            <a:pPr algn="ctr"/>
+            <a:endParaRPr lang="en-NL">
+              <a:solidFill>
+                <a:schemeClr val="tx1"/>
+              </a:solidFill>
+            </a:endParaRPr>
+          </a:p>
+        </p:txBody>
+      </p:sp>
+      <p:sp>
+        <p:nvSpPr>
+          <p:cNvPr id="34" name="TextBox 33">
+            <a:extLst>
+              <a:ext uri="{FF2B5EF4-FFF2-40B4-BE49-F238E27FC236}">
+                <a16:creationId xmlns:a16="http://schemas.microsoft.com/office/drawing/2014/main" id="{0E9405D9-9735-4C6D-88E9-CBD9336928B5}"/>
+              </a:ext>
+            </a:extLst>
+          </p:cNvPr>
+          <p:cNvSpPr txBox="1"/>
+          <p:nvPr/>
+        </p:nvSpPr>
+        <p:spPr>
+          <a:xfrm>
+            <a:off x="838202" y="4321678"/>
+            <a:ext cx="4414889" cy="369332"/>
+          </a:xfrm>
+          <a:prstGeom prst="rect">
+            <a:avLst/>
+          </a:prstGeom>
+          <a:noFill/>
+        </p:spPr>
+        <p:txBody>
+          <a:bodyPr wrap="square" lIns="0" rIns="0" rtlCol="0">
+            <a:spAutoFit/>
+          </a:bodyPr>
+          <a:lstStyle/>
+          <a:p>
+            <a:r>
+              <a:rPr lang="en-US" dirty="0"/>
+              <a:t>LEFT JOIN</a:t>
+            </a:r>
+            <a:endParaRPr lang="en-NL" dirty="0"/>
+          </a:p>
+        </p:txBody>
+      </p:sp>
+      <p:graphicFrame>
+        <p:nvGraphicFramePr>
+          <p:cNvPr id="37" name="Table 9">
+            <a:extLst>
+              <a:ext uri="{FF2B5EF4-FFF2-40B4-BE49-F238E27FC236}">
+                <a16:creationId xmlns:a16="http://schemas.microsoft.com/office/drawing/2014/main" id="{E23D8136-5FDF-4BC3-B73B-4EA78EB3EF63}"/>
+              </a:ext>
+            </a:extLst>
+          </p:cNvPr>
+          <p:cNvGraphicFramePr>
+            <a:graphicFrameLocks noGrp="1"/>
+          </p:cNvGraphicFramePr>
+          <p:nvPr/>
+        </p:nvGraphicFramePr>
+        <p:xfrm>
+          <a:off x="6159572" y="4815989"/>
+          <a:ext cx="870735" cy="1676400"/>
+        </p:xfrm>
+        <a:graphic>
+          <a:graphicData uri="http://schemas.openxmlformats.org/drawingml/2006/table">
+            <a:tbl>
+              <a:tblPr firstRow="1" bandRow="1">
+                <a:tableStyleId>{5C22544A-7EE6-4342-B048-85BDC9FD1C3A}</a:tableStyleId>
+              </a:tblPr>
+              <a:tblGrid>
+                <a:gridCol w="870735">
+                  <a:extLst>
+                    <a:ext uri="{9D8B030D-6E8A-4147-A177-3AD203B41FA5}">
+                      <a16:colId xmlns:a16="http://schemas.microsoft.com/office/drawing/2014/main" val="2491559972"/>
+                    </a:ext>
+                  </a:extLst>
+                </a:gridCol>
+              </a:tblGrid>
+              <a:tr h="302969">
+                <a:tc>
+                  <a:txBody>
+                    <a:bodyPr/>
+                    <a:lstStyle/>
+                    <a:p>
+                      <a:pPr algn="ctr"/>
+                      <a:r>
+                        <a:rPr lang="en-US" sz="1600" dirty="0"/>
+                        <a:t>LEFT</a:t>
+                      </a:r>
+                      <a:endParaRPr lang="en-NL" sz="1600" dirty="0"/>
+                    </a:p>
+                  </a:txBody>
+                  <a:tcPr/>
+                </a:tc>
+                <a:extLst>
+                  <a:ext uri="{0D108BD9-81ED-4DB2-BD59-A6C34878D82A}">
+                    <a16:rowId xmlns:a16="http://schemas.microsoft.com/office/drawing/2014/main" val="3546219780"/>
+                  </a:ext>
+                </a:extLst>
+              </a:tr>
+              <a:tr h="302969">
+                <a:tc>
+                  <a:txBody>
+                    <a:bodyPr/>
+                    <a:lstStyle/>
+                    <a:p>
+                      <a:pPr algn="ctr"/>
+                      <a:r>
+                        <a:rPr lang="en-US" sz="1600" dirty="0"/>
+                        <a:t>1</a:t>
+                      </a:r>
+                      <a:endParaRPr lang="en-NL" sz="1600" dirty="0"/>
+                    </a:p>
+                  </a:txBody>
+                  <a:tcPr/>
+                </a:tc>
+                <a:extLst>
+                  <a:ext uri="{0D108BD9-81ED-4DB2-BD59-A6C34878D82A}">
+                    <a16:rowId xmlns:a16="http://schemas.microsoft.com/office/drawing/2014/main" val="1999053236"/>
+                  </a:ext>
+                </a:extLst>
+              </a:tr>
+              <a:tr h="302969">
+                <a:tc>
+                  <a:txBody>
+                    <a:bodyPr/>
+                    <a:lstStyle/>
+                    <a:p>
+                      <a:pPr algn="ctr"/>
+                      <a:r>
+                        <a:rPr lang="en-US" sz="1600" dirty="0"/>
+                        <a:t>2</a:t>
+                      </a:r>
+                      <a:endParaRPr lang="en-NL" sz="1600" dirty="0"/>
+                    </a:p>
+                  </a:txBody>
+                  <a:tcPr/>
+                </a:tc>
+                <a:extLst>
+                  <a:ext uri="{0D108BD9-81ED-4DB2-BD59-A6C34878D82A}">
+                    <a16:rowId xmlns:a16="http://schemas.microsoft.com/office/drawing/2014/main" val="2764142827"/>
+                  </a:ext>
+                </a:extLst>
+              </a:tr>
+              <a:tr h="302969">
+                <a:tc>
+                  <a:txBody>
+                    <a:bodyPr/>
+                    <a:lstStyle/>
+                    <a:p>
+                      <a:pPr algn="ctr"/>
+                      <a:r>
+                        <a:rPr lang="en-US" sz="1600" dirty="0"/>
+                        <a:t>3</a:t>
+                      </a:r>
+                      <a:endParaRPr lang="en-NL" sz="1600" dirty="0"/>
+                    </a:p>
+                  </a:txBody>
+                  <a:tcPr/>
+                </a:tc>
+                <a:extLst>
+                  <a:ext uri="{0D108BD9-81ED-4DB2-BD59-A6C34878D82A}">
+                    <a16:rowId xmlns:a16="http://schemas.microsoft.com/office/drawing/2014/main" val="2895410762"/>
+                  </a:ext>
+                </a:extLst>
+              </a:tr>
+              <a:tr h="302969">
+                <a:tc>
+                  <a:txBody>
+                    <a:bodyPr/>
+                    <a:lstStyle/>
+                    <a:p>
+                      <a:pPr algn="ctr"/>
+                      <a:endParaRPr lang="en-NL" sz="1600" dirty="0"/>
+                    </a:p>
+                  </a:txBody>
+                  <a:tcPr>
+                    <a:noFill/>
+                  </a:tcPr>
+                </a:tc>
+                <a:extLst>
+                  <a:ext uri="{0D108BD9-81ED-4DB2-BD59-A6C34878D82A}">
+                    <a16:rowId xmlns:a16="http://schemas.microsoft.com/office/drawing/2014/main" val="220184898"/>
+                  </a:ext>
+                </a:extLst>
+              </a:tr>
+            </a:tbl>
+          </a:graphicData>
+        </a:graphic>
+      </p:graphicFrame>
+      <p:graphicFrame>
+        <p:nvGraphicFramePr>
+          <p:cNvPr id="38" name="Table 37">
+            <a:extLst>
+              <a:ext uri="{FF2B5EF4-FFF2-40B4-BE49-F238E27FC236}">
+                <a16:creationId xmlns:a16="http://schemas.microsoft.com/office/drawing/2014/main" id="{1D6EEDD1-7EF6-4FC9-BF19-F99361F17504}"/>
+              </a:ext>
+            </a:extLst>
+          </p:cNvPr>
+          <p:cNvGraphicFramePr>
+            <a:graphicFrameLocks noGrp="1"/>
+          </p:cNvGraphicFramePr>
+          <p:nvPr/>
+        </p:nvGraphicFramePr>
+        <p:xfrm>
+          <a:off x="7931650" y="4815989"/>
+          <a:ext cx="870735" cy="1676400"/>
+        </p:xfrm>
+        <a:graphic>
+          <a:graphicData uri="http://schemas.openxmlformats.org/drawingml/2006/table">
+            <a:tbl>
+              <a:tblPr firstRow="1" bandRow="1">
+                <a:tableStyleId>{5C22544A-7EE6-4342-B048-85BDC9FD1C3A}</a:tableStyleId>
+              </a:tblPr>
+              <a:tblGrid>
+                <a:gridCol w="870735">
+                  <a:extLst>
+                    <a:ext uri="{9D8B030D-6E8A-4147-A177-3AD203B41FA5}">
+                      <a16:colId xmlns:a16="http://schemas.microsoft.com/office/drawing/2014/main" val="2491559972"/>
+                    </a:ext>
+                  </a:extLst>
+                </a:gridCol>
+              </a:tblGrid>
+              <a:tr h="302969">
+                <a:tc>
+                  <a:txBody>
+                    <a:bodyPr/>
+                    <a:lstStyle/>
+                    <a:p>
+                      <a:pPr algn="ctr"/>
+                      <a:r>
+                        <a:rPr lang="en-US" sz="1600" dirty="0"/>
+                        <a:t>RIGHT</a:t>
+                      </a:r>
+                      <a:endParaRPr lang="en-NL" sz="1600" dirty="0"/>
+                    </a:p>
+                  </a:txBody>
+                  <a:tcPr/>
+                </a:tc>
+                <a:extLst>
+                  <a:ext uri="{0D108BD9-81ED-4DB2-BD59-A6C34878D82A}">
+                    <a16:rowId xmlns:a16="http://schemas.microsoft.com/office/drawing/2014/main" val="3546219780"/>
+                  </a:ext>
+                </a:extLst>
+              </a:tr>
+              <a:tr h="302969">
+                <a:tc>
+                  <a:txBody>
+                    <a:bodyPr/>
+                    <a:lstStyle/>
+                    <a:p>
+                      <a:pPr algn="ctr"/>
+                      <a:r>
+                        <a:rPr lang="en-US" sz="1600" dirty="0"/>
+                        <a:t>1</a:t>
+                      </a:r>
+                      <a:endParaRPr lang="en-NL" sz="1600" dirty="0"/>
+                    </a:p>
+                  </a:txBody>
+                  <a:tcPr/>
+                </a:tc>
+                <a:extLst>
+                  <a:ext uri="{0D108BD9-81ED-4DB2-BD59-A6C34878D82A}">
+                    <a16:rowId xmlns:a16="http://schemas.microsoft.com/office/drawing/2014/main" val="1999053236"/>
+                  </a:ext>
+                </a:extLst>
+              </a:tr>
+              <a:tr h="302969">
+                <a:tc>
+                  <a:txBody>
+                    <a:bodyPr/>
+                    <a:lstStyle/>
+                    <a:p>
+                      <a:pPr algn="ctr"/>
+                      <a:r>
+                        <a:rPr lang="en-US" sz="1600" dirty="0"/>
+                        <a:t>2</a:t>
+                      </a:r>
+                      <a:endParaRPr lang="en-NL" sz="1600" dirty="0"/>
+                    </a:p>
+                  </a:txBody>
+                  <a:tcPr/>
+                </a:tc>
+                <a:extLst>
+                  <a:ext uri="{0D108BD9-81ED-4DB2-BD59-A6C34878D82A}">
+                    <a16:rowId xmlns:a16="http://schemas.microsoft.com/office/drawing/2014/main" val="2764142827"/>
+                  </a:ext>
+                </a:extLst>
+              </a:tr>
+              <a:tr h="302969">
+                <a:tc>
+                  <a:txBody>
+                    <a:bodyPr/>
+                    <a:lstStyle/>
+                    <a:p>
+                      <a:pPr algn="ctr"/>
+                      <a:endParaRPr lang="en-NL" sz="1600" dirty="0"/>
+                    </a:p>
+                  </a:txBody>
+                  <a:tcPr>
+                    <a:noFill/>
+                  </a:tcPr>
+                </a:tc>
+                <a:extLst>
+                  <a:ext uri="{0D108BD9-81ED-4DB2-BD59-A6C34878D82A}">
+                    <a16:rowId xmlns:a16="http://schemas.microsoft.com/office/drawing/2014/main" val="2895410762"/>
+                  </a:ext>
+                </a:extLst>
+              </a:tr>
+              <a:tr h="302969">
+                <a:tc>
+                  <a:txBody>
+                    <a:bodyPr/>
+                    <a:lstStyle/>
+                    <a:p>
+                      <a:pPr algn="ctr"/>
+                      <a:r>
+                        <a:rPr lang="en-US" sz="1600" dirty="0"/>
+                        <a:t>4</a:t>
+                      </a:r>
+                      <a:endParaRPr lang="en-NL" sz="1600" dirty="0"/>
+                    </a:p>
+                  </a:txBody>
+                  <a:tcPr/>
+                </a:tc>
+                <a:extLst>
+                  <a:ext uri="{0D108BD9-81ED-4DB2-BD59-A6C34878D82A}">
+                    <a16:rowId xmlns:a16="http://schemas.microsoft.com/office/drawing/2014/main" val="220184898"/>
+                  </a:ext>
+                </a:extLst>
+              </a:tr>
+            </a:tbl>
+          </a:graphicData>
+        </a:graphic>
+      </p:graphicFrame>
+      <p:graphicFrame>
+        <p:nvGraphicFramePr>
+          <p:cNvPr id="39" name="Table 38">
+            <a:extLst>
+              <a:ext uri="{FF2B5EF4-FFF2-40B4-BE49-F238E27FC236}">
+                <a16:creationId xmlns:a16="http://schemas.microsoft.com/office/drawing/2014/main" id="{5BB58122-A24C-4848-906B-F3A1DCA2696E}"/>
+              </a:ext>
+            </a:extLst>
+          </p:cNvPr>
+          <p:cNvGraphicFramePr>
+            <a:graphicFrameLocks noGrp="1"/>
+          </p:cNvGraphicFramePr>
+          <p:nvPr/>
+        </p:nvGraphicFramePr>
+        <p:xfrm>
+          <a:off x="9703728" y="4815989"/>
+          <a:ext cx="870735" cy="1676400"/>
+        </p:xfrm>
+        <a:graphic>
+          <a:graphicData uri="http://schemas.openxmlformats.org/drawingml/2006/table">
+            <a:tbl>
+              <a:tblPr firstRow="1" bandRow="1">
+                <a:tableStyleId>{5C22544A-7EE6-4342-B048-85BDC9FD1C3A}</a:tableStyleId>
+              </a:tblPr>
+              <a:tblGrid>
+                <a:gridCol w="870735">
+                  <a:extLst>
+                    <a:ext uri="{9D8B030D-6E8A-4147-A177-3AD203B41FA5}">
+                      <a16:colId xmlns:a16="http://schemas.microsoft.com/office/drawing/2014/main" val="2491559972"/>
+                    </a:ext>
+                  </a:extLst>
+                </a:gridCol>
+              </a:tblGrid>
+              <a:tr h="302969">
+                <a:tc>
+                  <a:txBody>
+                    <a:bodyPr/>
+                    <a:lstStyle/>
+                    <a:p>
+                      <a:pPr algn="ctr"/>
+                      <a:r>
+                        <a:rPr lang="en-US" sz="1600" dirty="0"/>
+                        <a:t>JOINED</a:t>
+                      </a:r>
+                      <a:endParaRPr lang="en-NL" sz="1600" dirty="0"/>
+                    </a:p>
+                  </a:txBody>
+                  <a:tcPr/>
+                </a:tc>
+                <a:extLst>
+                  <a:ext uri="{0D108BD9-81ED-4DB2-BD59-A6C34878D82A}">
+                    <a16:rowId xmlns:a16="http://schemas.microsoft.com/office/drawing/2014/main" val="3546219780"/>
+                  </a:ext>
+                </a:extLst>
+              </a:tr>
+              <a:tr h="302969">
+                <a:tc>
+                  <a:txBody>
+                    <a:bodyPr/>
+                    <a:lstStyle/>
+                    <a:p>
+                      <a:pPr algn="ctr"/>
+                      <a:r>
+                        <a:rPr lang="en-US" sz="1600" dirty="0"/>
+                        <a:t>1</a:t>
+                      </a:r>
+                      <a:endParaRPr lang="en-NL" sz="1600" dirty="0"/>
+                    </a:p>
+                  </a:txBody>
+                  <a:tcPr/>
+                </a:tc>
+                <a:extLst>
+                  <a:ext uri="{0D108BD9-81ED-4DB2-BD59-A6C34878D82A}">
+                    <a16:rowId xmlns:a16="http://schemas.microsoft.com/office/drawing/2014/main" val="1999053236"/>
+                  </a:ext>
+                </a:extLst>
+              </a:tr>
+              <a:tr h="302969">
+                <a:tc>
+                  <a:txBody>
+                    <a:bodyPr/>
+                    <a:lstStyle/>
+                    <a:p>
+                      <a:pPr algn="ctr"/>
+                      <a:r>
+                        <a:rPr lang="en-US" sz="1600" dirty="0"/>
+                        <a:t>2</a:t>
+                      </a:r>
+                      <a:endParaRPr lang="en-NL" sz="1600" dirty="0"/>
+                    </a:p>
+                  </a:txBody>
+                  <a:tcPr/>
+                </a:tc>
+                <a:extLst>
+                  <a:ext uri="{0D108BD9-81ED-4DB2-BD59-A6C34878D82A}">
+                    <a16:rowId xmlns:a16="http://schemas.microsoft.com/office/drawing/2014/main" val="2764142827"/>
+                  </a:ext>
+                </a:extLst>
+              </a:tr>
+              <a:tr h="302969">
+                <a:tc>
+                  <a:txBody>
+                    <a:bodyPr/>
+                    <a:lstStyle/>
+                    <a:p>
+                      <a:pPr algn="ctr"/>
+                      <a:endParaRPr lang="en-NL" sz="1600" dirty="0"/>
+                    </a:p>
+                  </a:txBody>
+                  <a:tcPr>
+                    <a:noFill/>
+                  </a:tcPr>
+                </a:tc>
+                <a:extLst>
+                  <a:ext uri="{0D108BD9-81ED-4DB2-BD59-A6C34878D82A}">
+                    <a16:rowId xmlns:a16="http://schemas.microsoft.com/office/drawing/2014/main" val="2895410762"/>
+                  </a:ext>
+                </a:extLst>
+              </a:tr>
+              <a:tr h="302969">
+                <a:tc>
+                  <a:txBody>
+                    <a:bodyPr/>
+                    <a:lstStyle/>
+                    <a:p>
+                      <a:pPr algn="ctr"/>
+                      <a:r>
+                        <a:rPr lang="en-US" sz="1600" dirty="0"/>
+                        <a:t>4</a:t>
+                      </a:r>
+                      <a:endParaRPr lang="en-NL" sz="1600" dirty="0"/>
+                    </a:p>
+                  </a:txBody>
+                  <a:tcPr/>
+                </a:tc>
+                <a:extLst>
+                  <a:ext uri="{0D108BD9-81ED-4DB2-BD59-A6C34878D82A}">
+                    <a16:rowId xmlns:a16="http://schemas.microsoft.com/office/drawing/2014/main" val="220184898"/>
+                  </a:ext>
+                </a:extLst>
+              </a:tr>
+            </a:tbl>
+          </a:graphicData>
+        </a:graphic>
+      </p:graphicFrame>
+      <p:sp>
+        <p:nvSpPr>
+          <p:cNvPr id="40" name="Plus Sign 39">
+            <a:extLst>
+              <a:ext uri="{FF2B5EF4-FFF2-40B4-BE49-F238E27FC236}">
+                <a16:creationId xmlns:a16="http://schemas.microsoft.com/office/drawing/2014/main" id="{078E1513-33AD-40D8-B1B6-D61254AFB3ED}"/>
+              </a:ext>
+            </a:extLst>
+          </p:cNvPr>
+          <p:cNvSpPr/>
+          <p:nvPr/>
+        </p:nvSpPr>
+        <p:spPr>
+          <a:xfrm>
+            <a:off x="7263165" y="5381923"/>
+            <a:ext cx="435625" cy="435625"/>
+          </a:xfrm>
+          <a:prstGeom prst="mathPlus">
+            <a:avLst/>
+          </a:prstGeom>
+        </p:spPr>
+        <p:style>
+          <a:lnRef idx="2">
+            <a:schemeClr val="accent2">
+              <a:shade val="50000"/>
+            </a:schemeClr>
+          </a:lnRef>
+          <a:fillRef idx="1">
+            <a:schemeClr val="accent2"/>
+          </a:fillRef>
+          <a:effectRef idx="0">
+            <a:schemeClr val="accent2"/>
+          </a:effectRef>
+          <a:fontRef idx="minor">
+            <a:schemeClr val="lt1"/>
+          </a:fontRef>
+        </p:style>
+        <p:txBody>
+          <a:bodyPr rtlCol="0" anchor="ctr"/>
+          <a:lstStyle/>
+          <a:p>
+            <a:pPr algn="ctr"/>
+            <a:endParaRPr lang="en-NL"/>
+          </a:p>
+        </p:txBody>
+      </p:sp>
+      <p:sp>
+        <p:nvSpPr>
+          <p:cNvPr id="41" name="Equals 40">
+            <a:extLst>
+              <a:ext uri="{FF2B5EF4-FFF2-40B4-BE49-F238E27FC236}">
+                <a16:creationId xmlns:a16="http://schemas.microsoft.com/office/drawing/2014/main" id="{8D3699F4-8C4A-433E-BAC4-0EE946A4E183}"/>
+              </a:ext>
+            </a:extLst>
+          </p:cNvPr>
+          <p:cNvSpPr/>
+          <p:nvPr/>
+        </p:nvSpPr>
+        <p:spPr>
+          <a:xfrm>
+            <a:off x="9035244" y="5456714"/>
+            <a:ext cx="435625" cy="322366"/>
+          </a:xfrm>
+          <a:prstGeom prst="mathEqual">
+            <a:avLst/>
+          </a:prstGeom>
+        </p:spPr>
+        <p:style>
+          <a:lnRef idx="2">
+            <a:schemeClr val="accent2">
+              <a:shade val="50000"/>
+            </a:schemeClr>
+          </a:lnRef>
+          <a:fillRef idx="1">
+            <a:schemeClr val="accent2"/>
+          </a:fillRef>
+          <a:effectRef idx="0">
+            <a:schemeClr val="accent2"/>
+          </a:effectRef>
+          <a:fontRef idx="minor">
+            <a:schemeClr val="lt1"/>
+          </a:fontRef>
+        </p:style>
+        <p:txBody>
+          <a:bodyPr rtlCol="0" anchor="ctr"/>
+          <a:lstStyle/>
+          <a:p>
+            <a:pPr algn="ctr"/>
+            <a:endParaRPr lang="en-NL">
+              <a:solidFill>
+                <a:schemeClr val="tx1"/>
+              </a:solidFill>
+            </a:endParaRPr>
+          </a:p>
+        </p:txBody>
+      </p:sp>
+      <p:sp>
+        <p:nvSpPr>
+          <p:cNvPr id="42" name="TextBox 41">
+            <a:extLst>
+              <a:ext uri="{FF2B5EF4-FFF2-40B4-BE49-F238E27FC236}">
+                <a16:creationId xmlns:a16="http://schemas.microsoft.com/office/drawing/2014/main" id="{038931E2-77F8-40A8-8539-B2EF72200795}"/>
+              </a:ext>
+            </a:extLst>
+          </p:cNvPr>
+          <p:cNvSpPr txBox="1"/>
+          <p:nvPr/>
+        </p:nvSpPr>
+        <p:spPr>
+          <a:xfrm>
+            <a:off x="6159574" y="4321678"/>
+            <a:ext cx="4414889" cy="369332"/>
+          </a:xfrm>
+          <a:prstGeom prst="rect">
+            <a:avLst/>
+          </a:prstGeom>
+          <a:noFill/>
+        </p:spPr>
+        <p:txBody>
+          <a:bodyPr wrap="square" lIns="0" rIns="0" rtlCol="0">
+            <a:spAutoFit/>
+          </a:bodyPr>
+          <a:lstStyle/>
+          <a:p>
+            <a:pPr algn="r"/>
+            <a:r>
+              <a:rPr lang="en-US" dirty="0"/>
+              <a:t>RIGHT JOIN</a:t>
+            </a:r>
+            <a:endParaRPr lang="en-NL" dirty="0"/>
+          </a:p>
+        </p:txBody>
+      </p:sp>
+    </p:spTree>
+    <p:extLst>
+      <p:ext uri="{BB962C8B-B14F-4D97-AF65-F5344CB8AC3E}">
+        <p14:creationId xmlns:p14="http://schemas.microsoft.com/office/powerpoint/2010/main" val="1349700972"/>
+      </p:ext>
+    </p:extLst>
+  </p:cSld>
+  <p:clrMapOvr>
+    <a:masterClrMapping/>
+  </p:clrMapOvr>
+</p:sld>
+</file>
+
+<file path=ppt/slides/slide12.xml><?xml version="1.0" encoding="utf-8"?>
+<p:sld xmlns:a="http://schemas.openxmlformats.org/drawingml/2006/main" xmlns:r="http://schemas.openxmlformats.org/officeDocument/2006/relationships" xmlns:p="http://schemas.openxmlformats.org/presentationml/2006/main">
+  <p:cSld>
+    <p:spTree>
+      <p:nvGrpSpPr>
+        <p:cNvPr id="1" name=""/>
+        <p:cNvGrpSpPr/>
+        <p:nvPr/>
+      </p:nvGrpSpPr>
+      <p:grpSpPr>
+        <a:xfrm>
+          <a:off x="0" y="0"/>
+          <a:ext cx="0" cy="0"/>
+          <a:chOff x="0" y="0"/>
+          <a:chExt cx="0" cy="0"/>
+        </a:xfrm>
+      </p:grpSpPr>
+      <p:sp>
+        <p:nvSpPr>
           <p:cNvPr id="4" name="Title 3">
             <a:extLst>
               <a:ext uri="{FF2B5EF4-FFF2-40B4-BE49-F238E27FC236}">
@@ -4484,7 +7330,7 @@
 </p:sld>
 </file>
 
-<file path=ppt/slides/slide12.xml><?xml version="1.0" encoding="utf-8"?>
+<file path=ppt/slides/slide13.xml><?xml version="1.0" encoding="utf-8"?>
 <p:sld xmlns:a="http://schemas.openxmlformats.org/drawingml/2006/main" xmlns:r="http://schemas.openxmlformats.org/officeDocument/2006/relationships" xmlns:p="http://schemas.openxmlformats.org/presentationml/2006/main">
   <p:cSld>
     <p:spTree>
@@ -5048,7 +7894,7 @@
 </p:sld>
 </file>
 
-<file path=ppt/slides/slide13.xml><?xml version="1.0" encoding="utf-8"?>
+<file path=ppt/slides/slide14.xml><?xml version="1.0" encoding="utf-8"?>
 <p:sld xmlns:a="http://schemas.openxmlformats.org/drawingml/2006/main" xmlns:r="http://schemas.openxmlformats.org/officeDocument/2006/relationships" xmlns:p="http://schemas.openxmlformats.org/presentationml/2006/main">
   <p:cSld>
     <p:spTree>
@@ -6389,7 +9235,7 @@
 </p:sld>
 </file>
 
-<file path=ppt/slides/slide14.xml><?xml version="1.0" encoding="utf-8"?>
+<file path=ppt/slides/slide15.xml><?xml version="1.0" encoding="utf-8"?>
 <p:sld xmlns:a="http://schemas.openxmlformats.org/drawingml/2006/main" xmlns:r="http://schemas.openxmlformats.org/officeDocument/2006/relationships" xmlns:p="http://schemas.openxmlformats.org/presentationml/2006/main">
   <p:cSld>
     <p:spTree>
@@ -6824,7 +9670,7 @@
 </p:sld>
 </file>
 
-<file path=ppt/slides/slide15.xml><?xml version="1.0" encoding="utf-8"?>
+<file path=ppt/slides/slide16.xml><?xml version="1.0" encoding="utf-8"?>
 <p:sld xmlns:a="http://schemas.openxmlformats.org/drawingml/2006/main" xmlns:r="http://schemas.openxmlformats.org/officeDocument/2006/relationships" xmlns:p="http://schemas.openxmlformats.org/presentationml/2006/main">
   <p:cSld>
     <p:spTree>
@@ -7402,7 +10248,7 @@
 </p:sld>
 </file>
 
-<file path=ppt/slides/slide16.xml><?xml version="1.0" encoding="utf-8"?>
+<file path=ppt/slides/slide17.xml><?xml version="1.0" encoding="utf-8"?>
 <p:sld xmlns:a="http://schemas.openxmlformats.org/drawingml/2006/main" xmlns:r="http://schemas.openxmlformats.org/officeDocument/2006/relationships" xmlns:p="http://schemas.openxmlformats.org/presentationml/2006/main">
   <p:cSld>
     <p:spTree>
@@ -8474,7 +11320,7 @@
 </p:sld>
 </file>
 
-<file path=ppt/slides/slide17.xml><?xml version="1.0" encoding="utf-8"?>
+<file path=ppt/slides/slide18.xml><?xml version="1.0" encoding="utf-8"?>
 <p:sld xmlns:a="http://schemas.openxmlformats.org/drawingml/2006/main" xmlns:r="http://schemas.openxmlformats.org/officeDocument/2006/relationships" xmlns:p="http://schemas.openxmlformats.org/presentationml/2006/main">
   <p:cSld>
     <p:spTree>
@@ -9101,7 +11947,7 @@
 </p:sld>
 </file>
 
-<file path=ppt/slides/slide18.xml><?xml version="1.0" encoding="utf-8"?>
+<file path=ppt/slides/slide19.xml><?xml version="1.0" encoding="utf-8"?>
 <p:sld xmlns:a="http://schemas.openxmlformats.org/drawingml/2006/main" xmlns:r="http://schemas.openxmlformats.org/officeDocument/2006/relationships" xmlns:p="http://schemas.openxmlformats.org/presentationml/2006/main">
   <p:cSld>
     <p:spTree>
@@ -9657,7 +12503,285 @@
 </p:sld>
 </file>
 
-<file path=ppt/slides/slide19.xml><?xml version="1.0" encoding="utf-8"?>
+<file path=ppt/slides/slide2.xml><?xml version="1.0" encoding="utf-8"?>
+<p:sld xmlns:a="http://schemas.openxmlformats.org/drawingml/2006/main" xmlns:r="http://schemas.openxmlformats.org/officeDocument/2006/relationships" xmlns:p="http://schemas.openxmlformats.org/presentationml/2006/main">
+  <p:cSld>
+    <p:spTree>
+      <p:nvGrpSpPr>
+        <p:cNvPr id="1" name=""/>
+        <p:cNvGrpSpPr/>
+        <p:nvPr/>
+      </p:nvGrpSpPr>
+      <p:grpSpPr>
+        <a:xfrm>
+          <a:off x="0" y="0"/>
+          <a:ext cx="0" cy="0"/>
+          <a:chOff x="0" y="0"/>
+          <a:chExt cx="0" cy="0"/>
+        </a:xfrm>
+      </p:grpSpPr>
+      <p:sp>
+        <p:nvSpPr>
+          <p:cNvPr id="2" name="Title 1">
+            <a:extLst>
+              <a:ext uri="{FF2B5EF4-FFF2-40B4-BE49-F238E27FC236}">
+                <a16:creationId xmlns:a16="http://schemas.microsoft.com/office/drawing/2014/main" id="{39A1D606-8DD1-369C-5C09-471CDD551AD5}"/>
+              </a:ext>
+            </a:extLst>
+          </p:cNvPr>
+          <p:cNvSpPr>
+            <a:spLocks noGrp="1"/>
+          </p:cNvSpPr>
+          <p:nvPr>
+            <p:ph type="title"/>
+          </p:nvPr>
+        </p:nvSpPr>
+        <p:spPr>
+          <a:xfrm>
+            <a:off x="838200" y="365126"/>
+            <a:ext cx="10515600" cy="718608"/>
+          </a:xfrm>
+        </p:spPr>
+        <p:txBody>
+          <a:bodyPr>
+            <a:normAutofit/>
+          </a:bodyPr>
+          <a:lstStyle/>
+          <a:p>
+            <a:r>
+              <a:rPr lang="nl-NL" sz="3600" noProof="0" dirty="0"/>
+              <a:t>Agenda</a:t>
+            </a:r>
+          </a:p>
+        </p:txBody>
+      </p:sp>
+      <p:sp>
+        <p:nvSpPr>
+          <p:cNvPr id="3" name="Content Placeholder 2">
+            <a:extLst>
+              <a:ext uri="{FF2B5EF4-FFF2-40B4-BE49-F238E27FC236}">
+                <a16:creationId xmlns:a16="http://schemas.microsoft.com/office/drawing/2014/main" id="{F4C2D286-E049-0AAB-1360-B7157E11AD7E}"/>
+              </a:ext>
+            </a:extLst>
+          </p:cNvPr>
+          <p:cNvSpPr>
+            <a:spLocks noGrp="1"/>
+          </p:cNvSpPr>
+          <p:nvPr>
+            <p:ph idx="1"/>
+          </p:nvPr>
+        </p:nvSpPr>
+        <p:spPr>
+          <a:xfrm>
+            <a:off x="838200" y="1456267"/>
+            <a:ext cx="10515600" cy="4720696"/>
+          </a:xfrm>
+        </p:spPr>
+        <p:txBody>
+          <a:bodyPr>
+            <a:normAutofit/>
+          </a:bodyPr>
+          <a:lstStyle/>
+          <a:p>
+            <a:pPr>
+              <a:spcAft>
+                <a:spcPts val="600"/>
+              </a:spcAft>
+            </a:pPr>
+            <a:r>
+              <a:rPr lang="nl-NL" sz="2000" noProof="0" dirty="0" err="1"/>
+              <a:t>Pandas</a:t>
+            </a:r>
+            <a:endParaRPr lang="nl-NL" sz="2000" dirty="0"/>
+          </a:p>
+          <a:p>
+            <a:pPr lvl="1">
+              <a:spcAft>
+                <a:spcPts val="600"/>
+              </a:spcAft>
+            </a:pPr>
+            <a:r>
+              <a:rPr lang="nl-NL" sz="1600" dirty="0"/>
+              <a:t>Wat en waarom?</a:t>
+            </a:r>
+          </a:p>
+          <a:p>
+            <a:pPr>
+              <a:spcAft>
+                <a:spcPts val="600"/>
+              </a:spcAft>
+            </a:pPr>
+            <a:r>
+              <a:rPr lang="nl-NL" sz="2000" noProof="0" dirty="0"/>
+              <a:t>Series</a:t>
+            </a:r>
+          </a:p>
+          <a:p>
+            <a:pPr lvl="1">
+              <a:spcAft>
+                <a:spcPts val="600"/>
+              </a:spcAft>
+            </a:pPr>
+            <a:r>
+              <a:rPr lang="nl-NL" sz="1600" dirty="0"/>
+              <a:t>Wat zijn het?</a:t>
+            </a:r>
+          </a:p>
+          <a:p>
+            <a:pPr lvl="1">
+              <a:spcAft>
+                <a:spcPts val="600"/>
+              </a:spcAft>
+            </a:pPr>
+            <a:r>
+              <a:rPr lang="nl-NL" sz="1600" noProof="0" dirty="0"/>
+              <a:t>Werken met Series.</a:t>
+            </a:r>
+          </a:p>
+          <a:p>
+            <a:pPr>
+              <a:spcAft>
+                <a:spcPts val="600"/>
+              </a:spcAft>
+            </a:pPr>
+            <a:r>
+              <a:rPr lang="nl-NL" sz="2000" noProof="0" dirty="0" err="1"/>
+              <a:t>DataFrames</a:t>
+            </a:r>
+            <a:endParaRPr lang="nl-NL" sz="2000" noProof="0" dirty="0"/>
+          </a:p>
+          <a:p>
+            <a:pPr lvl="1">
+              <a:spcAft>
+                <a:spcPts val="600"/>
+              </a:spcAft>
+            </a:pPr>
+            <a:r>
+              <a:rPr lang="nl-NL" sz="1600" dirty="0"/>
+              <a:t>Wat zijn het?</a:t>
+            </a:r>
+          </a:p>
+          <a:p>
+            <a:pPr lvl="1">
+              <a:spcAft>
+                <a:spcPts val="600"/>
+              </a:spcAft>
+            </a:pPr>
+            <a:r>
+              <a:rPr lang="nl-NL" sz="1600" noProof="0" dirty="0"/>
+              <a:t>Werken met </a:t>
+            </a:r>
+            <a:r>
+              <a:rPr lang="nl-NL" sz="1600" noProof="0" dirty="0" err="1"/>
+              <a:t>DataFrames</a:t>
+            </a:r>
+            <a:r>
+              <a:rPr lang="nl-NL" sz="1600" noProof="0" dirty="0"/>
+              <a:t>.</a:t>
+            </a:r>
+          </a:p>
+          <a:p>
+            <a:pPr>
+              <a:spcAft>
+                <a:spcPts val="600"/>
+              </a:spcAft>
+            </a:pPr>
+            <a:r>
+              <a:rPr lang="nl-NL" sz="2000" dirty="0" err="1"/>
+              <a:t>Plotting</a:t>
+            </a:r>
+            <a:endParaRPr lang="nl-NL" sz="2000" dirty="0"/>
+          </a:p>
+          <a:p>
+            <a:pPr lvl="1">
+              <a:spcAft>
+                <a:spcPts val="600"/>
+              </a:spcAft>
+            </a:pPr>
+            <a:r>
+              <a:rPr lang="nl-NL" sz="1600" noProof="0" dirty="0" err="1"/>
+              <a:t>Frameworks</a:t>
+            </a:r>
+            <a:r>
+              <a:rPr lang="nl-NL" sz="1600" dirty="0"/>
+              <a:t>: voor- en nadelen.</a:t>
+            </a:r>
+          </a:p>
+          <a:p>
+            <a:pPr lvl="1">
+              <a:spcAft>
+                <a:spcPts val="600"/>
+              </a:spcAft>
+            </a:pPr>
+            <a:r>
+              <a:rPr lang="nl-NL" sz="1600" noProof="0" dirty="0" err="1"/>
+              <a:t>Matplotlib</a:t>
+            </a:r>
+            <a:r>
+              <a:rPr lang="nl-NL" sz="1600" noProof="0" dirty="0"/>
+              <a:t> bas</a:t>
+            </a:r>
+            <a:r>
+              <a:rPr lang="nl-NL" sz="1600" dirty="0"/>
+              <a:t>is</a:t>
+            </a:r>
+            <a:endParaRPr lang="nl-NL" sz="1600" noProof="0" dirty="0"/>
+          </a:p>
+          <a:p>
+            <a:pPr marL="0" indent="0">
+              <a:spcAft>
+                <a:spcPts val="600"/>
+              </a:spcAft>
+              <a:buNone/>
+            </a:pPr>
+            <a:endParaRPr lang="nl-NL" sz="2000" dirty="0"/>
+          </a:p>
+        </p:txBody>
+      </p:sp>
+      <p:pic>
+        <p:nvPicPr>
+          <p:cNvPr id="4" name="Picture 3">
+            <a:extLst>
+              <a:ext uri="{FF2B5EF4-FFF2-40B4-BE49-F238E27FC236}">
+                <a16:creationId xmlns:a16="http://schemas.microsoft.com/office/drawing/2014/main" id="{10F1785D-DBAB-C34E-4C20-A2078BA9DAEA}"/>
+              </a:ext>
+            </a:extLst>
+          </p:cNvPr>
+          <p:cNvPicPr>
+            <a:picLocks noChangeAspect="1"/>
+          </p:cNvPicPr>
+          <p:nvPr/>
+        </p:nvPicPr>
+        <p:blipFill>
+          <a:blip r:embed="rId2"/>
+          <a:stretch>
+            <a:fillRect/>
+          </a:stretch>
+        </p:blipFill>
+        <p:spPr>
+          <a:xfrm rot="1217736">
+            <a:off x="8321964" y="3685187"/>
+            <a:ext cx="2694468" cy="2415360"/>
+          </a:xfrm>
+          <a:prstGeom prst="rect">
+            <a:avLst/>
+          </a:prstGeom>
+        </p:spPr>
+      </p:pic>
+    </p:spTree>
+    <p:extLst>
+      <p:ext uri="{BB962C8B-B14F-4D97-AF65-F5344CB8AC3E}">
+        <p14:creationId xmlns:p14="http://schemas.microsoft.com/office/powerpoint/2010/main" val="1265611121"/>
+      </p:ext>
+    </p:extLst>
+  </p:cSld>
+  <p:clrMapOvr>
+    <a:masterClrMapping/>
+  </p:clrMapOvr>
+</p:sld>
+</file>
+
+<file path=ppt/slides/slide20.xml><?xml version="1.0" encoding="utf-8"?>
 <p:sld xmlns:a="http://schemas.openxmlformats.org/drawingml/2006/main" xmlns:r="http://schemas.openxmlformats.org/officeDocument/2006/relationships" xmlns:p="http://schemas.openxmlformats.org/presentationml/2006/main">
   <p:cSld>
     <p:spTree>
@@ -10200,285 +13324,7 @@
 </p:sld>
 </file>
 
-<file path=ppt/slides/slide2.xml><?xml version="1.0" encoding="utf-8"?>
-<p:sld xmlns:a="http://schemas.openxmlformats.org/drawingml/2006/main" xmlns:r="http://schemas.openxmlformats.org/officeDocument/2006/relationships" xmlns:p="http://schemas.openxmlformats.org/presentationml/2006/main">
-  <p:cSld>
-    <p:spTree>
-      <p:nvGrpSpPr>
-        <p:cNvPr id="1" name=""/>
-        <p:cNvGrpSpPr/>
-        <p:nvPr/>
-      </p:nvGrpSpPr>
-      <p:grpSpPr>
-        <a:xfrm>
-          <a:off x="0" y="0"/>
-          <a:ext cx="0" cy="0"/>
-          <a:chOff x="0" y="0"/>
-          <a:chExt cx="0" cy="0"/>
-        </a:xfrm>
-      </p:grpSpPr>
-      <p:sp>
-        <p:nvSpPr>
-          <p:cNvPr id="2" name="Title 1">
-            <a:extLst>
-              <a:ext uri="{FF2B5EF4-FFF2-40B4-BE49-F238E27FC236}">
-                <a16:creationId xmlns:a16="http://schemas.microsoft.com/office/drawing/2014/main" id="{39A1D606-8DD1-369C-5C09-471CDD551AD5}"/>
-              </a:ext>
-            </a:extLst>
-          </p:cNvPr>
-          <p:cNvSpPr>
-            <a:spLocks noGrp="1"/>
-          </p:cNvSpPr>
-          <p:nvPr>
-            <p:ph type="title"/>
-          </p:nvPr>
-        </p:nvSpPr>
-        <p:spPr>
-          <a:xfrm>
-            <a:off x="838200" y="365126"/>
-            <a:ext cx="10515600" cy="718608"/>
-          </a:xfrm>
-        </p:spPr>
-        <p:txBody>
-          <a:bodyPr>
-            <a:normAutofit/>
-          </a:bodyPr>
-          <a:lstStyle/>
-          <a:p>
-            <a:r>
-              <a:rPr lang="nl-NL" sz="3600" noProof="0" dirty="0"/>
-              <a:t>Agenda</a:t>
-            </a:r>
-          </a:p>
-        </p:txBody>
-      </p:sp>
-      <p:sp>
-        <p:nvSpPr>
-          <p:cNvPr id="3" name="Content Placeholder 2">
-            <a:extLst>
-              <a:ext uri="{FF2B5EF4-FFF2-40B4-BE49-F238E27FC236}">
-                <a16:creationId xmlns:a16="http://schemas.microsoft.com/office/drawing/2014/main" id="{F4C2D286-E049-0AAB-1360-B7157E11AD7E}"/>
-              </a:ext>
-            </a:extLst>
-          </p:cNvPr>
-          <p:cNvSpPr>
-            <a:spLocks noGrp="1"/>
-          </p:cNvSpPr>
-          <p:nvPr>
-            <p:ph idx="1"/>
-          </p:nvPr>
-        </p:nvSpPr>
-        <p:spPr>
-          <a:xfrm>
-            <a:off x="838200" y="1456267"/>
-            <a:ext cx="10515600" cy="4720696"/>
-          </a:xfrm>
-        </p:spPr>
-        <p:txBody>
-          <a:bodyPr>
-            <a:normAutofit/>
-          </a:bodyPr>
-          <a:lstStyle/>
-          <a:p>
-            <a:pPr>
-              <a:spcAft>
-                <a:spcPts val="600"/>
-              </a:spcAft>
-            </a:pPr>
-            <a:r>
-              <a:rPr lang="nl-NL" sz="2000" noProof="0" dirty="0" err="1"/>
-              <a:t>Pandas</a:t>
-            </a:r>
-            <a:endParaRPr lang="nl-NL" sz="2000" dirty="0"/>
-          </a:p>
-          <a:p>
-            <a:pPr lvl="1">
-              <a:spcAft>
-                <a:spcPts val="600"/>
-              </a:spcAft>
-            </a:pPr>
-            <a:r>
-              <a:rPr lang="nl-NL" sz="1600" dirty="0"/>
-              <a:t>Wat en waarom?</a:t>
-            </a:r>
-          </a:p>
-          <a:p>
-            <a:pPr>
-              <a:spcAft>
-                <a:spcPts val="600"/>
-              </a:spcAft>
-            </a:pPr>
-            <a:r>
-              <a:rPr lang="nl-NL" sz="2000" noProof="0" dirty="0"/>
-              <a:t>Series</a:t>
-            </a:r>
-          </a:p>
-          <a:p>
-            <a:pPr lvl="1">
-              <a:spcAft>
-                <a:spcPts val="600"/>
-              </a:spcAft>
-            </a:pPr>
-            <a:r>
-              <a:rPr lang="nl-NL" sz="1600" dirty="0"/>
-              <a:t>Wat zijn het?</a:t>
-            </a:r>
-          </a:p>
-          <a:p>
-            <a:pPr lvl="1">
-              <a:spcAft>
-                <a:spcPts val="600"/>
-              </a:spcAft>
-            </a:pPr>
-            <a:r>
-              <a:rPr lang="nl-NL" sz="1600" noProof="0" dirty="0"/>
-              <a:t>Werken met Series.</a:t>
-            </a:r>
-          </a:p>
-          <a:p>
-            <a:pPr>
-              <a:spcAft>
-                <a:spcPts val="600"/>
-              </a:spcAft>
-            </a:pPr>
-            <a:r>
-              <a:rPr lang="nl-NL" sz="2000" noProof="0" dirty="0" err="1"/>
-              <a:t>DataFrames</a:t>
-            </a:r>
-            <a:endParaRPr lang="nl-NL" sz="2000" noProof="0" dirty="0"/>
-          </a:p>
-          <a:p>
-            <a:pPr lvl="1">
-              <a:spcAft>
-                <a:spcPts val="600"/>
-              </a:spcAft>
-            </a:pPr>
-            <a:r>
-              <a:rPr lang="nl-NL" sz="1600" dirty="0"/>
-              <a:t>Wat zijn het?</a:t>
-            </a:r>
-          </a:p>
-          <a:p>
-            <a:pPr lvl="1">
-              <a:spcAft>
-                <a:spcPts val="600"/>
-              </a:spcAft>
-            </a:pPr>
-            <a:r>
-              <a:rPr lang="nl-NL" sz="1600" noProof="0" dirty="0"/>
-              <a:t>Werken met </a:t>
-            </a:r>
-            <a:r>
-              <a:rPr lang="nl-NL" sz="1600" noProof="0" dirty="0" err="1"/>
-              <a:t>DataFrames</a:t>
-            </a:r>
-            <a:r>
-              <a:rPr lang="nl-NL" sz="1600" noProof="0" dirty="0"/>
-              <a:t>.</a:t>
-            </a:r>
-          </a:p>
-          <a:p>
-            <a:pPr>
-              <a:spcAft>
-                <a:spcPts val="600"/>
-              </a:spcAft>
-            </a:pPr>
-            <a:r>
-              <a:rPr lang="nl-NL" sz="2000" dirty="0" err="1"/>
-              <a:t>Plotting</a:t>
-            </a:r>
-            <a:endParaRPr lang="nl-NL" sz="2000" dirty="0"/>
-          </a:p>
-          <a:p>
-            <a:pPr lvl="1">
-              <a:spcAft>
-                <a:spcPts val="600"/>
-              </a:spcAft>
-            </a:pPr>
-            <a:r>
-              <a:rPr lang="nl-NL" sz="1600" noProof="0" dirty="0" err="1"/>
-              <a:t>Frameworks</a:t>
-            </a:r>
-            <a:r>
-              <a:rPr lang="nl-NL" sz="1600" dirty="0"/>
-              <a:t>: voor- en nadelen.</a:t>
-            </a:r>
-          </a:p>
-          <a:p>
-            <a:pPr lvl="1">
-              <a:spcAft>
-                <a:spcPts val="600"/>
-              </a:spcAft>
-            </a:pPr>
-            <a:r>
-              <a:rPr lang="nl-NL" sz="1600" noProof="0" dirty="0" err="1"/>
-              <a:t>Matplotlib</a:t>
-            </a:r>
-            <a:r>
-              <a:rPr lang="nl-NL" sz="1600" noProof="0" dirty="0"/>
-              <a:t> bas</a:t>
-            </a:r>
-            <a:r>
-              <a:rPr lang="nl-NL" sz="1600" dirty="0"/>
-              <a:t>is</a:t>
-            </a:r>
-            <a:endParaRPr lang="nl-NL" sz="1600" noProof="0" dirty="0"/>
-          </a:p>
-          <a:p>
-            <a:pPr marL="0" indent="0">
-              <a:spcAft>
-                <a:spcPts val="600"/>
-              </a:spcAft>
-              <a:buNone/>
-            </a:pPr>
-            <a:endParaRPr lang="nl-NL" sz="2000" dirty="0"/>
-          </a:p>
-        </p:txBody>
-      </p:sp>
-      <p:pic>
-        <p:nvPicPr>
-          <p:cNvPr id="4" name="Picture 3">
-            <a:extLst>
-              <a:ext uri="{FF2B5EF4-FFF2-40B4-BE49-F238E27FC236}">
-                <a16:creationId xmlns:a16="http://schemas.microsoft.com/office/drawing/2014/main" id="{10F1785D-DBAB-C34E-4C20-A2078BA9DAEA}"/>
-              </a:ext>
-            </a:extLst>
-          </p:cNvPr>
-          <p:cNvPicPr>
-            <a:picLocks noChangeAspect="1"/>
-          </p:cNvPicPr>
-          <p:nvPr/>
-        </p:nvPicPr>
-        <p:blipFill>
-          <a:blip r:embed="rId2"/>
-          <a:stretch>
-            <a:fillRect/>
-          </a:stretch>
-        </p:blipFill>
-        <p:spPr>
-          <a:xfrm rot="1217736">
-            <a:off x="8321964" y="3685187"/>
-            <a:ext cx="2694468" cy="2415360"/>
-          </a:xfrm>
-          <a:prstGeom prst="rect">
-            <a:avLst/>
-          </a:prstGeom>
-        </p:spPr>
-      </p:pic>
-    </p:spTree>
-    <p:extLst>
-      <p:ext uri="{BB962C8B-B14F-4D97-AF65-F5344CB8AC3E}">
-        <p14:creationId xmlns:p14="http://schemas.microsoft.com/office/powerpoint/2010/main" val="1265611121"/>
-      </p:ext>
-    </p:extLst>
-  </p:cSld>
-  <p:clrMapOvr>
-    <a:masterClrMapping/>
-  </p:clrMapOvr>
-</p:sld>
-</file>
-
-<file path=ppt/slides/slide20.xml><?xml version="1.0" encoding="utf-8"?>
+<file path=ppt/slides/slide21.xml><?xml version="1.0" encoding="utf-8"?>
 <p:sld xmlns:a="http://schemas.openxmlformats.org/drawingml/2006/main" xmlns:r="http://schemas.openxmlformats.org/officeDocument/2006/relationships" xmlns:p="http://schemas.openxmlformats.org/presentationml/2006/main">
   <p:cSld>
     <p:spTree>
@@ -10982,7 +13828,7 @@
 </p:sld>
 </file>
 
-<file path=ppt/slides/slide21.xml><?xml version="1.0" encoding="utf-8"?>
+<file path=ppt/slides/slide22.xml><?xml version="1.0" encoding="utf-8"?>
 <p:sld xmlns:a="http://schemas.openxmlformats.org/drawingml/2006/main" xmlns:r="http://schemas.openxmlformats.org/officeDocument/2006/relationships" xmlns:p="http://schemas.openxmlformats.org/presentationml/2006/main">
   <p:cSld>
     <p:spTree>
@@ -11319,7 +14165,7 @@
 </p:sld>
 </file>
 
-<file path=ppt/slides/slide22.xml><?xml version="1.0" encoding="utf-8"?>
+<file path=ppt/slides/slide23.xml><?xml version="1.0" encoding="utf-8"?>
 <p:sld xmlns:a="http://schemas.openxmlformats.org/drawingml/2006/main" xmlns:r="http://schemas.openxmlformats.org/officeDocument/2006/relationships" xmlns:p="http://schemas.openxmlformats.org/presentationml/2006/main">
   <p:cSld>
     <p:spTree>
@@ -11721,7 +14567,7 @@
 </p:sld>
 </file>
 
-<file path=ppt/slides/slide23.xml><?xml version="1.0" encoding="utf-8"?>
+<file path=ppt/slides/slide24.xml><?xml version="1.0" encoding="utf-8"?>
 <p:sld xmlns:a="http://schemas.openxmlformats.org/drawingml/2006/main" xmlns:r="http://schemas.openxmlformats.org/officeDocument/2006/relationships" xmlns:p="http://schemas.openxmlformats.org/presentationml/2006/main">
   <p:cSld>
     <p:spTree>
@@ -12499,7 +15345,7 @@
 </p:sld>
 </file>
 
-<file path=ppt/slides/slide24.xml><?xml version="1.0" encoding="utf-8"?>
+<file path=ppt/slides/slide25.xml><?xml version="1.0" encoding="utf-8"?>
 <p:sld xmlns:a="http://schemas.openxmlformats.org/drawingml/2006/main" xmlns:r="http://schemas.openxmlformats.org/officeDocument/2006/relationships" xmlns:p="http://schemas.openxmlformats.org/presentationml/2006/main">
   <p:cSld>
     <p:spTree>
@@ -18943,4 +21789,299 @@
     </a:ext>
   </a:extLst>
 </a:theme>
+</file>
+
+<file path=ppt/theme/theme2.xml><?xml version="1.0" encoding="utf-8"?>
+<a:theme xmlns:a="http://schemas.openxmlformats.org/drawingml/2006/main" name="Office Theme">
+  <a:themeElements>
+    <a:clrScheme name="Office">
+      <a:dk1>
+        <a:sysClr val="windowText" lastClr="000000"/>
+      </a:dk1>
+      <a:lt1>
+        <a:sysClr val="window" lastClr="FFFFFF"/>
+      </a:lt1>
+      <a:dk2>
+        <a:srgbClr val="44546A"/>
+      </a:dk2>
+      <a:lt2>
+        <a:srgbClr val="E7E6E6"/>
+      </a:lt2>
+      <a:accent1>
+        <a:srgbClr val="4472C4"/>
+      </a:accent1>
+      <a:accent2>
+        <a:srgbClr val="ED7D31"/>
+      </a:accent2>
+      <a:accent3>
+        <a:srgbClr val="A5A5A5"/>
+      </a:accent3>
+      <a:accent4>
+        <a:srgbClr val="FFC000"/>
+      </a:accent4>
+      <a:accent5>
+        <a:srgbClr val="5B9BD5"/>
+      </a:accent5>
+      <a:accent6>
+        <a:srgbClr val="70AD47"/>
+      </a:accent6>
+      <a:hlink>
+        <a:srgbClr val="0563C1"/>
+      </a:hlink>
+      <a:folHlink>
+        <a:srgbClr val="954F72"/>
+      </a:folHlink>
+    </a:clrScheme>
+    <a:fontScheme name="Office">
+      <a:majorFont>
+        <a:latin typeface="Calibri Light" panose="020F0302020204030204"/>
+        <a:ea typeface=""/>
+        <a:cs typeface=""/>
+        <a:font script="Jpan" typeface="游ゴシック Light"/>
+        <a:font script="Hang" typeface="맑은 고딕"/>
+        <a:font script="Hans" typeface="等线 Light"/>
+        <a:font script="Hant" typeface="新細明體"/>
+        <a:font script="Arab" typeface="Times New Roman"/>
+        <a:font script="Hebr" typeface="Times New Roman"/>
+        <a:font script="Thai" typeface="Angsana New"/>
+        <a:font script="Ethi" typeface="Nyala"/>
+        <a:font script="Beng" typeface="Vrinda"/>
+        <a:font script="Gujr" typeface="Shruti"/>
+        <a:font script="Khmr" typeface="MoolBoran"/>
+        <a:font script="Knda" typeface="Tunga"/>
+        <a:font script="Guru" typeface="Raavi"/>
+        <a:font script="Cans" typeface="Euphemia"/>
+        <a:font script="Cher" typeface="Plantagenet Cherokee"/>
+        <a:font script="Yiii" typeface="Microsoft Yi Baiti"/>
+        <a:font script="Tibt" typeface="Microsoft Himalaya"/>
+        <a:font script="Thaa" typeface="MV Boli"/>
+        <a:font script="Deva" typeface="Mangal"/>
+        <a:font script="Telu" typeface="Gautami"/>
+        <a:font script="Taml" typeface="Latha"/>
+        <a:font script="Syrc" typeface="Estrangelo Edessa"/>
+        <a:font script="Orya" typeface="Kalinga"/>
+        <a:font script="Mlym" typeface="Kartika"/>
+        <a:font script="Laoo" typeface="DokChampa"/>
+        <a:font script="Sinh" typeface="Iskoola Pota"/>
+        <a:font script="Mong" typeface="Mongolian Baiti"/>
+        <a:font script="Viet" typeface="Times New Roman"/>
+        <a:font script="Uigh" typeface="Microsoft Uighur"/>
+        <a:font script="Geor" typeface="Sylfaen"/>
+        <a:font script="Armn" typeface="Arial"/>
+        <a:font script="Bugi" typeface="Leelawadee UI"/>
+        <a:font script="Bopo" typeface="Microsoft JhengHei"/>
+        <a:font script="Java" typeface="Javanese Text"/>
+        <a:font script="Lisu" typeface="Segoe UI"/>
+        <a:font script="Mymr" typeface="Myanmar Text"/>
+        <a:font script="Nkoo" typeface="Ebrima"/>
+        <a:font script="Olck" typeface="Nirmala UI"/>
+        <a:font script="Osma" typeface="Ebrima"/>
+        <a:font script="Phag" typeface="Phagspa"/>
+        <a:font script="Syrn" typeface="Estrangelo Edessa"/>
+        <a:font script="Syrj" typeface="Estrangelo Edessa"/>
+        <a:font script="Syre" typeface="Estrangelo Edessa"/>
+        <a:font script="Sora" typeface="Nirmala UI"/>
+        <a:font script="Tale" typeface="Microsoft Tai Le"/>
+        <a:font script="Talu" typeface="Microsoft New Tai Lue"/>
+        <a:font script="Tfng" typeface="Ebrima"/>
+      </a:majorFont>
+      <a:minorFont>
+        <a:latin typeface="Calibri" panose="020F0502020204030204"/>
+        <a:ea typeface=""/>
+        <a:cs typeface=""/>
+        <a:font script="Jpan" typeface="游ゴシック"/>
+        <a:font script="Hang" typeface="맑은 고딕"/>
+        <a:font script="Hans" typeface="等线"/>
+        <a:font script="Hant" typeface="新細明體"/>
+        <a:font script="Arab" typeface="Arial"/>
+        <a:font script="Hebr" typeface="Arial"/>
+        <a:font script="Thai" typeface="Cordia New"/>
+        <a:font script="Ethi" typeface="Nyala"/>
+        <a:font script="Beng" typeface="Vrinda"/>
+        <a:font script="Gujr" typeface="Shruti"/>
+        <a:font script="Khmr" typeface="DaunPenh"/>
+        <a:font script="Knda" typeface="Tunga"/>
+        <a:font script="Guru" typeface="Raavi"/>
+        <a:font script="Cans" typeface="Euphemia"/>
+        <a:font script="Cher" typeface="Plantagenet Cherokee"/>
+        <a:font script="Yiii" typeface="Microsoft Yi Baiti"/>
+        <a:font script="Tibt" typeface="Microsoft Himalaya"/>
+        <a:font script="Thaa" typeface="MV Boli"/>
+        <a:font script="Deva" typeface="Mangal"/>
+        <a:font script="Telu" typeface="Gautami"/>
+        <a:font script="Taml" typeface="Latha"/>
+        <a:font script="Syrc" typeface="Estrangelo Edessa"/>
+        <a:font script="Orya" typeface="Kalinga"/>
+        <a:font script="Mlym" typeface="Kartika"/>
+        <a:font script="Laoo" typeface="DokChampa"/>
+        <a:font script="Sinh" typeface="Iskoola Pota"/>
+        <a:font script="Mong" typeface="Mongolian Baiti"/>
+        <a:font script="Viet" typeface="Arial"/>
+        <a:font script="Uigh" typeface="Microsoft Uighur"/>
+        <a:font script="Geor" typeface="Sylfaen"/>
+        <a:font script="Armn" typeface="Arial"/>
+        <a:font script="Bugi" typeface="Leelawadee UI"/>
+        <a:font script="Bopo" typeface="Microsoft JhengHei"/>
+        <a:font script="Java" typeface="Javanese Text"/>
+        <a:font script="Lisu" typeface="Segoe UI"/>
+        <a:font script="Mymr" typeface="Myanmar Text"/>
+        <a:font script="Nkoo" typeface="Ebrima"/>
+        <a:font script="Olck" typeface="Nirmala UI"/>
+        <a:font script="Osma" typeface="Ebrima"/>
+        <a:font script="Phag" typeface="Phagspa"/>
+        <a:font script="Syrn" typeface="Estrangelo Edessa"/>
+        <a:font script="Syrj" typeface="Estrangelo Edessa"/>
+        <a:font script="Syre" typeface="Estrangelo Edessa"/>
+        <a:font script="Sora" typeface="Nirmala UI"/>
+        <a:font script="Tale" typeface="Microsoft Tai Le"/>
+        <a:font script="Talu" typeface="Microsoft New Tai Lue"/>
+        <a:font script="Tfng" typeface="Ebrima"/>
+      </a:minorFont>
+    </a:fontScheme>
+    <a:fmtScheme name="Office">
+      <a:fillStyleLst>
+        <a:solidFill>
+          <a:schemeClr val="phClr"/>
+        </a:solidFill>
+        <a:gradFill rotWithShape="1">
+          <a:gsLst>
+            <a:gs pos="0">
+              <a:schemeClr val="phClr">
+                <a:lumMod val="110000"/>
+                <a:satMod val="105000"/>
+                <a:tint val="67000"/>
+              </a:schemeClr>
+            </a:gs>
+            <a:gs pos="50000">
+              <a:schemeClr val="phClr">
+                <a:lumMod val="105000"/>
+                <a:satMod val="103000"/>
+                <a:tint val="73000"/>
+              </a:schemeClr>
+            </a:gs>
+            <a:gs pos="100000">
+              <a:schemeClr val="phClr">
+                <a:lumMod val="105000"/>
+                <a:satMod val="109000"/>
+                <a:tint val="81000"/>
+              </a:schemeClr>
+            </a:gs>
+          </a:gsLst>
+          <a:lin ang="5400000" scaled="0"/>
+        </a:gradFill>
+        <a:gradFill rotWithShape="1">
+          <a:gsLst>
+            <a:gs pos="0">
+              <a:schemeClr val="phClr">
+                <a:satMod val="103000"/>
+                <a:lumMod val="102000"/>
+                <a:tint val="94000"/>
+              </a:schemeClr>
+            </a:gs>
+            <a:gs pos="50000">
+              <a:schemeClr val="phClr">
+                <a:satMod val="110000"/>
+                <a:lumMod val="100000"/>
+                <a:shade val="100000"/>
+              </a:schemeClr>
+            </a:gs>
+            <a:gs pos="100000">
+              <a:schemeClr val="phClr">
+                <a:lumMod val="99000"/>
+                <a:satMod val="120000"/>
+                <a:shade val="78000"/>
+              </a:schemeClr>
+            </a:gs>
+          </a:gsLst>
+          <a:lin ang="5400000" scaled="0"/>
+        </a:gradFill>
+      </a:fillStyleLst>
+      <a:lnStyleLst>
+        <a:ln w="6350" cap="flat" cmpd="sng" algn="ctr">
+          <a:solidFill>
+            <a:schemeClr val="phClr"/>
+          </a:solidFill>
+          <a:prstDash val="solid"/>
+          <a:miter lim="800000"/>
+        </a:ln>
+        <a:ln w="12700" cap="flat" cmpd="sng" algn="ctr">
+          <a:solidFill>
+            <a:schemeClr val="phClr"/>
+          </a:solidFill>
+          <a:prstDash val="solid"/>
+          <a:miter lim="800000"/>
+        </a:ln>
+        <a:ln w="19050" cap="flat" cmpd="sng" algn="ctr">
+          <a:solidFill>
+            <a:schemeClr val="phClr"/>
+          </a:solidFill>
+          <a:prstDash val="solid"/>
+          <a:miter lim="800000"/>
+        </a:ln>
+      </a:lnStyleLst>
+      <a:effectStyleLst>
+        <a:effectStyle>
+          <a:effectLst/>
+        </a:effectStyle>
+        <a:effectStyle>
+          <a:effectLst/>
+        </a:effectStyle>
+        <a:effectStyle>
+          <a:effectLst>
+            <a:outerShdw blurRad="57150" dist="19050" dir="5400000" algn="ctr" rotWithShape="0">
+              <a:srgbClr val="000000">
+                <a:alpha val="63000"/>
+              </a:srgbClr>
+            </a:outerShdw>
+          </a:effectLst>
+        </a:effectStyle>
+      </a:effectStyleLst>
+      <a:bgFillStyleLst>
+        <a:solidFill>
+          <a:schemeClr val="phClr"/>
+        </a:solidFill>
+        <a:solidFill>
+          <a:schemeClr val="phClr">
+            <a:tint val="95000"/>
+            <a:satMod val="170000"/>
+          </a:schemeClr>
+        </a:solidFill>
+        <a:gradFill rotWithShape="1">
+          <a:gsLst>
+            <a:gs pos="0">
+              <a:schemeClr val="phClr">
+                <a:tint val="93000"/>
+                <a:satMod val="150000"/>
+                <a:shade val="98000"/>
+                <a:lumMod val="102000"/>
+              </a:schemeClr>
+            </a:gs>
+            <a:gs pos="50000">
+              <a:schemeClr val="phClr">
+                <a:tint val="98000"/>
+                <a:satMod val="130000"/>
+                <a:shade val="90000"/>
+                <a:lumMod val="103000"/>
+              </a:schemeClr>
+            </a:gs>
+            <a:gs pos="100000">
+              <a:schemeClr val="phClr">
+                <a:shade val="63000"/>
+                <a:satMod val="120000"/>
+              </a:schemeClr>
+            </a:gs>
+          </a:gsLst>
+          <a:lin ang="5400000" scaled="0"/>
+        </a:gradFill>
+      </a:bgFillStyleLst>
+    </a:fmtScheme>
+  </a:themeElements>
+  <a:objectDefaults/>
+  <a:extraClrSchemeLst/>
+  <a:extLst>
+    <a:ext uri="{05A4C25C-085E-4340-85A3-A5531E510DB2}">
+      <thm15:themeFamily xmlns:thm15="http://schemas.microsoft.com/office/thememl/2012/main" name="Office Theme" id="{62F939B6-93AF-4DB8-9C6B-D6C7DFDC589F}" vid="{4A3C46E8-61CC-4603-A589-7422A47A8E4A}"/>
+    </a:ext>
+  </a:extLst>
+</a:theme>
 </file>
</xml_diff>

<commit_message>
Update Python Trainees part 3 slides
</commit_message>
<xml_diff>
--- a/python_trainees/3_pandas_plotting/python_traineeship_3.pptx
+++ b/python_trainees/3_pandas_plotting/python_traineeship_3.pptx
@@ -236,7 +236,7 @@
           <a:p>
             <a:fld id="{16CF57F2-0494-4F4F-A7AD-E8F59CFB368A}" type="datetimeFigureOut">
               <a:rPr lang="en-NL" smtClean="0"/>
-              <a:t>09/03/2023</a:t>
+              <a:t>16/03/2023</a:t>
             </a:fld>
             <a:endParaRPr lang="en-NL"/>
           </a:p>
@@ -821,7 +821,7 @@
           <a:p>
             <a:fld id="{0EBB069A-003F-4FC0-8534-236B0C5C7B5F}" type="datetimeFigureOut">
               <a:rPr lang="en-NL" smtClean="0"/>
-              <a:t>09/03/2023</a:t>
+              <a:t>16/03/2023</a:t>
             </a:fld>
             <a:endParaRPr lang="en-NL"/>
           </a:p>
@@ -1021,7 +1021,7 @@
           <a:p>
             <a:fld id="{0EBB069A-003F-4FC0-8534-236B0C5C7B5F}" type="datetimeFigureOut">
               <a:rPr lang="en-NL" smtClean="0"/>
-              <a:t>09/03/2023</a:t>
+              <a:t>16/03/2023</a:t>
             </a:fld>
             <a:endParaRPr lang="en-NL"/>
           </a:p>
@@ -1231,7 +1231,7 @@
           <a:p>
             <a:fld id="{0EBB069A-003F-4FC0-8534-236B0C5C7B5F}" type="datetimeFigureOut">
               <a:rPr lang="en-NL" smtClean="0"/>
-              <a:t>09/03/2023</a:t>
+              <a:t>16/03/2023</a:t>
             </a:fld>
             <a:endParaRPr lang="en-NL"/>
           </a:p>
@@ -1431,7 +1431,7 @@
           <a:p>
             <a:fld id="{0EBB069A-003F-4FC0-8534-236B0C5C7B5F}" type="datetimeFigureOut">
               <a:rPr lang="en-NL" smtClean="0"/>
-              <a:t>09/03/2023</a:t>
+              <a:t>16/03/2023</a:t>
             </a:fld>
             <a:endParaRPr lang="en-NL"/>
           </a:p>
@@ -1707,7 +1707,7 @@
           <a:p>
             <a:fld id="{0EBB069A-003F-4FC0-8534-236B0C5C7B5F}" type="datetimeFigureOut">
               <a:rPr lang="en-NL" smtClean="0"/>
-              <a:t>09/03/2023</a:t>
+              <a:t>16/03/2023</a:t>
             </a:fld>
             <a:endParaRPr lang="en-NL"/>
           </a:p>
@@ -1975,7 +1975,7 @@
           <a:p>
             <a:fld id="{0EBB069A-003F-4FC0-8534-236B0C5C7B5F}" type="datetimeFigureOut">
               <a:rPr lang="en-NL" smtClean="0"/>
-              <a:t>09/03/2023</a:t>
+              <a:t>16/03/2023</a:t>
             </a:fld>
             <a:endParaRPr lang="en-NL"/>
           </a:p>
@@ -2390,7 +2390,7 @@
           <a:p>
             <a:fld id="{0EBB069A-003F-4FC0-8534-236B0C5C7B5F}" type="datetimeFigureOut">
               <a:rPr lang="en-NL" smtClean="0"/>
-              <a:t>09/03/2023</a:t>
+              <a:t>16/03/2023</a:t>
             </a:fld>
             <a:endParaRPr lang="en-NL"/>
           </a:p>
@@ -2532,7 +2532,7 @@
           <a:p>
             <a:fld id="{0EBB069A-003F-4FC0-8534-236B0C5C7B5F}" type="datetimeFigureOut">
               <a:rPr lang="en-NL" smtClean="0"/>
-              <a:t>09/03/2023</a:t>
+              <a:t>16/03/2023</a:t>
             </a:fld>
             <a:endParaRPr lang="en-NL"/>
           </a:p>
@@ -2645,7 +2645,7 @@
           <a:p>
             <a:fld id="{0EBB069A-003F-4FC0-8534-236B0C5C7B5F}" type="datetimeFigureOut">
               <a:rPr lang="en-NL" smtClean="0"/>
-              <a:t>09/03/2023</a:t>
+              <a:t>16/03/2023</a:t>
             </a:fld>
             <a:endParaRPr lang="en-NL"/>
           </a:p>
@@ -2958,7 +2958,7 @@
           <a:p>
             <a:fld id="{0EBB069A-003F-4FC0-8534-236B0C5C7B5F}" type="datetimeFigureOut">
               <a:rPr lang="en-NL" smtClean="0"/>
-              <a:t>09/03/2023</a:t>
+              <a:t>16/03/2023</a:t>
             </a:fld>
             <a:endParaRPr lang="en-NL"/>
           </a:p>
@@ -3247,7 +3247,7 @@
           <a:p>
             <a:fld id="{0EBB069A-003F-4FC0-8534-236B0C5C7B5F}" type="datetimeFigureOut">
               <a:rPr lang="en-NL" smtClean="0"/>
-              <a:t>09/03/2023</a:t>
+              <a:t>16/03/2023</a:t>
             </a:fld>
             <a:endParaRPr lang="en-NL"/>
           </a:p>
@@ -3490,7 +3490,7 @@
           <a:p>
             <a:fld id="{0EBB069A-003F-4FC0-8534-236B0C5C7B5F}" type="datetimeFigureOut">
               <a:rPr lang="en-NL" smtClean="0"/>
-              <a:t>09/03/2023</a:t>
+              <a:t>16/03/2023</a:t>
             </a:fld>
             <a:endParaRPr lang="en-NL"/>
           </a:p>
@@ -13984,14 +13984,6 @@
               <a:rPr lang="nl-NL" sz="1600" noProof="0" dirty="0" err="1"/>
               <a:t>Matplotlib</a:t>
             </a:r>
-            <a:r>
-              <a:rPr lang="nl-NL" sz="1600" noProof="0" dirty="0"/>
-              <a:t> bas</a:t>
-            </a:r>
-            <a:r>
-              <a:rPr lang="nl-NL" sz="1600" dirty="0"/>
-              <a:t>is</a:t>
-            </a:r>
             <a:endParaRPr lang="nl-NL" sz="1600" noProof="0" dirty="0"/>
           </a:p>
           <a:p>
@@ -20682,14 +20674,14 @@
           <p:nvPr>
             <p:extLst>
               <p:ext uri="{D42A27DB-BD31-4B8C-83A1-F6EECF244321}">
-                <p14:modId xmlns:p14="http://schemas.microsoft.com/office/powerpoint/2010/main" val="1696159438"/>
+                <p14:modId xmlns:p14="http://schemas.microsoft.com/office/powerpoint/2010/main" val="3126004770"/>
               </p:ext>
             </p:extLst>
           </p:nvPr>
         </p:nvGraphicFramePr>
         <p:xfrm>
-          <a:off x="971551" y="3175000"/>
-          <a:ext cx="8756649" cy="2780574"/>
+          <a:off x="971550" y="3175000"/>
+          <a:ext cx="9893299" cy="2780574"/>
         </p:xfrm>
         <a:graphic>
           <a:graphicData uri="http://schemas.openxmlformats.org/drawingml/2006/table">
@@ -20698,21 +20690,21 @@
                 <a:tableStyleId>{5C22544A-7EE6-4342-B048-85BDC9FD1C3A}</a:tableStyleId>
               </a:tblPr>
               <a:tblGrid>
-                <a:gridCol w="2918883">
+                <a:gridCol w="2550770">
                   <a:extLst>
                     <a:ext uri="{9D8B030D-6E8A-4147-A177-3AD203B41FA5}">
                       <a16:colId xmlns:a16="http://schemas.microsoft.com/office/drawing/2014/main" val="2862620184"/>
                     </a:ext>
                   </a:extLst>
                 </a:gridCol>
-                <a:gridCol w="2918883">
+                <a:gridCol w="3697630">
                   <a:extLst>
                     <a:ext uri="{9D8B030D-6E8A-4147-A177-3AD203B41FA5}">
                       <a16:colId xmlns:a16="http://schemas.microsoft.com/office/drawing/2014/main" val="4052530923"/>
                     </a:ext>
                   </a:extLst>
                 </a:gridCol>
-                <a:gridCol w="2918883">
+                <a:gridCol w="3644899">
                   <a:extLst>
                     <a:ext uri="{9D8B030D-6E8A-4147-A177-3AD203B41FA5}">
                       <a16:colId xmlns:a16="http://schemas.microsoft.com/office/drawing/2014/main" val="1687699138"/>
@@ -21995,15 +21987,7 @@
             </a:pPr>
             <a:r>
               <a:rPr lang="nl-NL" sz="2000" dirty="0"/>
-              <a:t>Waardes van </a:t>
-            </a:r>
-            <a:r>
-              <a:rPr lang="nl-NL" sz="2000" u="sng" dirty="0"/>
-              <a:t>hetzelfde</a:t>
-            </a:r>
-            <a:r>
-              <a:rPr lang="nl-NL" sz="2000" dirty="0"/>
-              <a:t> data type (automatisch cast).</a:t>
+              <a:t>Optioneel: naam.</a:t>
             </a:r>
           </a:p>
           <a:p>
@@ -22020,7 +22004,15 @@
             </a:pPr>
             <a:r>
               <a:rPr lang="nl-NL" sz="2000" dirty="0"/>
-              <a:t>Optioneel: naam.</a:t>
+              <a:t>Waardes van </a:t>
+            </a:r>
+            <a:r>
+              <a:rPr lang="nl-NL" sz="2000" u="sng" dirty="0"/>
+              <a:t>hetzelfde</a:t>
+            </a:r>
+            <a:r>
+              <a:rPr lang="nl-NL" sz="2000" dirty="0"/>
+              <a:t> data type (automatische cast).</a:t>
             </a:r>
           </a:p>
           <a:p>
@@ -22037,7 +22029,7 @@
             </a:pPr>
             <a:r>
               <a:rPr lang="nl-NL" sz="2000" dirty="0"/>
-              <a:t>Index met labels voor de rijen.</a:t>
+              <a:t>Index met labels voor de waardes.</a:t>
             </a:r>
           </a:p>
           <a:p>
@@ -22054,25 +22046,14 @@
             </a:pPr>
             <a:r>
               <a:rPr lang="nl-NL" sz="2000" dirty="0"/>
-              <a:t>Ondersteunt mathematische bewerkingen.</a:t>
-            </a:r>
-          </a:p>
-          <a:p>
-            <a:pPr>
-              <a:buFontTx/>
-              <a:buChar char="-"/>
+              <a:t>Bewerkingen houden rekening met de index.</a:t>
+            </a:r>
+          </a:p>
+          <a:p>
+            <a:pPr marL="0" indent="0">
+              <a:buNone/>
             </a:pPr>
             <a:endParaRPr lang="nl-NL" sz="2000" dirty="0"/>
-          </a:p>
-          <a:p>
-            <a:pPr>
-              <a:buFontTx/>
-              <a:buChar char="-"/>
-            </a:pPr>
-            <a:r>
-              <a:rPr lang="nl-NL" sz="2000" dirty="0"/>
-              <a:t>Biedt veel ondersteunde functies.</a:t>
-            </a:r>
           </a:p>
         </p:txBody>
       </p:sp>
@@ -22395,6 +22376,33 @@
             <a:pPr marL="0" indent="0">
               <a:buNone/>
             </a:pPr>
+            <a:endParaRPr lang="nl-NL" sz="2000" dirty="0"/>
+          </a:p>
+          <a:p>
+            <a:pPr marL="0" indent="0">
+              <a:buNone/>
+            </a:pPr>
+            <a:r>
+              <a:rPr lang="nl-NL" sz="2000" dirty="0"/>
+              <a:t>Wiskundige bewerkingen</a:t>
+            </a:r>
+          </a:p>
+          <a:p>
+            <a:pPr marL="0" indent="0">
+              <a:buNone/>
+            </a:pPr>
+            <a:endParaRPr lang="nl-NL" sz="2000" dirty="0"/>
+          </a:p>
+          <a:p>
+            <a:pPr marL="0" indent="0">
+              <a:buNone/>
+            </a:pPr>
+            <a:endParaRPr lang="nl-NL" sz="2000" dirty="0"/>
+          </a:p>
+          <a:p>
+            <a:pPr marL="0" indent="0">
+              <a:buNone/>
+            </a:pPr>
             <a:r>
               <a:rPr lang="nl-NL" sz="2000" dirty="0"/>
               <a:t>Beschrijvende statistieken en plots</a:t>
@@ -22411,21 +22419,6 @@
               <a:buNone/>
             </a:pPr>
             <a:endParaRPr lang="nl-NL" sz="2000" dirty="0"/>
-          </a:p>
-          <a:p>
-            <a:pPr marL="0" indent="0">
-              <a:buNone/>
-            </a:pPr>
-            <a:endParaRPr lang="nl-NL" sz="2000" dirty="0"/>
-          </a:p>
-          <a:p>
-            <a:pPr marL="0" indent="0">
-              <a:buNone/>
-            </a:pPr>
-            <a:r>
-              <a:rPr lang="nl-NL" sz="2000" dirty="0"/>
-              <a:t>Wiskundige bewerkingen</a:t>
-            </a:r>
           </a:p>
           <a:p>
             <a:pPr marL="0" indent="0">
@@ -22671,6 +22664,69 @@
             <a:pPr marL="0" indent="0">
               <a:buNone/>
             </a:pPr>
+            <a:r>
+              <a:rPr lang="nl-NL" sz="2000" dirty="0">
+                <a:latin typeface="Courier New" panose="02070309020205020404" pitchFamily="49" charset="0"/>
+                <a:cs typeface="Courier New" panose="02070309020205020404" pitchFamily="49" charset="0"/>
+              </a:rPr>
+              <a:t>series["2022-01-01":"2022-01-03"]</a:t>
+            </a:r>
+          </a:p>
+          <a:p>
+            <a:pPr marL="0" indent="0">
+              <a:buNone/>
+            </a:pPr>
+            <a:endParaRPr lang="nl-NL" sz="2000" dirty="0">
+              <a:latin typeface="Courier New" panose="02070309020205020404" pitchFamily="49" charset="0"/>
+              <a:cs typeface="Courier New" panose="02070309020205020404" pitchFamily="49" charset="0"/>
+            </a:endParaRPr>
+          </a:p>
+          <a:p>
+            <a:pPr marL="0" indent="0">
+              <a:buNone/>
+            </a:pPr>
+            <a:r>
+              <a:rPr lang="nl-NL" sz="2000" dirty="0">
+                <a:latin typeface="Courier New" panose="02070309020205020404" pitchFamily="49" charset="0"/>
+                <a:cs typeface="Courier New" panose="02070309020205020404" pitchFamily="49" charset="0"/>
+              </a:rPr>
+              <a:t>series ** 2 / 2</a:t>
+            </a:r>
+          </a:p>
+          <a:p>
+            <a:pPr marL="0" indent="0">
+              <a:buNone/>
+            </a:pPr>
+            <a:r>
+              <a:rPr lang="nl-NL" sz="2000" dirty="0" err="1">
+                <a:latin typeface="Courier New" panose="02070309020205020404" pitchFamily="49" charset="0"/>
+                <a:cs typeface="Courier New" panose="02070309020205020404" pitchFamily="49" charset="0"/>
+              </a:rPr>
+              <a:t>series_a</a:t>
+            </a:r>
+            <a:r>
+              <a:rPr lang="nl-NL" sz="2000" dirty="0">
+                <a:latin typeface="Courier New" panose="02070309020205020404" pitchFamily="49" charset="0"/>
+                <a:cs typeface="Courier New" panose="02070309020205020404" pitchFamily="49" charset="0"/>
+              </a:rPr>
+              <a:t> * </a:t>
+            </a:r>
+            <a:r>
+              <a:rPr lang="nl-NL" sz="2000" dirty="0" err="1">
+                <a:latin typeface="Courier New" panose="02070309020205020404" pitchFamily="49" charset="0"/>
+                <a:cs typeface="Courier New" panose="02070309020205020404" pitchFamily="49" charset="0"/>
+              </a:rPr>
+              <a:t>series_b</a:t>
+            </a:r>
+            <a:endParaRPr lang="nl-NL" sz="2000" dirty="0">
+              <a:latin typeface="Courier New" panose="02070309020205020404" pitchFamily="49" charset="0"/>
+              <a:cs typeface="Courier New" panose="02070309020205020404" pitchFamily="49" charset="0"/>
+            </a:endParaRPr>
+          </a:p>
+          <a:p>
+            <a:pPr marL="0" indent="0">
+              <a:buNone/>
+            </a:pPr>
             <a:endParaRPr lang="nl-NL" sz="2000" dirty="0">
               <a:latin typeface="Courier New" panose="02070309020205020404" pitchFamily="49" charset="0"/>
               <a:cs typeface="Courier New" panose="02070309020205020404" pitchFamily="49" charset="0"/>
@@ -22731,27 +22787,6 @@
                 <a:cs typeface="Courier New" panose="02070309020205020404" pitchFamily="49" charset="0"/>
               </a:rPr>
               <a:t>()</a:t>
-            </a:r>
-          </a:p>
-          <a:p>
-            <a:pPr marL="0" indent="0">
-              <a:buNone/>
-            </a:pPr>
-            <a:endParaRPr lang="nl-NL" sz="2000" dirty="0">
-              <a:latin typeface="Courier New" panose="02070309020205020404" pitchFamily="49" charset="0"/>
-              <a:cs typeface="Courier New" panose="02070309020205020404" pitchFamily="49" charset="0"/>
-            </a:endParaRPr>
-          </a:p>
-          <a:p>
-            <a:pPr marL="0" indent="0">
-              <a:buNone/>
-            </a:pPr>
-            <a:r>
-              <a:rPr lang="nl-NL" sz="2000" dirty="0">
-                <a:latin typeface="Courier New" panose="02070309020205020404" pitchFamily="49" charset="0"/>
-                <a:cs typeface="Courier New" panose="02070309020205020404" pitchFamily="49" charset="0"/>
-              </a:rPr>
-              <a:t>series ** 2 / 2</a:t>
             </a:r>
           </a:p>
           <a:p>

</xml_diff>

<commit_message>
Finalize pandas part of Python trainees
</commit_message>
<xml_diff>
--- a/python_trainees/3_pandas_plotting/python_traineeship_3.pptx
+++ b/python_trainees/3_pandas_plotting/python_traineeship_3.pptx
@@ -242,7 +242,7 @@
           <a:p>
             <a:fld id="{16CF57F2-0494-4F4F-A7AD-E8F59CFB368A}" type="datetimeFigureOut">
               <a:rPr lang="en-NL" smtClean="0"/>
-              <a:t>31/03/2023</a:t>
+              <a:t>03/04/2023</a:t>
             </a:fld>
             <a:endParaRPr lang="en-NL"/>
           </a:p>
@@ -827,7 +827,7 @@
           <a:p>
             <a:fld id="{0EBB069A-003F-4FC0-8534-236B0C5C7B5F}" type="datetimeFigureOut">
               <a:rPr lang="en-NL" smtClean="0"/>
-              <a:t>31/03/2023</a:t>
+              <a:t>03/04/2023</a:t>
             </a:fld>
             <a:endParaRPr lang="en-NL"/>
           </a:p>
@@ -1027,7 +1027,7 @@
           <a:p>
             <a:fld id="{0EBB069A-003F-4FC0-8534-236B0C5C7B5F}" type="datetimeFigureOut">
               <a:rPr lang="en-NL" smtClean="0"/>
-              <a:t>31/03/2023</a:t>
+              <a:t>03/04/2023</a:t>
             </a:fld>
             <a:endParaRPr lang="en-NL"/>
           </a:p>
@@ -1237,7 +1237,7 @@
           <a:p>
             <a:fld id="{0EBB069A-003F-4FC0-8534-236B0C5C7B5F}" type="datetimeFigureOut">
               <a:rPr lang="en-NL" smtClean="0"/>
-              <a:t>31/03/2023</a:t>
+              <a:t>03/04/2023</a:t>
             </a:fld>
             <a:endParaRPr lang="en-NL"/>
           </a:p>
@@ -1437,7 +1437,7 @@
           <a:p>
             <a:fld id="{0EBB069A-003F-4FC0-8534-236B0C5C7B5F}" type="datetimeFigureOut">
               <a:rPr lang="en-NL" smtClean="0"/>
-              <a:t>31/03/2023</a:t>
+              <a:t>03/04/2023</a:t>
             </a:fld>
             <a:endParaRPr lang="en-NL"/>
           </a:p>
@@ -1713,7 +1713,7 @@
           <a:p>
             <a:fld id="{0EBB069A-003F-4FC0-8534-236B0C5C7B5F}" type="datetimeFigureOut">
               <a:rPr lang="en-NL" smtClean="0"/>
-              <a:t>31/03/2023</a:t>
+              <a:t>03/04/2023</a:t>
             </a:fld>
             <a:endParaRPr lang="en-NL"/>
           </a:p>
@@ -1981,7 +1981,7 @@
           <a:p>
             <a:fld id="{0EBB069A-003F-4FC0-8534-236B0C5C7B5F}" type="datetimeFigureOut">
               <a:rPr lang="en-NL" smtClean="0"/>
-              <a:t>31/03/2023</a:t>
+              <a:t>03/04/2023</a:t>
             </a:fld>
             <a:endParaRPr lang="en-NL"/>
           </a:p>
@@ -2396,7 +2396,7 @@
           <a:p>
             <a:fld id="{0EBB069A-003F-4FC0-8534-236B0C5C7B5F}" type="datetimeFigureOut">
               <a:rPr lang="en-NL" smtClean="0"/>
-              <a:t>31/03/2023</a:t>
+              <a:t>03/04/2023</a:t>
             </a:fld>
             <a:endParaRPr lang="en-NL"/>
           </a:p>
@@ -2538,7 +2538,7 @@
           <a:p>
             <a:fld id="{0EBB069A-003F-4FC0-8534-236B0C5C7B5F}" type="datetimeFigureOut">
               <a:rPr lang="en-NL" smtClean="0"/>
-              <a:t>31/03/2023</a:t>
+              <a:t>03/04/2023</a:t>
             </a:fld>
             <a:endParaRPr lang="en-NL"/>
           </a:p>
@@ -2651,7 +2651,7 @@
           <a:p>
             <a:fld id="{0EBB069A-003F-4FC0-8534-236B0C5C7B5F}" type="datetimeFigureOut">
               <a:rPr lang="en-NL" smtClean="0"/>
-              <a:t>31/03/2023</a:t>
+              <a:t>03/04/2023</a:t>
             </a:fld>
             <a:endParaRPr lang="en-NL"/>
           </a:p>
@@ -2964,7 +2964,7 @@
           <a:p>
             <a:fld id="{0EBB069A-003F-4FC0-8534-236B0C5C7B5F}" type="datetimeFigureOut">
               <a:rPr lang="en-NL" smtClean="0"/>
-              <a:t>31/03/2023</a:t>
+              <a:t>03/04/2023</a:t>
             </a:fld>
             <a:endParaRPr lang="en-NL"/>
           </a:p>
@@ -3253,7 +3253,7 @@
           <a:p>
             <a:fld id="{0EBB069A-003F-4FC0-8534-236B0C5C7B5F}" type="datetimeFigureOut">
               <a:rPr lang="en-NL" smtClean="0"/>
-              <a:t>31/03/2023</a:t>
+              <a:t>03/04/2023</a:t>
             </a:fld>
             <a:endParaRPr lang="en-NL"/>
           </a:p>
@@ -3496,7 +3496,7 @@
           <a:p>
             <a:fld id="{0EBB069A-003F-4FC0-8534-236B0C5C7B5F}" type="datetimeFigureOut">
               <a:rPr lang="en-NL" smtClean="0"/>
-              <a:t>31/03/2023</a:t>
+              <a:t>03/04/2023</a:t>
             </a:fld>
             <a:endParaRPr lang="en-NL"/>
           </a:p>
@@ -6311,18 +6311,7 @@
             </a:pPr>
             <a:r>
               <a:rPr lang="nl-NL" sz="2000" dirty="0"/>
-              <a:t>Maak een integer kolom met het regelnummer uit </a:t>
-            </a:r>
-            <a:r>
-              <a:rPr lang="nl-NL" sz="2000" dirty="0" err="1">
-                <a:latin typeface="Courier New" panose="02070309020205020404" pitchFamily="49" charset="0"/>
-                <a:cs typeface="Courier New" panose="02070309020205020404" pitchFamily="49" charset="0"/>
-              </a:rPr>
-              <a:t>line_id</a:t>
-            </a:r>
-            <a:r>
-              <a:rPr lang="nl-NL" sz="2000" dirty="0"/>
-              <a:t> (laatste 4 cijfers).</a:t>
+              <a:t>Selecteer de 15 regels met de hoogste omzet; wat valt je op?</a:t>
             </a:r>
           </a:p>
           <a:p>
@@ -6339,23 +6328,104 @@
             </a:pPr>
             <a:r>
               <a:rPr lang="nl-NL" sz="2000" dirty="0"/>
-              <a:t>Maak een kolom met een samenvoeging van </a:t>
-            </a:r>
-            <a:r>
-              <a:rPr lang="nl-NL" sz="2000" dirty="0" err="1"/>
+              <a:t>Voeg een kolom toe met een line ID:</a:t>
+            </a:r>
+          </a:p>
+          <a:p>
+            <a:pPr lvl="1"/>
+            <a:endParaRPr lang="nl-NL" sz="1600" dirty="0"/>
+          </a:p>
+          <a:p>
+            <a:pPr lvl="1"/>
+            <a:r>
+              <a:rPr lang="nl-NL" sz="1600" dirty="0"/>
+              <a:t>Samenvoeging van </a:t>
+            </a:r>
+            <a:r>
+              <a:rPr lang="nl-NL" sz="1600" dirty="0" err="1">
+                <a:latin typeface="Courier New" panose="02070309020205020404" pitchFamily="49" charset="0"/>
+                <a:cs typeface="Courier New" panose="02070309020205020404" pitchFamily="49" charset="0"/>
+              </a:rPr>
               <a:t>transaction_id</a:t>
             </a:r>
             <a:r>
-              <a:rPr lang="nl-NL" sz="2000" dirty="0"/>
+              <a:rPr lang="nl-NL" sz="1600" dirty="0"/>
               <a:t> en </a:t>
             </a:r>
             <a:r>
-              <a:rPr lang="nl-NL" sz="2000" dirty="0" err="1"/>
-              <a:t>line_id</a:t>
-            </a:r>
-            <a:r>
-              <a:rPr lang="nl-NL" sz="2000" dirty="0"/>
+              <a:rPr lang="nl-NL" sz="1600" dirty="0" err="1">
+                <a:latin typeface="Courier New" panose="02070309020205020404" pitchFamily="49" charset="0"/>
+                <a:cs typeface="Courier New" panose="02070309020205020404" pitchFamily="49" charset="0"/>
+              </a:rPr>
+              <a:t>line_nr</a:t>
+            </a:r>
+            <a:r>
+              <a:rPr lang="nl-NL" sz="1600" dirty="0"/>
               <a:t>.</a:t>
+            </a:r>
+          </a:p>
+          <a:p>
+            <a:pPr lvl="1"/>
+            <a:r>
+              <a:rPr lang="nl-NL" sz="1600" dirty="0"/>
+              <a:t>Template: </a:t>
+            </a:r>
+            <a:r>
+              <a:rPr lang="nl-NL" sz="1600" dirty="0">
+                <a:latin typeface="Courier New" panose="02070309020205020404" pitchFamily="49" charset="0"/>
+                <a:cs typeface="Courier New" panose="02070309020205020404" pitchFamily="49" charset="0"/>
+              </a:rPr>
+              <a:t>&lt;</a:t>
+            </a:r>
+            <a:r>
+              <a:rPr lang="nl-NL" sz="1600" dirty="0" err="1">
+                <a:latin typeface="Courier New" panose="02070309020205020404" pitchFamily="49" charset="0"/>
+                <a:cs typeface="Courier New" panose="02070309020205020404" pitchFamily="49" charset="0"/>
+              </a:rPr>
+              <a:t>transaction_id</a:t>
+            </a:r>
+            <a:r>
+              <a:rPr lang="nl-NL" sz="1600" dirty="0">
+                <a:latin typeface="Courier New" panose="02070309020205020404" pitchFamily="49" charset="0"/>
+                <a:cs typeface="Courier New" panose="02070309020205020404" pitchFamily="49" charset="0"/>
+              </a:rPr>
+              <a:t>&gt;-&lt;</a:t>
+            </a:r>
+            <a:r>
+              <a:rPr lang="nl-NL" sz="1600" dirty="0" err="1">
+                <a:latin typeface="Courier New" panose="02070309020205020404" pitchFamily="49" charset="0"/>
+                <a:cs typeface="Courier New" panose="02070309020205020404" pitchFamily="49" charset="0"/>
+              </a:rPr>
+              <a:t>line_nr</a:t>
+            </a:r>
+            <a:r>
+              <a:rPr lang="nl-NL" sz="1600" dirty="0">
+                <a:latin typeface="Courier New" panose="02070309020205020404" pitchFamily="49" charset="0"/>
+                <a:cs typeface="Courier New" panose="02070309020205020404" pitchFamily="49" charset="0"/>
+              </a:rPr>
+              <a:t>&gt;.</a:t>
+            </a:r>
+          </a:p>
+          <a:p>
+            <a:pPr lvl="1"/>
+            <a:r>
+              <a:rPr lang="nl-NL" sz="1600" dirty="0">
+                <a:cs typeface="Courier New" panose="02070309020205020404" pitchFamily="49" charset="0"/>
+              </a:rPr>
+              <a:t>Gebruik voor </a:t>
+            </a:r>
+            <a:r>
+              <a:rPr lang="nl-NL" sz="1600" dirty="0" err="1">
+                <a:latin typeface="Courier New" panose="02070309020205020404" pitchFamily="49" charset="0"/>
+                <a:cs typeface="Courier New" panose="02070309020205020404" pitchFamily="49" charset="0"/>
+              </a:rPr>
+              <a:t>line_nr</a:t>
+            </a:r>
+            <a:r>
+              <a:rPr lang="nl-NL" sz="1600" dirty="0">
+                <a:cs typeface="Courier New" panose="02070309020205020404" pitchFamily="49" charset="0"/>
+              </a:rPr>
+              <a:t> vier getallen, vul aan met nullen.</a:t>
             </a:r>
           </a:p>
         </p:txBody>
@@ -7584,7 +7654,7 @@
             </a:pPr>
             <a:r>
               <a:rPr lang="nl-NL" sz="2000" dirty="0"/>
-              <a:t>Open het transactiebestand: </a:t>
+              <a:t>Open weer transactiebestand: </a:t>
             </a:r>
             <a:r>
               <a:rPr lang="nl-NL" sz="2000" dirty="0">
@@ -11151,7 +11221,7 @@
             </a:r>
             <a:r>
               <a:rPr lang="nl-NL" sz="2000" dirty="0"/>
-              <a:t> om producten en klanten aan de transacties te koppelen.</a:t>
+              <a:t> om producten en klanten aan transacties te koppelen.</a:t>
             </a:r>
           </a:p>
           <a:p>
@@ -12150,8 +12220,12 @@
           <a:lstStyle/>
           <a:p>
             <a:r>
-              <a:rPr lang="nl-NL" sz="3600"/>
-              <a:t>Matplotlib overzicht</a:t>
+              <a:rPr lang="nl-NL" sz="3600" dirty="0" err="1"/>
+              <a:t>Matplotlib</a:t>
+            </a:r>
+            <a:r>
+              <a:rPr lang="nl-NL" sz="3600" dirty="0"/>
+              <a:t> API overzicht</a:t>
             </a:r>
             <a:endParaRPr lang="nl-NL" sz="3600" noProof="0" dirty="0"/>
           </a:p>
@@ -12483,8 +12557,12 @@
               <a:buNone/>
             </a:pPr>
             <a:r>
+              <a:rPr lang="nl-NL" sz="2000" b="1" dirty="0" err="1"/>
+              <a:t>Text</a:t>
+            </a:r>
+            <a:r>
               <a:rPr lang="nl-NL" sz="2000" b="1" dirty="0"/>
-              <a:t>Tekst, </a:t>
+              <a:t>, </a:t>
             </a:r>
             <a:r>
               <a:rPr lang="nl-NL" sz="2000" b="1" dirty="0" err="1"/>
@@ -13778,7 +13856,7 @@
             </a:pPr>
             <a:r>
               <a:rPr lang="nl-NL" sz="2000" dirty="0"/>
-              <a:t>De minimalistische manier:</a:t>
+              <a:t>De simpele manier:</a:t>
             </a:r>
           </a:p>
           <a:p>
@@ -16649,28 +16727,33 @@
                 <a:latin typeface="Courier New" panose="02070309020205020404" pitchFamily="49" charset="0"/>
                 <a:cs typeface="Courier New" panose="02070309020205020404" pitchFamily="49" charset="0"/>
               </a:rPr>
-              <a:t>ax.set</a:t>
+              <a:t>ax.set_xlabel</a:t>
             </a:r>
             <a:r>
               <a:rPr lang="nl-NL" sz="1800" dirty="0">
                 <a:latin typeface="Courier New" panose="02070309020205020404" pitchFamily="49" charset="0"/>
                 <a:cs typeface="Courier New" panose="02070309020205020404" pitchFamily="49" charset="0"/>
               </a:rPr>
-              <a:t>(</a:t>
-            </a:r>
+              <a:t>("&lt;label&gt;")</a:t>
+            </a:r>
+          </a:p>
+          <a:p>
+            <a:pPr marL="0" indent="0">
+              <a:buNone/>
+            </a:pPr>
             <a:r>
               <a:rPr lang="nl-NL" sz="1800" dirty="0" err="1">
                 <a:latin typeface="Courier New" panose="02070309020205020404" pitchFamily="49" charset="0"/>
                 <a:cs typeface="Courier New" panose="02070309020205020404" pitchFamily="49" charset="0"/>
               </a:rPr>
-              <a:t>title</a:t>
+              <a:t>ax.set</a:t>
             </a:r>
             <a:r>
               <a:rPr lang="nl-NL" sz="1800" dirty="0">
                 <a:latin typeface="Courier New" panose="02070309020205020404" pitchFamily="49" charset="0"/>
                 <a:cs typeface="Courier New" panose="02070309020205020404" pitchFamily="49" charset="0"/>
               </a:rPr>
-              <a:t>="&lt;</a:t>
+              <a:t>(</a:t>
             </a:r>
             <a:r>
               <a:rPr lang="nl-NL" sz="1800" dirty="0" err="1">
@@ -16684,54 +16767,49 @@
                 <a:latin typeface="Courier New" panose="02070309020205020404" pitchFamily="49" charset="0"/>
                 <a:cs typeface="Courier New" panose="02070309020205020404" pitchFamily="49" charset="0"/>
               </a:rPr>
-              <a:t>&gt;", </a:t>
+              <a:t>="&lt;</a:t>
             </a:r>
             <a:r>
               <a:rPr lang="nl-NL" sz="1800" dirty="0" err="1">
                 <a:latin typeface="Courier New" panose="02070309020205020404" pitchFamily="49" charset="0"/>
                 <a:cs typeface="Courier New" panose="02070309020205020404" pitchFamily="49" charset="0"/>
               </a:rPr>
-              <a:t>xlabel</a:t>
+              <a:t>title</a:t>
             </a:r>
             <a:r>
               <a:rPr lang="nl-NL" sz="1800" dirty="0">
                 <a:latin typeface="Courier New" panose="02070309020205020404" pitchFamily="49" charset="0"/>
                 <a:cs typeface="Courier New" panose="02070309020205020404" pitchFamily="49" charset="0"/>
               </a:rPr>
-              <a:t>="&lt;label&gt;", </a:t>
+              <a:t>&gt;", </a:t>
             </a:r>
             <a:r>
               <a:rPr lang="nl-NL" sz="1800" dirty="0" err="1">
                 <a:latin typeface="Courier New" panose="02070309020205020404" pitchFamily="49" charset="0"/>
                 <a:cs typeface="Courier New" panose="02070309020205020404" pitchFamily="49" charset="0"/>
               </a:rPr>
-              <a:t>ylabel</a:t>
+              <a:t>xlabel</a:t>
             </a:r>
             <a:r>
               <a:rPr lang="nl-NL" sz="1800" dirty="0">
                 <a:latin typeface="Courier New" panose="02070309020205020404" pitchFamily="49" charset="0"/>
                 <a:cs typeface="Courier New" panose="02070309020205020404" pitchFamily="49" charset="0"/>
               </a:rPr>
-              <a:t>="&lt;label&gt;")</a:t>
-            </a:r>
-          </a:p>
-          <a:p>
-            <a:pPr marL="0" indent="0">
-              <a:buNone/>
-            </a:pPr>
+              <a:t>="&lt;label&gt;", </a:t>
+            </a:r>
             <a:r>
               <a:rPr lang="nl-NL" sz="1800" dirty="0" err="1">
                 <a:latin typeface="Courier New" panose="02070309020205020404" pitchFamily="49" charset="0"/>
                 <a:cs typeface="Courier New" panose="02070309020205020404" pitchFamily="49" charset="0"/>
               </a:rPr>
-              <a:t>ax.set_xlabel</a:t>
+              <a:t>ylabel</a:t>
             </a:r>
             <a:r>
               <a:rPr lang="nl-NL" sz="1800" dirty="0">
                 <a:latin typeface="Courier New" panose="02070309020205020404" pitchFamily="49" charset="0"/>
                 <a:cs typeface="Courier New" panose="02070309020205020404" pitchFamily="49" charset="0"/>
               </a:rPr>
-              <a:t>("&lt;label&gt;")</a:t>
+              <a:t>="&lt;label&gt;")</a:t>
             </a:r>
           </a:p>
           <a:p>
@@ -20943,7 +21021,7 @@
             <a:pPr algn="ctr"/>
             <a:r>
               <a:rPr lang="nl-NL" sz="1400" dirty="0"/>
-              <a:t>(Python API)</a:t>
+              <a:t>(Python)</a:t>
             </a:r>
           </a:p>
         </p:txBody>
@@ -21018,7 +21096,7 @@
               <a:pPr algn="ctr"/>
               <a:r>
                 <a:rPr lang="nl-NL" sz="1400" dirty="0"/>
-                <a:t>(Python API)</a:t>
+                <a:t>(Python)</a:t>
               </a:r>
             </a:p>
           </p:txBody>
@@ -21136,34 +21214,46 @@
             </a:r>
             <a:r>
               <a:rPr lang="nl-NL" sz="2000" noProof="0" dirty="0"/>
-              <a:t> is een package om efficiënt met data te werken via </a:t>
-            </a:r>
-            <a:r>
-              <a:rPr lang="nl-NL" sz="2000" noProof="0" dirty="0" err="1"/>
+              <a:t> maakt makkelijker en efficiënter om met data te werken.</a:t>
+            </a:r>
+          </a:p>
+          <a:p>
+            <a:pPr>
+              <a:buFontTx/>
+              <a:buChar char="-"/>
+            </a:pPr>
+            <a:r>
+              <a:rPr lang="nl-NL" sz="2000" dirty="0"/>
+              <a:t>Series:	1-dimensionaal: vergelijkbaar met list.</a:t>
+            </a:r>
+          </a:p>
+          <a:p>
+            <a:pPr>
+              <a:buFontTx/>
+              <a:buChar char="-"/>
+            </a:pPr>
+            <a:r>
+              <a:rPr lang="nl-NL" sz="2000" dirty="0" err="1"/>
               <a:t>DataFrames</a:t>
             </a:r>
             <a:r>
-              <a:rPr lang="nl-NL" sz="2000" noProof="0" dirty="0"/>
-              <a:t>; 2-dimensionele tabellen.</a:t>
+              <a:rPr lang="nl-NL" sz="2000" dirty="0"/>
+              <a:t>:	2-dimensionaal: vergelijkbaar (SQL) tabel.</a:t>
             </a:r>
           </a:p>
           <a:p>
             <a:pPr marL="0" indent="0">
               <a:buNone/>
             </a:pPr>
-            <a:endParaRPr lang="nl-NL" sz="2000" dirty="0"/>
+            <a:endParaRPr lang="nl-NL" sz="2000" b="1" noProof="0" dirty="0"/>
           </a:p>
           <a:p>
             <a:pPr marL="0" indent="0">
               <a:buNone/>
             </a:pPr>
             <a:r>
-              <a:rPr lang="nl-NL" sz="2000" b="1" noProof="0" dirty="0" err="1"/>
-              <a:t>Pandas</a:t>
-            </a:r>
-            <a:r>
               <a:rPr lang="nl-NL" sz="2000" b="1" noProof="0" dirty="0"/>
-              <a:t> is gebaseerd op </a:t>
+              <a:t>Gebaseerd op </a:t>
             </a:r>
             <a:r>
               <a:rPr lang="nl-NL" sz="2000" b="1" noProof="0" dirty="0" err="1"/>
@@ -21177,11 +21267,19 @@
             </a:pPr>
             <a:r>
               <a:rPr lang="nl-NL" sz="2000" dirty="0" err="1"/>
-              <a:t>Pandas</a:t>
+              <a:t>Numpy</a:t>
             </a:r>
             <a:r>
               <a:rPr lang="nl-NL" sz="2000" dirty="0"/>
-              <a:t> stuurt instructies door naar </a:t>
+              <a:t> doet het werk onder de motorkap; </a:t>
+            </a:r>
+            <a:r>
+              <a:rPr lang="nl-NL" sz="2000" dirty="0" err="1"/>
+              <a:t>pandas</a:t>
+            </a:r>
+            <a:r>
+              <a:rPr lang="nl-NL" sz="2000" dirty="0"/>
+              <a:t> roept bewerkingen aan in </a:t>
             </a:r>
             <a:r>
               <a:rPr lang="nl-NL" sz="2000" dirty="0" err="1"/>
@@ -21189,7 +21287,7 @@
             </a:r>
             <a:r>
               <a:rPr lang="nl-NL" sz="2000" dirty="0"/>
-              <a:t>, dat het zware werk doet.</a:t>
+              <a:t>.</a:t>
             </a:r>
             <a:endParaRPr lang="nl-NL" sz="2000" noProof="0" dirty="0"/>
           </a:p>
@@ -21226,7 +21324,7 @@
             </a:r>
             <a:r>
               <a:rPr lang="nl-NL" sz="2000" noProof="0" dirty="0"/>
-              <a:t> verwerkt de data in C; deze taal is veel sneller dan Python. </a:t>
+              <a:t> is geschreven in C, dat veel sneller is dan Python. </a:t>
             </a:r>
           </a:p>
           <a:p>
@@ -21235,7 +21333,7 @@
             </a:pPr>
             <a:r>
               <a:rPr lang="nl-NL" sz="2000" noProof="0" dirty="0"/>
-              <a:t>Om dit te kunnen doen, worden de data overgebracht naar C.</a:t>
+              <a:t>Maar: Data wordt overgezet van Python naar C.</a:t>
             </a:r>
           </a:p>
         </p:txBody>
@@ -21460,24 +21558,11 @@
             </a:pPr>
             <a:r>
               <a:rPr lang="nl-NL" sz="2000" noProof="0" dirty="0" err="1"/>
-              <a:t>Numpy</a:t>
+              <a:t>Pandas</a:t>
             </a:r>
             <a:r>
               <a:rPr lang="nl-NL" sz="2000" noProof="0" dirty="0"/>
-              <a:t> heeft andere data types dan Python, omdat het in C is geschreven.</a:t>
-            </a:r>
-          </a:p>
-          <a:p>
-            <a:pPr marL="0" indent="0">
-              <a:buNone/>
-            </a:pPr>
-            <a:r>
-              <a:rPr lang="nl-NL" sz="2000" noProof="0" dirty="0" err="1"/>
-              <a:t>Pandas</a:t>
-            </a:r>
-            <a:r>
-              <a:rPr lang="nl-NL" sz="2000" noProof="0" dirty="0"/>
-              <a:t> slaat sommige data op via </a:t>
+              <a:t> slaat een deel van de data op in Python en een deel via </a:t>
             </a:r>
             <a:r>
               <a:rPr lang="nl-NL" sz="2000" noProof="0" dirty="0" err="1"/>
@@ -21485,7 +21570,15 @@
             </a:r>
             <a:r>
               <a:rPr lang="nl-NL" sz="2000" noProof="0" dirty="0"/>
-              <a:t>.</a:t>
+              <a:t>. Soms wordt data dus geconverteerd </a:t>
+            </a:r>
+            <a:r>
+              <a:rPr lang="nl-NL" sz="2000" dirty="0"/>
+              <a:t>naar </a:t>
+            </a:r>
+            <a:r>
+              <a:rPr lang="nl-NL" sz="2000" noProof="0" dirty="0"/>
+              <a:t>andere data types.</a:t>
             </a:r>
           </a:p>
           <a:p>
@@ -21500,7 +21593,7 @@
             </a:pPr>
             <a:r>
               <a:rPr lang="nl-NL" sz="2000" noProof="0" dirty="0"/>
-              <a:t>Deze tabel geeft een overzicht van de basale data types:</a:t>
+              <a:t>Hieronder staat een overzicht van zulke conversies:</a:t>
             </a:r>
           </a:p>
           <a:p>
@@ -21546,8 +21639,12 @@
           <a:lstStyle/>
           <a:p>
             <a:r>
+              <a:rPr lang="nl-NL" sz="3600" noProof="0" dirty="0" err="1"/>
+              <a:t>Numpy</a:t>
+            </a:r>
+            <a:r>
               <a:rPr lang="nl-NL" sz="3600" noProof="0" dirty="0"/>
-              <a:t>Andere data types</a:t>
+              <a:t> data types</a:t>
             </a:r>
           </a:p>
         </p:txBody>
@@ -21567,13 +21664,13 @@
           <p:nvPr>
             <p:extLst>
               <p:ext uri="{D42A27DB-BD31-4B8C-83A1-F6EECF244321}">
-                <p14:modId xmlns:p14="http://schemas.microsoft.com/office/powerpoint/2010/main" val="3126004770"/>
+                <p14:modId xmlns:p14="http://schemas.microsoft.com/office/powerpoint/2010/main" val="3509172993"/>
               </p:ext>
             </p:extLst>
           </p:nvPr>
         </p:nvGraphicFramePr>
         <p:xfrm>
-          <a:off x="971550" y="3175000"/>
+          <a:off x="939800" y="2978150"/>
           <a:ext cx="9893299" cy="2780574"/>
         </p:xfrm>
         <a:graphic>
@@ -21857,7 +21954,7 @@
                     <a:p>
                       <a:r>
                         <a:rPr lang="en-US" dirty="0"/>
-                        <a:t>object / category / string</a:t>
+                        <a:t>object</a:t>
                       </a:r>
                       <a:endParaRPr lang="en-NL" dirty="0"/>
                     </a:p>
@@ -23249,6 +23346,33 @@
             </a:pPr>
             <a:r>
               <a:rPr lang="nl-NL" sz="2000" dirty="0"/>
+              <a:t>Beschrijvende informatie</a:t>
+            </a:r>
+          </a:p>
+          <a:p>
+            <a:pPr marL="0" indent="0">
+              <a:buNone/>
+            </a:pPr>
+            <a:endParaRPr lang="nl-NL" sz="2000" dirty="0"/>
+          </a:p>
+          <a:p>
+            <a:pPr marL="0" indent="0">
+              <a:buNone/>
+            </a:pPr>
+            <a:endParaRPr lang="nl-NL" sz="2000" dirty="0"/>
+          </a:p>
+          <a:p>
+            <a:pPr marL="0" indent="0">
+              <a:buNone/>
+            </a:pPr>
+            <a:endParaRPr lang="nl-NL" sz="2000" dirty="0"/>
+          </a:p>
+          <a:p>
+            <a:pPr marL="0" indent="0">
+              <a:buNone/>
+            </a:pPr>
+            <a:r>
+              <a:rPr lang="nl-NL" sz="2000" dirty="0"/>
               <a:t>Selecties maken</a:t>
             </a:r>
           </a:p>
@@ -23291,34 +23415,7 @@
             </a:pPr>
             <a:r>
               <a:rPr lang="nl-NL" sz="2000" dirty="0"/>
-              <a:t>Beschrijvende statistieken en plots</a:t>
-            </a:r>
-          </a:p>
-          <a:p>
-            <a:pPr marL="0" indent="0">
-              <a:buNone/>
-            </a:pPr>
-            <a:endParaRPr lang="nl-NL" sz="2000" dirty="0"/>
-          </a:p>
-          <a:p>
-            <a:pPr marL="0" indent="0">
-              <a:buNone/>
-            </a:pPr>
-            <a:endParaRPr lang="nl-NL" sz="2000" dirty="0"/>
-          </a:p>
-          <a:p>
-            <a:pPr marL="0" indent="0">
-              <a:buNone/>
-            </a:pPr>
-            <a:endParaRPr lang="nl-NL" sz="2000" dirty="0"/>
-          </a:p>
-          <a:p>
-            <a:pPr marL="0" indent="0">
-              <a:buNone/>
-            </a:pPr>
-            <a:r>
-              <a:rPr lang="nl-NL" sz="2000" dirty="0"/>
-              <a:t>Eigen functies toepassen</a:t>
+              <a:t>Functies toepassen</a:t>
             </a:r>
             <a:endParaRPr lang="nl-NL" sz="2000" dirty="0">
               <a:latin typeface="Courier New" panose="02070309020205020404" pitchFamily="49" charset="0"/>
@@ -23536,23 +23633,56 @@
               <a:buNone/>
             </a:pPr>
             <a:r>
+              <a:rPr lang="nl-NL" sz="2000" dirty="0" err="1">
+                <a:latin typeface="Courier New" panose="02070309020205020404" pitchFamily="49" charset="0"/>
+                <a:cs typeface="Courier New" panose="02070309020205020404" pitchFamily="49" charset="0"/>
+              </a:rPr>
+              <a:t>series.describe</a:t>
+            </a:r>
+            <a:r>
               <a:rPr lang="nl-NL" sz="2000" dirty="0">
                 <a:latin typeface="Courier New" panose="02070309020205020404" pitchFamily="49" charset="0"/>
                 <a:cs typeface="Courier New" panose="02070309020205020404" pitchFamily="49" charset="0"/>
               </a:rPr>
-              <a:t>series[0:3]</a:t>
+              <a:t>()</a:t>
             </a:r>
           </a:p>
           <a:p>
             <a:pPr marL="0" indent="0">
               <a:buNone/>
             </a:pPr>
+            <a:r>
+              <a:rPr lang="nl-NL" sz="2000" dirty="0" err="1">
+                <a:latin typeface="Courier New" panose="02070309020205020404" pitchFamily="49" charset="0"/>
+                <a:cs typeface="Courier New" panose="02070309020205020404" pitchFamily="49" charset="0"/>
+              </a:rPr>
+              <a:t>series.value_counts</a:t>
+            </a:r>
             <a:r>
               <a:rPr lang="nl-NL" sz="2000" dirty="0">
                 <a:latin typeface="Courier New" panose="02070309020205020404" pitchFamily="49" charset="0"/>
                 <a:cs typeface="Courier New" panose="02070309020205020404" pitchFamily="49" charset="0"/>
               </a:rPr>
-              <a:t>series["2022-01-01":"2022-01-03"]</a:t>
+              <a:t>()</a:t>
+            </a:r>
+          </a:p>
+          <a:p>
+            <a:pPr marL="0" indent="0">
+              <a:buNone/>
+            </a:pPr>
+            <a:r>
+              <a:rPr lang="nl-NL" sz="2000" dirty="0" err="1">
+                <a:latin typeface="Courier New" panose="02070309020205020404" pitchFamily="49" charset="0"/>
+                <a:cs typeface="Courier New" panose="02070309020205020404" pitchFamily="49" charset="0"/>
+              </a:rPr>
+              <a:t>series.plot.hist</a:t>
+            </a:r>
+            <a:r>
+              <a:rPr lang="nl-NL" sz="2000" dirty="0">
+                <a:latin typeface="Courier New" panose="02070309020205020404" pitchFamily="49" charset="0"/>
+                <a:cs typeface="Courier New" panose="02070309020205020404" pitchFamily="49" charset="0"/>
+              </a:rPr>
+              <a:t>()</a:t>
             </a:r>
           </a:p>
           <a:p>
@@ -23573,34 +23703,25 @@
                 <a:latin typeface="Courier New" panose="02070309020205020404" pitchFamily="49" charset="0"/>
                 <a:cs typeface="Courier New" panose="02070309020205020404" pitchFamily="49" charset="0"/>
               </a:rPr>
-              <a:t>series ** 2 / 2</a:t>
+              <a:t>series[0:3]</a:t>
             </a:r>
           </a:p>
           <a:p>
             <a:pPr marL="0" indent="0">
               <a:buNone/>
             </a:pPr>
-            <a:r>
-              <a:rPr lang="nl-NL" sz="2000" dirty="0" err="1">
-                <a:latin typeface="Courier New" panose="02070309020205020404" pitchFamily="49" charset="0"/>
-                <a:cs typeface="Courier New" panose="02070309020205020404" pitchFamily="49" charset="0"/>
-              </a:rPr>
-              <a:t>series_a</a:t>
-            </a:r>
             <a:r>
               <a:rPr lang="nl-NL" sz="2000" dirty="0">
                 <a:latin typeface="Courier New" panose="02070309020205020404" pitchFamily="49" charset="0"/>
                 <a:cs typeface="Courier New" panose="02070309020205020404" pitchFamily="49" charset="0"/>
               </a:rPr>
-              <a:t> * </a:t>
-            </a:r>
-            <a:r>
-              <a:rPr lang="nl-NL" sz="2000" dirty="0" err="1">
-                <a:latin typeface="Courier New" panose="02070309020205020404" pitchFamily="49" charset="0"/>
-                <a:cs typeface="Courier New" panose="02070309020205020404" pitchFamily="49" charset="0"/>
-              </a:rPr>
-              <a:t>series_b</a:t>
-            </a:r>
+              <a:t>series["2022-01-01":"2022-01-03"]</a:t>
+            </a:r>
+          </a:p>
+          <a:p>
+            <a:pPr marL="0" indent="0">
+              <a:buNone/>
+            </a:pPr>
             <a:endParaRPr lang="nl-NL" sz="2000" dirty="0">
               <a:latin typeface="Courier New" panose="02070309020205020404" pitchFamily="49" charset="0"/>
               <a:cs typeface="Courier New" panose="02070309020205020404" pitchFamily="49" charset="0"/>
@@ -23610,67 +23731,43 @@
             <a:pPr marL="0" indent="0">
               <a:buNone/>
             </a:pPr>
+            <a:r>
+              <a:rPr lang="nl-NL" sz="2000" dirty="0">
+                <a:latin typeface="Courier New" panose="02070309020205020404" pitchFamily="49" charset="0"/>
+                <a:cs typeface="Courier New" panose="02070309020205020404" pitchFamily="49" charset="0"/>
+              </a:rPr>
+              <a:t>series ** 2 / 2</a:t>
+            </a:r>
+          </a:p>
+          <a:p>
+            <a:pPr marL="0" indent="0">
+              <a:buNone/>
+            </a:pPr>
+            <a:r>
+              <a:rPr lang="nl-NL" sz="2000" dirty="0" err="1">
+                <a:latin typeface="Courier New" panose="02070309020205020404" pitchFamily="49" charset="0"/>
+                <a:cs typeface="Courier New" panose="02070309020205020404" pitchFamily="49" charset="0"/>
+              </a:rPr>
+              <a:t>series_a</a:t>
+            </a:r>
+            <a:r>
+              <a:rPr lang="nl-NL" sz="2000" dirty="0">
+                <a:latin typeface="Courier New" panose="02070309020205020404" pitchFamily="49" charset="0"/>
+                <a:cs typeface="Courier New" panose="02070309020205020404" pitchFamily="49" charset="0"/>
+              </a:rPr>
+              <a:t> * </a:t>
+            </a:r>
+            <a:r>
+              <a:rPr lang="nl-NL" sz="2000" dirty="0" err="1">
+                <a:latin typeface="Courier New" panose="02070309020205020404" pitchFamily="49" charset="0"/>
+                <a:cs typeface="Courier New" panose="02070309020205020404" pitchFamily="49" charset="0"/>
+              </a:rPr>
+              <a:t>series_b</a:t>
+            </a:r>
             <a:endParaRPr lang="nl-NL" sz="2000" dirty="0">
               <a:latin typeface="Courier New" panose="02070309020205020404" pitchFamily="49" charset="0"/>
               <a:cs typeface="Courier New" panose="02070309020205020404" pitchFamily="49" charset="0"/>
             </a:endParaRPr>
-          </a:p>
-          <a:p>
-            <a:pPr marL="0" indent="0">
-              <a:buNone/>
-            </a:pPr>
-            <a:r>
-              <a:rPr lang="nl-NL" sz="2000" dirty="0" err="1">
-                <a:latin typeface="Courier New" panose="02070309020205020404" pitchFamily="49" charset="0"/>
-                <a:cs typeface="Courier New" panose="02070309020205020404" pitchFamily="49" charset="0"/>
-              </a:rPr>
-              <a:t>series.describe</a:t>
-            </a:r>
-            <a:r>
-              <a:rPr lang="nl-NL" sz="2000" dirty="0">
-                <a:latin typeface="Courier New" panose="02070309020205020404" pitchFamily="49" charset="0"/>
-                <a:cs typeface="Courier New" panose="02070309020205020404" pitchFamily="49" charset="0"/>
-              </a:rPr>
-              <a:t>()</a:t>
-            </a:r>
-          </a:p>
-          <a:p>
-            <a:pPr marL="0" indent="0">
-              <a:buNone/>
-            </a:pPr>
-            <a:r>
-              <a:rPr lang="nl-NL" sz="2000" dirty="0" err="1">
-                <a:latin typeface="Courier New" panose="02070309020205020404" pitchFamily="49" charset="0"/>
-                <a:cs typeface="Courier New" panose="02070309020205020404" pitchFamily="49" charset="0"/>
-              </a:rPr>
-              <a:t>series.value_counts</a:t>
-            </a:r>
-            <a:r>
-              <a:rPr lang="nl-NL" sz="2000" dirty="0">
-                <a:latin typeface="Courier New" panose="02070309020205020404" pitchFamily="49" charset="0"/>
-                <a:cs typeface="Courier New" panose="02070309020205020404" pitchFamily="49" charset="0"/>
-              </a:rPr>
-              <a:t>()</a:t>
-            </a:r>
-          </a:p>
-          <a:p>
-            <a:pPr marL="0" indent="0">
-              <a:buNone/>
-            </a:pPr>
-            <a:r>
-              <a:rPr lang="nl-NL" sz="2000" dirty="0" err="1">
-                <a:latin typeface="Courier New" panose="02070309020205020404" pitchFamily="49" charset="0"/>
-                <a:cs typeface="Courier New" panose="02070309020205020404" pitchFamily="49" charset="0"/>
-              </a:rPr>
-              <a:t>series.plot.hist</a:t>
-            </a:r>
-            <a:r>
-              <a:rPr lang="nl-NL" sz="2000" dirty="0">
-                <a:latin typeface="Courier New" panose="02070309020205020404" pitchFamily="49" charset="0"/>
-                <a:cs typeface="Courier New" panose="02070309020205020404" pitchFamily="49" charset="0"/>
-              </a:rPr>
-              <a:t>()</a:t>
-            </a:r>
           </a:p>
           <a:p>
             <a:pPr marL="0" indent="0">
@@ -23878,7 +23975,7 @@
             <a:pPr lvl="1"/>
             <a:r>
               <a:rPr lang="nl-NL" sz="1600" dirty="0"/>
-              <a:t>Optioneel: Is dit type efficiënter of juist niet?</a:t>
+              <a:t>Bonus: Is dit type efficiënter of juist niet?</a:t>
             </a:r>
             <a:endParaRPr lang="nl-NL" sz="2000" dirty="0"/>
           </a:p>
@@ -24111,7 +24208,7 @@
             <p:ph idx="1"/>
             <p:extLst>
               <p:ext uri="{D42A27DB-BD31-4B8C-83A1-F6EECF244321}">
-                <p14:modId xmlns:p14="http://schemas.microsoft.com/office/powerpoint/2010/main" val="1788154910"/>
+                <p14:modId xmlns:p14="http://schemas.microsoft.com/office/powerpoint/2010/main" val="1049318642"/>
               </p:ext>
             </p:extLst>
           </p:nvPr>
@@ -24402,7 +24499,7 @@
                       <a:pPr algn="ctr"/>
                       <a:r>
                         <a:rPr lang="en-US" dirty="0"/>
-                        <a:t>STR</a:t>
+                        <a:t>OBJ</a:t>
                       </a:r>
                       <a:endParaRPr lang="en-NL" dirty="0"/>
                     </a:p>
@@ -24527,7 +24624,7 @@
                       </a:pPr>
                       <a:r>
                         <a:rPr lang="en-US" dirty="0"/>
-                        <a:t>STR</a:t>
+                        <a:t>OBJ</a:t>
                       </a:r>
                       <a:endParaRPr lang="en-NL" dirty="0"/>
                     </a:p>
@@ -24652,7 +24749,7 @@
                       </a:pPr>
                       <a:r>
                         <a:rPr lang="en-US" dirty="0"/>
-                        <a:t>STR</a:t>
+                        <a:t>OBJ</a:t>
                       </a:r>
                       <a:endParaRPr lang="en-NL" dirty="0"/>
                     </a:p>
@@ -24777,7 +24874,7 @@
                       </a:pPr>
                       <a:r>
                         <a:rPr lang="en-US" dirty="0"/>
-                        <a:t>STR</a:t>
+                        <a:t>OBJ</a:t>
                       </a:r>
                       <a:endParaRPr lang="en-NL" dirty="0"/>
                     </a:p>
@@ -24906,7 +25003,7 @@
                       </a:pPr>
                       <a:r>
                         <a:rPr lang="en-US" dirty="0"/>
-                        <a:t>STR</a:t>
+                        <a:t>OBJ</a:t>
                       </a:r>
                       <a:endParaRPr lang="en-NL" dirty="0"/>
                     </a:p>
@@ -25322,15 +25419,7 @@
             </a:pPr>
             <a:r>
               <a:rPr lang="nl-NL" sz="2000" dirty="0"/>
-              <a:t>Elke kolom is een </a:t>
-            </a:r>
-            <a:r>
-              <a:rPr lang="nl-NL" sz="2000" dirty="0" err="1"/>
-              <a:t>pandas</a:t>
-            </a:r>
-            <a:r>
-              <a:rPr lang="nl-NL" sz="2000" dirty="0"/>
-              <a:t> Series.</a:t>
+              <a:t>Elke kolom is een Series object.</a:t>
             </a:r>
           </a:p>
           <a:p>
@@ -25346,7 +25435,7 @@
             </a:pPr>
             <a:r>
               <a:rPr lang="nl-NL" sz="2000" dirty="0"/>
-              <a:t>Zelfde functionaliteit als Series.</a:t>
+              <a:t>Kolom heeft zelfde functionaliteit als Series.</a:t>
             </a:r>
           </a:p>
           <a:p>

</xml_diff>

<commit_message>
Finalize Python trainees part 3
</commit_message>
<xml_diff>
--- a/python_trainees/3_pandas_plotting/python_traineeship_3.pptx
+++ b/python_trainees/3_pandas_plotting/python_traineeship_3.pptx
@@ -242,7 +242,7 @@
           <a:p>
             <a:fld id="{16CF57F2-0494-4F4F-A7AD-E8F59CFB368A}" type="datetimeFigureOut">
               <a:rPr lang="en-NL" smtClean="0"/>
-              <a:t>03/04/2023</a:t>
+              <a:t>04/04/2023</a:t>
             </a:fld>
             <a:endParaRPr lang="en-NL"/>
           </a:p>
@@ -827,7 +827,7 @@
           <a:p>
             <a:fld id="{0EBB069A-003F-4FC0-8534-236B0C5C7B5F}" type="datetimeFigureOut">
               <a:rPr lang="en-NL" smtClean="0"/>
-              <a:t>03/04/2023</a:t>
+              <a:t>04/04/2023</a:t>
             </a:fld>
             <a:endParaRPr lang="en-NL"/>
           </a:p>
@@ -1027,7 +1027,7 @@
           <a:p>
             <a:fld id="{0EBB069A-003F-4FC0-8534-236B0C5C7B5F}" type="datetimeFigureOut">
               <a:rPr lang="en-NL" smtClean="0"/>
-              <a:t>03/04/2023</a:t>
+              <a:t>04/04/2023</a:t>
             </a:fld>
             <a:endParaRPr lang="en-NL"/>
           </a:p>
@@ -1237,7 +1237,7 @@
           <a:p>
             <a:fld id="{0EBB069A-003F-4FC0-8534-236B0C5C7B5F}" type="datetimeFigureOut">
               <a:rPr lang="en-NL" smtClean="0"/>
-              <a:t>03/04/2023</a:t>
+              <a:t>04/04/2023</a:t>
             </a:fld>
             <a:endParaRPr lang="en-NL"/>
           </a:p>
@@ -1437,7 +1437,7 @@
           <a:p>
             <a:fld id="{0EBB069A-003F-4FC0-8534-236B0C5C7B5F}" type="datetimeFigureOut">
               <a:rPr lang="en-NL" smtClean="0"/>
-              <a:t>03/04/2023</a:t>
+              <a:t>04/04/2023</a:t>
             </a:fld>
             <a:endParaRPr lang="en-NL"/>
           </a:p>
@@ -1713,7 +1713,7 @@
           <a:p>
             <a:fld id="{0EBB069A-003F-4FC0-8534-236B0C5C7B5F}" type="datetimeFigureOut">
               <a:rPr lang="en-NL" smtClean="0"/>
-              <a:t>03/04/2023</a:t>
+              <a:t>04/04/2023</a:t>
             </a:fld>
             <a:endParaRPr lang="en-NL"/>
           </a:p>
@@ -1981,7 +1981,7 @@
           <a:p>
             <a:fld id="{0EBB069A-003F-4FC0-8534-236B0C5C7B5F}" type="datetimeFigureOut">
               <a:rPr lang="en-NL" smtClean="0"/>
-              <a:t>03/04/2023</a:t>
+              <a:t>04/04/2023</a:t>
             </a:fld>
             <a:endParaRPr lang="en-NL"/>
           </a:p>
@@ -2396,7 +2396,7 @@
           <a:p>
             <a:fld id="{0EBB069A-003F-4FC0-8534-236B0C5C7B5F}" type="datetimeFigureOut">
               <a:rPr lang="en-NL" smtClean="0"/>
-              <a:t>03/04/2023</a:t>
+              <a:t>04/04/2023</a:t>
             </a:fld>
             <a:endParaRPr lang="en-NL"/>
           </a:p>
@@ -2538,7 +2538,7 @@
           <a:p>
             <a:fld id="{0EBB069A-003F-4FC0-8534-236B0C5C7B5F}" type="datetimeFigureOut">
               <a:rPr lang="en-NL" smtClean="0"/>
-              <a:t>03/04/2023</a:t>
+              <a:t>04/04/2023</a:t>
             </a:fld>
             <a:endParaRPr lang="en-NL"/>
           </a:p>
@@ -2651,7 +2651,7 @@
           <a:p>
             <a:fld id="{0EBB069A-003F-4FC0-8534-236B0C5C7B5F}" type="datetimeFigureOut">
               <a:rPr lang="en-NL" smtClean="0"/>
-              <a:t>03/04/2023</a:t>
+              <a:t>04/04/2023</a:t>
             </a:fld>
             <a:endParaRPr lang="en-NL"/>
           </a:p>
@@ -2964,7 +2964,7 @@
           <a:p>
             <a:fld id="{0EBB069A-003F-4FC0-8534-236B0C5C7B5F}" type="datetimeFigureOut">
               <a:rPr lang="en-NL" smtClean="0"/>
-              <a:t>03/04/2023</a:t>
+              <a:t>04/04/2023</a:t>
             </a:fld>
             <a:endParaRPr lang="en-NL"/>
           </a:p>
@@ -3253,7 +3253,7 @@
           <a:p>
             <a:fld id="{0EBB069A-003F-4FC0-8534-236B0C5C7B5F}" type="datetimeFigureOut">
               <a:rPr lang="en-NL" smtClean="0"/>
-              <a:t>03/04/2023</a:t>
+              <a:t>04/04/2023</a:t>
             </a:fld>
             <a:endParaRPr lang="en-NL"/>
           </a:p>
@@ -3496,7 +3496,7 @@
           <a:p>
             <a:fld id="{0EBB069A-003F-4FC0-8534-236B0C5C7B5F}" type="datetimeFigureOut">
               <a:rPr lang="en-NL" smtClean="0"/>
-              <a:t>03/04/2023</a:t>
+              <a:t>04/04/2023</a:t>
             </a:fld>
             <a:endParaRPr lang="en-NL"/>
           </a:p>
@@ -16708,26 +16708,30 @@
               <a:buNone/>
             </a:pPr>
             <a:r>
-              <a:rPr lang="nl-NL" sz="2000" dirty="0"/>
-              <a:t>Nuttige methodes om assen op te maken:</a:t>
+              <a:rPr lang="nl-NL" sz="1800" dirty="0" err="1">
+                <a:latin typeface="Courier New" panose="02070309020205020404" pitchFamily="49" charset="0"/>
+                <a:cs typeface="Courier New" panose="02070309020205020404" pitchFamily="49" charset="0"/>
+              </a:rPr>
+              <a:t>ax.set_xlabel</a:t>
+            </a:r>
+            <a:r>
+              <a:rPr lang="nl-NL" sz="1800" dirty="0">
+                <a:latin typeface="Courier New" panose="02070309020205020404" pitchFamily="49" charset="0"/>
+                <a:cs typeface="Courier New" panose="02070309020205020404" pitchFamily="49" charset="0"/>
+              </a:rPr>
+              <a:t>("&lt;label&gt;")</a:t>
             </a:r>
           </a:p>
           <a:p>
             <a:pPr marL="0" indent="0">
               <a:buNone/>
             </a:pPr>
-            <a:endParaRPr lang="nl-NL" sz="2000" dirty="0"/>
-          </a:p>
-          <a:p>
-            <a:pPr marL="0" indent="0">
-              <a:buNone/>
-            </a:pPr>
             <a:r>
               <a:rPr lang="nl-NL" sz="1800" dirty="0" err="1">
                 <a:latin typeface="Courier New" panose="02070309020205020404" pitchFamily="49" charset="0"/>
                 <a:cs typeface="Courier New" panose="02070309020205020404" pitchFamily="49" charset="0"/>
               </a:rPr>
-              <a:t>ax.set_xlabel</a:t>
+              <a:t>ax.set_ylabel</a:t>
             </a:r>
             <a:r>
               <a:rPr lang="nl-NL" sz="1800" dirty="0">
@@ -20469,7 +20473,10 @@
               <a:t>Overige kolommen:		Negeer deze kolommen (vb. </a:t>
             </a:r>
             <a:r>
-              <a:rPr lang="nl-NL" sz="1600" dirty="0" err="1"/>
+              <a:rPr lang="nl-NL" sz="1600" dirty="0" err="1">
+                <a:latin typeface="Courier New" panose="02070309020205020404" pitchFamily="49" charset="0"/>
+                <a:cs typeface="Courier New" panose="02070309020205020404" pitchFamily="49" charset="0"/>
+              </a:rPr>
               <a:t>transaction_date</a:t>
             </a:r>
             <a:r>
@@ -20518,7 +20525,7 @@
 </file>
 
 <file path=ppt/slides/slide34.xml><?xml version="1.0" encoding="utf-8"?>
-<p:sld xmlns:a="http://schemas.openxmlformats.org/drawingml/2006/main" xmlns:r="http://schemas.openxmlformats.org/officeDocument/2006/relationships" xmlns:p="http://schemas.openxmlformats.org/presentationml/2006/main" show="0">
+<p:sld xmlns:a="http://schemas.openxmlformats.org/drawingml/2006/main" xmlns:r="http://schemas.openxmlformats.org/officeDocument/2006/relationships" xmlns:p="http://schemas.openxmlformats.org/presentationml/2006/main">
   <p:cSld>
     <p:spTree>
       <p:nvGrpSpPr>
@@ -20564,7 +20571,15 @@
           <a:p>
             <a:r>
               <a:rPr lang="nl-NL" sz="3600" noProof="0" dirty="0"/>
-              <a:t>Data weergeven als kleuren</a:t>
+              <a:t>Bonus</a:t>
+            </a:r>
+            <a:r>
+              <a:rPr lang="nl-NL" sz="3600" noProof="0"/>
+              <a:t>: Data </a:t>
+            </a:r>
+            <a:r>
+              <a:rPr lang="nl-NL" sz="3600" noProof="0" dirty="0"/>
+              <a:t>in kleur</a:t>
             </a:r>
           </a:p>
         </p:txBody>

</xml_diff>

<commit_message>
Refresh Python trainees part 3
</commit_message>
<xml_diff>
--- a/python_trainees/3_pandas_plotting/python_traineeship_3.pptx
+++ b/python_trainees/3_pandas_plotting/python_traineeship_3.pptx
@@ -242,7 +242,7 @@
           <a:p>
             <a:fld id="{16CF57F2-0494-4F4F-A7AD-E8F59CFB368A}" type="datetimeFigureOut">
               <a:rPr lang="en-NL" smtClean="0"/>
-              <a:t>04/04/2023</a:t>
+              <a:t>25/09/2023</a:t>
             </a:fld>
             <a:endParaRPr lang="en-NL"/>
           </a:p>
@@ -827,7 +827,7 @@
           <a:p>
             <a:fld id="{0EBB069A-003F-4FC0-8534-236B0C5C7B5F}" type="datetimeFigureOut">
               <a:rPr lang="en-NL" smtClean="0"/>
-              <a:t>04/04/2023</a:t>
+              <a:t>25/09/2023</a:t>
             </a:fld>
             <a:endParaRPr lang="en-NL"/>
           </a:p>
@@ -1027,7 +1027,7 @@
           <a:p>
             <a:fld id="{0EBB069A-003F-4FC0-8534-236B0C5C7B5F}" type="datetimeFigureOut">
               <a:rPr lang="en-NL" smtClean="0"/>
-              <a:t>04/04/2023</a:t>
+              <a:t>25/09/2023</a:t>
             </a:fld>
             <a:endParaRPr lang="en-NL"/>
           </a:p>
@@ -1237,7 +1237,7 @@
           <a:p>
             <a:fld id="{0EBB069A-003F-4FC0-8534-236B0C5C7B5F}" type="datetimeFigureOut">
               <a:rPr lang="en-NL" smtClean="0"/>
-              <a:t>04/04/2023</a:t>
+              <a:t>25/09/2023</a:t>
             </a:fld>
             <a:endParaRPr lang="en-NL"/>
           </a:p>
@@ -1437,7 +1437,7 @@
           <a:p>
             <a:fld id="{0EBB069A-003F-4FC0-8534-236B0C5C7B5F}" type="datetimeFigureOut">
               <a:rPr lang="en-NL" smtClean="0"/>
-              <a:t>04/04/2023</a:t>
+              <a:t>25/09/2023</a:t>
             </a:fld>
             <a:endParaRPr lang="en-NL"/>
           </a:p>
@@ -1713,7 +1713,7 @@
           <a:p>
             <a:fld id="{0EBB069A-003F-4FC0-8534-236B0C5C7B5F}" type="datetimeFigureOut">
               <a:rPr lang="en-NL" smtClean="0"/>
-              <a:t>04/04/2023</a:t>
+              <a:t>25/09/2023</a:t>
             </a:fld>
             <a:endParaRPr lang="en-NL"/>
           </a:p>
@@ -1981,7 +1981,7 @@
           <a:p>
             <a:fld id="{0EBB069A-003F-4FC0-8534-236B0C5C7B5F}" type="datetimeFigureOut">
               <a:rPr lang="en-NL" smtClean="0"/>
-              <a:t>04/04/2023</a:t>
+              <a:t>25/09/2023</a:t>
             </a:fld>
             <a:endParaRPr lang="en-NL"/>
           </a:p>
@@ -2396,7 +2396,7 @@
           <a:p>
             <a:fld id="{0EBB069A-003F-4FC0-8534-236B0C5C7B5F}" type="datetimeFigureOut">
               <a:rPr lang="en-NL" smtClean="0"/>
-              <a:t>04/04/2023</a:t>
+              <a:t>25/09/2023</a:t>
             </a:fld>
             <a:endParaRPr lang="en-NL"/>
           </a:p>
@@ -2538,7 +2538,7 @@
           <a:p>
             <a:fld id="{0EBB069A-003F-4FC0-8534-236B0C5C7B5F}" type="datetimeFigureOut">
               <a:rPr lang="en-NL" smtClean="0"/>
-              <a:t>04/04/2023</a:t>
+              <a:t>25/09/2023</a:t>
             </a:fld>
             <a:endParaRPr lang="en-NL"/>
           </a:p>
@@ -2651,7 +2651,7 @@
           <a:p>
             <a:fld id="{0EBB069A-003F-4FC0-8534-236B0C5C7B5F}" type="datetimeFigureOut">
               <a:rPr lang="en-NL" smtClean="0"/>
-              <a:t>04/04/2023</a:t>
+              <a:t>25/09/2023</a:t>
             </a:fld>
             <a:endParaRPr lang="en-NL"/>
           </a:p>
@@ -2964,7 +2964,7 @@
           <a:p>
             <a:fld id="{0EBB069A-003F-4FC0-8534-236B0C5C7B5F}" type="datetimeFigureOut">
               <a:rPr lang="en-NL" smtClean="0"/>
-              <a:t>04/04/2023</a:t>
+              <a:t>25/09/2023</a:t>
             </a:fld>
             <a:endParaRPr lang="en-NL"/>
           </a:p>
@@ -3253,7 +3253,7 @@
           <a:p>
             <a:fld id="{0EBB069A-003F-4FC0-8534-236B0C5C7B5F}" type="datetimeFigureOut">
               <a:rPr lang="en-NL" smtClean="0"/>
-              <a:t>04/04/2023</a:t>
+              <a:t>25/09/2023</a:t>
             </a:fld>
             <a:endParaRPr lang="en-NL"/>
           </a:p>
@@ -3496,7 +3496,7 @@
           <a:p>
             <a:fld id="{0EBB069A-003F-4FC0-8534-236B0C5C7B5F}" type="datetimeFigureOut">
               <a:rPr lang="en-NL" smtClean="0"/>
-              <a:t>04/04/2023</a:t>
+              <a:t>25/09/2023</a:t>
             </a:fld>
             <a:endParaRPr lang="en-NL"/>
           </a:p>
@@ -3936,13 +3936,8 @@
           <a:p>
             <a:r>
               <a:rPr lang="nl-NL" noProof="0" dirty="0"/>
-              <a:t>Python - </a:t>
-            </a:r>
-            <a:r>
-              <a:rPr lang="nl-NL" noProof="0" dirty="0" err="1"/>
-              <a:t>Traineeship</a:t>
-            </a:r>
-            <a:endParaRPr lang="nl-NL" noProof="0" dirty="0"/>
+              <a:t>Python – Cursus</a:t>
+            </a:r>
           </a:p>
         </p:txBody>
       </p:sp>
@@ -3969,15 +3964,7 @@
           <a:p>
             <a:r>
               <a:rPr lang="nl-NL" noProof="0" dirty="0"/>
-              <a:t>ACM / AFM / </a:t>
-            </a:r>
-            <a:r>
-              <a:rPr lang="nl-NL" noProof="0" dirty="0" err="1"/>
-              <a:t>NZa</a:t>
-            </a:r>
-            <a:r>
-              <a:rPr lang="nl-NL" noProof="0" dirty="0"/>
-              <a:t> - 2023</a:t>
+              <a:t>2023</a:t>
             </a:r>
           </a:p>
         </p:txBody>
@@ -4335,10 +4322,27 @@
                 <a:latin typeface="Courier New" panose="02070309020205020404" pitchFamily="49" charset="0"/>
                 <a:cs typeface="Courier New" panose="02070309020205020404" pitchFamily="49" charset="0"/>
               </a:rPr>
-              <a:t>[0:3, "</a:t>
+              <a:t>[0:3, </a:t>
+            </a:r>
+            <a:r>
+              <a:rPr lang="nl-NL" sz="2000" dirty="0">
+                <a:solidFill>
+                  <a:schemeClr val="accent2">
+                    <a:lumMod val="75000"/>
+                  </a:schemeClr>
+                </a:solidFill>
+                <a:latin typeface="Courier New" panose="02070309020205020404" pitchFamily="49" charset="0"/>
+                <a:cs typeface="Courier New" panose="02070309020205020404" pitchFamily="49" charset="0"/>
+              </a:rPr>
+              <a:t>"</a:t>
             </a:r>
             <a:r>
               <a:rPr lang="nl-NL" sz="2000" dirty="0" err="1">
+                <a:solidFill>
+                  <a:schemeClr val="accent2">
+                    <a:lumMod val="75000"/>
+                  </a:schemeClr>
+                </a:solidFill>
                 <a:latin typeface="Courier New" panose="02070309020205020404" pitchFamily="49" charset="0"/>
                 <a:cs typeface="Courier New" panose="02070309020205020404" pitchFamily="49" charset="0"/>
               </a:rPr>
@@ -4346,10 +4350,22 @@
             </a:r>
             <a:r>
               <a:rPr lang="nl-NL" sz="2000" dirty="0">
-                <a:latin typeface="Courier New" panose="02070309020205020404" pitchFamily="49" charset="0"/>
-                <a:cs typeface="Courier New" panose="02070309020205020404" pitchFamily="49" charset="0"/>
-              </a:rPr>
-              <a:t>"]</a:t>
+                <a:solidFill>
+                  <a:schemeClr val="accent2">
+                    <a:lumMod val="75000"/>
+                  </a:schemeClr>
+                </a:solidFill>
+                <a:latin typeface="Courier New" panose="02070309020205020404" pitchFamily="49" charset="0"/>
+                <a:cs typeface="Courier New" panose="02070309020205020404" pitchFamily="49" charset="0"/>
+              </a:rPr>
+              <a:t>"</a:t>
+            </a:r>
+            <a:r>
+              <a:rPr lang="nl-NL" sz="2000" dirty="0">
+                <a:latin typeface="Courier New" panose="02070309020205020404" pitchFamily="49" charset="0"/>
+                <a:cs typeface="Courier New" panose="02070309020205020404" pitchFamily="49" charset="0"/>
+              </a:rPr>
+              <a:t>]</a:t>
             </a:r>
           </a:p>
           <a:p>
@@ -4396,10 +4412,27 @@
                 <a:latin typeface="Courier New" panose="02070309020205020404" pitchFamily="49" charset="0"/>
                 <a:cs typeface="Courier New" panose="02070309020205020404" pitchFamily="49" charset="0"/>
               </a:rPr>
-              <a:t>("</a:t>
+              <a:t>(</a:t>
+            </a:r>
+            <a:r>
+              <a:rPr lang="nl-NL" sz="2000" dirty="0">
+                <a:solidFill>
+                  <a:schemeClr val="accent2">
+                    <a:lumMod val="75000"/>
+                  </a:schemeClr>
+                </a:solidFill>
+                <a:latin typeface="Courier New" panose="02070309020205020404" pitchFamily="49" charset="0"/>
+                <a:cs typeface="Courier New" panose="02070309020205020404" pitchFamily="49" charset="0"/>
+              </a:rPr>
+              <a:t>"</a:t>
             </a:r>
             <a:r>
               <a:rPr lang="nl-NL" sz="2000" dirty="0" err="1">
+                <a:solidFill>
+                  <a:schemeClr val="accent2">
+                    <a:lumMod val="75000"/>
+                  </a:schemeClr>
+                </a:solidFill>
                 <a:latin typeface="Courier New" panose="02070309020205020404" pitchFamily="49" charset="0"/>
                 <a:cs typeface="Courier New" panose="02070309020205020404" pitchFamily="49" charset="0"/>
               </a:rPr>
@@ -4407,10 +4440,22 @@
             </a:r>
             <a:r>
               <a:rPr lang="nl-NL" sz="2000" dirty="0">
-                <a:latin typeface="Courier New" panose="02070309020205020404" pitchFamily="49" charset="0"/>
-                <a:cs typeface="Courier New" panose="02070309020205020404" pitchFamily="49" charset="0"/>
-              </a:rPr>
-              <a:t>").</a:t>
+                <a:solidFill>
+                  <a:schemeClr val="accent2">
+                    <a:lumMod val="75000"/>
+                  </a:schemeClr>
+                </a:solidFill>
+                <a:latin typeface="Courier New" panose="02070309020205020404" pitchFamily="49" charset="0"/>
+                <a:cs typeface="Courier New" panose="02070309020205020404" pitchFamily="49" charset="0"/>
+              </a:rPr>
+              <a:t>"</a:t>
+            </a:r>
+            <a:r>
+              <a:rPr lang="nl-NL" sz="2000" dirty="0">
+                <a:latin typeface="Courier New" panose="02070309020205020404" pitchFamily="49" charset="0"/>
+                <a:cs typeface="Courier New" panose="02070309020205020404" pitchFamily="49" charset="0"/>
+              </a:rPr>
+              <a:t>).</a:t>
             </a:r>
             <a:r>
               <a:rPr lang="nl-NL" sz="2000" dirty="0" err="1">
@@ -4443,10 +4488,27 @@
                 <a:latin typeface="Courier New" panose="02070309020205020404" pitchFamily="49" charset="0"/>
                 <a:cs typeface="Courier New" panose="02070309020205020404" pitchFamily="49" charset="0"/>
               </a:rPr>
-              <a:t>("</a:t>
+              <a:t>(</a:t>
+            </a:r>
+            <a:r>
+              <a:rPr lang="nl-NL" sz="2000" dirty="0">
+                <a:solidFill>
+                  <a:schemeClr val="accent2">
+                    <a:lumMod val="75000"/>
+                  </a:schemeClr>
+                </a:solidFill>
+                <a:latin typeface="Courier New" panose="02070309020205020404" pitchFamily="49" charset="0"/>
+                <a:cs typeface="Courier New" panose="02070309020205020404" pitchFamily="49" charset="0"/>
+              </a:rPr>
+              <a:t>"</a:t>
             </a:r>
             <a:r>
               <a:rPr lang="nl-NL" sz="2000" dirty="0" err="1">
+                <a:solidFill>
+                  <a:schemeClr val="accent2">
+                    <a:lumMod val="75000"/>
+                  </a:schemeClr>
+                </a:solidFill>
                 <a:latin typeface="Courier New" panose="02070309020205020404" pitchFamily="49" charset="0"/>
                 <a:cs typeface="Courier New" panose="02070309020205020404" pitchFamily="49" charset="0"/>
               </a:rPr>
@@ -4454,10 +4516,22 @@
             </a:r>
             <a:r>
               <a:rPr lang="nl-NL" sz="2000" dirty="0">
-                <a:latin typeface="Courier New" panose="02070309020205020404" pitchFamily="49" charset="0"/>
-                <a:cs typeface="Courier New" panose="02070309020205020404" pitchFamily="49" charset="0"/>
-              </a:rPr>
-              <a:t>").</a:t>
+                <a:solidFill>
+                  <a:schemeClr val="accent2">
+                    <a:lumMod val="75000"/>
+                  </a:schemeClr>
+                </a:solidFill>
+                <a:latin typeface="Courier New" panose="02070309020205020404" pitchFamily="49" charset="0"/>
+                <a:cs typeface="Courier New" panose="02070309020205020404" pitchFamily="49" charset="0"/>
+              </a:rPr>
+              <a:t>"</a:t>
+            </a:r>
+            <a:r>
+              <a:rPr lang="nl-NL" sz="2000" dirty="0">
+                <a:latin typeface="Courier New" panose="02070309020205020404" pitchFamily="49" charset="0"/>
+                <a:cs typeface="Courier New" panose="02070309020205020404" pitchFamily="49" charset="0"/>
+              </a:rPr>
+              <a:t>).</a:t>
             </a:r>
             <a:r>
               <a:rPr lang="nl-NL" sz="2000" dirty="0" err="1">
@@ -4471,10 +4545,27 @@
                 <a:latin typeface="Courier New" panose="02070309020205020404" pitchFamily="49" charset="0"/>
                 <a:cs typeface="Courier New" panose="02070309020205020404" pitchFamily="49" charset="0"/>
               </a:rPr>
-              <a:t>("</a:t>
+              <a:t>(</a:t>
+            </a:r>
+            <a:r>
+              <a:rPr lang="nl-NL" sz="2000" dirty="0">
+                <a:solidFill>
+                  <a:schemeClr val="accent2">
+                    <a:lumMod val="75000"/>
+                  </a:schemeClr>
+                </a:solidFill>
+                <a:latin typeface="Courier New" panose="02070309020205020404" pitchFamily="49" charset="0"/>
+                <a:cs typeface="Courier New" panose="02070309020205020404" pitchFamily="49" charset="0"/>
+              </a:rPr>
+              <a:t>"</a:t>
             </a:r>
             <a:r>
               <a:rPr lang="nl-NL" sz="2000" dirty="0" err="1">
+                <a:solidFill>
+                  <a:schemeClr val="accent2">
+                    <a:lumMod val="75000"/>
+                  </a:schemeClr>
+                </a:solidFill>
                 <a:latin typeface="Courier New" panose="02070309020205020404" pitchFamily="49" charset="0"/>
                 <a:cs typeface="Courier New" panose="02070309020205020404" pitchFamily="49" charset="0"/>
               </a:rPr>
@@ -4482,10 +4573,22 @@
             </a:r>
             <a:r>
               <a:rPr lang="nl-NL" sz="2000" dirty="0">
-                <a:latin typeface="Courier New" panose="02070309020205020404" pitchFamily="49" charset="0"/>
-                <a:cs typeface="Courier New" panose="02070309020205020404" pitchFamily="49" charset="0"/>
-              </a:rPr>
-              <a:t>")</a:t>
+                <a:solidFill>
+                  <a:schemeClr val="accent2">
+                    <a:lumMod val="75000"/>
+                  </a:schemeClr>
+                </a:solidFill>
+                <a:latin typeface="Courier New" panose="02070309020205020404" pitchFamily="49" charset="0"/>
+                <a:cs typeface="Courier New" panose="02070309020205020404" pitchFamily="49" charset="0"/>
+              </a:rPr>
+              <a:t>"</a:t>
+            </a:r>
+            <a:r>
+              <a:rPr lang="nl-NL" sz="2000" dirty="0">
+                <a:latin typeface="Courier New" panose="02070309020205020404" pitchFamily="49" charset="0"/>
+                <a:cs typeface="Courier New" panose="02070309020205020404" pitchFamily="49" charset="0"/>
+              </a:rPr>
+              <a:t>)</a:t>
             </a:r>
           </a:p>
           <a:p>
@@ -4971,14 +5074,14 @@
           <p:nvPr>
             <p:extLst>
               <p:ext uri="{D42A27DB-BD31-4B8C-83A1-F6EECF244321}">
-                <p14:modId xmlns:p14="http://schemas.microsoft.com/office/powerpoint/2010/main" val="2507028169"/>
+                <p14:modId xmlns:p14="http://schemas.microsoft.com/office/powerpoint/2010/main" val="975255573"/>
               </p:ext>
             </p:extLst>
           </p:nvPr>
         </p:nvGraphicFramePr>
         <p:xfrm>
-          <a:off x="990598" y="1449493"/>
-          <a:ext cx="10363200" cy="4964856"/>
+          <a:off x="990600" y="1278043"/>
+          <a:ext cx="10363200" cy="4778130"/>
         </p:xfrm>
         <a:graphic>
           <a:graphicData uri="http://schemas.openxmlformats.org/drawingml/2006/table">
@@ -5009,14 +5112,14 @@
                   </a:extLst>
                 </a:gridCol>
               </a:tblGrid>
-              <a:tr h="447742">
+              <a:tr h="422130">
                 <a:tc>
                   <a:txBody>
                     <a:bodyPr/>
                     <a:lstStyle/>
                     <a:p>
                       <a:r>
-                        <a:rPr lang="nl-NL" noProof="0"/>
+                        <a:rPr lang="nl-NL" noProof="0" dirty="0"/>
                         <a:t>Syntax</a:t>
                       </a:r>
                     </a:p>
@@ -5029,7 +5132,7 @@
                     <a:lstStyle/>
                     <a:p>
                       <a:r>
-                        <a:rPr lang="nl-NL" noProof="0"/>
+                        <a:rPr lang="nl-NL" noProof="0" dirty="0"/>
                         <a:t>Selectie</a:t>
                       </a:r>
                     </a:p>
@@ -5055,41 +5158,34 @@
                   </a:ext>
                 </a:extLst>
               </a:tr>
-              <a:tr h="521755">
+              <a:tr h="468000">
                 <a:tc>
                   <a:txBody>
                     <a:bodyPr/>
                     <a:lstStyle/>
                     <a:p>
                       <a:r>
-                        <a:rPr lang="en-US" dirty="0" err="1">
+                        <a:rPr lang="en-US" sz="1600">
                           <a:latin typeface="Courier New" panose="02070309020205020404" pitchFamily="49" charset="0"/>
                           <a:cs typeface="Courier New" panose="02070309020205020404" pitchFamily="49" charset="0"/>
                         </a:rPr>
-                        <a:t>df</a:t>
-                      </a:r>
-                      <a:r>
-                        <a:rPr lang="en-US" dirty="0">
-                          <a:latin typeface="Courier New" panose="02070309020205020404" pitchFamily="49" charset="0"/>
-                          <a:cs typeface="Courier New" panose="02070309020205020404" pitchFamily="49" charset="0"/>
-                        </a:rPr>
-                        <a:t>[</a:t>
-                      </a:r>
-                      <a:r>
-                        <a:rPr lang="en-US" b="1" dirty="0">
+                        <a:t>df[</a:t>
+                      </a:r>
+                      <a:r>
+                        <a:rPr lang="en-US" sz="1600" b="1">
                           <a:latin typeface="Courier New" panose="02070309020205020404" pitchFamily="49" charset="0"/>
                           <a:cs typeface="Courier New" panose="02070309020205020404" pitchFamily="49" charset="0"/>
                         </a:rPr>
                         <a:t>&lt;str&gt;</a:t>
                       </a:r>
                       <a:r>
-                        <a:rPr lang="en-US" dirty="0">
+                        <a:rPr lang="en-US" sz="1600">
                           <a:latin typeface="Courier New" panose="02070309020205020404" pitchFamily="49" charset="0"/>
                           <a:cs typeface="Courier New" panose="02070309020205020404" pitchFamily="49" charset="0"/>
                         </a:rPr>
                         <a:t>]</a:t>
                       </a:r>
-                      <a:endParaRPr lang="en-NL" dirty="0">
+                      <a:endParaRPr lang="en-NL" sz="1600" dirty="0">
                         <a:latin typeface="Courier New" panose="02070309020205020404" pitchFamily="49" charset="0"/>
                         <a:cs typeface="Courier New" panose="02070309020205020404" pitchFamily="49" charset="0"/>
                       </a:endParaRPr>
@@ -5103,18 +5199,18 @@
                     <a:lstStyle/>
                     <a:p>
                       <a:r>
-                        <a:rPr lang="nl-NL" b="0" noProof="0"/>
-                        <a:t>Een kolom als </a:t>
-                      </a:r>
-                      <a:r>
-                        <a:rPr lang="nl-NL" b="0" noProof="0">
+                        <a:rPr lang="nl-NL" sz="1600" b="0" noProof="0" dirty="0"/>
+                        <a:t>Kolom als </a:t>
+                      </a:r>
+                      <a:r>
+                        <a:rPr lang="nl-NL" sz="1600" b="0" noProof="0" dirty="0">
                           <a:latin typeface="Courier New" panose="02070309020205020404" pitchFamily="49" charset="0"/>
                           <a:cs typeface="Courier New" panose="02070309020205020404" pitchFamily="49" charset="0"/>
                         </a:rPr>
                         <a:t>Series</a:t>
                       </a:r>
                       <a:r>
-                        <a:rPr lang="nl-NL" b="0" noProof="0"/>
+                        <a:rPr lang="nl-NL" sz="1600" b="0" noProof="0" dirty="0"/>
                         <a:t>.</a:t>
                       </a:r>
                     </a:p>
@@ -5127,34 +5223,63 @@
                     <a:lstStyle/>
                     <a:p>
                       <a:r>
-                        <a:rPr lang="en-US" dirty="0" err="1">
+                        <a:rPr lang="en-US" sz="1600" dirty="0" err="1">
                           <a:latin typeface="Courier New" panose="02070309020205020404" pitchFamily="49" charset="0"/>
                           <a:cs typeface="Courier New" panose="02070309020205020404" pitchFamily="49" charset="0"/>
                         </a:rPr>
                         <a:t>df</a:t>
                       </a:r>
                       <a:r>
-                        <a:rPr lang="en-US" dirty="0">
+                        <a:rPr lang="en-US" sz="1600" dirty="0">
                           <a:latin typeface="Courier New" panose="02070309020205020404" pitchFamily="49" charset="0"/>
                           <a:cs typeface="Courier New" panose="02070309020205020404" pitchFamily="49" charset="0"/>
                         </a:rPr>
-                        <a:t>["</a:t>
-                      </a:r>
-                      <a:r>
-                        <a:rPr lang="en-US" dirty="0" err="1">
+                        <a:t>[</a:t>
+                      </a:r>
+                      <a:r>
+                        <a:rPr lang="en-US" sz="1600" dirty="0">
+                          <a:solidFill>
+                            <a:schemeClr val="accent2">
+                              <a:lumMod val="75000"/>
+                            </a:schemeClr>
+                          </a:solidFill>
+                          <a:latin typeface="Courier New" panose="02070309020205020404" pitchFamily="49" charset="0"/>
+                          <a:cs typeface="Courier New" panose="02070309020205020404" pitchFamily="49" charset="0"/>
+                        </a:rPr>
+                        <a:t>"</a:t>
+                      </a:r>
+                      <a:r>
+                        <a:rPr lang="en-US" sz="1600" dirty="0" err="1">
+                          <a:solidFill>
+                            <a:schemeClr val="accent2">
+                              <a:lumMod val="75000"/>
+                            </a:schemeClr>
+                          </a:solidFill>
                           <a:latin typeface="Courier New" panose="02070309020205020404" pitchFamily="49" charset="0"/>
                           <a:cs typeface="Courier New" panose="02070309020205020404" pitchFamily="49" charset="0"/>
                         </a:rPr>
                         <a:t>col_a</a:t>
                       </a:r>
                       <a:r>
-                        <a:rPr lang="en-US" dirty="0">
+                        <a:rPr lang="en-US" sz="1600" dirty="0">
+                          <a:solidFill>
+                            <a:schemeClr val="accent2">
+                              <a:lumMod val="75000"/>
+                            </a:schemeClr>
+                          </a:solidFill>
                           <a:latin typeface="Courier New" panose="02070309020205020404" pitchFamily="49" charset="0"/>
                           <a:cs typeface="Courier New" panose="02070309020205020404" pitchFamily="49" charset="0"/>
                         </a:rPr>
-                        <a:t>"]</a:t>
-                      </a:r>
-                      <a:endParaRPr lang="en-NL" dirty="0">
+                        <a:t>"</a:t>
+                      </a:r>
+                      <a:r>
+                        <a:rPr lang="en-US" sz="1600" dirty="0">
+                          <a:latin typeface="Courier New" panose="02070309020205020404" pitchFamily="49" charset="0"/>
+                          <a:cs typeface="Courier New" panose="02070309020205020404" pitchFamily="49" charset="0"/>
+                        </a:rPr>
+                        <a:t>]</a:t>
+                      </a:r>
+                      <a:endParaRPr lang="en-NL" sz="1600" dirty="0">
                         <a:latin typeface="Courier New" panose="02070309020205020404" pitchFamily="49" charset="0"/>
                         <a:cs typeface="Courier New" panose="02070309020205020404" pitchFamily="49" charset="0"/>
                       </a:endParaRPr>
@@ -5168,41 +5293,34 @@
                   </a:ext>
                 </a:extLst>
               </a:tr>
-              <a:tr h="521755">
+              <a:tr h="468000">
                 <a:tc>
                   <a:txBody>
                     <a:bodyPr/>
                     <a:lstStyle/>
                     <a:p>
                       <a:r>
-                        <a:rPr lang="en-US" dirty="0" err="1">
+                        <a:rPr lang="en-US" sz="1600">
                           <a:latin typeface="Courier New" panose="02070309020205020404" pitchFamily="49" charset="0"/>
                           <a:cs typeface="Courier New" panose="02070309020205020404" pitchFamily="49" charset="0"/>
                         </a:rPr>
-                        <a:t>df</a:t>
-                      </a:r>
-                      <a:r>
-                        <a:rPr lang="en-US" dirty="0">
-                          <a:latin typeface="Courier New" panose="02070309020205020404" pitchFamily="49" charset="0"/>
-                          <a:cs typeface="Courier New" panose="02070309020205020404" pitchFamily="49" charset="0"/>
-                        </a:rPr>
-                        <a:t>[</a:t>
-                      </a:r>
-                      <a:r>
-                        <a:rPr lang="en-US" b="1" dirty="0">
+                        <a:t>df[</a:t>
+                      </a:r>
+                      <a:r>
+                        <a:rPr lang="en-US" sz="1600" b="1">
                           <a:latin typeface="Courier New" panose="02070309020205020404" pitchFamily="49" charset="0"/>
                           <a:cs typeface="Courier New" panose="02070309020205020404" pitchFamily="49" charset="0"/>
                         </a:rPr>
                         <a:t>&lt;list&gt;</a:t>
                       </a:r>
                       <a:r>
-                        <a:rPr lang="en-US" dirty="0">
+                        <a:rPr lang="en-US" sz="1600">
                           <a:latin typeface="Courier New" panose="02070309020205020404" pitchFamily="49" charset="0"/>
                           <a:cs typeface="Courier New" panose="02070309020205020404" pitchFamily="49" charset="0"/>
                         </a:rPr>
                         <a:t>]</a:t>
                       </a:r>
-                      <a:endParaRPr lang="en-NL" dirty="0">
+                      <a:endParaRPr lang="en-NL" sz="1600" dirty="0">
                         <a:latin typeface="Courier New" panose="02070309020205020404" pitchFamily="49" charset="0"/>
                         <a:cs typeface="Courier New" panose="02070309020205020404" pitchFamily="49" charset="0"/>
                       </a:endParaRPr>
@@ -5216,18 +5334,18 @@
                     <a:lstStyle/>
                     <a:p>
                       <a:r>
-                        <a:rPr lang="nl-NL" b="0" noProof="0"/>
+                        <a:rPr lang="nl-NL" sz="1600" b="0" noProof="0" dirty="0"/>
                         <a:t>Kolom(men) als </a:t>
                       </a:r>
                       <a:r>
-                        <a:rPr lang="nl-NL" b="0" noProof="0">
+                        <a:rPr lang="nl-NL" sz="1600" b="0" noProof="0" dirty="0" err="1">
                           <a:latin typeface="Courier New" panose="02070309020205020404" pitchFamily="49" charset="0"/>
                           <a:cs typeface="Courier New" panose="02070309020205020404" pitchFamily="49" charset="0"/>
                         </a:rPr>
                         <a:t>DataFrame</a:t>
                       </a:r>
                       <a:r>
-                        <a:rPr lang="nl-NL" b="0" noProof="0"/>
+                        <a:rPr lang="nl-NL" sz="1600" b="0" noProof="0" dirty="0"/>
                         <a:t>.</a:t>
                       </a:r>
                     </a:p>
@@ -5240,48 +5358,120 @@
                     <a:lstStyle/>
                     <a:p>
                       <a:r>
-                        <a:rPr lang="en-US" dirty="0" err="1">
+                        <a:rPr lang="en-US" sz="1600" dirty="0" err="1">
                           <a:latin typeface="Courier New" panose="02070309020205020404" pitchFamily="49" charset="0"/>
                           <a:cs typeface="Courier New" panose="02070309020205020404" pitchFamily="49" charset="0"/>
                         </a:rPr>
                         <a:t>df</a:t>
                       </a:r>
                       <a:r>
-                        <a:rPr lang="en-US" dirty="0">
+                        <a:rPr lang="en-US" sz="1600" dirty="0">
                           <a:latin typeface="Courier New" panose="02070309020205020404" pitchFamily="49" charset="0"/>
                           <a:cs typeface="Courier New" panose="02070309020205020404" pitchFamily="49" charset="0"/>
                         </a:rPr>
-                        <a:t>[["</a:t>
-                      </a:r>
-                      <a:r>
-                        <a:rPr lang="en-US" dirty="0" err="1">
+                        <a:t>[</a:t>
+                      </a:r>
+                      <a:r>
+                        <a:rPr lang="en-US" sz="1600" b="1" dirty="0">
+                          <a:latin typeface="Courier New" panose="02070309020205020404" pitchFamily="49" charset="0"/>
+                          <a:cs typeface="Courier New" panose="02070309020205020404" pitchFamily="49" charset="0"/>
+                        </a:rPr>
+                        <a:t>[</a:t>
+                      </a:r>
+                      <a:r>
+                        <a:rPr lang="en-US" sz="1600" dirty="0">
+                          <a:solidFill>
+                            <a:schemeClr val="accent2">
+                              <a:lumMod val="75000"/>
+                            </a:schemeClr>
+                          </a:solidFill>
+                          <a:latin typeface="Courier New" panose="02070309020205020404" pitchFamily="49" charset="0"/>
+                          <a:cs typeface="Courier New" panose="02070309020205020404" pitchFamily="49" charset="0"/>
+                        </a:rPr>
+                        <a:t>"</a:t>
+                      </a:r>
+                      <a:r>
+                        <a:rPr lang="en-US" sz="1600" dirty="0" err="1">
+                          <a:solidFill>
+                            <a:schemeClr val="accent2">
+                              <a:lumMod val="75000"/>
+                            </a:schemeClr>
+                          </a:solidFill>
                           <a:latin typeface="Courier New" panose="02070309020205020404" pitchFamily="49" charset="0"/>
                           <a:cs typeface="Courier New" panose="02070309020205020404" pitchFamily="49" charset="0"/>
                         </a:rPr>
                         <a:t>col_a</a:t>
                       </a:r>
                       <a:r>
-                        <a:rPr lang="en-US" dirty="0">
+                        <a:rPr lang="en-US" sz="1600" dirty="0">
+                          <a:solidFill>
+                            <a:schemeClr val="accent2">
+                              <a:lumMod val="75000"/>
+                            </a:schemeClr>
+                          </a:solidFill>
                           <a:latin typeface="Courier New" panose="02070309020205020404" pitchFamily="49" charset="0"/>
                           <a:cs typeface="Courier New" panose="02070309020205020404" pitchFamily="49" charset="0"/>
                         </a:rPr>
-                        <a:t>", "</a:t>
-                      </a:r>
-                      <a:r>
-                        <a:rPr lang="en-US" dirty="0" err="1">
+                        <a:t>"</a:t>
+                      </a:r>
+                      <a:r>
+                        <a:rPr lang="en-US" sz="1600" dirty="0">
+                          <a:latin typeface="Courier New" panose="02070309020205020404" pitchFamily="49" charset="0"/>
+                          <a:cs typeface="Courier New" panose="02070309020205020404" pitchFamily="49" charset="0"/>
+                        </a:rPr>
+                        <a:t>, </a:t>
+                      </a:r>
+                      <a:r>
+                        <a:rPr lang="en-US" sz="1600" dirty="0">
+                          <a:solidFill>
+                            <a:schemeClr val="accent2">
+                              <a:lumMod val="75000"/>
+                            </a:schemeClr>
+                          </a:solidFill>
+                          <a:latin typeface="Courier New" panose="02070309020205020404" pitchFamily="49" charset="0"/>
+                          <a:cs typeface="Courier New" panose="02070309020205020404" pitchFamily="49" charset="0"/>
+                        </a:rPr>
+                        <a:t>"</a:t>
+                      </a:r>
+                      <a:r>
+                        <a:rPr lang="en-US" sz="1600" dirty="0" err="1">
+                          <a:solidFill>
+                            <a:schemeClr val="accent2">
+                              <a:lumMod val="75000"/>
+                            </a:schemeClr>
+                          </a:solidFill>
                           <a:latin typeface="Courier New" panose="02070309020205020404" pitchFamily="49" charset="0"/>
                           <a:cs typeface="Courier New" panose="02070309020205020404" pitchFamily="49" charset="0"/>
                         </a:rPr>
                         <a:t>col_c</a:t>
                       </a:r>
                       <a:r>
-                        <a:rPr lang="en-US" dirty="0">
+                        <a:rPr lang="en-US" sz="1600" dirty="0">
+                          <a:solidFill>
+                            <a:schemeClr val="accent2">
+                              <a:lumMod val="75000"/>
+                            </a:schemeClr>
+                          </a:solidFill>
                           <a:latin typeface="Courier New" panose="02070309020205020404" pitchFamily="49" charset="0"/>
                           <a:cs typeface="Courier New" panose="02070309020205020404" pitchFamily="49" charset="0"/>
                         </a:rPr>
-                        <a:t>"]]</a:t>
-                      </a:r>
-                      <a:endParaRPr lang="en-NL" dirty="0">
+                        <a:t>"</a:t>
+                      </a:r>
+                      <a:r>
+                        <a:rPr lang="en-US" sz="1600" b="1" dirty="0">
+                          <a:latin typeface="Courier New" panose="02070309020205020404" pitchFamily="49" charset="0"/>
+                          <a:cs typeface="Courier New" panose="02070309020205020404" pitchFamily="49" charset="0"/>
+                        </a:rPr>
+                        <a:t>]</a:t>
+                      </a:r>
+                      <a:r>
+                        <a:rPr lang="en-US" sz="1600" dirty="0">
+                          <a:latin typeface="Courier New" panose="02070309020205020404" pitchFamily="49" charset="0"/>
+                          <a:cs typeface="Courier New" panose="02070309020205020404" pitchFamily="49" charset="0"/>
+                        </a:rPr>
+                        <a:t>]</a:t>
+                      </a:r>
+                      <a:endParaRPr lang="en-NL" sz="1600" dirty="0">
                         <a:latin typeface="Courier New" panose="02070309020205020404" pitchFamily="49" charset="0"/>
                         <a:cs typeface="Courier New" panose="02070309020205020404" pitchFamily="49" charset="0"/>
                       </a:endParaRPr>
@@ -5295,41 +5485,41 @@
                   </a:ext>
                 </a:extLst>
               </a:tr>
-              <a:tr h="900564">
+              <a:tr h="468000">
                 <a:tc>
                   <a:txBody>
                     <a:bodyPr/>
                     <a:lstStyle/>
                     <a:p>
                       <a:r>
-                        <a:rPr lang="en-US" dirty="0" err="1">
+                        <a:rPr lang="en-US" sz="1600" dirty="0" err="1">
                           <a:latin typeface="Courier New" panose="02070309020205020404" pitchFamily="49" charset="0"/>
                           <a:cs typeface="Courier New" panose="02070309020205020404" pitchFamily="49" charset="0"/>
                         </a:rPr>
                         <a:t>df</a:t>
                       </a:r>
                       <a:r>
-                        <a:rPr lang="en-US" dirty="0">
+                        <a:rPr lang="en-US" sz="1600" dirty="0">
                           <a:latin typeface="Courier New" panose="02070309020205020404" pitchFamily="49" charset="0"/>
                           <a:cs typeface="Courier New" panose="02070309020205020404" pitchFamily="49" charset="0"/>
                         </a:rPr>
                         <a:t>[</a:t>
                       </a:r>
                       <a:r>
-                        <a:rPr lang="en-US" b="1" dirty="0">
+                        <a:rPr lang="en-US" sz="1600" b="1" dirty="0">
                           <a:latin typeface="Courier New" panose="02070309020205020404" pitchFamily="49" charset="0"/>
                           <a:cs typeface="Courier New" panose="02070309020205020404" pitchFamily="49" charset="0"/>
                         </a:rPr>
                         <a:t>&lt;slice&gt;</a:t>
                       </a:r>
                       <a:r>
-                        <a:rPr lang="en-US" dirty="0">
+                        <a:rPr lang="en-US" sz="1600" dirty="0">
                           <a:latin typeface="Courier New" panose="02070309020205020404" pitchFamily="49" charset="0"/>
                           <a:cs typeface="Courier New" panose="02070309020205020404" pitchFamily="49" charset="0"/>
                         </a:rPr>
                         <a:t>]</a:t>
                       </a:r>
-                      <a:endParaRPr lang="en-NL" dirty="0">
+                      <a:endParaRPr lang="en-NL" sz="1600" dirty="0">
                         <a:latin typeface="Courier New" panose="02070309020205020404" pitchFamily="49" charset="0"/>
                         <a:cs typeface="Courier New" panose="02070309020205020404" pitchFamily="49" charset="0"/>
                       </a:endParaRPr>
@@ -5343,18 +5533,18 @@
                     <a:lstStyle/>
                     <a:p>
                       <a:r>
-                        <a:rPr lang="nl-NL" b="0" noProof="0"/>
+                        <a:rPr lang="nl-NL" sz="1600" b="0" noProof="0" dirty="0"/>
                         <a:t>Rijen als </a:t>
                       </a:r>
                       <a:r>
-                        <a:rPr lang="nl-NL" b="0" noProof="0">
+                        <a:rPr lang="nl-NL" sz="1600" b="0" noProof="0" dirty="0" err="1">
                           <a:latin typeface="Courier New" panose="02070309020205020404" pitchFamily="49" charset="0"/>
                           <a:cs typeface="Courier New" panose="02070309020205020404" pitchFamily="49" charset="0"/>
                         </a:rPr>
                         <a:t>DataFrame</a:t>
                       </a:r>
                       <a:r>
-                        <a:rPr lang="nl-NL" b="0" noProof="0"/>
+                        <a:rPr lang="nl-NL" sz="1600" b="0" noProof="0" dirty="0"/>
                         <a:t>.</a:t>
                       </a:r>
                     </a:p>
@@ -5367,50 +5557,58 @@
                     <a:lstStyle/>
                     <a:p>
                       <a:r>
-                        <a:rPr lang="en-US" dirty="0" err="1">
+                        <a:rPr lang="en-US" sz="1600" dirty="0" err="1">
                           <a:latin typeface="Courier New" panose="02070309020205020404" pitchFamily="49" charset="0"/>
                           <a:cs typeface="Courier New" panose="02070309020205020404" pitchFamily="49" charset="0"/>
                         </a:rPr>
                         <a:t>df</a:t>
                       </a:r>
                       <a:r>
-                        <a:rPr lang="en-US" dirty="0">
+                        <a:rPr lang="en-US" sz="1600" dirty="0">
                           <a:latin typeface="Courier New" panose="02070309020205020404" pitchFamily="49" charset="0"/>
                           <a:cs typeface="Courier New" panose="02070309020205020404" pitchFamily="49" charset="0"/>
                         </a:rPr>
-                        <a:t>[0:3]</a:t>
-                      </a:r>
-                    </a:p>
-                    <a:p>
-                      <a:r>
-                        <a:rPr lang="en-US" dirty="0" err="1">
+                        <a:t>[</a:t>
+                      </a:r>
+                      <a:r>
+                        <a:rPr lang="nl-NL" sz="1600" dirty="0">
+                          <a:solidFill>
+                            <a:schemeClr val="accent2">
+                              <a:lumMod val="75000"/>
+                            </a:schemeClr>
+                          </a:solidFill>
                           <a:latin typeface="Courier New" panose="02070309020205020404" pitchFamily="49" charset="0"/>
                           <a:cs typeface="Courier New" panose="02070309020205020404" pitchFamily="49" charset="0"/>
                         </a:rPr>
-                        <a:t>df</a:t>
-                      </a:r>
-                      <a:r>
-                        <a:rPr lang="en-US" dirty="0">
+                        <a:t>"2022-01-01"</a:t>
+                      </a:r>
+                      <a:r>
+                        <a:rPr lang="nl-NL" sz="1600" dirty="0">
                           <a:latin typeface="Courier New" panose="02070309020205020404" pitchFamily="49" charset="0"/>
                           <a:cs typeface="Courier New" panose="02070309020205020404" pitchFamily="49" charset="0"/>
                         </a:rPr>
-                        <a:t>["</a:t>
-                      </a:r>
-                      <a:r>
-                        <a:rPr lang="en-US" dirty="0" err="1">
+                        <a:t>:</a:t>
+                      </a:r>
+                      <a:r>
+                        <a:rPr lang="nl-NL" sz="1600" dirty="0">
+                          <a:solidFill>
+                            <a:schemeClr val="accent2">
+                              <a:lumMod val="75000"/>
+                            </a:schemeClr>
+                          </a:solidFill>
                           <a:latin typeface="Courier New" panose="02070309020205020404" pitchFamily="49" charset="0"/>
                           <a:cs typeface="Courier New" panose="02070309020205020404" pitchFamily="49" charset="0"/>
                         </a:rPr>
-                        <a:t>a":"c</a:t>
-                      </a:r>
-                      <a:r>
-                        <a:rPr lang="en-US" dirty="0">
+                        <a:t>"2022-01-03"</a:t>
+                      </a:r>
+                      <a:r>
+                        <a:rPr lang="en-US" sz="1600" dirty="0">
                           <a:latin typeface="Courier New" panose="02070309020205020404" pitchFamily="49" charset="0"/>
                           <a:cs typeface="Courier New" panose="02070309020205020404" pitchFamily="49" charset="0"/>
                         </a:rPr>
-                        <a:t>"]</a:t>
-                      </a:r>
-                      <a:endParaRPr lang="en-NL" dirty="0">
+                        <a:t>]</a:t>
+                      </a:r>
+                      <a:endParaRPr lang="en-NL" sz="1600" dirty="0">
                         <a:latin typeface="Courier New" panose="02070309020205020404" pitchFamily="49" charset="0"/>
                         <a:cs typeface="Courier New" panose="02070309020205020404" pitchFamily="49" charset="0"/>
                       </a:endParaRPr>
@@ -5424,21 +5622,21 @@
                   </a:ext>
                 </a:extLst>
               </a:tr>
-              <a:tr h="1286520">
+              <a:tr h="1224000">
                 <a:tc>
                   <a:txBody>
                     <a:bodyPr/>
                     <a:lstStyle/>
                     <a:p>
                       <a:r>
-                        <a:rPr lang="en-US" b="1" dirty="0" err="1">
+                        <a:rPr lang="en-US" sz="1600" b="0" dirty="0" err="1">
                           <a:latin typeface="Courier New" panose="02070309020205020404" pitchFamily="49" charset="0"/>
                           <a:cs typeface="Courier New" panose="02070309020205020404" pitchFamily="49" charset="0"/>
                         </a:rPr>
                         <a:t>df.loc</a:t>
                       </a:r>
                       <a:r>
-                        <a:rPr lang="en-US" dirty="0">
+                        <a:rPr lang="en-US" sz="1600" dirty="0">
                           <a:latin typeface="Courier New" panose="02070309020205020404" pitchFamily="49" charset="0"/>
                           <a:cs typeface="Courier New" panose="02070309020205020404" pitchFamily="49" charset="0"/>
                         </a:rPr>
@@ -5447,22 +5645,29 @@
                     </a:p>
                     <a:p>
                       <a:r>
-                        <a:rPr lang="en-US" dirty="0">
+                        <a:rPr lang="en-US" sz="1600" dirty="0">
                           <a:latin typeface="Courier New" panose="02070309020205020404" pitchFamily="49" charset="0"/>
                           <a:cs typeface="Courier New" panose="02070309020205020404" pitchFamily="49" charset="0"/>
                         </a:rPr>
-                        <a:t>  &lt;slice&gt;, &lt;list&gt;</a:t>
+                        <a:t>  </a:t>
+                      </a:r>
+                      <a:r>
+                        <a:rPr lang="en-US" sz="1600" b="1" dirty="0">
+                          <a:latin typeface="Courier New" panose="02070309020205020404" pitchFamily="49" charset="0"/>
+                          <a:cs typeface="Courier New" panose="02070309020205020404" pitchFamily="49" charset="0"/>
+                        </a:rPr>
+                        <a:t>&lt;slice&gt;, &lt;list&gt;</a:t>
                       </a:r>
                     </a:p>
                     <a:p>
                       <a:r>
-                        <a:rPr lang="en-US" dirty="0">
+                        <a:rPr lang="en-US" sz="1600" dirty="0">
                           <a:latin typeface="Courier New" panose="02070309020205020404" pitchFamily="49" charset="0"/>
                           <a:cs typeface="Courier New" panose="02070309020205020404" pitchFamily="49" charset="0"/>
                         </a:rPr>
                         <a:t>]</a:t>
                       </a:r>
-                      <a:endParaRPr lang="en-NL" dirty="0">
+                      <a:endParaRPr lang="en-NL" sz="1600" dirty="0">
                         <a:latin typeface="Courier New" panose="02070309020205020404" pitchFamily="49" charset="0"/>
                         <a:cs typeface="Courier New" panose="02070309020205020404" pitchFamily="49" charset="0"/>
                       </a:endParaRPr>
@@ -5476,18 +5681,18 @@
                     <a:lstStyle/>
                     <a:p>
                       <a:r>
-                        <a:rPr lang="nl-NL" b="0" noProof="0"/>
+                        <a:rPr lang="nl-NL" sz="1600" b="0" noProof="0" dirty="0"/>
                         <a:t>Rijen en kolommen als </a:t>
                       </a:r>
                       <a:r>
-                        <a:rPr lang="nl-NL" b="0" noProof="0">
+                        <a:rPr lang="nl-NL" sz="1600" b="0" noProof="0" dirty="0" err="1">
                           <a:latin typeface="Courier New" panose="02070309020205020404" pitchFamily="49" charset="0"/>
                           <a:cs typeface="Courier New" panose="02070309020205020404" pitchFamily="49" charset="0"/>
                         </a:rPr>
                         <a:t>DataFrame</a:t>
                       </a:r>
                       <a:r>
-                        <a:rPr lang="nl-NL" b="0" noProof="0"/>
+                        <a:rPr lang="nl-NL" sz="1600" b="0" noProof="0" dirty="0"/>
                         <a:t>.</a:t>
                       </a:r>
                     </a:p>
@@ -5500,14 +5705,14 @@
                     <a:lstStyle/>
                     <a:p>
                       <a:r>
-                        <a:rPr lang="en-US" dirty="0" err="1">
+                        <a:rPr lang="en-US" sz="1600" dirty="0" err="1">
                           <a:latin typeface="Courier New" panose="02070309020205020404" pitchFamily="49" charset="0"/>
                           <a:cs typeface="Courier New" panose="02070309020205020404" pitchFamily="49" charset="0"/>
                         </a:rPr>
                         <a:t>df.loc</a:t>
                       </a:r>
                       <a:r>
-                        <a:rPr lang="en-US" dirty="0">
+                        <a:rPr lang="en-US" sz="1600" dirty="0">
                           <a:latin typeface="Courier New" panose="02070309020205020404" pitchFamily="49" charset="0"/>
                           <a:cs typeface="Courier New" panose="02070309020205020404" pitchFamily="49" charset="0"/>
                         </a:rPr>
@@ -5516,50 +5721,108 @@
                     </a:p>
                     <a:p>
                       <a:r>
-                        <a:rPr lang="en-US" dirty="0">
+                        <a:rPr lang="en-US" sz="1600" dirty="0">
                           <a:latin typeface="Courier New" panose="02070309020205020404" pitchFamily="49" charset="0"/>
                           <a:cs typeface="Courier New" panose="02070309020205020404" pitchFamily="49" charset="0"/>
                         </a:rPr>
-                        <a:t>  0:3, ["</a:t>
-                      </a:r>
-                      <a:r>
-                        <a:rPr lang="en-US" dirty="0" err="1">
+                        <a:t>  0:3, [</a:t>
+                      </a:r>
+                      <a:r>
+                        <a:rPr lang="en-US" sz="1600" dirty="0">
+                          <a:solidFill>
+                            <a:schemeClr val="accent2">
+                              <a:lumMod val="75000"/>
+                            </a:schemeClr>
+                          </a:solidFill>
+                          <a:latin typeface="Courier New" panose="02070309020205020404" pitchFamily="49" charset="0"/>
+                          <a:cs typeface="Courier New" panose="02070309020205020404" pitchFamily="49" charset="0"/>
+                        </a:rPr>
+                        <a:t>"</a:t>
+                      </a:r>
+                      <a:r>
+                        <a:rPr lang="en-US" sz="1600" dirty="0" err="1">
+                          <a:solidFill>
+                            <a:schemeClr val="accent2">
+                              <a:lumMod val="75000"/>
+                            </a:schemeClr>
+                          </a:solidFill>
                           <a:latin typeface="Courier New" panose="02070309020205020404" pitchFamily="49" charset="0"/>
                           <a:cs typeface="Courier New" panose="02070309020205020404" pitchFamily="49" charset="0"/>
                         </a:rPr>
                         <a:t>col_a</a:t>
                       </a:r>
                       <a:r>
-                        <a:rPr lang="en-US" dirty="0">
+                        <a:rPr lang="en-US" sz="1600" dirty="0">
+                          <a:solidFill>
+                            <a:schemeClr val="accent2">
+                              <a:lumMod val="75000"/>
+                            </a:schemeClr>
+                          </a:solidFill>
                           <a:latin typeface="Courier New" panose="02070309020205020404" pitchFamily="49" charset="0"/>
                           <a:cs typeface="Courier New" panose="02070309020205020404" pitchFamily="49" charset="0"/>
                         </a:rPr>
-                        <a:t>", "</a:t>
-                      </a:r>
-                      <a:r>
-                        <a:rPr lang="en-US" dirty="0" err="1">
+                        <a:t>"</a:t>
+                      </a:r>
+                      <a:r>
+                        <a:rPr lang="en-US" sz="1600" dirty="0">
+                          <a:latin typeface="Courier New" panose="02070309020205020404" pitchFamily="49" charset="0"/>
+                          <a:cs typeface="Courier New" panose="02070309020205020404" pitchFamily="49" charset="0"/>
+                        </a:rPr>
+                        <a:t>, </a:t>
+                      </a:r>
+                      <a:r>
+                        <a:rPr lang="en-US" sz="1600" dirty="0">
+                          <a:solidFill>
+                            <a:schemeClr val="accent2">
+                              <a:lumMod val="75000"/>
+                            </a:schemeClr>
+                          </a:solidFill>
+                          <a:latin typeface="Courier New" panose="02070309020205020404" pitchFamily="49" charset="0"/>
+                          <a:cs typeface="Courier New" panose="02070309020205020404" pitchFamily="49" charset="0"/>
+                        </a:rPr>
+                        <a:t>"</a:t>
+                      </a:r>
+                      <a:r>
+                        <a:rPr lang="en-US" sz="1600" dirty="0" err="1">
+                          <a:solidFill>
+                            <a:schemeClr val="accent2">
+                              <a:lumMod val="75000"/>
+                            </a:schemeClr>
+                          </a:solidFill>
                           <a:latin typeface="Courier New" panose="02070309020205020404" pitchFamily="49" charset="0"/>
                           <a:cs typeface="Courier New" panose="02070309020205020404" pitchFamily="49" charset="0"/>
                         </a:rPr>
                         <a:t>col_c</a:t>
                       </a:r>
                       <a:r>
-                        <a:rPr lang="en-US" dirty="0">
+                        <a:rPr lang="en-US" sz="1600" dirty="0">
+                          <a:solidFill>
+                            <a:schemeClr val="accent2">
+                              <a:lumMod val="75000"/>
+                            </a:schemeClr>
+                          </a:solidFill>
                           <a:latin typeface="Courier New" panose="02070309020205020404" pitchFamily="49" charset="0"/>
                           <a:cs typeface="Courier New" panose="02070309020205020404" pitchFamily="49" charset="0"/>
                         </a:rPr>
-                        <a:t>"]</a:t>
-                      </a:r>
-                    </a:p>
-                    <a:p>
-                      <a:r>
-                        <a:rPr lang="en-US" dirty="0">
+                        <a:t>"</a:t>
+                      </a:r>
+                      <a:r>
+                        <a:rPr lang="en-US" sz="1600" dirty="0">
                           <a:latin typeface="Courier New" panose="02070309020205020404" pitchFamily="49" charset="0"/>
                           <a:cs typeface="Courier New" panose="02070309020205020404" pitchFamily="49" charset="0"/>
                         </a:rPr>
                         <a:t>]</a:t>
                       </a:r>
-                      <a:endParaRPr lang="en-NL" dirty="0">
+                    </a:p>
+                    <a:p>
+                      <a:r>
+                        <a:rPr lang="en-US" sz="1600" dirty="0">
+                          <a:latin typeface="Courier New" panose="02070309020205020404" pitchFamily="49" charset="0"/>
+                          <a:cs typeface="Courier New" panose="02070309020205020404" pitchFamily="49" charset="0"/>
+                        </a:rPr>
+                        <a:t>]</a:t>
+                      </a:r>
+                      <a:endParaRPr lang="en-NL" sz="1600" dirty="0">
                         <a:latin typeface="Courier New" panose="02070309020205020404" pitchFamily="49" charset="0"/>
                         <a:cs typeface="Courier New" panose="02070309020205020404" pitchFamily="49" charset="0"/>
                       </a:endParaRPr>
@@ -5573,48 +5836,213 @@
                   </a:ext>
                 </a:extLst>
               </a:tr>
-              <a:tr h="1286520">
+              <a:tr h="1224000">
                 <a:tc>
                   <a:txBody>
                     <a:bodyPr/>
                     <a:lstStyle/>
                     <a:p>
                       <a:r>
-                        <a:rPr lang="en-US" b="1" dirty="0" err="1">
+                        <a:rPr lang="en-US" sz="1600" b="0" dirty="0" err="1">
+                          <a:latin typeface="Courier New" panose="02070309020205020404" pitchFamily="49" charset="0"/>
+                          <a:cs typeface="Courier New" panose="02070309020205020404" pitchFamily="49" charset="0"/>
+                        </a:rPr>
+                        <a:t>df.loc</a:t>
+                      </a:r>
+                      <a:r>
+                        <a:rPr lang="en-US" sz="1600" dirty="0">
+                          <a:latin typeface="Courier New" panose="02070309020205020404" pitchFamily="49" charset="0"/>
+                          <a:cs typeface="Courier New" panose="02070309020205020404" pitchFamily="49" charset="0"/>
+                        </a:rPr>
+                        <a:t>[</a:t>
+                      </a:r>
+                    </a:p>
+                    <a:p>
+                      <a:r>
+                        <a:rPr lang="en-US" sz="1600" dirty="0">
+                          <a:latin typeface="Courier New" panose="02070309020205020404" pitchFamily="49" charset="0"/>
+                          <a:cs typeface="Courier New" panose="02070309020205020404" pitchFamily="49" charset="0"/>
+                        </a:rPr>
+                        <a:t>  </a:t>
+                      </a:r>
+                      <a:r>
+                        <a:rPr lang="en-US" sz="1600" b="1" dirty="0">
+                          <a:latin typeface="Courier New" panose="02070309020205020404" pitchFamily="49" charset="0"/>
+                          <a:cs typeface="Courier New" panose="02070309020205020404" pitchFamily="49" charset="0"/>
+                        </a:rPr>
+                        <a:t>&lt;slice&gt;, &lt;slice&gt;</a:t>
+                      </a:r>
+                    </a:p>
+                    <a:p>
+                      <a:r>
+                        <a:rPr lang="en-US" sz="1600" dirty="0">
+                          <a:latin typeface="Courier New" panose="02070309020205020404" pitchFamily="49" charset="0"/>
+                          <a:cs typeface="Courier New" panose="02070309020205020404" pitchFamily="49" charset="0"/>
+                        </a:rPr>
+                        <a:t>]</a:t>
+                      </a:r>
+                      <a:endParaRPr lang="en-NL" sz="1600" dirty="0">
+                        <a:latin typeface="Courier New" panose="02070309020205020404" pitchFamily="49" charset="0"/>
+                        <a:cs typeface="Courier New" panose="02070309020205020404" pitchFamily="49" charset="0"/>
+                      </a:endParaRPr>
+                    </a:p>
+                  </a:txBody>
+                  <a:tcPr anchor="ctr"/>
+                </a:tc>
+                <a:tc>
+                  <a:txBody>
+                    <a:bodyPr/>
+                    <a:lstStyle/>
+                    <a:p>
+                      <a:r>
+                        <a:rPr lang="nl-NL" sz="1600" b="0" noProof="0" dirty="0"/>
+                        <a:t>Rijen en kolommen als </a:t>
+                      </a:r>
+                      <a:r>
+                        <a:rPr lang="nl-NL" sz="1600" b="0" noProof="0" dirty="0" err="1">
+                          <a:latin typeface="Courier New" panose="02070309020205020404" pitchFamily="49" charset="0"/>
+                          <a:cs typeface="Courier New" panose="02070309020205020404" pitchFamily="49" charset="0"/>
+                        </a:rPr>
+                        <a:t>DataFrame</a:t>
+                      </a:r>
+                      <a:r>
+                        <a:rPr lang="nl-NL" sz="1600" b="0" noProof="0" dirty="0"/>
+                        <a:t>.</a:t>
+                      </a:r>
+                    </a:p>
+                  </a:txBody>
+                  <a:tcPr anchor="ctr"/>
+                </a:tc>
+                <a:tc>
+                  <a:txBody>
+                    <a:bodyPr/>
+                    <a:lstStyle/>
+                    <a:p>
+                      <a:r>
+                        <a:rPr lang="en-US" sz="1600" dirty="0" err="1">
+                          <a:latin typeface="Courier New" panose="02070309020205020404" pitchFamily="49" charset="0"/>
+                          <a:cs typeface="Courier New" panose="02070309020205020404" pitchFamily="49" charset="0"/>
+                        </a:rPr>
+                        <a:t>df.loc</a:t>
+                      </a:r>
+                      <a:r>
+                        <a:rPr lang="en-US" sz="1600" dirty="0">
+                          <a:latin typeface="Courier New" panose="02070309020205020404" pitchFamily="49" charset="0"/>
+                          <a:cs typeface="Courier New" panose="02070309020205020404" pitchFamily="49" charset="0"/>
+                        </a:rPr>
+                        <a:t>[</a:t>
+                      </a:r>
+                    </a:p>
+                    <a:p>
+                      <a:r>
+                        <a:rPr lang="en-US" sz="1600" dirty="0">
+                          <a:latin typeface="Courier New" panose="02070309020205020404" pitchFamily="49" charset="0"/>
+                          <a:cs typeface="Courier New" panose="02070309020205020404" pitchFamily="49" charset="0"/>
+                        </a:rPr>
+                        <a:t>  0:3, </a:t>
+                      </a:r>
+                      <a:r>
+                        <a:rPr lang="en-US" sz="1600" dirty="0">
+                          <a:solidFill>
+                            <a:schemeClr val="accent2">
+                              <a:lumMod val="75000"/>
+                            </a:schemeClr>
+                          </a:solidFill>
+                          <a:latin typeface="Courier New" panose="02070309020205020404" pitchFamily="49" charset="0"/>
+                          <a:cs typeface="Courier New" panose="02070309020205020404" pitchFamily="49" charset="0"/>
+                        </a:rPr>
+                        <a:t>"col_a"</a:t>
+                      </a:r>
+                      <a:r>
+                        <a:rPr lang="en-US" sz="1600" dirty="0">
+                          <a:latin typeface="Courier New" panose="02070309020205020404" pitchFamily="49" charset="0"/>
+                          <a:cs typeface="Courier New" panose="02070309020205020404" pitchFamily="49" charset="0"/>
+                        </a:rPr>
+                        <a:t>:</a:t>
+                      </a:r>
+                      <a:r>
+                        <a:rPr lang="en-US" sz="1600" dirty="0">
+                          <a:solidFill>
+                            <a:schemeClr val="accent2">
+                              <a:lumMod val="75000"/>
+                            </a:schemeClr>
+                          </a:solidFill>
+                          <a:latin typeface="Courier New" panose="02070309020205020404" pitchFamily="49" charset="0"/>
+                          <a:cs typeface="Courier New" panose="02070309020205020404" pitchFamily="49" charset="0"/>
+                        </a:rPr>
+                        <a:t>"</a:t>
+                      </a:r>
+                      <a:r>
+                        <a:rPr lang="en-US" sz="1600" dirty="0" err="1">
+                          <a:solidFill>
+                            <a:schemeClr val="accent2">
+                              <a:lumMod val="75000"/>
+                            </a:schemeClr>
+                          </a:solidFill>
+                          <a:latin typeface="Courier New" panose="02070309020205020404" pitchFamily="49" charset="0"/>
+                          <a:cs typeface="Courier New" panose="02070309020205020404" pitchFamily="49" charset="0"/>
+                        </a:rPr>
+                        <a:t>col_c</a:t>
+                      </a:r>
+                      <a:r>
+                        <a:rPr lang="en-US" sz="1600" dirty="0">
+                          <a:solidFill>
+                            <a:schemeClr val="accent2">
+                              <a:lumMod val="75000"/>
+                            </a:schemeClr>
+                          </a:solidFill>
+                          <a:latin typeface="Courier New" panose="02070309020205020404" pitchFamily="49" charset="0"/>
+                          <a:cs typeface="Courier New" panose="02070309020205020404" pitchFamily="49" charset="0"/>
+                        </a:rPr>
+                        <a:t>"</a:t>
+                      </a:r>
+                      <a:endParaRPr lang="en-US" sz="1600" dirty="0">
+                        <a:latin typeface="Courier New" panose="02070309020205020404" pitchFamily="49" charset="0"/>
+                        <a:cs typeface="Courier New" panose="02070309020205020404" pitchFamily="49" charset="0"/>
+                      </a:endParaRPr>
+                    </a:p>
+                    <a:p>
+                      <a:r>
+                        <a:rPr lang="en-US" sz="1600" dirty="0">
+                          <a:latin typeface="Courier New" panose="02070309020205020404" pitchFamily="49" charset="0"/>
+                          <a:cs typeface="Courier New" panose="02070309020205020404" pitchFamily="49" charset="0"/>
+                        </a:rPr>
+                        <a:t>]</a:t>
+                      </a:r>
+                      <a:endParaRPr lang="en-NL" sz="1600" dirty="0">
+                        <a:latin typeface="Courier New" panose="02070309020205020404" pitchFamily="49" charset="0"/>
+                        <a:cs typeface="Courier New" panose="02070309020205020404" pitchFamily="49" charset="0"/>
+                      </a:endParaRPr>
+                    </a:p>
+                  </a:txBody>
+                  <a:tcPr anchor="ctr"/>
+                </a:tc>
+                <a:extLst>
+                  <a:ext uri="{0D108BD9-81ED-4DB2-BD59-A6C34878D82A}">
+                    <a16:rowId xmlns:a16="http://schemas.microsoft.com/office/drawing/2014/main" val="2781865799"/>
+                  </a:ext>
+                </a:extLst>
+              </a:tr>
+              <a:tr h="504000">
+                <a:tc>
+                  <a:txBody>
+                    <a:bodyPr/>
+                    <a:lstStyle/>
+                    <a:p>
+                      <a:r>
+                        <a:rPr lang="en-US" sz="1600" b="0" dirty="0" err="1">
                           <a:latin typeface="Courier New" panose="02070309020205020404" pitchFamily="49" charset="0"/>
                           <a:cs typeface="Courier New" panose="02070309020205020404" pitchFamily="49" charset="0"/>
                         </a:rPr>
                         <a:t>df.iloc</a:t>
                       </a:r>
                       <a:r>
-                        <a:rPr lang="en-US" dirty="0">
+                        <a:rPr lang="en-US" sz="1600" dirty="0">
                           <a:latin typeface="Courier New" panose="02070309020205020404" pitchFamily="49" charset="0"/>
                           <a:cs typeface="Courier New" panose="02070309020205020404" pitchFamily="49" charset="0"/>
                         </a:rPr>
-                        <a:t>[</a:t>
-                      </a:r>
-                    </a:p>
-                    <a:p>
-                      <a:r>
-                        <a:rPr lang="en-US" dirty="0">
-                          <a:latin typeface="Courier New" panose="02070309020205020404" pitchFamily="49" charset="0"/>
-                          <a:cs typeface="Courier New" panose="02070309020205020404" pitchFamily="49" charset="0"/>
-                        </a:rPr>
-                        <a:t>  &lt;slice&gt;, &lt;list&gt;</a:t>
-                      </a:r>
-                    </a:p>
-                    <a:p>
-                      <a:r>
-                        <a:rPr lang="en-US" dirty="0">
-                          <a:latin typeface="Courier New" panose="02070309020205020404" pitchFamily="49" charset="0"/>
-                          <a:cs typeface="Courier New" panose="02070309020205020404" pitchFamily="49" charset="0"/>
-                        </a:rPr>
-                        <a:t>]</a:t>
-                      </a:r>
-                      <a:endParaRPr lang="en-NL" dirty="0">
-                        <a:latin typeface="Courier New" panose="02070309020205020404" pitchFamily="49" charset="0"/>
-                        <a:cs typeface="Courier New" panose="02070309020205020404" pitchFamily="49" charset="0"/>
-                      </a:endParaRPr>
+                        <a:t>[...]</a:t>
+                      </a:r>
                     </a:p>
                   </a:txBody>
                   <a:tcPr anchor="ctr"/>
@@ -5642,19 +6070,19 @@
                         <a:defRPr/>
                       </a:pPr>
                       <a:r>
-                        <a:rPr lang="nl-NL" b="0" noProof="0" dirty="0"/>
-                        <a:t>Vergelijkbaar </a:t>
-                      </a:r>
-                      <a:r>
-                        <a:rPr lang="nl-NL" b="0" noProof="0" dirty="0">
+                        <a:rPr lang="nl-NL" sz="1600" b="0" noProof="0" dirty="0"/>
+                        <a:t>Zoals </a:t>
+                      </a:r>
+                      <a:r>
+                        <a:rPr lang="nl-NL" sz="1600" b="0" noProof="0" dirty="0">
                           <a:latin typeface="Courier New" panose="02070309020205020404" pitchFamily="49" charset="0"/>
                           <a:cs typeface="Courier New" panose="02070309020205020404" pitchFamily="49" charset="0"/>
                         </a:rPr>
-                        <a:t>loc[…],</a:t>
-                      </a:r>
-                      <a:r>
-                        <a:rPr lang="nl-NL" b="0" noProof="0" dirty="0"/>
-                        <a:t> maar gebruikt positionele indexering.</a:t>
+                        <a:t>loc[…]</a:t>
+                      </a:r>
+                      <a:r>
+                        <a:rPr lang="nl-NL" sz="1600" b="0" noProof="0" dirty="0"/>
+                        <a:t> maar met indices.</a:t>
                       </a:r>
                     </a:p>
                   </a:txBody>
@@ -5666,38 +6094,20 @@
                     <a:lstStyle/>
                     <a:p>
                       <a:r>
-                        <a:rPr lang="en-US" dirty="0" err="1">
+                        <a:rPr lang="en-US" sz="1600" dirty="0" err="1">
                           <a:latin typeface="Courier New" panose="02070309020205020404" pitchFamily="49" charset="0"/>
                           <a:cs typeface="Courier New" panose="02070309020205020404" pitchFamily="49" charset="0"/>
                         </a:rPr>
                         <a:t>df.iloc</a:t>
                       </a:r>
                       <a:r>
-                        <a:rPr lang="en-US" dirty="0">
+                        <a:rPr lang="en-US" sz="1600" dirty="0">
                           <a:latin typeface="Courier New" panose="02070309020205020404" pitchFamily="49" charset="0"/>
                           <a:cs typeface="Courier New" panose="02070309020205020404" pitchFamily="49" charset="0"/>
                         </a:rPr>
-                        <a:t>[</a:t>
-                      </a:r>
-                    </a:p>
-                    <a:p>
-                      <a:r>
-                        <a:rPr lang="en-US" dirty="0">
-                          <a:latin typeface="Courier New" panose="02070309020205020404" pitchFamily="49" charset="0"/>
-                          <a:cs typeface="Courier New" panose="02070309020205020404" pitchFamily="49" charset="0"/>
-                        </a:rPr>
-                        <a:t>  0:3, [0, 2]</a:t>
-                      </a:r>
-                    </a:p>
-                    <a:p>
-                      <a:r>
-                        <a:rPr lang="en-US" dirty="0">
-                          <a:latin typeface="Courier New" panose="02070309020205020404" pitchFamily="49" charset="0"/>
-                          <a:cs typeface="Courier New" panose="02070309020205020404" pitchFamily="49" charset="0"/>
-                        </a:rPr>
-                        <a:t>]</a:t>
-                      </a:r>
-                      <a:endParaRPr lang="en-NL" dirty="0">
+                        <a:t>[0:3, 0:2]</a:t>
+                      </a:r>
+                      <a:endParaRPr lang="en-NL" sz="1600" dirty="0">
                         <a:latin typeface="Courier New" panose="02070309020205020404" pitchFamily="49" charset="0"/>
                         <a:cs typeface="Courier New" panose="02070309020205020404" pitchFamily="49" charset="0"/>
                       </a:endParaRPr>
@@ -5707,7 +6117,7 @@
                 </a:tc>
                 <a:extLst>
                   <a:ext uri="{0D108BD9-81ED-4DB2-BD59-A6C34878D82A}">
-                    <a16:rowId xmlns:a16="http://schemas.microsoft.com/office/drawing/2014/main" val="744846987"/>
+                    <a16:rowId xmlns:a16="http://schemas.microsoft.com/office/drawing/2014/main" val="2440733991"/>
                   </a:ext>
                 </a:extLst>
               </a:tr>
@@ -5836,7 +6246,7 @@
           <p:nvPr>
             <p:extLst>
               <p:ext uri="{D42A27DB-BD31-4B8C-83A1-F6EECF244321}">
-                <p14:modId xmlns:p14="http://schemas.microsoft.com/office/powerpoint/2010/main" val="1181708816"/>
+                <p14:modId xmlns:p14="http://schemas.microsoft.com/office/powerpoint/2010/main" val="1078928987"/>
               </p:ext>
             </p:extLst>
           </p:nvPr>
@@ -5908,18 +6318,15 @@
                     <a:p>
                       <a:r>
                         <a:rPr lang="nl-NL" b="0" noProof="0" dirty="0"/>
-                        <a:t>Kolom aanmaken met </a:t>
-                      </a:r>
-                      <a:r>
-                        <a:rPr lang="nl-NL" b="0" noProof="0" dirty="0">
-                          <a:latin typeface="Courier New" panose="02070309020205020404" pitchFamily="49" charset="0"/>
-                          <a:cs typeface="Courier New" panose="02070309020205020404" pitchFamily="49" charset="0"/>
-                        </a:rPr>
-                        <a:t>[…]</a:t>
+                        <a:t>Kolom aanmaken in-</a:t>
+                      </a:r>
+                      <a:r>
+                        <a:rPr lang="nl-NL" b="0" noProof="0" dirty="0" err="1"/>
+                        <a:t>place</a:t>
                       </a:r>
                       <a:r>
                         <a:rPr lang="nl-NL" b="0" noProof="0" dirty="0"/>
-                        <a:t> of </a:t>
+                        <a:t> of met </a:t>
                       </a:r>
                       <a:r>
                         <a:rPr lang="nl-NL" b="0" noProof="0" dirty="0">
@@ -5967,6 +6374,20 @@
                       </a:r>
                     </a:p>
                     <a:p>
+                      <a:r>
+                        <a:rPr lang="en-US" dirty="0" err="1">
+                          <a:latin typeface="Courier New" panose="02070309020205020404" pitchFamily="49" charset="0"/>
+                          <a:cs typeface="Courier New" panose="02070309020205020404" pitchFamily="49" charset="0"/>
+                        </a:rPr>
+                        <a:t>df</a:t>
+                      </a:r>
+                      <a:r>
+                        <a:rPr lang="en-US" dirty="0">
+                          <a:latin typeface="Courier New" panose="02070309020205020404" pitchFamily="49" charset="0"/>
+                          <a:cs typeface="Courier New" panose="02070309020205020404" pitchFamily="49" charset="0"/>
+                        </a:rPr>
+                        <a:t> = </a:t>
+                      </a:r>
                       <a:r>
                         <a:rPr lang="en-US" dirty="0" err="1">
                           <a:latin typeface="Courier New" panose="02070309020205020404" pitchFamily="49" charset="0"/>
@@ -8052,13 +8473,13 @@
               <a:buNone/>
             </a:pPr>
             <a:r>
-              <a:rPr lang="nl-NL" sz="1600" b="1" dirty="0" err="1">
+              <a:rPr lang="nl-NL" sz="1800" b="1" dirty="0" err="1">
                 <a:latin typeface="Courier New" panose="02070309020205020404" pitchFamily="49" charset="0"/>
                 <a:cs typeface="Courier New" panose="02070309020205020404" pitchFamily="49" charset="0"/>
               </a:rPr>
               <a:t>pandas.concat</a:t>
             </a:r>
-            <a:endParaRPr lang="nl-NL" sz="1600" b="1" dirty="0">
+            <a:endParaRPr lang="nl-NL" sz="1800" b="1" dirty="0">
               <a:latin typeface="Courier New" panose="02070309020205020404" pitchFamily="49" charset="0"/>
               <a:cs typeface="Courier New" panose="02070309020205020404" pitchFamily="49" charset="0"/>
             </a:endParaRPr>
@@ -8068,19 +8489,19 @@
               <a:buNone/>
             </a:pPr>
             <a:r>
-              <a:rPr lang="nl-NL" sz="1600" dirty="0">
+              <a:rPr lang="nl-NL" sz="1800" dirty="0">
                 <a:cs typeface="Courier New" panose="02070309020205020404" pitchFamily="49" charset="0"/>
               </a:rPr>
               <a:t>Voegt lijst van </a:t>
             </a:r>
             <a:r>
-              <a:rPr lang="nl-NL" sz="1600" dirty="0" err="1">
+              <a:rPr lang="nl-NL" sz="1800" dirty="0" err="1">
                 <a:cs typeface="Courier New" panose="02070309020205020404" pitchFamily="49" charset="0"/>
               </a:rPr>
               <a:t>DataFrames</a:t>
             </a:r>
             <a:r>
-              <a:rPr lang="nl-NL" sz="1600" dirty="0">
+              <a:rPr lang="nl-NL" sz="1800" dirty="0">
                 <a:cs typeface="Courier New" panose="02070309020205020404" pitchFamily="49" charset="0"/>
               </a:rPr>
               <a:t> samen als rijen of kolommen.</a:t>
@@ -8090,7 +8511,7 @@
             <a:pPr marL="0" indent="0">
               <a:buNone/>
             </a:pPr>
-            <a:endParaRPr lang="nl-NL" sz="1600" dirty="0">
+            <a:endParaRPr lang="nl-NL" sz="1800" dirty="0">
               <a:cs typeface="Courier New" panose="02070309020205020404" pitchFamily="49" charset="0"/>
             </a:endParaRPr>
           </a:p>
@@ -8098,7 +8519,7 @@
             <a:pPr marL="0" indent="0">
               <a:buNone/>
             </a:pPr>
-            <a:endParaRPr lang="nl-NL" sz="1600" dirty="0">
+            <a:endParaRPr lang="nl-NL" sz="1800" dirty="0">
               <a:cs typeface="Courier New" panose="02070309020205020404" pitchFamily="49" charset="0"/>
             </a:endParaRPr>
           </a:p>
@@ -8106,22 +8527,14 @@
             <a:pPr marL="0" indent="0">
               <a:buNone/>
             </a:pPr>
-            <a:endParaRPr lang="nl-NL" sz="1600" dirty="0">
-              <a:cs typeface="Courier New" panose="02070309020205020404" pitchFamily="49" charset="0"/>
-            </a:endParaRPr>
-          </a:p>
-          <a:p>
-            <a:pPr marL="0" indent="0">
-              <a:buNone/>
-            </a:pPr>
-            <a:r>
-              <a:rPr lang="nl-NL" sz="1600" b="1" dirty="0" err="1">
+            <a:r>
+              <a:rPr lang="nl-NL" sz="1800" b="1" dirty="0" err="1">
                 <a:latin typeface="Courier New" panose="02070309020205020404" pitchFamily="49" charset="0"/>
                 <a:cs typeface="Courier New" panose="02070309020205020404" pitchFamily="49" charset="0"/>
               </a:rPr>
               <a:t>DataFrame.join</a:t>
             </a:r>
-            <a:endParaRPr lang="nl-NL" sz="1600" b="1" dirty="0">
+            <a:endParaRPr lang="nl-NL" sz="1800" b="1" dirty="0">
               <a:latin typeface="Courier New" panose="02070309020205020404" pitchFamily="49" charset="0"/>
               <a:cs typeface="Courier New" panose="02070309020205020404" pitchFamily="49" charset="0"/>
             </a:endParaRPr>
@@ -8131,19 +8544,19 @@
               <a:buNone/>
             </a:pPr>
             <a:r>
-              <a:rPr lang="nl-NL" sz="1600" dirty="0">
+              <a:rPr lang="nl-NL" sz="1800" dirty="0">
                 <a:cs typeface="Courier New" panose="02070309020205020404" pitchFamily="49" charset="0"/>
               </a:rPr>
               <a:t>Voegt 2 </a:t>
             </a:r>
             <a:r>
-              <a:rPr lang="nl-NL" sz="1600" dirty="0" err="1">
+              <a:rPr lang="nl-NL" sz="1800" dirty="0" err="1">
                 <a:cs typeface="Courier New" panose="02070309020205020404" pitchFamily="49" charset="0"/>
               </a:rPr>
               <a:t>DataFrames</a:t>
             </a:r>
             <a:r>
-              <a:rPr lang="nl-NL" sz="1600" dirty="0">
+              <a:rPr lang="nl-NL" sz="1800" dirty="0">
                 <a:cs typeface="Courier New" panose="02070309020205020404" pitchFamily="49" charset="0"/>
               </a:rPr>
               <a:t> samen via hun indices.</a:t>
@@ -8153,7 +8566,7 @@
             <a:pPr marL="0" indent="0">
               <a:buNone/>
             </a:pPr>
-            <a:endParaRPr lang="nl-NL" sz="1600" dirty="0">
+            <a:endParaRPr lang="nl-NL" sz="1800" dirty="0">
               <a:cs typeface="Courier New" panose="02070309020205020404" pitchFamily="49" charset="0"/>
             </a:endParaRPr>
           </a:p>
@@ -8161,7 +8574,7 @@
             <a:pPr marL="0" indent="0">
               <a:buNone/>
             </a:pPr>
-            <a:endParaRPr lang="nl-NL" sz="1600" dirty="0">
+            <a:endParaRPr lang="nl-NL" sz="1800" dirty="0">
               <a:cs typeface="Courier New" panose="02070309020205020404" pitchFamily="49" charset="0"/>
             </a:endParaRPr>
           </a:p>
@@ -8169,22 +8582,14 @@
             <a:pPr marL="0" indent="0">
               <a:buNone/>
             </a:pPr>
-            <a:endParaRPr lang="nl-NL" sz="1600" dirty="0">
-              <a:cs typeface="Courier New" panose="02070309020205020404" pitchFamily="49" charset="0"/>
-            </a:endParaRPr>
-          </a:p>
-          <a:p>
-            <a:pPr marL="0" indent="0">
-              <a:buNone/>
-            </a:pPr>
-            <a:r>
-              <a:rPr lang="nl-NL" sz="1600" b="1" dirty="0" err="1">
+            <a:r>
+              <a:rPr lang="nl-NL" sz="1800" b="1" dirty="0" err="1">
                 <a:latin typeface="Courier New" panose="02070309020205020404" pitchFamily="49" charset="0"/>
                 <a:cs typeface="Courier New" panose="02070309020205020404" pitchFamily="49" charset="0"/>
               </a:rPr>
               <a:t>DataFrame.merge</a:t>
             </a:r>
-            <a:endParaRPr lang="nl-NL" sz="1600" b="1" dirty="0">
+            <a:endParaRPr lang="nl-NL" sz="1800" b="1" dirty="0">
               <a:latin typeface="Courier New" panose="02070309020205020404" pitchFamily="49" charset="0"/>
               <a:cs typeface="Courier New" panose="02070309020205020404" pitchFamily="49" charset="0"/>
             </a:endParaRPr>
@@ -8194,19 +8599,19 @@
               <a:buNone/>
             </a:pPr>
             <a:r>
-              <a:rPr lang="nl-NL" sz="1600" dirty="0">
+              <a:rPr lang="nl-NL" sz="1800" dirty="0">
                 <a:cs typeface="Courier New" panose="02070309020205020404" pitchFamily="49" charset="0"/>
               </a:rPr>
               <a:t>Voegt 2 </a:t>
             </a:r>
             <a:r>
-              <a:rPr lang="nl-NL" sz="1600" dirty="0" err="1">
+              <a:rPr lang="nl-NL" sz="1800" dirty="0" err="1">
                 <a:cs typeface="Courier New" panose="02070309020205020404" pitchFamily="49" charset="0"/>
               </a:rPr>
               <a:t>DataFrames</a:t>
             </a:r>
             <a:r>
-              <a:rPr lang="nl-NL" sz="1600" dirty="0">
+              <a:rPr lang="nl-NL" sz="1800" dirty="0">
                 <a:cs typeface="Courier New" panose="02070309020205020404" pitchFamily="49" charset="0"/>
               </a:rPr>
               <a:t> samen via een gedeelde kolom.</a:t>
@@ -8410,14 +8815,14 @@
               <a:buNone/>
             </a:pPr>
             <a:r>
-              <a:rPr lang="en-US" sz="2000" dirty="0" err="1">
+              <a:rPr lang="en-US" sz="2000" b="1" dirty="0" err="1">
                 <a:latin typeface="Courier New" panose="02070309020205020404" pitchFamily="49" charset="0"/>
                 <a:cs typeface="Courier New" panose="02070309020205020404" pitchFamily="49" charset="0"/>
               </a:rPr>
               <a:t>pd.concat</a:t>
             </a:r>
             <a:r>
-              <a:rPr lang="en-US" sz="2000" dirty="0">
+              <a:rPr lang="en-US" sz="2000" b="1" dirty="0">
                 <a:latin typeface="Courier New" panose="02070309020205020404" pitchFamily="49" charset="0"/>
                 <a:cs typeface="Courier New" panose="02070309020205020404" pitchFamily="49" charset="0"/>
               </a:rPr>
@@ -8445,7 +8850,19 @@
                 <a:latin typeface="Courier New" panose="02070309020205020404" pitchFamily="49" charset="0"/>
                 <a:cs typeface="Courier New" panose="02070309020205020404" pitchFamily="49" charset="0"/>
               </a:rPr>
-              <a:t>    axis="columns"</a:t>
+              <a:t>    axis=</a:t>
+            </a:r>
+            <a:r>
+              <a:rPr lang="en-US" sz="2000" dirty="0">
+                <a:solidFill>
+                  <a:schemeClr val="accent2">
+                    <a:lumMod val="75000"/>
+                  </a:schemeClr>
+                </a:solidFill>
+                <a:latin typeface="Courier New" panose="02070309020205020404" pitchFamily="49" charset="0"/>
+                <a:cs typeface="Courier New" panose="02070309020205020404" pitchFamily="49" charset="0"/>
+              </a:rPr>
+              <a:t>"columns"</a:t>
             </a:r>
           </a:p>
           <a:p>
@@ -8453,7 +8870,7 @@
               <a:buNone/>
             </a:pPr>
             <a:r>
-              <a:rPr lang="en-US" sz="2000" dirty="0">
+              <a:rPr lang="en-US" sz="2000" b="1" dirty="0">
                 <a:latin typeface="Courier New" panose="02070309020205020404" pitchFamily="49" charset="0"/>
                 <a:cs typeface="Courier New" panose="02070309020205020404" pitchFamily="49" charset="0"/>
               </a:rPr>
@@ -8474,14 +8891,14 @@
               <a:buNone/>
             </a:pPr>
             <a:r>
-              <a:rPr lang="en-US" sz="2000" dirty="0" err="1">
+              <a:rPr lang="en-US" sz="2000" b="1" dirty="0" err="1">
                 <a:latin typeface="Courier New" panose="02070309020205020404" pitchFamily="49" charset="0"/>
                 <a:cs typeface="Courier New" panose="02070309020205020404" pitchFamily="49" charset="0"/>
               </a:rPr>
               <a:t>df_left.join</a:t>
             </a:r>
             <a:r>
-              <a:rPr lang="en-US" sz="2000" dirty="0">
+              <a:rPr lang="en-US" sz="2000" b="1" dirty="0">
                 <a:latin typeface="Courier New" panose="02070309020205020404" pitchFamily="49" charset="0"/>
                 <a:cs typeface="Courier New" panose="02070309020205020404" pitchFamily="49" charset="0"/>
               </a:rPr>
@@ -8523,7 +8940,26 @@
                 <a:latin typeface="Courier New" panose="02070309020205020404" pitchFamily="49" charset="0"/>
                 <a:cs typeface="Courier New" panose="02070309020205020404" pitchFamily="49" charset="0"/>
               </a:rPr>
-              <a:t>    how="left",</a:t>
+              <a:t>    how=</a:t>
+            </a:r>
+            <a:r>
+              <a:rPr lang="en-US" sz="2000" dirty="0">
+                <a:solidFill>
+                  <a:schemeClr val="accent2">
+                    <a:lumMod val="75000"/>
+                  </a:schemeClr>
+                </a:solidFill>
+                <a:latin typeface="Courier New" panose="02070309020205020404" pitchFamily="49" charset="0"/>
+                <a:cs typeface="Courier New" panose="02070309020205020404" pitchFamily="49" charset="0"/>
+              </a:rPr>
+              <a:t>"left"</a:t>
+            </a:r>
+            <a:r>
+              <a:rPr lang="en-US" sz="2000" dirty="0">
+                <a:latin typeface="Courier New" panose="02070309020205020404" pitchFamily="49" charset="0"/>
+                <a:cs typeface="Courier New" panose="02070309020205020404" pitchFamily="49" charset="0"/>
+              </a:rPr>
+              <a:t>,</a:t>
             </a:r>
           </a:p>
           <a:p>
@@ -8531,7 +8967,7 @@
               <a:buNone/>
             </a:pPr>
             <a:r>
-              <a:rPr lang="en-US" sz="2000" dirty="0">
+              <a:rPr lang="en-US" sz="2000" b="1" dirty="0">
                 <a:latin typeface="Courier New" panose="02070309020205020404" pitchFamily="49" charset="0"/>
                 <a:cs typeface="Courier New" panose="02070309020205020404" pitchFamily="49" charset="0"/>
               </a:rPr>
@@ -8552,14 +8988,14 @@
               <a:buNone/>
             </a:pPr>
             <a:r>
-              <a:rPr lang="en-US" sz="2000" dirty="0" err="1">
+              <a:rPr lang="en-US" sz="2000" b="1" dirty="0" err="1">
                 <a:latin typeface="Courier New" panose="02070309020205020404" pitchFamily="49" charset="0"/>
                 <a:cs typeface="Courier New" panose="02070309020205020404" pitchFamily="49" charset="0"/>
               </a:rPr>
               <a:t>df_left.merge</a:t>
             </a:r>
             <a:r>
-              <a:rPr lang="en-US" sz="2000" dirty="0">
+              <a:rPr lang="en-US" sz="2000" b="1" dirty="0">
                 <a:latin typeface="Courier New" panose="02070309020205020404" pitchFamily="49" charset="0"/>
                 <a:cs typeface="Courier New" panose="02070309020205020404" pitchFamily="49" charset="0"/>
               </a:rPr>
@@ -8601,10 +9037,27 @@
                 <a:latin typeface="Courier New" panose="02070309020205020404" pitchFamily="49" charset="0"/>
                 <a:cs typeface="Courier New" panose="02070309020205020404" pitchFamily="49" charset="0"/>
               </a:rPr>
-              <a:t>   on="</a:t>
+              <a:t>   on=</a:t>
+            </a:r>
+            <a:r>
+              <a:rPr lang="en-US" sz="2000" dirty="0">
+                <a:solidFill>
+                  <a:schemeClr val="accent2">
+                    <a:lumMod val="75000"/>
+                  </a:schemeClr>
+                </a:solidFill>
+                <a:latin typeface="Courier New" panose="02070309020205020404" pitchFamily="49" charset="0"/>
+                <a:cs typeface="Courier New" panose="02070309020205020404" pitchFamily="49" charset="0"/>
+              </a:rPr>
+              <a:t>"</a:t>
             </a:r>
             <a:r>
               <a:rPr lang="en-US" sz="2000" dirty="0" err="1">
+                <a:solidFill>
+                  <a:schemeClr val="accent2">
+                    <a:lumMod val="75000"/>
+                  </a:schemeClr>
+                </a:solidFill>
                 <a:latin typeface="Courier New" panose="02070309020205020404" pitchFamily="49" charset="0"/>
                 <a:cs typeface="Courier New" panose="02070309020205020404" pitchFamily="49" charset="0"/>
               </a:rPr>
@@ -8612,10 +9065,22 @@
             </a:r>
             <a:r>
               <a:rPr lang="en-US" sz="2000" dirty="0">
-                <a:latin typeface="Courier New" panose="02070309020205020404" pitchFamily="49" charset="0"/>
-                <a:cs typeface="Courier New" panose="02070309020205020404" pitchFamily="49" charset="0"/>
-              </a:rPr>
-              <a:t>",</a:t>
+                <a:solidFill>
+                  <a:schemeClr val="accent2">
+                    <a:lumMod val="75000"/>
+                  </a:schemeClr>
+                </a:solidFill>
+                <a:latin typeface="Courier New" panose="02070309020205020404" pitchFamily="49" charset="0"/>
+                <a:cs typeface="Courier New" panose="02070309020205020404" pitchFamily="49" charset="0"/>
+              </a:rPr>
+              <a:t>"</a:t>
+            </a:r>
+            <a:r>
+              <a:rPr lang="en-US" sz="2000" dirty="0">
+                <a:latin typeface="Courier New" panose="02070309020205020404" pitchFamily="49" charset="0"/>
+                <a:cs typeface="Courier New" panose="02070309020205020404" pitchFamily="49" charset="0"/>
+              </a:rPr>
+              <a:t>,</a:t>
             </a:r>
           </a:p>
           <a:p>
@@ -8627,7 +9092,26 @@
                 <a:latin typeface="Courier New" panose="02070309020205020404" pitchFamily="49" charset="0"/>
                 <a:cs typeface="Courier New" panose="02070309020205020404" pitchFamily="49" charset="0"/>
               </a:rPr>
-              <a:t>   how="inner",</a:t>
+              <a:t>   how=</a:t>
+            </a:r>
+            <a:r>
+              <a:rPr lang="en-US" sz="2000" dirty="0">
+                <a:solidFill>
+                  <a:schemeClr val="accent2">
+                    <a:lumMod val="75000"/>
+                  </a:schemeClr>
+                </a:solidFill>
+                <a:latin typeface="Courier New" panose="02070309020205020404" pitchFamily="49" charset="0"/>
+                <a:cs typeface="Courier New" panose="02070309020205020404" pitchFamily="49" charset="0"/>
+              </a:rPr>
+              <a:t>"inner"</a:t>
+            </a:r>
+            <a:r>
+              <a:rPr lang="en-US" sz="2000" dirty="0">
+                <a:latin typeface="Courier New" panose="02070309020205020404" pitchFamily="49" charset="0"/>
+                <a:cs typeface="Courier New" panose="02070309020205020404" pitchFamily="49" charset="0"/>
+              </a:rPr>
+              <a:t>,</a:t>
             </a:r>
           </a:p>
           <a:p>
@@ -8635,7 +9119,7 @@
               <a:buNone/>
             </a:pPr>
             <a:r>
-              <a:rPr lang="en-US" sz="2000" dirty="0">
+              <a:rPr lang="en-US" sz="2000" b="1" dirty="0">
                 <a:latin typeface="Courier New" panose="02070309020205020404" pitchFamily="49" charset="0"/>
                 <a:cs typeface="Courier New" panose="02070309020205020404" pitchFamily="49" charset="0"/>
               </a:rPr>
@@ -21229,31 +21713,7 @@
             </a:r>
             <a:r>
               <a:rPr lang="nl-NL" sz="2000" noProof="0" dirty="0"/>
-              <a:t> maakt makkelijker en efficiënter om met data te werken.</a:t>
-            </a:r>
-          </a:p>
-          <a:p>
-            <a:pPr>
-              <a:buFontTx/>
-              <a:buChar char="-"/>
-            </a:pPr>
-            <a:r>
-              <a:rPr lang="nl-NL" sz="2000" dirty="0"/>
-              <a:t>Series:	1-dimensionaal: vergelijkbaar met list.</a:t>
-            </a:r>
-          </a:p>
-          <a:p>
-            <a:pPr>
-              <a:buFontTx/>
-              <a:buChar char="-"/>
-            </a:pPr>
-            <a:r>
-              <a:rPr lang="nl-NL" sz="2000" dirty="0" err="1"/>
-              <a:t>DataFrames</a:t>
-            </a:r>
-            <a:r>
-              <a:rPr lang="nl-NL" sz="2000" dirty="0"/>
-              <a:t>:	2-dimensionaal: vergelijkbaar (SQL) tabel.</a:t>
+              <a:t> maakt data verwerken makkelijk en vooral efficiënt.</a:t>
             </a:r>
           </a:p>
           <a:p>
@@ -21348,7 +21808,7 @@
             </a:pPr>
             <a:r>
               <a:rPr lang="nl-NL" sz="2000" noProof="0" dirty="0"/>
-              <a:t>Maar: Data wordt overgezet van Python naar C.</a:t>
+              <a:t>Maar: Data worden geconverteerd van Python naar C.</a:t>
             </a:r>
           </a:p>
         </p:txBody>
@@ -21425,10 +21885,9 @@
           <a:lstStyle/>
           <a:p>
             <a:r>
-              <a:rPr lang="en-US" sz="1400" dirty="0" err="1"/>
+              <a:rPr lang="nl-NL" sz="1400"/>
               <a:t>instructies</a:t>
             </a:r>
-            <a:endParaRPr lang="en-NL" sz="1400" dirty="0"/>
           </a:p>
         </p:txBody>
       </p:sp>
@@ -21679,7 +22138,7 @@
           <p:nvPr>
             <p:extLst>
               <p:ext uri="{D42A27DB-BD31-4B8C-83A1-F6EECF244321}">
-                <p14:modId xmlns:p14="http://schemas.microsoft.com/office/powerpoint/2010/main" val="3509172993"/>
+                <p14:modId xmlns:p14="http://schemas.microsoft.com/office/powerpoint/2010/main" val="4183957268"/>
               </p:ext>
             </p:extLst>
           </p:nvPr>
@@ -21920,7 +22379,7 @@
                     <a:p>
                       <a:r>
                         <a:rPr lang="en-US" dirty="0"/>
-                        <a:t>bool</a:t>
+                        <a:t>-</a:t>
                       </a:r>
                       <a:endParaRPr lang="en-NL" dirty="0"/>
                     </a:p>
@@ -21955,6 +22414,55 @@
                     <a:p>
                       <a:r>
                         <a:rPr lang="en-US" dirty="0"/>
+                        <a:t>datetime</a:t>
+                      </a:r>
+                      <a:endParaRPr lang="en-NL" dirty="0"/>
+                    </a:p>
+                  </a:txBody>
+                  <a:tcPr/>
+                </a:tc>
+                <a:tc>
+                  <a:txBody>
+                    <a:bodyPr/>
+                    <a:lstStyle/>
+                    <a:p>
+                      <a:r>
+                        <a:rPr lang="en-US" dirty="0"/>
+                        <a:t>-</a:t>
+                      </a:r>
+                      <a:endParaRPr lang="en-NL" dirty="0"/>
+                    </a:p>
+                  </a:txBody>
+                  <a:tcPr/>
+                </a:tc>
+                <a:tc>
+                  <a:txBody>
+                    <a:bodyPr/>
+                    <a:lstStyle/>
+                    <a:p>
+                      <a:r>
+                        <a:rPr lang="en-US" dirty="0"/>
+                        <a:t>datetime64</a:t>
+                      </a:r>
+                      <a:endParaRPr lang="en-NL" dirty="0"/>
+                    </a:p>
+                  </a:txBody>
+                  <a:tcPr/>
+                </a:tc>
+                <a:extLst>
+                  <a:ext uri="{0D108BD9-81ED-4DB2-BD59-A6C34878D82A}">
+                    <a16:rowId xmlns:a16="http://schemas.microsoft.com/office/drawing/2014/main" val="1204761656"/>
+                  </a:ext>
+                </a:extLst>
+              </a:tr>
+              <a:tr h="402469">
+                <a:tc>
+                  <a:txBody>
+                    <a:bodyPr/>
+                    <a:lstStyle/>
+                    <a:p>
+                      <a:r>
+                        <a:rPr lang="en-US" dirty="0"/>
                         <a:t>str</a:t>
                       </a:r>
                       <a:endParaRPr lang="en-NL" dirty="0"/>
@@ -22042,55 +22550,6 @@
                 <a:extLst>
                   <a:ext uri="{0D108BD9-81ED-4DB2-BD59-A6C34878D82A}">
                     <a16:rowId xmlns:a16="http://schemas.microsoft.com/office/drawing/2014/main" val="3903160831"/>
-                  </a:ext>
-                </a:extLst>
-              </a:tr>
-              <a:tr h="402469">
-                <a:tc>
-                  <a:txBody>
-                    <a:bodyPr/>
-                    <a:lstStyle/>
-                    <a:p>
-                      <a:r>
-                        <a:rPr lang="en-US" dirty="0"/>
-                        <a:t>datetime</a:t>
-                      </a:r>
-                      <a:endParaRPr lang="en-NL" dirty="0"/>
-                    </a:p>
-                  </a:txBody>
-                  <a:tcPr/>
-                </a:tc>
-                <a:tc>
-                  <a:txBody>
-                    <a:bodyPr/>
-                    <a:lstStyle/>
-                    <a:p>
-                      <a:r>
-                        <a:rPr lang="en-US" dirty="0"/>
-                        <a:t>-</a:t>
-                      </a:r>
-                      <a:endParaRPr lang="en-NL" dirty="0"/>
-                    </a:p>
-                  </a:txBody>
-                  <a:tcPr/>
-                </a:tc>
-                <a:tc>
-                  <a:txBody>
-                    <a:bodyPr/>
-                    <a:lstStyle/>
-                    <a:p>
-                      <a:r>
-                        <a:rPr lang="en-US" dirty="0"/>
-                        <a:t>datetime64</a:t>
-                      </a:r>
-                      <a:endParaRPr lang="en-NL" dirty="0"/>
-                    </a:p>
-                  </a:txBody>
-                  <a:tcPr/>
-                </a:tc>
-                <a:extLst>
-                  <a:ext uri="{0D108BD9-81ED-4DB2-BD59-A6C34878D82A}">
-                    <a16:rowId xmlns:a16="http://schemas.microsoft.com/office/drawing/2014/main" val="2703858188"/>
                   </a:ext>
                 </a:extLst>
               </a:tr>
@@ -23730,7 +24189,45 @@
                 <a:latin typeface="Courier New" panose="02070309020205020404" pitchFamily="49" charset="0"/>
                 <a:cs typeface="Courier New" panose="02070309020205020404" pitchFamily="49" charset="0"/>
               </a:rPr>
-              <a:t>series["2022-01-01":"2022-01-03"]</a:t>
+              <a:t>series[</a:t>
+            </a:r>
+            <a:r>
+              <a:rPr lang="nl-NL" sz="2000" dirty="0">
+                <a:solidFill>
+                  <a:schemeClr val="accent2">
+                    <a:lumMod val="75000"/>
+                  </a:schemeClr>
+                </a:solidFill>
+                <a:latin typeface="Courier New" panose="02070309020205020404" pitchFamily="49" charset="0"/>
+                <a:cs typeface="Courier New" panose="02070309020205020404" pitchFamily="49" charset="0"/>
+              </a:rPr>
+              <a:t>"2022-01-01"</a:t>
+            </a:r>
+            <a:r>
+              <a:rPr lang="nl-NL" sz="2000" dirty="0">
+                <a:latin typeface="Courier New" panose="02070309020205020404" pitchFamily="49" charset="0"/>
+                <a:cs typeface="Courier New" panose="02070309020205020404" pitchFamily="49" charset="0"/>
+              </a:rPr>
+              <a:t>:</a:t>
+            </a:r>
+            <a:r>
+              <a:rPr lang="nl-NL" sz="2000" dirty="0">
+                <a:solidFill>
+                  <a:schemeClr val="accent2">
+                    <a:lumMod val="75000"/>
+                  </a:schemeClr>
+                </a:solidFill>
+                <a:latin typeface="Courier New" panose="02070309020205020404" pitchFamily="49" charset="0"/>
+                <a:cs typeface="Courier New" panose="02070309020205020404" pitchFamily="49" charset="0"/>
+              </a:rPr>
+              <a:t>"2022-01-03"</a:t>
+            </a:r>
+            <a:r>
+              <a:rPr lang="nl-NL" sz="2000" dirty="0">
+                <a:latin typeface="Courier New" panose="02070309020205020404" pitchFamily="49" charset="0"/>
+                <a:cs typeface="Courier New" panose="02070309020205020404" pitchFamily="49" charset="0"/>
+              </a:rPr>
+              <a:t>]</a:t>
             </a:r>
           </a:p>
           <a:p>
@@ -24050,10 +24547,39 @@
             </a:r>
             <a:r>
               <a:rPr lang="nl-NL" sz="2000" dirty="0">
-                <a:latin typeface="Courier New" panose="02070309020205020404" pitchFamily="49" charset="0"/>
-                <a:cs typeface="Courier New" panose="02070309020205020404" pitchFamily="49" charset="0"/>
-              </a:rPr>
-              <a:t>"anders"</a:t>
+                <a:solidFill>
+                  <a:schemeClr val="accent2">
+                    <a:lumMod val="75000"/>
+                  </a:schemeClr>
+                </a:solidFill>
+                <a:latin typeface="Courier New" panose="02070309020205020404" pitchFamily="49" charset="0"/>
+                <a:cs typeface="Courier New" panose="02070309020205020404" pitchFamily="49" charset="0"/>
+              </a:rPr>
+              <a:t>"</a:t>
+            </a:r>
+            <a:r>
+              <a:rPr lang="nl-NL" sz="2000" dirty="0" err="1">
+                <a:solidFill>
+                  <a:schemeClr val="accent2">
+                    <a:lumMod val="75000"/>
+                  </a:schemeClr>
+                </a:solidFill>
+                <a:latin typeface="Courier New" panose="02070309020205020404" pitchFamily="49" charset="0"/>
+                <a:cs typeface="Courier New" panose="02070309020205020404" pitchFamily="49" charset="0"/>
+              </a:rPr>
+              <a:t>other</a:t>
+            </a:r>
+            <a:r>
+              <a:rPr lang="nl-NL" sz="2000" dirty="0">
+                <a:solidFill>
+                  <a:schemeClr val="accent2">
+                    <a:lumMod val="75000"/>
+                  </a:schemeClr>
+                </a:solidFill>
+                <a:latin typeface="Courier New" panose="02070309020205020404" pitchFamily="49" charset="0"/>
+                <a:cs typeface="Courier New" panose="02070309020205020404" pitchFamily="49" charset="0"/>
+              </a:rPr>
+              <a:t>"</a:t>
             </a:r>
             <a:r>
               <a:rPr lang="nl-NL" sz="2000" dirty="0"/>
@@ -24080,7 +24606,178 @@
                 <a:latin typeface="Courier New" panose="02070309020205020404" pitchFamily="49" charset="0"/>
                 <a:cs typeface="Courier New" panose="02070309020205020404" pitchFamily="49" charset="0"/>
               </a:rPr>
-              <a:t>(["A", "A", "A", "B", "B", "C", "C",  "D", "E"])</a:t>
+              <a:t>([</a:t>
+            </a:r>
+            <a:r>
+              <a:rPr lang="nl-NL" sz="1400" dirty="0">
+                <a:solidFill>
+                  <a:schemeClr val="accent2">
+                    <a:lumMod val="75000"/>
+                  </a:schemeClr>
+                </a:solidFill>
+                <a:latin typeface="Courier New" panose="02070309020205020404" pitchFamily="49" charset="0"/>
+                <a:cs typeface="Courier New" panose="02070309020205020404" pitchFamily="49" charset="0"/>
+              </a:rPr>
+              <a:t>"A"</a:t>
+            </a:r>
+            <a:r>
+              <a:rPr lang="nl-NL" sz="1400" dirty="0">
+                <a:latin typeface="Courier New" panose="02070309020205020404" pitchFamily="49" charset="0"/>
+                <a:cs typeface="Courier New" panose="02070309020205020404" pitchFamily="49" charset="0"/>
+              </a:rPr>
+              <a:t>, </a:t>
+            </a:r>
+            <a:r>
+              <a:rPr lang="nl-NL" sz="1400" dirty="0">
+                <a:solidFill>
+                  <a:schemeClr val="accent2">
+                    <a:lumMod val="75000"/>
+                  </a:schemeClr>
+                </a:solidFill>
+                <a:latin typeface="Courier New" panose="02070309020205020404" pitchFamily="49" charset="0"/>
+                <a:cs typeface="Courier New" panose="02070309020205020404" pitchFamily="49" charset="0"/>
+              </a:rPr>
+              <a:t>"A"</a:t>
+            </a:r>
+            <a:r>
+              <a:rPr lang="nl-NL" sz="1400" dirty="0">
+                <a:latin typeface="Courier New" panose="02070309020205020404" pitchFamily="49" charset="0"/>
+                <a:cs typeface="Courier New" panose="02070309020205020404" pitchFamily="49" charset="0"/>
+              </a:rPr>
+              <a:t>, </a:t>
+            </a:r>
+            <a:r>
+              <a:rPr lang="nl-NL" sz="1400" dirty="0">
+                <a:solidFill>
+                  <a:schemeClr val="accent2">
+                    <a:lumMod val="75000"/>
+                  </a:schemeClr>
+                </a:solidFill>
+                <a:latin typeface="Courier New" panose="02070309020205020404" pitchFamily="49" charset="0"/>
+                <a:cs typeface="Courier New" panose="02070309020205020404" pitchFamily="49" charset="0"/>
+              </a:rPr>
+              <a:t>"A"</a:t>
+            </a:r>
+            <a:r>
+              <a:rPr lang="nl-NL" sz="1400" dirty="0">
+                <a:latin typeface="Courier New" panose="02070309020205020404" pitchFamily="49" charset="0"/>
+                <a:cs typeface="Courier New" panose="02070309020205020404" pitchFamily="49" charset="0"/>
+              </a:rPr>
+              <a:t>, </a:t>
+            </a:r>
+            <a:r>
+              <a:rPr lang="nl-NL" sz="1400" dirty="0">
+                <a:solidFill>
+                  <a:schemeClr val="accent2">
+                    <a:lumMod val="75000"/>
+                  </a:schemeClr>
+                </a:solidFill>
+                <a:latin typeface="Courier New" panose="02070309020205020404" pitchFamily="49" charset="0"/>
+                <a:cs typeface="Courier New" panose="02070309020205020404" pitchFamily="49" charset="0"/>
+              </a:rPr>
+              <a:t>"B"</a:t>
+            </a:r>
+            <a:r>
+              <a:rPr lang="nl-NL" sz="1400" dirty="0">
+                <a:latin typeface="Courier New" panose="02070309020205020404" pitchFamily="49" charset="0"/>
+                <a:cs typeface="Courier New" panose="02070309020205020404" pitchFamily="49" charset="0"/>
+              </a:rPr>
+              <a:t>, </a:t>
+            </a:r>
+            <a:r>
+              <a:rPr lang="nl-NL" sz="1400" dirty="0">
+                <a:solidFill>
+                  <a:schemeClr val="accent2">
+                    <a:lumMod val="75000"/>
+                  </a:schemeClr>
+                </a:solidFill>
+                <a:latin typeface="Courier New" panose="02070309020205020404" pitchFamily="49" charset="0"/>
+                <a:cs typeface="Courier New" panose="02070309020205020404" pitchFamily="49" charset="0"/>
+              </a:rPr>
+              <a:t>"B"</a:t>
+            </a:r>
+            <a:r>
+              <a:rPr lang="nl-NL" sz="1400" dirty="0">
+                <a:latin typeface="Courier New" panose="02070309020205020404" pitchFamily="49" charset="0"/>
+                <a:cs typeface="Courier New" panose="02070309020205020404" pitchFamily="49" charset="0"/>
+              </a:rPr>
+              <a:t>, </a:t>
+            </a:r>
+            <a:r>
+              <a:rPr lang="nl-NL" sz="1400" dirty="0">
+                <a:solidFill>
+                  <a:schemeClr val="accent2">
+                    <a:lumMod val="75000"/>
+                  </a:schemeClr>
+                </a:solidFill>
+                <a:latin typeface="Courier New" panose="02070309020205020404" pitchFamily="49" charset="0"/>
+                <a:cs typeface="Courier New" panose="02070309020205020404" pitchFamily="49" charset="0"/>
+              </a:rPr>
+              <a:t>"C"</a:t>
+            </a:r>
+            <a:r>
+              <a:rPr lang="nl-NL" sz="1400" dirty="0">
+                <a:latin typeface="Courier New" panose="02070309020205020404" pitchFamily="49" charset="0"/>
+                <a:cs typeface="Courier New" panose="02070309020205020404" pitchFamily="49" charset="0"/>
+              </a:rPr>
+              <a:t>, </a:t>
+            </a:r>
+            <a:r>
+              <a:rPr lang="nl-NL" sz="1400" dirty="0">
+                <a:solidFill>
+                  <a:schemeClr val="accent2">
+                    <a:lumMod val="75000"/>
+                  </a:schemeClr>
+                </a:solidFill>
+                <a:latin typeface="Courier New" panose="02070309020205020404" pitchFamily="49" charset="0"/>
+                <a:cs typeface="Courier New" panose="02070309020205020404" pitchFamily="49" charset="0"/>
+              </a:rPr>
+              <a:t>"C"</a:t>
+            </a:r>
+            <a:r>
+              <a:rPr lang="nl-NL" sz="1400" dirty="0">
+                <a:latin typeface="Courier New" panose="02070309020205020404" pitchFamily="49" charset="0"/>
+                <a:cs typeface="Courier New" panose="02070309020205020404" pitchFamily="49" charset="0"/>
+              </a:rPr>
+              <a:t>,  </a:t>
+            </a:r>
+            <a:r>
+              <a:rPr lang="nl-NL" sz="1400" dirty="0">
+                <a:solidFill>
+                  <a:schemeClr val="accent2">
+                    <a:lumMod val="75000"/>
+                  </a:schemeClr>
+                </a:solidFill>
+                <a:latin typeface="Courier New" panose="02070309020205020404" pitchFamily="49" charset="0"/>
+                <a:cs typeface="Courier New" panose="02070309020205020404" pitchFamily="49" charset="0"/>
+              </a:rPr>
+              <a:t>"D"</a:t>
+            </a:r>
+            <a:r>
+              <a:rPr lang="nl-NL" sz="1400" dirty="0">
+                <a:latin typeface="Courier New" panose="02070309020205020404" pitchFamily="49" charset="0"/>
+                <a:cs typeface="Courier New" panose="02070309020205020404" pitchFamily="49" charset="0"/>
+              </a:rPr>
+              <a:t>, </a:t>
+            </a:r>
+            <a:r>
+              <a:rPr lang="nl-NL" sz="1400" dirty="0">
+                <a:solidFill>
+                  <a:schemeClr val="accent2">
+                    <a:lumMod val="75000"/>
+                  </a:schemeClr>
+                </a:solidFill>
+                <a:latin typeface="Courier New" panose="02070309020205020404" pitchFamily="49" charset="0"/>
+                <a:cs typeface="Courier New" panose="02070309020205020404" pitchFamily="49" charset="0"/>
+              </a:rPr>
+              <a:t>"E"</a:t>
+            </a:r>
+            <a:r>
+              <a:rPr lang="nl-NL" sz="1400" dirty="0">
+                <a:latin typeface="Courier New" panose="02070309020205020404" pitchFamily="49" charset="0"/>
+                <a:cs typeface="Courier New" panose="02070309020205020404" pitchFamily="49" charset="0"/>
+              </a:rPr>
+              <a:t>])</a:t>
             </a:r>
           </a:p>
           <a:p>
@@ -24110,7 +24807,226 @@
                 <a:latin typeface="Courier New" panose="02070309020205020404" pitchFamily="49" charset="0"/>
                 <a:cs typeface="Courier New" panose="02070309020205020404" pitchFamily="49" charset="0"/>
               </a:rPr>
-              <a:t>(["A", "A", "A", "B", "B", "C", "C", "anders", "anders"]</a:t>
+              <a:t>([</a:t>
+            </a:r>
+            <a:r>
+              <a:rPr lang="nl-NL" sz="1400" dirty="0">
+                <a:solidFill>
+                  <a:schemeClr val="accent2">
+                    <a:lumMod val="75000"/>
+                  </a:schemeClr>
+                </a:solidFill>
+                <a:latin typeface="Courier New" panose="02070309020205020404" pitchFamily="49" charset="0"/>
+                <a:cs typeface="Courier New" panose="02070309020205020404" pitchFamily="49" charset="0"/>
+              </a:rPr>
+              <a:t>"A"</a:t>
+            </a:r>
+            <a:r>
+              <a:rPr lang="nl-NL" sz="1400" dirty="0">
+                <a:latin typeface="Courier New" panose="02070309020205020404" pitchFamily="49" charset="0"/>
+                <a:cs typeface="Courier New" panose="02070309020205020404" pitchFamily="49" charset="0"/>
+              </a:rPr>
+              <a:t>, </a:t>
+            </a:r>
+            <a:r>
+              <a:rPr lang="nl-NL" sz="1400" dirty="0">
+                <a:solidFill>
+                  <a:schemeClr val="accent2">
+                    <a:lumMod val="75000"/>
+                  </a:schemeClr>
+                </a:solidFill>
+                <a:latin typeface="Courier New" panose="02070309020205020404" pitchFamily="49" charset="0"/>
+                <a:cs typeface="Courier New" panose="02070309020205020404" pitchFamily="49" charset="0"/>
+              </a:rPr>
+              <a:t>"A"</a:t>
+            </a:r>
+            <a:r>
+              <a:rPr lang="nl-NL" sz="1400" dirty="0">
+                <a:latin typeface="Courier New" panose="02070309020205020404" pitchFamily="49" charset="0"/>
+                <a:cs typeface="Courier New" panose="02070309020205020404" pitchFamily="49" charset="0"/>
+              </a:rPr>
+              <a:t>, </a:t>
+            </a:r>
+            <a:r>
+              <a:rPr lang="nl-NL" sz="1400" dirty="0">
+                <a:solidFill>
+                  <a:schemeClr val="accent2">
+                    <a:lumMod val="75000"/>
+                  </a:schemeClr>
+                </a:solidFill>
+                <a:latin typeface="Courier New" panose="02070309020205020404" pitchFamily="49" charset="0"/>
+                <a:cs typeface="Courier New" panose="02070309020205020404" pitchFamily="49" charset="0"/>
+              </a:rPr>
+              <a:t>"A"</a:t>
+            </a:r>
+            <a:r>
+              <a:rPr lang="nl-NL" sz="1400" dirty="0">
+                <a:latin typeface="Courier New" panose="02070309020205020404" pitchFamily="49" charset="0"/>
+                <a:cs typeface="Courier New" panose="02070309020205020404" pitchFamily="49" charset="0"/>
+              </a:rPr>
+              <a:t>, </a:t>
+            </a:r>
+            <a:r>
+              <a:rPr lang="nl-NL" sz="1400" dirty="0">
+                <a:solidFill>
+                  <a:schemeClr val="accent2">
+                    <a:lumMod val="75000"/>
+                  </a:schemeClr>
+                </a:solidFill>
+                <a:latin typeface="Courier New" panose="02070309020205020404" pitchFamily="49" charset="0"/>
+                <a:cs typeface="Courier New" panose="02070309020205020404" pitchFamily="49" charset="0"/>
+              </a:rPr>
+              <a:t>"B"</a:t>
+            </a:r>
+            <a:r>
+              <a:rPr lang="nl-NL" sz="1400" dirty="0">
+                <a:latin typeface="Courier New" panose="02070309020205020404" pitchFamily="49" charset="0"/>
+                <a:cs typeface="Courier New" panose="02070309020205020404" pitchFamily="49" charset="0"/>
+              </a:rPr>
+              <a:t>, </a:t>
+            </a:r>
+            <a:r>
+              <a:rPr lang="nl-NL" sz="1400" dirty="0">
+                <a:solidFill>
+                  <a:schemeClr val="accent2">
+                    <a:lumMod val="75000"/>
+                  </a:schemeClr>
+                </a:solidFill>
+                <a:latin typeface="Courier New" panose="02070309020205020404" pitchFamily="49" charset="0"/>
+                <a:cs typeface="Courier New" panose="02070309020205020404" pitchFamily="49" charset="0"/>
+              </a:rPr>
+              <a:t>"B"</a:t>
+            </a:r>
+            <a:r>
+              <a:rPr lang="nl-NL" sz="1400" dirty="0">
+                <a:latin typeface="Courier New" panose="02070309020205020404" pitchFamily="49" charset="0"/>
+                <a:cs typeface="Courier New" panose="02070309020205020404" pitchFamily="49" charset="0"/>
+              </a:rPr>
+              <a:t>, </a:t>
+            </a:r>
+            <a:r>
+              <a:rPr lang="nl-NL" sz="1400" dirty="0">
+                <a:solidFill>
+                  <a:schemeClr val="accent2">
+                    <a:lumMod val="75000"/>
+                  </a:schemeClr>
+                </a:solidFill>
+                <a:latin typeface="Courier New" panose="02070309020205020404" pitchFamily="49" charset="0"/>
+                <a:cs typeface="Courier New" panose="02070309020205020404" pitchFamily="49" charset="0"/>
+              </a:rPr>
+              <a:t>"C"</a:t>
+            </a:r>
+            <a:r>
+              <a:rPr lang="nl-NL" sz="1400" dirty="0">
+                <a:latin typeface="Courier New" panose="02070309020205020404" pitchFamily="49" charset="0"/>
+                <a:cs typeface="Courier New" panose="02070309020205020404" pitchFamily="49" charset="0"/>
+              </a:rPr>
+              <a:t>, </a:t>
+            </a:r>
+            <a:r>
+              <a:rPr lang="nl-NL" sz="1400" dirty="0">
+                <a:solidFill>
+                  <a:schemeClr val="accent2">
+                    <a:lumMod val="75000"/>
+                  </a:schemeClr>
+                </a:solidFill>
+                <a:latin typeface="Courier New" panose="02070309020205020404" pitchFamily="49" charset="0"/>
+                <a:cs typeface="Courier New" panose="02070309020205020404" pitchFamily="49" charset="0"/>
+              </a:rPr>
+              <a:t>"C"</a:t>
+            </a:r>
+            <a:r>
+              <a:rPr lang="nl-NL" sz="1400" dirty="0">
+                <a:latin typeface="Courier New" panose="02070309020205020404" pitchFamily="49" charset="0"/>
+                <a:cs typeface="Courier New" panose="02070309020205020404" pitchFamily="49" charset="0"/>
+              </a:rPr>
+              <a:t>, </a:t>
+            </a:r>
+            <a:r>
+              <a:rPr lang="nl-NL" sz="1400" dirty="0">
+                <a:solidFill>
+                  <a:schemeClr val="accent2">
+                    <a:lumMod val="75000"/>
+                  </a:schemeClr>
+                </a:solidFill>
+                <a:latin typeface="Courier New" panose="02070309020205020404" pitchFamily="49" charset="0"/>
+                <a:cs typeface="Courier New" panose="02070309020205020404" pitchFamily="49" charset="0"/>
+              </a:rPr>
+              <a:t>"</a:t>
+            </a:r>
+            <a:r>
+              <a:rPr lang="nl-NL" sz="1400" dirty="0" err="1">
+                <a:solidFill>
+                  <a:schemeClr val="accent2">
+                    <a:lumMod val="75000"/>
+                  </a:schemeClr>
+                </a:solidFill>
+                <a:latin typeface="Courier New" panose="02070309020205020404" pitchFamily="49" charset="0"/>
+                <a:cs typeface="Courier New" panose="02070309020205020404" pitchFamily="49" charset="0"/>
+              </a:rPr>
+              <a:t>other</a:t>
+            </a:r>
+            <a:r>
+              <a:rPr lang="nl-NL" sz="1400" dirty="0">
+                <a:solidFill>
+                  <a:schemeClr val="accent2">
+                    <a:lumMod val="75000"/>
+                  </a:schemeClr>
+                </a:solidFill>
+                <a:latin typeface="Courier New" panose="02070309020205020404" pitchFamily="49" charset="0"/>
+                <a:cs typeface="Courier New" panose="02070309020205020404" pitchFamily="49" charset="0"/>
+              </a:rPr>
+              <a:t>"</a:t>
+            </a:r>
+            <a:r>
+              <a:rPr lang="nl-NL" sz="1400" dirty="0">
+                <a:latin typeface="Courier New" panose="02070309020205020404" pitchFamily="49" charset="0"/>
+                <a:cs typeface="Courier New" panose="02070309020205020404" pitchFamily="49" charset="0"/>
+              </a:rPr>
+              <a:t>, </a:t>
+            </a:r>
+            <a:r>
+              <a:rPr lang="nl-NL" sz="1400" dirty="0">
+                <a:solidFill>
+                  <a:schemeClr val="accent2">
+                    <a:lumMod val="75000"/>
+                  </a:schemeClr>
+                </a:solidFill>
+                <a:latin typeface="Courier New" panose="02070309020205020404" pitchFamily="49" charset="0"/>
+                <a:cs typeface="Courier New" panose="02070309020205020404" pitchFamily="49" charset="0"/>
+              </a:rPr>
+              <a:t>"</a:t>
+            </a:r>
+            <a:r>
+              <a:rPr lang="nl-NL" sz="1400" dirty="0" err="1">
+                <a:solidFill>
+                  <a:schemeClr val="accent2">
+                    <a:lumMod val="75000"/>
+                  </a:schemeClr>
+                </a:solidFill>
+                <a:latin typeface="Courier New" panose="02070309020205020404" pitchFamily="49" charset="0"/>
+                <a:cs typeface="Courier New" panose="02070309020205020404" pitchFamily="49" charset="0"/>
+              </a:rPr>
+              <a:t>other</a:t>
+            </a:r>
+            <a:r>
+              <a:rPr lang="nl-NL" sz="1400" dirty="0">
+                <a:solidFill>
+                  <a:schemeClr val="accent2">
+                    <a:lumMod val="75000"/>
+                  </a:schemeClr>
+                </a:solidFill>
+                <a:latin typeface="Courier New" panose="02070309020205020404" pitchFamily="49" charset="0"/>
+                <a:cs typeface="Courier New" panose="02070309020205020404" pitchFamily="49" charset="0"/>
+              </a:rPr>
+              <a:t>"</a:t>
+            </a:r>
+            <a:r>
+              <a:rPr lang="nl-NL" sz="1400" dirty="0">
+                <a:latin typeface="Courier New" panose="02070309020205020404" pitchFamily="49" charset="0"/>
+                <a:cs typeface="Courier New" panose="02070309020205020404" pitchFamily="49" charset="0"/>
+              </a:rPr>
+              <a:t>]</a:t>
             </a:r>
           </a:p>
           <a:p>
@@ -25450,7 +26366,7 @@
             </a:pPr>
             <a:r>
               <a:rPr lang="nl-NL" sz="2000" dirty="0"/>
-              <a:t>Kolom heeft zelfde functionaliteit als Series.</a:t>
+              <a:t>Kolom zelfde functionaliteit als Series.</a:t>
             </a:r>
           </a:p>
           <a:p>

</xml_diff>

<commit_message>
Updated Python trainees part 3 pandas
</commit_message>
<xml_diff>
--- a/python_trainees/3_pandas_plotting/python_traineeship_3.pptx
+++ b/python_trainees/3_pandas_plotting/python_traineeship_3.pptx
@@ -242,7 +242,7 @@
           <a:p>
             <a:fld id="{16CF57F2-0494-4F4F-A7AD-E8F59CFB368A}" type="datetimeFigureOut">
               <a:rPr lang="en-NL" smtClean="0"/>
-              <a:t>28/09/2023</a:t>
+              <a:t>29/09/2023</a:t>
             </a:fld>
             <a:endParaRPr lang="en-NL"/>
           </a:p>
@@ -827,7 +827,7 @@
           <a:p>
             <a:fld id="{0EBB069A-003F-4FC0-8534-236B0C5C7B5F}" type="datetimeFigureOut">
               <a:rPr lang="en-NL" smtClean="0"/>
-              <a:t>28/09/2023</a:t>
+              <a:t>29/09/2023</a:t>
             </a:fld>
             <a:endParaRPr lang="en-NL"/>
           </a:p>
@@ -1027,7 +1027,7 @@
           <a:p>
             <a:fld id="{0EBB069A-003F-4FC0-8534-236B0C5C7B5F}" type="datetimeFigureOut">
               <a:rPr lang="en-NL" smtClean="0"/>
-              <a:t>28/09/2023</a:t>
+              <a:t>29/09/2023</a:t>
             </a:fld>
             <a:endParaRPr lang="en-NL"/>
           </a:p>
@@ -1237,7 +1237,7 @@
           <a:p>
             <a:fld id="{0EBB069A-003F-4FC0-8534-236B0C5C7B5F}" type="datetimeFigureOut">
               <a:rPr lang="en-NL" smtClean="0"/>
-              <a:t>28/09/2023</a:t>
+              <a:t>29/09/2023</a:t>
             </a:fld>
             <a:endParaRPr lang="en-NL"/>
           </a:p>
@@ -1437,7 +1437,7 @@
           <a:p>
             <a:fld id="{0EBB069A-003F-4FC0-8534-236B0C5C7B5F}" type="datetimeFigureOut">
               <a:rPr lang="en-NL" smtClean="0"/>
-              <a:t>28/09/2023</a:t>
+              <a:t>29/09/2023</a:t>
             </a:fld>
             <a:endParaRPr lang="en-NL"/>
           </a:p>
@@ -1713,7 +1713,7 @@
           <a:p>
             <a:fld id="{0EBB069A-003F-4FC0-8534-236B0C5C7B5F}" type="datetimeFigureOut">
               <a:rPr lang="en-NL" smtClean="0"/>
-              <a:t>28/09/2023</a:t>
+              <a:t>29/09/2023</a:t>
             </a:fld>
             <a:endParaRPr lang="en-NL"/>
           </a:p>
@@ -1981,7 +1981,7 @@
           <a:p>
             <a:fld id="{0EBB069A-003F-4FC0-8534-236B0C5C7B5F}" type="datetimeFigureOut">
               <a:rPr lang="en-NL" smtClean="0"/>
-              <a:t>28/09/2023</a:t>
+              <a:t>29/09/2023</a:t>
             </a:fld>
             <a:endParaRPr lang="en-NL"/>
           </a:p>
@@ -2396,7 +2396,7 @@
           <a:p>
             <a:fld id="{0EBB069A-003F-4FC0-8534-236B0C5C7B5F}" type="datetimeFigureOut">
               <a:rPr lang="en-NL" smtClean="0"/>
-              <a:t>28/09/2023</a:t>
+              <a:t>29/09/2023</a:t>
             </a:fld>
             <a:endParaRPr lang="en-NL"/>
           </a:p>
@@ -2538,7 +2538,7 @@
           <a:p>
             <a:fld id="{0EBB069A-003F-4FC0-8534-236B0C5C7B5F}" type="datetimeFigureOut">
               <a:rPr lang="en-NL" smtClean="0"/>
-              <a:t>28/09/2023</a:t>
+              <a:t>29/09/2023</a:t>
             </a:fld>
             <a:endParaRPr lang="en-NL"/>
           </a:p>
@@ -2651,7 +2651,7 @@
           <a:p>
             <a:fld id="{0EBB069A-003F-4FC0-8534-236B0C5C7B5F}" type="datetimeFigureOut">
               <a:rPr lang="en-NL" smtClean="0"/>
-              <a:t>28/09/2023</a:t>
+              <a:t>29/09/2023</a:t>
             </a:fld>
             <a:endParaRPr lang="en-NL"/>
           </a:p>
@@ -2964,7 +2964,7 @@
           <a:p>
             <a:fld id="{0EBB069A-003F-4FC0-8534-236B0C5C7B5F}" type="datetimeFigureOut">
               <a:rPr lang="en-NL" smtClean="0"/>
-              <a:t>28/09/2023</a:t>
+              <a:t>29/09/2023</a:t>
             </a:fld>
             <a:endParaRPr lang="en-NL"/>
           </a:p>
@@ -3253,7 +3253,7 @@
           <a:p>
             <a:fld id="{0EBB069A-003F-4FC0-8534-236B0C5C7B5F}" type="datetimeFigureOut">
               <a:rPr lang="en-NL" smtClean="0"/>
-              <a:t>28/09/2023</a:t>
+              <a:t>29/09/2023</a:t>
             </a:fld>
             <a:endParaRPr lang="en-NL"/>
           </a:p>
@@ -3496,7 +3496,7 @@
           <a:p>
             <a:fld id="{0EBB069A-003F-4FC0-8534-236B0C5C7B5F}" type="datetimeFigureOut">
               <a:rPr lang="en-NL" smtClean="0"/>
-              <a:t>28/09/2023</a:t>
+              <a:t>29/09/2023</a:t>
             </a:fld>
             <a:endParaRPr lang="en-NL"/>
           </a:p>
@@ -6806,7 +6806,7 @@
             </a:pPr>
             <a:r>
               <a:rPr lang="nl-NL" sz="2000" dirty="0"/>
-              <a:t>Open met </a:t>
+              <a:t>Lees met </a:t>
             </a:r>
             <a:r>
               <a:rPr lang="nl-NL" sz="2000" dirty="0" err="1"/>
@@ -8198,7 +8198,15 @@
             </a:pPr>
             <a:r>
               <a:rPr lang="nl-NL" sz="2000" dirty="0"/>
-              <a:t>Open weer transactiebestand: </a:t>
+              <a:t>Lees met </a:t>
+            </a:r>
+            <a:r>
+              <a:rPr lang="nl-NL" sz="2000" dirty="0" err="1"/>
+              <a:t>pandas</a:t>
+            </a:r>
+            <a:r>
+              <a:rPr lang="nl-NL" sz="2000" dirty="0"/>
+              <a:t> het bestand: </a:t>
             </a:r>
             <a:r>
               <a:rPr lang="nl-NL" sz="2000" dirty="0">
@@ -8207,7 +8215,6 @@
               </a:rPr>
               <a:t>0_data/sales/transactions.csv</a:t>
             </a:r>
-            <a:endParaRPr lang="nl-NL" sz="2000" dirty="0"/>
           </a:p>
           <a:p>
             <a:pPr marL="457200" indent="-457200">
@@ -8223,7 +8230,7 @@
             </a:pPr>
             <a:r>
               <a:rPr lang="nl-NL" sz="2000" dirty="0"/>
-              <a:t>Maak deze dagelijkse aggregaties:</a:t>
+              <a:t>Maak deze aggregaties per dag:</a:t>
             </a:r>
           </a:p>
           <a:p>
@@ -8270,35 +8277,41 @@
             </a:pPr>
             <a:r>
               <a:rPr lang="nl-NL" sz="2000" dirty="0"/>
-              <a:t>En over het totaal:</a:t>
-            </a:r>
-          </a:p>
-          <a:p>
-            <a:pPr marL="914400" lvl="1" indent="-457200">
+              <a:t>Vind de klant met de </a:t>
+            </a:r>
+            <a:r>
+              <a:rPr lang="nl-NL" sz="2000" u="sng" dirty="0"/>
+              <a:t>meeste</a:t>
+            </a:r>
+            <a:r>
+              <a:rPr lang="nl-NL" sz="2000" dirty="0"/>
+              <a:t> omzet.</a:t>
+            </a:r>
+          </a:p>
+          <a:p>
+            <a:pPr marL="457200" indent="-457200">
               <a:buFont typeface="Arial" panose="020B0604020202020204" pitchFamily="34" charset="0"/>
               <a:buAutoNum type="arabicPeriod"/>
             </a:pPr>
-            <a:r>
-              <a:rPr lang="nl-NL" sz="1600" dirty="0"/>
-              <a:t>Klant met meeste omzet.</a:t>
-            </a:r>
-          </a:p>
-          <a:p>
-            <a:pPr marL="914400" lvl="1" indent="-457200">
+            <a:endParaRPr lang="nl-NL" sz="2000" dirty="0"/>
+          </a:p>
+          <a:p>
+            <a:pPr marL="457200" indent="-457200">
               <a:buFont typeface="Arial" panose="020B0604020202020204" pitchFamily="34" charset="0"/>
               <a:buAutoNum type="arabicPeriod"/>
             </a:pPr>
             <a:r>
-              <a:rPr lang="nl-NL" sz="1600" dirty="0"/>
-              <a:t>Product met meeste omzet.</a:t>
-            </a:r>
-          </a:p>
-          <a:p>
-            <a:pPr marL="914400" lvl="1" indent="-457200">
-              <a:buFont typeface="Arial" panose="020B0604020202020204" pitchFamily="34" charset="0"/>
-              <a:buAutoNum type="arabicPeriod"/>
-            </a:pPr>
-            <a:endParaRPr lang="nl-NL" sz="1600" dirty="0"/>
+              <a:rPr lang="nl-NL" sz="2000" dirty="0"/>
+              <a:t>Vind het product met de </a:t>
+            </a:r>
+            <a:r>
+              <a:rPr lang="nl-NL" sz="2000" u="sng" dirty="0"/>
+              <a:t>minste</a:t>
+            </a:r>
+            <a:r>
+              <a:rPr lang="nl-NL" sz="2000" dirty="0"/>
+              <a:t> omzet.</a:t>
+            </a:r>
           </a:p>
         </p:txBody>
       </p:sp>
@@ -8362,7 +8375,7 @@
           <a:p>
             <a:r>
               <a:rPr lang="nl-NL" sz="3600" dirty="0"/>
-              <a:t>Methodes voor samenvoegen</a:t>
+              <a:t>Samenvoegen: Verschillende methodes</a:t>
             </a:r>
             <a:endParaRPr lang="nl-NL" sz="3600" noProof="0" dirty="0"/>
           </a:p>
@@ -8417,7 +8430,7 @@
         <p:spPr>
           <a:xfrm>
             <a:off x="990601" y="1608667"/>
-            <a:ext cx="4895849" cy="4720696"/>
+            <a:ext cx="5125453" cy="4720696"/>
           </a:xfrm>
           <a:prstGeom prst="rect">
             <a:avLst/>
@@ -8615,7 +8628,7 @@
               <a:rPr lang="nl-NL" sz="1800" dirty="0">
                 <a:cs typeface="Courier New" panose="02070309020205020404" pitchFamily="49" charset="0"/>
               </a:rPr>
-              <a:t>Voegt lijst van </a:t>
+              <a:t>Voeg lijst van </a:t>
             </a:r>
             <a:r>
               <a:rPr lang="nl-NL" sz="1800" dirty="0" err="1">
@@ -8627,7 +8640,7 @@
               <a:rPr lang="nl-NL" sz="1800" dirty="0">
                 <a:cs typeface="Courier New" panose="02070309020205020404" pitchFamily="49" charset="0"/>
               </a:rPr>
-              <a:t> samen als rijen of kolommen.</a:t>
+              <a:t> samen langs de rijen of kolommen.</a:t>
             </a:r>
           </a:p>
           <a:p>
@@ -8670,7 +8683,7 @@
               <a:rPr lang="nl-NL" sz="1800" dirty="0">
                 <a:cs typeface="Courier New" panose="02070309020205020404" pitchFamily="49" charset="0"/>
               </a:rPr>
-              <a:t>Voegt 2 </a:t>
+              <a:t>Voeg twee </a:t>
             </a:r>
             <a:r>
               <a:rPr lang="nl-NL" sz="1800" dirty="0" err="1">
@@ -8682,7 +8695,19 @@
               <a:rPr lang="nl-NL" sz="1800" dirty="0">
                 <a:cs typeface="Courier New" panose="02070309020205020404" pitchFamily="49" charset="0"/>
               </a:rPr>
-              <a:t> samen via hun indices.</a:t>
+              <a:t> samen via hun </a:t>
+            </a:r>
+            <a:r>
+              <a:rPr lang="nl-NL" sz="1800" u="sng" dirty="0">
+                <a:cs typeface="Courier New" panose="02070309020205020404" pitchFamily="49" charset="0"/>
+              </a:rPr>
+              <a:t>indices</a:t>
+            </a:r>
+            <a:r>
+              <a:rPr lang="nl-NL" sz="1800" dirty="0">
+                <a:cs typeface="Courier New" panose="02070309020205020404" pitchFamily="49" charset="0"/>
+              </a:rPr>
+              <a:t>.</a:t>
             </a:r>
           </a:p>
           <a:p>
@@ -8725,7 +8750,7 @@
               <a:rPr lang="nl-NL" sz="1800" dirty="0">
                 <a:cs typeface="Courier New" panose="02070309020205020404" pitchFamily="49" charset="0"/>
               </a:rPr>
-              <a:t>Voegt 2 </a:t>
+              <a:t>Voegt twee </a:t>
             </a:r>
             <a:r>
               <a:rPr lang="nl-NL" sz="1800" dirty="0" err="1">
@@ -8737,7 +8762,19 @@
               <a:rPr lang="nl-NL" sz="1800" dirty="0">
                 <a:cs typeface="Courier New" panose="02070309020205020404" pitchFamily="49" charset="0"/>
               </a:rPr>
-              <a:t> samen via een gedeelde kolom.</a:t>
+              <a:t> samen via </a:t>
+            </a:r>
+            <a:r>
+              <a:rPr lang="nl-NL" sz="1800" u="sng" dirty="0">
+                <a:cs typeface="Courier New" panose="02070309020205020404" pitchFamily="49" charset="0"/>
+              </a:rPr>
+              <a:t>gedeelde kolom</a:t>
+            </a:r>
+            <a:r>
+              <a:rPr lang="nl-NL" sz="1800" dirty="0">
+                <a:cs typeface="Courier New" panose="02070309020205020404" pitchFamily="49" charset="0"/>
+              </a:rPr>
+              <a:t>.</a:t>
             </a:r>
           </a:p>
         </p:txBody>
@@ -8758,8 +8795,8 @@
         </p:nvSpPr>
         <p:spPr>
           <a:xfrm>
-            <a:off x="5905500" y="1608667"/>
-            <a:ext cx="5295899" cy="4720696"/>
+            <a:off x="6915150" y="1608667"/>
+            <a:ext cx="4286249" cy="4720696"/>
           </a:xfrm>
           <a:prstGeom prst="rect">
             <a:avLst/>
@@ -8767,7 +8804,7 @@
         </p:spPr>
         <p:txBody>
           <a:bodyPr vert="horz" lIns="91440" tIns="45720" rIns="91440" bIns="45720" rtlCol="0">
-            <a:normAutofit fontScale="85000" lnSpcReduction="20000"/>
+            <a:noAutofit/>
           </a:bodyPr>
           <a:lstStyle>
             <a:lvl1pPr marL="228600" indent="-228600" algn="l" defTabSz="914400" rtl="0" eaLnBrk="1" latinLnBrk="0" hangingPunct="1">
@@ -8935,17 +8972,23 @@
           </a:lstStyle>
           <a:p>
             <a:pPr marL="0" indent="0">
+              <a:lnSpc>
+                <a:spcPct val="120000"/>
+              </a:lnSpc>
+              <a:spcBef>
+                <a:spcPts val="0"/>
+              </a:spcBef>
               <a:buNone/>
             </a:pPr>
             <a:r>
-              <a:rPr lang="en-US" sz="2000" b="1" dirty="0" err="1">
+              <a:rPr lang="en-US" sz="1600" dirty="0" err="1">
                 <a:latin typeface="Courier New" panose="02070309020205020404" pitchFamily="49" charset="0"/>
                 <a:cs typeface="Courier New" panose="02070309020205020404" pitchFamily="49" charset="0"/>
               </a:rPr>
               <a:t>pd.concat</a:t>
             </a:r>
             <a:r>
-              <a:rPr lang="en-US" sz="2000" b="1" dirty="0">
+              <a:rPr lang="en-US" sz="1600" dirty="0">
                 <a:latin typeface="Courier New" panose="02070309020205020404" pitchFamily="49" charset="0"/>
                 <a:cs typeface="Courier New" panose="02070309020205020404" pitchFamily="49" charset="0"/>
               </a:rPr>
@@ -8954,29 +8997,83 @@
           </a:p>
           <a:p>
             <a:pPr marL="0" indent="0">
+              <a:lnSpc>
+                <a:spcPct val="120000"/>
+              </a:lnSpc>
+              <a:spcBef>
+                <a:spcPts val="0"/>
+              </a:spcBef>
               <a:buNone/>
             </a:pPr>
             <a:r>
-              <a:rPr lang="en-US" sz="2000" dirty="0">
-                <a:latin typeface="Courier New" panose="02070309020205020404" pitchFamily="49" charset="0"/>
-                <a:cs typeface="Courier New" panose="02070309020205020404" pitchFamily="49" charset="0"/>
-              </a:rPr>
-              <a:t>    [df1, df2, df3],</a:t>
+              <a:rPr lang="en-US" sz="1600" dirty="0">
+                <a:latin typeface="Courier New" panose="02070309020205020404" pitchFamily="49" charset="0"/>
+                <a:cs typeface="Courier New" panose="02070309020205020404" pitchFamily="49" charset="0"/>
+              </a:rPr>
+              <a:t>    [</a:t>
+            </a:r>
+            <a:r>
+              <a:rPr lang="en-US" sz="1600" b="1" dirty="0">
+                <a:latin typeface="Courier New" panose="02070309020205020404" pitchFamily="49" charset="0"/>
+                <a:cs typeface="Courier New" panose="02070309020205020404" pitchFamily="49" charset="0"/>
+              </a:rPr>
+              <a:t>df1</a:t>
+            </a:r>
+            <a:r>
+              <a:rPr lang="en-US" sz="1600" dirty="0">
+                <a:latin typeface="Courier New" panose="02070309020205020404" pitchFamily="49" charset="0"/>
+                <a:cs typeface="Courier New" panose="02070309020205020404" pitchFamily="49" charset="0"/>
+              </a:rPr>
+              <a:t>, </a:t>
+            </a:r>
+            <a:r>
+              <a:rPr lang="en-US" sz="1600" b="1" dirty="0">
+                <a:latin typeface="Courier New" panose="02070309020205020404" pitchFamily="49" charset="0"/>
+                <a:cs typeface="Courier New" panose="02070309020205020404" pitchFamily="49" charset="0"/>
+              </a:rPr>
+              <a:t>df2</a:t>
+            </a:r>
+            <a:r>
+              <a:rPr lang="en-US" sz="1600" dirty="0">
+                <a:latin typeface="Courier New" panose="02070309020205020404" pitchFamily="49" charset="0"/>
+                <a:cs typeface="Courier New" panose="02070309020205020404" pitchFamily="49" charset="0"/>
+              </a:rPr>
+              <a:t>, </a:t>
+            </a:r>
+            <a:r>
+              <a:rPr lang="en-US" sz="1600" b="1" dirty="0">
+                <a:latin typeface="Courier New" panose="02070309020205020404" pitchFamily="49" charset="0"/>
+                <a:cs typeface="Courier New" panose="02070309020205020404" pitchFamily="49" charset="0"/>
+              </a:rPr>
+              <a:t>df3</a:t>
+            </a:r>
+            <a:r>
+              <a:rPr lang="en-US" sz="1600" dirty="0">
+                <a:latin typeface="Courier New" panose="02070309020205020404" pitchFamily="49" charset="0"/>
+                <a:cs typeface="Courier New" panose="02070309020205020404" pitchFamily="49" charset="0"/>
+              </a:rPr>
+              <a:t>],</a:t>
             </a:r>
           </a:p>
           <a:p>
             <a:pPr marL="0" indent="0">
+              <a:lnSpc>
+                <a:spcPct val="120000"/>
+              </a:lnSpc>
+              <a:spcBef>
+                <a:spcPts val="0"/>
+              </a:spcBef>
               <a:buNone/>
             </a:pPr>
             <a:r>
-              <a:rPr lang="en-US" sz="2000" dirty="0">
+              <a:rPr lang="en-US" sz="1600" dirty="0">
                 <a:latin typeface="Courier New" panose="02070309020205020404" pitchFamily="49" charset="0"/>
                 <a:cs typeface="Courier New" panose="02070309020205020404" pitchFamily="49" charset="0"/>
               </a:rPr>
               <a:t>    axis=</a:t>
             </a:r>
             <a:r>
-              <a:rPr lang="en-US" sz="2000" dirty="0">
+              <a:rPr lang="en-US" sz="1600" dirty="0">
                 <a:solidFill>
                   <a:schemeClr val="accent2">
                     <a:lumMod val="75000"/>
@@ -8990,10 +9087,16 @@
           </a:p>
           <a:p>
             <a:pPr marL="0" indent="0">
+              <a:lnSpc>
+                <a:spcPct val="120000"/>
+              </a:lnSpc>
+              <a:spcBef>
+                <a:spcPts val="0"/>
+              </a:spcBef>
               <a:buNone/>
             </a:pPr>
             <a:r>
-              <a:rPr lang="en-US" sz="2000" b="1" dirty="0">
+              <a:rPr lang="en-US" sz="1600" dirty="0">
                 <a:latin typeface="Courier New" panose="02070309020205020404" pitchFamily="49" charset="0"/>
                 <a:cs typeface="Courier New" panose="02070309020205020404" pitchFamily="49" charset="0"/>
               </a:rPr>
@@ -9002,26 +9105,45 @@
           </a:p>
           <a:p>
             <a:pPr marL="0" indent="0">
+              <a:lnSpc>
+                <a:spcPct val="120000"/>
+              </a:lnSpc>
+              <a:spcBef>
+                <a:spcPts val="0"/>
+              </a:spcBef>
               <a:buNone/>
             </a:pPr>
-            <a:endParaRPr lang="en-US" sz="2000" dirty="0">
+            <a:endParaRPr lang="en-US" sz="1600" dirty="0">
               <a:latin typeface="Courier New" panose="02070309020205020404" pitchFamily="49" charset="0"/>
               <a:cs typeface="Courier New" panose="02070309020205020404" pitchFamily="49" charset="0"/>
             </a:endParaRPr>
           </a:p>
           <a:p>
             <a:pPr marL="0" indent="0">
+              <a:lnSpc>
+                <a:spcPct val="120000"/>
+              </a:lnSpc>
+              <a:spcBef>
+                <a:spcPts val="0"/>
+              </a:spcBef>
               <a:buNone/>
             </a:pPr>
             <a:r>
-              <a:rPr lang="en-US" sz="2000" b="1" dirty="0" err="1">
-                <a:latin typeface="Courier New" panose="02070309020205020404" pitchFamily="49" charset="0"/>
-                <a:cs typeface="Courier New" panose="02070309020205020404" pitchFamily="49" charset="0"/>
-              </a:rPr>
-              <a:t>df_left.join</a:t>
-            </a:r>
-            <a:r>
-              <a:rPr lang="en-US" sz="2000" b="1" dirty="0">
+              <a:rPr lang="en-US" sz="1600" b="1" dirty="0" err="1">
+                <a:latin typeface="Courier New" panose="02070309020205020404" pitchFamily="49" charset="0"/>
+                <a:cs typeface="Courier New" panose="02070309020205020404" pitchFamily="49" charset="0"/>
+              </a:rPr>
+              <a:t>df_left.</a:t>
+            </a:r>
+            <a:r>
+              <a:rPr lang="en-US" sz="1600" dirty="0" err="1">
+                <a:latin typeface="Courier New" panose="02070309020205020404" pitchFamily="49" charset="0"/>
+                <a:cs typeface="Courier New" panose="02070309020205020404" pitchFamily="49" charset="0"/>
+              </a:rPr>
+              <a:t>join</a:t>
+            </a:r>
+            <a:r>
+              <a:rPr lang="en-US" sz="1600" dirty="0">
                 <a:latin typeface="Courier New" panose="02070309020205020404" pitchFamily="49" charset="0"/>
                 <a:cs typeface="Courier New" panose="02070309020205020404" pitchFamily="49" charset="0"/>
               </a:rPr>
@@ -9030,24 +9152,30 @@
           </a:p>
           <a:p>
             <a:pPr marL="0" indent="0">
+              <a:lnSpc>
+                <a:spcPct val="120000"/>
+              </a:lnSpc>
+              <a:spcBef>
+                <a:spcPts val="0"/>
+              </a:spcBef>
               <a:buNone/>
             </a:pPr>
             <a:r>
-              <a:rPr lang="en-US" sz="2000" dirty="0">
+              <a:rPr lang="en-US" sz="1600" dirty="0">
                 <a:latin typeface="Courier New" panose="02070309020205020404" pitchFamily="49" charset="0"/>
                 <a:cs typeface="Courier New" panose="02070309020205020404" pitchFamily="49" charset="0"/>
               </a:rPr>
               <a:t>    </a:t>
             </a:r>
             <a:r>
-              <a:rPr lang="en-US" sz="2000" dirty="0" err="1">
+              <a:rPr lang="en-US" sz="1600" b="1" dirty="0" err="1">
                 <a:latin typeface="Courier New" panose="02070309020205020404" pitchFamily="49" charset="0"/>
                 <a:cs typeface="Courier New" panose="02070309020205020404" pitchFamily="49" charset="0"/>
               </a:rPr>
               <a:t>df_right</a:t>
             </a:r>
             <a:r>
-              <a:rPr lang="en-US" sz="2000" dirty="0">
+              <a:rPr lang="en-US" sz="1600" dirty="0">
                 <a:latin typeface="Courier New" panose="02070309020205020404" pitchFamily="49" charset="0"/>
                 <a:cs typeface="Courier New" panose="02070309020205020404" pitchFamily="49" charset="0"/>
               </a:rPr>
@@ -9056,17 +9184,23 @@
           </a:p>
           <a:p>
             <a:pPr marL="0" indent="0">
+              <a:lnSpc>
+                <a:spcPct val="120000"/>
+              </a:lnSpc>
+              <a:spcBef>
+                <a:spcPts val="0"/>
+              </a:spcBef>
               <a:buNone/>
             </a:pPr>
             <a:r>
-              <a:rPr lang="en-US" sz="2000" dirty="0">
+              <a:rPr lang="en-US" sz="1600" dirty="0">
                 <a:latin typeface="Courier New" panose="02070309020205020404" pitchFamily="49" charset="0"/>
                 <a:cs typeface="Courier New" panose="02070309020205020404" pitchFamily="49" charset="0"/>
               </a:rPr>
               <a:t>    how=</a:t>
             </a:r>
             <a:r>
-              <a:rPr lang="en-US" sz="2000" dirty="0">
+              <a:rPr lang="en-US" sz="1600" dirty="0">
                 <a:solidFill>
                   <a:schemeClr val="accent2">
                     <a:lumMod val="75000"/>
@@ -9078,7 +9212,7 @@
               <a:t>"left"</a:t>
             </a:r>
             <a:r>
-              <a:rPr lang="en-US" sz="2000" dirty="0">
+              <a:rPr lang="en-US" sz="1600" dirty="0">
                 <a:latin typeface="Courier New" panose="02070309020205020404" pitchFamily="49" charset="0"/>
                 <a:cs typeface="Courier New" panose="02070309020205020404" pitchFamily="49" charset="0"/>
               </a:rPr>
@@ -9087,10 +9221,16 @@
           </a:p>
           <a:p>
             <a:pPr marL="0" indent="0">
+              <a:lnSpc>
+                <a:spcPct val="120000"/>
+              </a:lnSpc>
+              <a:spcBef>
+                <a:spcPts val="0"/>
+              </a:spcBef>
               <a:buNone/>
             </a:pPr>
             <a:r>
-              <a:rPr lang="en-US" sz="2000" b="1" dirty="0">
+              <a:rPr lang="en-US" sz="1600" dirty="0">
                 <a:latin typeface="Courier New" panose="02070309020205020404" pitchFamily="49" charset="0"/>
                 <a:cs typeface="Courier New" panose="02070309020205020404" pitchFamily="49" charset="0"/>
               </a:rPr>
@@ -9099,26 +9239,45 @@
           </a:p>
           <a:p>
             <a:pPr marL="0" indent="0">
+              <a:lnSpc>
+                <a:spcPct val="120000"/>
+              </a:lnSpc>
+              <a:spcBef>
+                <a:spcPts val="0"/>
+              </a:spcBef>
               <a:buNone/>
             </a:pPr>
-            <a:endParaRPr lang="en-US" sz="2000" dirty="0">
+            <a:endParaRPr lang="en-US" sz="1600" dirty="0">
               <a:latin typeface="Courier New" panose="02070309020205020404" pitchFamily="49" charset="0"/>
               <a:cs typeface="Courier New" panose="02070309020205020404" pitchFamily="49" charset="0"/>
             </a:endParaRPr>
           </a:p>
           <a:p>
             <a:pPr marL="0" indent="0">
+              <a:lnSpc>
+                <a:spcPct val="120000"/>
+              </a:lnSpc>
+              <a:spcBef>
+                <a:spcPts val="0"/>
+              </a:spcBef>
               <a:buNone/>
             </a:pPr>
             <a:r>
-              <a:rPr lang="en-US" sz="2000" b="1" dirty="0" err="1">
-                <a:latin typeface="Courier New" panose="02070309020205020404" pitchFamily="49" charset="0"/>
-                <a:cs typeface="Courier New" panose="02070309020205020404" pitchFamily="49" charset="0"/>
-              </a:rPr>
-              <a:t>df_left.merge</a:t>
-            </a:r>
-            <a:r>
-              <a:rPr lang="en-US" sz="2000" b="1" dirty="0">
+              <a:rPr lang="en-US" sz="1600" b="1" dirty="0" err="1">
+                <a:latin typeface="Courier New" panose="02070309020205020404" pitchFamily="49" charset="0"/>
+                <a:cs typeface="Courier New" panose="02070309020205020404" pitchFamily="49" charset="0"/>
+              </a:rPr>
+              <a:t>df_left</a:t>
+            </a:r>
+            <a:r>
+              <a:rPr lang="en-US" sz="1600" dirty="0" err="1">
+                <a:latin typeface="Courier New" panose="02070309020205020404" pitchFamily="49" charset="0"/>
+                <a:cs typeface="Courier New" panose="02070309020205020404" pitchFamily="49" charset="0"/>
+              </a:rPr>
+              <a:t>.merge</a:t>
+            </a:r>
+            <a:r>
+              <a:rPr lang="en-US" sz="1600" dirty="0">
                 <a:latin typeface="Courier New" panose="02070309020205020404" pitchFamily="49" charset="0"/>
                 <a:cs typeface="Courier New" panose="02070309020205020404" pitchFamily="49" charset="0"/>
               </a:rPr>
@@ -9127,24 +9286,30 @@
           </a:p>
           <a:p>
             <a:pPr marL="0" indent="0">
+              <a:lnSpc>
+                <a:spcPct val="120000"/>
+              </a:lnSpc>
+              <a:spcBef>
+                <a:spcPts val="0"/>
+              </a:spcBef>
               <a:buNone/>
             </a:pPr>
             <a:r>
-              <a:rPr lang="en-US" sz="2000" dirty="0">
+              <a:rPr lang="en-US" sz="1600" dirty="0">
                 <a:latin typeface="Courier New" panose="02070309020205020404" pitchFamily="49" charset="0"/>
                 <a:cs typeface="Courier New" panose="02070309020205020404" pitchFamily="49" charset="0"/>
               </a:rPr>
               <a:t>   </a:t>
             </a:r>
             <a:r>
-              <a:rPr lang="en-US" sz="2000" dirty="0" err="1">
+              <a:rPr lang="en-US" sz="1600" b="1" dirty="0" err="1">
                 <a:latin typeface="Courier New" panose="02070309020205020404" pitchFamily="49" charset="0"/>
                 <a:cs typeface="Courier New" panose="02070309020205020404" pitchFamily="49" charset="0"/>
               </a:rPr>
               <a:t>df_right</a:t>
             </a:r>
             <a:r>
-              <a:rPr lang="en-US" sz="2000" dirty="0">
+              <a:rPr lang="en-US" sz="1600" dirty="0">
                 <a:latin typeface="Courier New" panose="02070309020205020404" pitchFamily="49" charset="0"/>
                 <a:cs typeface="Courier New" panose="02070309020205020404" pitchFamily="49" charset="0"/>
               </a:rPr>
@@ -9153,17 +9318,23 @@
           </a:p>
           <a:p>
             <a:pPr marL="0" indent="0">
+              <a:lnSpc>
+                <a:spcPct val="120000"/>
+              </a:lnSpc>
+              <a:spcBef>
+                <a:spcPts val="0"/>
+              </a:spcBef>
               <a:buNone/>
             </a:pPr>
             <a:r>
-              <a:rPr lang="en-US" sz="2000" dirty="0">
+              <a:rPr lang="en-US" sz="1600" dirty="0">
                 <a:latin typeface="Courier New" panose="02070309020205020404" pitchFamily="49" charset="0"/>
                 <a:cs typeface="Courier New" panose="02070309020205020404" pitchFamily="49" charset="0"/>
               </a:rPr>
               <a:t>   on=</a:t>
             </a:r>
             <a:r>
-              <a:rPr lang="en-US" sz="2000" dirty="0">
+              <a:rPr lang="en-US" sz="1600" dirty="0">
                 <a:solidFill>
                   <a:schemeClr val="accent2">
                     <a:lumMod val="75000"/>
@@ -9175,7 +9346,7 @@
               <a:t>"</a:t>
             </a:r>
             <a:r>
-              <a:rPr lang="en-US" sz="2000" dirty="0" err="1">
+              <a:rPr lang="en-US" sz="1600" dirty="0" err="1">
                 <a:solidFill>
                   <a:schemeClr val="accent2">
                     <a:lumMod val="75000"/>
@@ -9187,7 +9358,7 @@
               <a:t>person_id</a:t>
             </a:r>
             <a:r>
-              <a:rPr lang="en-US" sz="2000" dirty="0">
+              <a:rPr lang="en-US" sz="1600" dirty="0">
                 <a:solidFill>
                   <a:schemeClr val="accent2">
                     <a:lumMod val="75000"/>
@@ -9199,7 +9370,7 @@
               <a:t>"</a:t>
             </a:r>
             <a:r>
-              <a:rPr lang="en-US" sz="2000" dirty="0">
+              <a:rPr lang="en-US" sz="1600" dirty="0">
                 <a:latin typeface="Courier New" panose="02070309020205020404" pitchFamily="49" charset="0"/>
                 <a:cs typeface="Courier New" panose="02070309020205020404" pitchFamily="49" charset="0"/>
               </a:rPr>
@@ -9208,17 +9379,23 @@
           </a:p>
           <a:p>
             <a:pPr marL="0" indent="0">
+              <a:lnSpc>
+                <a:spcPct val="120000"/>
+              </a:lnSpc>
+              <a:spcBef>
+                <a:spcPts val="0"/>
+              </a:spcBef>
               <a:buNone/>
             </a:pPr>
             <a:r>
-              <a:rPr lang="en-US" sz="2000" dirty="0">
+              <a:rPr lang="en-US" sz="1600" dirty="0">
                 <a:latin typeface="Courier New" panose="02070309020205020404" pitchFamily="49" charset="0"/>
                 <a:cs typeface="Courier New" panose="02070309020205020404" pitchFamily="49" charset="0"/>
               </a:rPr>
               <a:t>   how=</a:t>
             </a:r>
             <a:r>
-              <a:rPr lang="en-US" sz="2000" dirty="0">
+              <a:rPr lang="en-US" sz="1600" dirty="0">
                 <a:solidFill>
                   <a:schemeClr val="accent2">
                     <a:lumMod val="75000"/>
@@ -9230,7 +9407,7 @@
               <a:t>"inner"</a:t>
             </a:r>
             <a:r>
-              <a:rPr lang="en-US" sz="2000" dirty="0">
+              <a:rPr lang="en-US" sz="1600" dirty="0">
                 <a:latin typeface="Courier New" panose="02070309020205020404" pitchFamily="49" charset="0"/>
                 <a:cs typeface="Courier New" panose="02070309020205020404" pitchFamily="49" charset="0"/>
               </a:rPr>
@@ -9239,10 +9416,16 @@
           </a:p>
           <a:p>
             <a:pPr marL="0" indent="0">
+              <a:lnSpc>
+                <a:spcPct val="120000"/>
+              </a:lnSpc>
+              <a:spcBef>
+                <a:spcPts val="0"/>
+              </a:spcBef>
               <a:buNone/>
             </a:pPr>
             <a:r>
-              <a:rPr lang="en-US" sz="2000" b="1" dirty="0">
+              <a:rPr lang="en-US" sz="1600" dirty="0">
                 <a:latin typeface="Courier New" panose="02070309020205020404" pitchFamily="49" charset="0"/>
                 <a:cs typeface="Courier New" panose="02070309020205020404" pitchFamily="49" charset="0"/>
               </a:rPr>
@@ -9251,6 +9434,44 @@
           </a:p>
         </p:txBody>
       </p:sp>
+      <p:cxnSp>
+        <p:nvCxnSpPr>
+          <p:cNvPr id="3" name="Straight Connector 2">
+            <a:extLst>
+              <a:ext uri="{FF2B5EF4-FFF2-40B4-BE49-F238E27FC236}">
+                <a16:creationId xmlns:a16="http://schemas.microsoft.com/office/drawing/2014/main" id="{A37BE195-127A-BF62-C86E-E7F845782D91}"/>
+              </a:ext>
+            </a:extLst>
+          </p:cNvPr>
+          <p:cNvCxnSpPr>
+            <a:cxnSpLocks/>
+          </p:cNvCxnSpPr>
+          <p:nvPr/>
+        </p:nvCxnSpPr>
+        <p:spPr>
+          <a:xfrm>
+            <a:off x="6555232" y="1608667"/>
+            <a:ext cx="0" cy="4620683"/>
+          </a:xfrm>
+          <a:prstGeom prst="line">
+            <a:avLst/>
+          </a:prstGeom>
+        </p:spPr>
+        <p:style>
+          <a:lnRef idx="2">
+            <a:schemeClr val="dk1"/>
+          </a:lnRef>
+          <a:fillRef idx="0">
+            <a:schemeClr val="dk1"/>
+          </a:fillRef>
+          <a:effectRef idx="1">
+            <a:schemeClr val="dk1"/>
+          </a:effectRef>
+          <a:fontRef idx="minor">
+            <a:schemeClr val="tx1"/>
+          </a:fontRef>
+        </p:style>
+      </p:cxnSp>
     </p:spTree>
     <p:extLst>
       <p:ext uri="{BB962C8B-B14F-4D97-AF65-F5344CB8AC3E}">
@@ -11845,7 +12066,24 @@
             </a:pPr>
             <a:r>
               <a:rPr lang="nl-NL" sz="2000" dirty="0"/>
-              <a:t>Welke klant en product hadden de meeste omzet?</a:t>
+              <a:t>Welke klant (naam) had het meeste omzet?</a:t>
+            </a:r>
+          </a:p>
+          <a:p>
+            <a:pPr marL="457200" indent="-457200">
+              <a:buFont typeface="Arial" panose="020B0604020202020204" pitchFamily="34" charset="0"/>
+              <a:buAutoNum type="arabicPeriod"/>
+            </a:pPr>
+            <a:endParaRPr lang="nl-NL" sz="2000" dirty="0"/>
+          </a:p>
+          <a:p>
+            <a:pPr marL="457200" indent="-457200">
+              <a:buFont typeface="Arial" panose="020B0604020202020204" pitchFamily="34" charset="0"/>
+              <a:buAutoNum type="arabicPeriod"/>
+            </a:pPr>
+            <a:r>
+              <a:rPr lang="nl-NL" sz="2000" dirty="0"/>
+              <a:t>Welk product (naam) had de minste omzet?</a:t>
             </a:r>
           </a:p>
         </p:txBody>
@@ -12298,20 +12536,18 @@
               <a:buNone/>
             </a:pPr>
             <a:r>
-              <a:rPr lang="nl-NL" sz="2000" dirty="0"/>
-              <a:t>Basis: </a:t>
-            </a:r>
-            <a:r>
-              <a:rPr lang="nl-NL" sz="2000" dirty="0" err="1"/>
+              <a:rPr lang="nl-NL" sz="1600" b="1" dirty="0" err="1"/>
+              <a:t>Gebaseer</a:t>
+            </a:r>
+            <a:r>
+              <a:rPr lang="nl-NL" sz="1600" b="1" dirty="0"/>
+              <a:t> op: </a:t>
+            </a:r>
+            <a:r>
+              <a:rPr lang="nl-NL" sz="1600" b="1" dirty="0" err="1"/>
               <a:t>matplotlib</a:t>
             </a:r>
-            <a:endParaRPr lang="nl-NL" sz="2000" dirty="0"/>
-          </a:p>
-          <a:p>
-            <a:pPr marL="0" indent="0">
-              <a:buNone/>
-            </a:pPr>
-            <a:endParaRPr lang="nl-NL" sz="1600" dirty="0"/>
+            <a:endParaRPr lang="nl-NL" sz="1600" b="1" dirty="0"/>
           </a:p>
           <a:p>
             <a:pPr>
@@ -12354,13 +12590,32 @@
             <a:endParaRPr lang="nl-NL" sz="1600" dirty="0"/>
           </a:p>
           <a:p>
+            <a:pPr marL="0" indent="0">
+              <a:buNone/>
+            </a:pPr>
+            <a:r>
+              <a:rPr lang="nl-NL" sz="1600" b="1" dirty="0"/>
+              <a:t>Voordelen:</a:t>
+            </a:r>
+          </a:p>
+          <a:p>
             <a:pPr>
               <a:buFontTx/>
               <a:buChar char="-"/>
             </a:pPr>
             <a:r>
               <a:rPr lang="nl-NL" sz="1600" dirty="0"/>
-              <a:t>Voordelen:</a:t>
+              <a:t>Standaard backend voor Python.</a:t>
+            </a:r>
+          </a:p>
+          <a:p>
+            <a:pPr>
+              <a:buFontTx/>
+              <a:buChar char="-"/>
+            </a:pPr>
+            <a:r>
+              <a:rPr lang="nl-NL" sz="1600" dirty="0"/>
+              <a:t>Geen conversie naar Javascript.</a:t>
             </a:r>
           </a:p>
           <a:p>
@@ -12368,27 +12623,16 @@
               <a:buFontTx/>
               <a:buChar char="-"/>
             </a:pPr>
-            <a:r>
-              <a:rPr lang="nl-NL" sz="1200" dirty="0"/>
-              <a:t>Standaard backend voor Python.</a:t>
-            </a:r>
-          </a:p>
-          <a:p>
-            <a:pPr lvl="1">
-              <a:buFontTx/>
-              <a:buChar char="-"/>
-            </a:pPr>
-            <a:r>
-              <a:rPr lang="nl-NL" sz="1200" dirty="0"/>
-              <a:t>Geen conversie naar Javascript.</a:t>
-            </a:r>
-          </a:p>
-          <a:p>
-            <a:pPr lvl="1">
-              <a:buFontTx/>
-              <a:buChar char="-"/>
-            </a:pPr>
-            <a:endParaRPr lang="nl-NL" sz="1200" dirty="0"/>
+            <a:endParaRPr lang="nl-NL" sz="1600" dirty="0"/>
+          </a:p>
+          <a:p>
+            <a:pPr marL="0" indent="0">
+              <a:buNone/>
+            </a:pPr>
+            <a:r>
+              <a:rPr lang="nl-NL" sz="1600" b="1" dirty="0"/>
+              <a:t>Nadelen:</a:t>
+            </a:r>
           </a:p>
           <a:p>
             <a:pPr>
@@ -12397,26 +12641,16 @@
             </a:pPr>
             <a:r>
               <a:rPr lang="nl-NL" sz="1600" dirty="0"/>
-              <a:t>Nadelen:</a:t>
-            </a:r>
-          </a:p>
-          <a:p>
-            <a:pPr lvl="1">
+              <a:t>Minder gebruiksvriendelijk.</a:t>
+            </a:r>
+          </a:p>
+          <a:p>
+            <a:pPr>
               <a:buFontTx/>
               <a:buChar char="-"/>
             </a:pPr>
             <a:r>
-              <a:rPr lang="nl-NL" sz="1200" dirty="0"/>
-              <a:t>Minder gebruiksvriendelijk.</a:t>
-            </a:r>
-          </a:p>
-          <a:p>
-            <a:pPr lvl="1">
-              <a:buFontTx/>
-              <a:buChar char="-"/>
-            </a:pPr>
-            <a:r>
-              <a:rPr lang="nl-NL" sz="1200" dirty="0"/>
+              <a:rPr lang="nl-NL" sz="1600" dirty="0"/>
               <a:t>Uiterlijk minder mooi.</a:t>
             </a:r>
           </a:p>
@@ -12618,15 +12852,9 @@
               <a:buNone/>
             </a:pPr>
             <a:r>
-              <a:rPr lang="nl-NL" sz="2000" dirty="0"/>
-              <a:t>Basis: Javascript</a:t>
-            </a:r>
-          </a:p>
-          <a:p>
-            <a:pPr marL="0" indent="0">
-              <a:buNone/>
-            </a:pPr>
-            <a:endParaRPr lang="nl-NL" sz="1600" dirty="0"/>
+              <a:rPr lang="nl-NL" sz="1600" b="1" dirty="0"/>
+              <a:t>Gebaseerd op: Javascript</a:t>
+            </a:r>
           </a:p>
           <a:p>
             <a:pPr>
@@ -12664,33 +12892,22 @@
             <a:endParaRPr lang="nl-NL" sz="1600" dirty="0"/>
           </a:p>
           <a:p>
+            <a:pPr marL="0" indent="0">
+              <a:buNone/>
+            </a:pPr>
+            <a:r>
+              <a:rPr lang="nl-NL" sz="1600" b="1" dirty="0"/>
+              <a:t>Voordelen:</a:t>
+            </a:r>
+          </a:p>
+          <a:p>
             <a:pPr>
               <a:buFontTx/>
               <a:buChar char="-"/>
             </a:pPr>
             <a:r>
               <a:rPr lang="nl-NL" sz="1600" dirty="0"/>
-              <a:t>Voordelen:</a:t>
-            </a:r>
-          </a:p>
-          <a:p>
-            <a:pPr lvl="1">
-              <a:buFontTx/>
-              <a:buChar char="-"/>
-            </a:pPr>
-            <a:r>
-              <a:rPr lang="nl-NL" sz="1200" dirty="0"/>
               <a:t>Mooie, interactieve plots.</a:t>
-            </a:r>
-          </a:p>
-          <a:p>
-            <a:pPr lvl="1">
-              <a:buFontTx/>
-              <a:buChar char="-"/>
-            </a:pPr>
-            <a:r>
-              <a:rPr lang="nl-NL" sz="1200" dirty="0"/>
-              <a:t>Gebruiksvriendelijke API.</a:t>
             </a:r>
           </a:p>
           <a:p>
@@ -12698,35 +12915,44 @@
               <a:buFontTx/>
               <a:buChar char="-"/>
             </a:pPr>
-            <a:endParaRPr lang="nl-NL" sz="1600" dirty="0"/>
+            <a:r>
+              <a:rPr lang="nl-NL" sz="1600" dirty="0"/>
+              <a:t>Gebruiksvriendelijke API.</a:t>
+            </a:r>
           </a:p>
           <a:p>
             <a:pPr>
               <a:buFontTx/>
               <a:buChar char="-"/>
             </a:pPr>
-            <a:r>
-              <a:rPr lang="nl-NL" sz="1600" dirty="0"/>
+            <a:endParaRPr lang="nl-NL" sz="1600" dirty="0"/>
+          </a:p>
+          <a:p>
+            <a:pPr marL="0" indent="0">
+              <a:buNone/>
+            </a:pPr>
+            <a:r>
+              <a:rPr lang="nl-NL" sz="1600" b="1" dirty="0"/>
               <a:t>Nadelen:</a:t>
             </a:r>
           </a:p>
           <a:p>
-            <a:pPr lvl="1">
+            <a:pPr>
               <a:buFontTx/>
               <a:buChar char="-"/>
             </a:pPr>
             <a:r>
-              <a:rPr lang="nl-NL" sz="1200" dirty="0"/>
+              <a:rPr lang="nl-NL" sz="1600" dirty="0"/>
               <a:t>Vereist apart Javascript backend.</a:t>
             </a:r>
           </a:p>
           <a:p>
-            <a:pPr lvl="1">
+            <a:pPr>
               <a:buFontTx/>
               <a:buChar char="-"/>
             </a:pPr>
             <a:r>
-              <a:rPr lang="nl-NL" sz="1200" dirty="0"/>
+              <a:rPr lang="nl-NL" sz="1600" dirty="0"/>
               <a:t>Soms lastiger te exporteren.</a:t>
             </a:r>
           </a:p>
@@ -14509,7 +14735,7 @@
             </a:pPr>
             <a:r>
               <a:rPr lang="nl-NL" sz="2000" dirty="0"/>
-              <a:t>Maar: geen controle over de figuur…</a:t>
+              <a:t>Maar: weinig controle over de figuur…</a:t>
             </a:r>
           </a:p>
         </p:txBody>
@@ -14837,8 +15063,15 @@
               <a:buNone/>
             </a:pPr>
             <a:r>
+              <a:rPr lang="nl-NL" sz="2000" dirty="0" err="1">
+                <a:latin typeface="Courier New" panose="02070309020205020404" pitchFamily="49" charset="0"/>
+                <a:cs typeface="Courier New" panose="02070309020205020404" pitchFamily="49" charset="0"/>
+              </a:rPr>
+              <a:t>Figure</a:t>
+            </a:r>
+            <a:r>
               <a:rPr lang="nl-NL" sz="2000" dirty="0"/>
-              <a:t>Figuur aanmaken:</a:t>
+              <a:t> aanmaken:</a:t>
             </a:r>
           </a:p>
           <a:p>
@@ -14898,10 +15131,6 @@
             <a:pPr marL="0" indent="0">
               <a:buNone/>
             </a:pPr>
-            <a:r>
-              <a:rPr lang="nl-NL" sz="2000" dirty="0"/>
-              <a:t>Een </a:t>
-            </a:r>
             <a:r>
               <a:rPr lang="nl-NL" sz="2000" dirty="0" err="1">
                 <a:latin typeface="Courier New" panose="02070309020205020404" pitchFamily="49" charset="0"/>
@@ -16999,7 +17228,7 @@
               <a:buAutoNum type="arabicPeriod"/>
             </a:pPr>
             <a:r>
-              <a:rPr lang="nl-NL" sz="1600" dirty="0"/>
+              <a:rPr lang="nl-NL" sz="1800" dirty="0"/>
               <a:t>Een staafdiagram met omzet per klant (top 15).</a:t>
             </a:r>
           </a:p>
@@ -17008,7 +17237,7 @@
               <a:buFont typeface="Arial" panose="020B0604020202020204" pitchFamily="34" charset="0"/>
               <a:buAutoNum type="arabicPeriod"/>
             </a:pPr>
-            <a:endParaRPr lang="nl-NL" sz="1600" dirty="0"/>
+            <a:endParaRPr lang="nl-NL" sz="1800" dirty="0"/>
           </a:p>
           <a:p>
             <a:pPr marL="914400" lvl="1" indent="-457200">
@@ -17016,7 +17245,7 @@
               <a:buAutoNum type="arabicPeriod"/>
             </a:pPr>
             <a:r>
-              <a:rPr lang="nl-NL" sz="1600" dirty="0"/>
+              <a:rPr lang="nl-NL" sz="1800" dirty="0"/>
               <a:t>Een lijndiagram met omzet per dag.</a:t>
             </a:r>
           </a:p>
@@ -24542,7 +24771,7 @@
           <a:lstStyle/>
           <a:p>
             <a:pPr marL="457200" indent="-457200">
-              <a:buFont typeface="Arial" panose="020B0604020202020204" pitchFamily="34" charset="0"/>
+              <a:buFont typeface="+mj-lt"/>
               <a:buAutoNum type="arabicPeriod"/>
             </a:pPr>
             <a:r>
@@ -24570,13 +24799,14 @@
           </a:p>
           <a:p>
             <a:pPr marL="457200" indent="-457200">
+              <a:buFont typeface="+mj-lt"/>
               <a:buAutoNum type="arabicPeriod"/>
             </a:pPr>
             <a:endParaRPr lang="nl-NL" sz="2000" dirty="0"/>
           </a:p>
           <a:p>
             <a:pPr marL="457200" indent="-457200">
-              <a:buFont typeface="Arial" panose="020B0604020202020204" pitchFamily="34" charset="0"/>
+              <a:buFont typeface="+mj-lt"/>
               <a:buAutoNum type="arabicPeriod"/>
             </a:pPr>
             <a:r>
@@ -24607,22 +24837,16 @@
             <a:endParaRPr lang="nl-NL" sz="1600" dirty="0"/>
           </a:p>
           <a:p>
-            <a:pPr lvl="1"/>
-            <a:r>
-              <a:rPr lang="nl-NL" sz="1600" dirty="0"/>
-              <a:t>Bonus: Is dit type efficiënter of juist niet?</a:t>
-            </a:r>
+            <a:pPr marL="457200" indent="-457200">
+              <a:buFont typeface="+mj-lt"/>
+              <a:buAutoNum type="arabicPeriod"/>
+            </a:pPr>
             <a:endParaRPr lang="nl-NL" sz="2000" dirty="0"/>
           </a:p>
           <a:p>
-            <a:pPr marL="0" indent="0">
-              <a:buNone/>
-            </a:pPr>
-            <a:endParaRPr lang="nl-NL" sz="2000" dirty="0"/>
-          </a:p>
-          <a:p>
             <a:pPr marL="457200" indent="-457200">
-              <a:buAutoNum type="arabicPeriod" startAt="3"/>
+              <a:buFont typeface="+mj-lt"/>
+              <a:buAutoNum type="arabicPeriod"/>
             </a:pPr>
             <a:r>
               <a:rPr lang="nl-NL" sz="2000" noProof="0" dirty="0"/>
@@ -24655,14 +24879,16 @@
             </a:r>
           </a:p>
           <a:p>
-            <a:pPr marL="0" indent="0">
-              <a:buNone/>
+            <a:pPr marL="457200" indent="-457200">
+              <a:buFont typeface="+mj-lt"/>
+              <a:buAutoNum type="arabicPeriod"/>
             </a:pPr>
             <a:endParaRPr lang="nl-NL" sz="2000" dirty="0"/>
           </a:p>
           <a:p>
             <a:pPr marL="457200" indent="-457200">
-              <a:buAutoNum type="arabicPeriod" startAt="3"/>
+              <a:buFont typeface="+mj-lt"/>
+              <a:buAutoNum type="arabicPeriod"/>
             </a:pPr>
             <a:r>
               <a:rPr lang="nl-NL" sz="2000" dirty="0"/>

</xml_diff>

<commit_message>
Update part 3 Python trainees
</commit_message>
<xml_diff>
--- a/python_trainees/3_pandas_plotting/python_traineeship_3.pptx
+++ b/python_trainees/3_pandas_plotting/python_traineeship_3.pptx
@@ -242,7 +242,7 @@
           <a:p>
             <a:fld id="{16CF57F2-0494-4F4F-A7AD-E8F59CFB368A}" type="datetimeFigureOut">
               <a:rPr lang="en-NL" smtClean="0"/>
-              <a:t>29/09/2023</a:t>
+              <a:t>03/10/2023</a:t>
             </a:fld>
             <a:endParaRPr lang="en-NL"/>
           </a:p>
@@ -827,7 +827,7 @@
           <a:p>
             <a:fld id="{0EBB069A-003F-4FC0-8534-236B0C5C7B5F}" type="datetimeFigureOut">
               <a:rPr lang="en-NL" smtClean="0"/>
-              <a:t>29/09/2023</a:t>
+              <a:t>03/10/2023</a:t>
             </a:fld>
             <a:endParaRPr lang="en-NL"/>
           </a:p>
@@ -1027,7 +1027,7 @@
           <a:p>
             <a:fld id="{0EBB069A-003F-4FC0-8534-236B0C5C7B5F}" type="datetimeFigureOut">
               <a:rPr lang="en-NL" smtClean="0"/>
-              <a:t>29/09/2023</a:t>
+              <a:t>03/10/2023</a:t>
             </a:fld>
             <a:endParaRPr lang="en-NL"/>
           </a:p>
@@ -1237,7 +1237,7 @@
           <a:p>
             <a:fld id="{0EBB069A-003F-4FC0-8534-236B0C5C7B5F}" type="datetimeFigureOut">
               <a:rPr lang="en-NL" smtClean="0"/>
-              <a:t>29/09/2023</a:t>
+              <a:t>03/10/2023</a:t>
             </a:fld>
             <a:endParaRPr lang="en-NL"/>
           </a:p>
@@ -1437,7 +1437,7 @@
           <a:p>
             <a:fld id="{0EBB069A-003F-4FC0-8534-236B0C5C7B5F}" type="datetimeFigureOut">
               <a:rPr lang="en-NL" smtClean="0"/>
-              <a:t>29/09/2023</a:t>
+              <a:t>03/10/2023</a:t>
             </a:fld>
             <a:endParaRPr lang="en-NL"/>
           </a:p>
@@ -1713,7 +1713,7 @@
           <a:p>
             <a:fld id="{0EBB069A-003F-4FC0-8534-236B0C5C7B5F}" type="datetimeFigureOut">
               <a:rPr lang="en-NL" smtClean="0"/>
-              <a:t>29/09/2023</a:t>
+              <a:t>03/10/2023</a:t>
             </a:fld>
             <a:endParaRPr lang="en-NL"/>
           </a:p>
@@ -1981,7 +1981,7 @@
           <a:p>
             <a:fld id="{0EBB069A-003F-4FC0-8534-236B0C5C7B5F}" type="datetimeFigureOut">
               <a:rPr lang="en-NL" smtClean="0"/>
-              <a:t>29/09/2023</a:t>
+              <a:t>03/10/2023</a:t>
             </a:fld>
             <a:endParaRPr lang="en-NL"/>
           </a:p>
@@ -2396,7 +2396,7 @@
           <a:p>
             <a:fld id="{0EBB069A-003F-4FC0-8534-236B0C5C7B5F}" type="datetimeFigureOut">
               <a:rPr lang="en-NL" smtClean="0"/>
-              <a:t>29/09/2023</a:t>
+              <a:t>03/10/2023</a:t>
             </a:fld>
             <a:endParaRPr lang="en-NL"/>
           </a:p>
@@ -2538,7 +2538,7 @@
           <a:p>
             <a:fld id="{0EBB069A-003F-4FC0-8534-236B0C5C7B5F}" type="datetimeFigureOut">
               <a:rPr lang="en-NL" smtClean="0"/>
-              <a:t>29/09/2023</a:t>
+              <a:t>03/10/2023</a:t>
             </a:fld>
             <a:endParaRPr lang="en-NL"/>
           </a:p>
@@ -2651,7 +2651,7 @@
           <a:p>
             <a:fld id="{0EBB069A-003F-4FC0-8534-236B0C5C7B5F}" type="datetimeFigureOut">
               <a:rPr lang="en-NL" smtClean="0"/>
-              <a:t>29/09/2023</a:t>
+              <a:t>03/10/2023</a:t>
             </a:fld>
             <a:endParaRPr lang="en-NL"/>
           </a:p>
@@ -2964,7 +2964,7 @@
           <a:p>
             <a:fld id="{0EBB069A-003F-4FC0-8534-236B0C5C7B5F}" type="datetimeFigureOut">
               <a:rPr lang="en-NL" smtClean="0"/>
-              <a:t>29/09/2023</a:t>
+              <a:t>03/10/2023</a:t>
             </a:fld>
             <a:endParaRPr lang="en-NL"/>
           </a:p>
@@ -3253,7 +3253,7 @@
           <a:p>
             <a:fld id="{0EBB069A-003F-4FC0-8534-236B0C5C7B5F}" type="datetimeFigureOut">
               <a:rPr lang="en-NL" smtClean="0"/>
-              <a:t>29/09/2023</a:t>
+              <a:t>03/10/2023</a:t>
             </a:fld>
             <a:endParaRPr lang="en-NL"/>
           </a:p>
@@ -3496,7 +3496,7 @@
           <a:p>
             <a:fld id="{0EBB069A-003F-4FC0-8534-236B0C5C7B5F}" type="datetimeFigureOut">
               <a:rPr lang="en-NL" smtClean="0"/>
-              <a:t>29/09/2023</a:t>
+              <a:t>03/10/2023</a:t>
             </a:fld>
             <a:endParaRPr lang="en-NL"/>
           </a:p>
@@ -21352,20 +21352,57 @@
             </a:r>
           </a:p>
           <a:p>
-            <a:pPr marL="457200" indent="-457200">
-              <a:buFont typeface="Arial" panose="020B0604020202020204" pitchFamily="34" charset="0"/>
-              <a:buAutoNum type="arabicPeriod"/>
+            <a:pPr marL="0" indent="0">
+              <a:buNone/>
             </a:pPr>
             <a:endParaRPr lang="nl-NL" sz="2000" dirty="0"/>
           </a:p>
           <a:p>
-            <a:pPr marL="457200" indent="-457200">
-              <a:buFont typeface="Arial" panose="020B0604020202020204" pitchFamily="34" charset="0"/>
-              <a:buAutoNum type="arabicPeriod"/>
+            <a:pPr marL="0" indent="0">
+              <a:buNone/>
             </a:pPr>
             <a:r>
               <a:rPr lang="nl-NL" sz="2000" dirty="0"/>
-              <a:t>Bonus: Maak de functie generiek zodat deze op een willekeurig </a:t>
+              <a:t>Tip: Gebruik </a:t>
+            </a:r>
+            <a:r>
+              <a:rPr lang="nl-NL" sz="2000" dirty="0" err="1">
+                <a:latin typeface="Courier New" panose="02070309020205020404" pitchFamily="49" charset="0"/>
+                <a:cs typeface="Courier New" panose="02070309020205020404" pitchFamily="49" charset="0"/>
+              </a:rPr>
+              <a:t>DataFrame.select_dtypes</a:t>
+            </a:r>
+            <a:r>
+              <a:rPr lang="nl-NL" sz="2000" dirty="0">
+                <a:latin typeface="Courier New" panose="02070309020205020404" pitchFamily="49" charset="0"/>
+                <a:cs typeface="Courier New" panose="02070309020205020404" pitchFamily="49" charset="0"/>
+              </a:rPr>
+              <a:t>(…)</a:t>
+            </a:r>
+            <a:r>
+              <a:rPr lang="nl-NL" sz="2000" dirty="0"/>
+              <a:t>.</a:t>
+            </a:r>
+          </a:p>
+          <a:p>
+            <a:pPr marL="0" indent="0">
+              <a:buNone/>
+            </a:pPr>
+            <a:endParaRPr lang="nl-NL" sz="2000" dirty="0"/>
+          </a:p>
+          <a:p>
+            <a:pPr marL="0" indent="0">
+              <a:buNone/>
+            </a:pPr>
+            <a:endParaRPr lang="nl-NL" sz="2000" dirty="0"/>
+          </a:p>
+          <a:p>
+            <a:pPr marL="0" indent="0">
+              <a:buNone/>
+            </a:pPr>
+            <a:r>
+              <a:rPr lang="nl-NL" sz="2000" dirty="0"/>
+              <a:t>Bonus: Maak een generieke functie die op een willekeurig </a:t>
             </a:r>
             <a:r>
               <a:rPr lang="nl-NL" sz="2000" dirty="0" err="1"/>

</xml_diff>